<commit_message>
PPT finished. UI finished. Still need 1. wallet 2. software to simulate multiple physical lockers
</commit_message>
<xml_diff>
--- a/CatchBo.pptx
+++ b/CatchBo.pptx
@@ -5,36 +5,38 @@
     <p:sldMasterId id="2147483648" r:id="rId1"/>
   </p:sldMasterIdLst>
   <p:notesMasterIdLst>
-    <p:notesMasterId r:id="rId29"/>
+    <p:notesMasterId r:id="rId31"/>
   </p:notesMasterIdLst>
   <p:sldIdLst>
     <p:sldId id="257" r:id="rId2"/>
     <p:sldId id="279" r:id="rId3"/>
     <p:sldId id="280" r:id="rId4"/>
     <p:sldId id="276" r:id="rId5"/>
-    <p:sldId id="277" r:id="rId6"/>
-    <p:sldId id="278" r:id="rId7"/>
-    <p:sldId id="256" r:id="rId8"/>
-    <p:sldId id="258" r:id="rId9"/>
-    <p:sldId id="259" r:id="rId10"/>
-    <p:sldId id="260" r:id="rId11"/>
-    <p:sldId id="261" r:id="rId12"/>
-    <p:sldId id="262" r:id="rId13"/>
-    <p:sldId id="263" r:id="rId14"/>
-    <p:sldId id="264" r:id="rId15"/>
-    <p:sldId id="265" r:id="rId16"/>
-    <p:sldId id="282" r:id="rId17"/>
-    <p:sldId id="268" r:id="rId18"/>
-    <p:sldId id="273" r:id="rId19"/>
-    <p:sldId id="270" r:id="rId20"/>
-    <p:sldId id="266" r:id="rId21"/>
-    <p:sldId id="267" r:id="rId22"/>
-    <p:sldId id="274" r:id="rId23"/>
-    <p:sldId id="269" r:id="rId24"/>
-    <p:sldId id="271" r:id="rId25"/>
-    <p:sldId id="272" r:id="rId26"/>
-    <p:sldId id="275" r:id="rId27"/>
-    <p:sldId id="281" r:id="rId28"/>
+    <p:sldId id="283" r:id="rId6"/>
+    <p:sldId id="277" r:id="rId7"/>
+    <p:sldId id="278" r:id="rId8"/>
+    <p:sldId id="256" r:id="rId9"/>
+    <p:sldId id="258" r:id="rId10"/>
+    <p:sldId id="259" r:id="rId11"/>
+    <p:sldId id="260" r:id="rId12"/>
+    <p:sldId id="261" r:id="rId13"/>
+    <p:sldId id="262" r:id="rId14"/>
+    <p:sldId id="263" r:id="rId15"/>
+    <p:sldId id="264" r:id="rId16"/>
+    <p:sldId id="265" r:id="rId17"/>
+    <p:sldId id="282" r:id="rId18"/>
+    <p:sldId id="268" r:id="rId19"/>
+    <p:sldId id="273" r:id="rId20"/>
+    <p:sldId id="270" r:id="rId21"/>
+    <p:sldId id="284" r:id="rId22"/>
+    <p:sldId id="266" r:id="rId23"/>
+    <p:sldId id="274" r:id="rId24"/>
+    <p:sldId id="267" r:id="rId25"/>
+    <p:sldId id="269" r:id="rId26"/>
+    <p:sldId id="271" r:id="rId27"/>
+    <p:sldId id="272" r:id="rId28"/>
+    <p:sldId id="275" r:id="rId29"/>
+    <p:sldId id="281" r:id="rId30"/>
   </p:sldIdLst>
   <p:sldSz cx="12192000" cy="6858000"/>
   <p:notesSz cx="6858000" cy="9144000"/>
@@ -223,7 +225,7 @@
           <a:p>
             <a:fld id="{35DA5B65-FF5A-4949-8C78-8AC5C84B93F6}" type="datetimeFigureOut">
               <a:rPr lang="zh-TW" altLang="en-US" smtClean="0"/>
-              <a:t>2018/7/9</a:t>
+              <a:t>2018/7/22</a:t>
             </a:fld>
             <a:endParaRPr lang="zh-TW" altLang="en-US"/>
           </a:p>
@@ -535,10 +537,6 @@
           <a:bodyPr/>
           <a:lstStyle/>
           <a:p>
-            <a:r>
-              <a:rPr lang="zh-TW" altLang="en-US" dirty="0" smtClean="0"/>
-              <a:t>跟之前一樣</a:t>
-            </a:r>
             <a:endParaRPr lang="zh-TW" altLang="en-US" dirty="0"/>
           </a:p>
         </p:txBody>
@@ -570,6 +568,90 @@
     <p:extLst>
       <p:ext uri="{BB962C8B-B14F-4D97-AF65-F5344CB8AC3E}">
         <p14:creationId xmlns:p14="http://schemas.microsoft.com/office/powerpoint/2010/main" val="190371080"/>
+      </p:ext>
+    </p:extLst>
+  </p:cSld>
+  <p:clrMapOvr>
+    <a:masterClrMapping/>
+  </p:clrMapOvr>
+</p:notes>
+</file>
+
+<file path=ppt/notesSlides/notesSlide2.xml><?xml version="1.0" encoding="utf-8"?>
+<p:notes xmlns:a="http://schemas.openxmlformats.org/drawingml/2006/main" xmlns:r="http://schemas.openxmlformats.org/officeDocument/2006/relationships" xmlns:p="http://schemas.openxmlformats.org/presentationml/2006/main">
+  <p:cSld>
+    <p:spTree>
+      <p:nvGrpSpPr>
+        <p:cNvPr id="1" name=""/>
+        <p:cNvGrpSpPr/>
+        <p:nvPr/>
+      </p:nvGrpSpPr>
+      <p:grpSpPr>
+        <a:xfrm>
+          <a:off x="0" y="0"/>
+          <a:ext cx="0" cy="0"/>
+          <a:chOff x="0" y="0"/>
+          <a:chExt cx="0" cy="0"/>
+        </a:xfrm>
+      </p:grpSpPr>
+      <p:sp>
+        <p:nvSpPr>
+          <p:cNvPr id="2" name="投影片圖像版面配置區 1"/>
+          <p:cNvSpPr>
+            <a:spLocks noGrp="1" noRot="1" noChangeAspect="1"/>
+          </p:cNvSpPr>
+          <p:nvPr>
+            <p:ph type="sldImg"/>
+          </p:nvPr>
+        </p:nvSpPr>
+        <p:spPr/>
+      </p:sp>
+      <p:sp>
+        <p:nvSpPr>
+          <p:cNvPr id="3" name="備忘稿版面配置區 2"/>
+          <p:cNvSpPr>
+            <a:spLocks noGrp="1"/>
+          </p:cNvSpPr>
+          <p:nvPr>
+            <p:ph type="body" idx="1"/>
+          </p:nvPr>
+        </p:nvSpPr>
+        <p:spPr/>
+        <p:txBody>
+          <a:bodyPr/>
+          <a:lstStyle/>
+          <a:p>
+            <a:endParaRPr lang="zh-TW" altLang="en-US" dirty="0"/>
+          </a:p>
+        </p:txBody>
+      </p:sp>
+      <p:sp>
+        <p:nvSpPr>
+          <p:cNvPr id="4" name="投影片編號版面配置區 3"/>
+          <p:cNvSpPr>
+            <a:spLocks noGrp="1"/>
+          </p:cNvSpPr>
+          <p:nvPr>
+            <p:ph type="sldNum" sz="quarter" idx="10"/>
+          </p:nvPr>
+        </p:nvSpPr>
+        <p:spPr/>
+        <p:txBody>
+          <a:bodyPr/>
+          <a:lstStyle/>
+          <a:p>
+            <a:fld id="{72DAF05B-E42E-49AC-BE56-1348F132AD9A}" type="slidenum">
+              <a:rPr lang="zh-TW" altLang="en-US" smtClean="0"/>
+              <a:t>6</a:t>
+            </a:fld>
+            <a:endParaRPr lang="zh-TW" altLang="en-US"/>
+          </a:p>
+        </p:txBody>
+      </p:sp>
+    </p:spTree>
+    <p:extLst>
+      <p:ext uri="{BB962C8B-B14F-4D97-AF65-F5344CB8AC3E}">
+        <p14:creationId xmlns:p14="http://schemas.microsoft.com/office/powerpoint/2010/main" val="762146388"/>
       </p:ext>
     </p:extLst>
   </p:cSld>
@@ -710,7 +792,7 @@
           <a:p>
             <a:fld id="{B40DF12A-1B60-4DFD-9E28-CDD98DEE53C4}" type="datetimeFigureOut">
               <a:rPr lang="zh-TW" altLang="en-US" smtClean="0"/>
-              <a:t>2018/7/9</a:t>
+              <a:t>2018/7/22</a:t>
             </a:fld>
             <a:endParaRPr lang="zh-TW" altLang="en-US"/>
           </a:p>
@@ -880,7 +962,7 @@
           <a:p>
             <a:fld id="{B40DF12A-1B60-4DFD-9E28-CDD98DEE53C4}" type="datetimeFigureOut">
               <a:rPr lang="zh-TW" altLang="en-US" smtClean="0"/>
-              <a:t>2018/7/9</a:t>
+              <a:t>2018/7/22</a:t>
             </a:fld>
             <a:endParaRPr lang="zh-TW" altLang="en-US"/>
           </a:p>
@@ -1060,7 +1142,7 @@
           <a:p>
             <a:fld id="{B40DF12A-1B60-4DFD-9E28-CDD98DEE53C4}" type="datetimeFigureOut">
               <a:rPr lang="zh-TW" altLang="en-US" smtClean="0"/>
-              <a:t>2018/7/9</a:t>
+              <a:t>2018/7/22</a:t>
             </a:fld>
             <a:endParaRPr lang="zh-TW" altLang="en-US"/>
           </a:p>
@@ -1230,7 +1312,7 @@
           <a:p>
             <a:fld id="{B40DF12A-1B60-4DFD-9E28-CDD98DEE53C4}" type="datetimeFigureOut">
               <a:rPr lang="zh-TW" altLang="en-US" smtClean="0"/>
-              <a:t>2018/7/9</a:t>
+              <a:t>2018/7/22</a:t>
             </a:fld>
             <a:endParaRPr lang="zh-TW" altLang="en-US"/>
           </a:p>
@@ -1476,7 +1558,7 @@
           <a:p>
             <a:fld id="{B40DF12A-1B60-4DFD-9E28-CDD98DEE53C4}" type="datetimeFigureOut">
               <a:rPr lang="zh-TW" altLang="en-US" smtClean="0"/>
-              <a:t>2018/7/9</a:t>
+              <a:t>2018/7/22</a:t>
             </a:fld>
             <a:endParaRPr lang="zh-TW" altLang="en-US"/>
           </a:p>
@@ -1708,7 +1790,7 @@
           <a:p>
             <a:fld id="{B40DF12A-1B60-4DFD-9E28-CDD98DEE53C4}" type="datetimeFigureOut">
               <a:rPr lang="zh-TW" altLang="en-US" smtClean="0"/>
-              <a:t>2018/7/9</a:t>
+              <a:t>2018/7/22</a:t>
             </a:fld>
             <a:endParaRPr lang="zh-TW" altLang="en-US"/>
           </a:p>
@@ -2075,7 +2157,7 @@
           <a:p>
             <a:fld id="{B40DF12A-1B60-4DFD-9E28-CDD98DEE53C4}" type="datetimeFigureOut">
               <a:rPr lang="zh-TW" altLang="en-US" smtClean="0"/>
-              <a:t>2018/7/9</a:t>
+              <a:t>2018/7/22</a:t>
             </a:fld>
             <a:endParaRPr lang="zh-TW" altLang="en-US"/>
           </a:p>
@@ -2193,7 +2275,7 @@
           <a:p>
             <a:fld id="{B40DF12A-1B60-4DFD-9E28-CDD98DEE53C4}" type="datetimeFigureOut">
               <a:rPr lang="zh-TW" altLang="en-US" smtClean="0"/>
-              <a:t>2018/7/9</a:t>
+              <a:t>2018/7/22</a:t>
             </a:fld>
             <a:endParaRPr lang="zh-TW" altLang="en-US"/>
           </a:p>
@@ -2288,7 +2370,7 @@
           <a:p>
             <a:fld id="{B40DF12A-1B60-4DFD-9E28-CDD98DEE53C4}" type="datetimeFigureOut">
               <a:rPr lang="zh-TW" altLang="en-US" smtClean="0"/>
-              <a:t>2018/7/9</a:t>
+              <a:t>2018/7/22</a:t>
             </a:fld>
             <a:endParaRPr lang="zh-TW" altLang="en-US"/>
           </a:p>
@@ -2565,7 +2647,7 @@
           <a:p>
             <a:fld id="{B40DF12A-1B60-4DFD-9E28-CDD98DEE53C4}" type="datetimeFigureOut">
               <a:rPr lang="zh-TW" altLang="en-US" smtClean="0"/>
-              <a:t>2018/7/9</a:t>
+              <a:t>2018/7/22</a:t>
             </a:fld>
             <a:endParaRPr lang="zh-TW" altLang="en-US"/>
           </a:p>
@@ -2818,7 +2900,7 @@
           <a:p>
             <a:fld id="{B40DF12A-1B60-4DFD-9E28-CDD98DEE53C4}" type="datetimeFigureOut">
               <a:rPr lang="zh-TW" altLang="en-US" smtClean="0"/>
-              <a:t>2018/7/9</a:t>
+              <a:t>2018/7/22</a:t>
             </a:fld>
             <a:endParaRPr lang="zh-TW" altLang="en-US"/>
           </a:p>
@@ -3031,7 +3113,7 @@
           <a:p>
             <a:fld id="{B40DF12A-1B60-4DFD-9E28-CDD98DEE53C4}" type="datetimeFigureOut">
               <a:rPr lang="zh-TW" altLang="en-US" smtClean="0"/>
-              <a:t>2018/7/9</a:t>
+              <a:t>2018/7/22</a:t>
             </a:fld>
             <a:endParaRPr lang="zh-TW" altLang="en-US"/>
           </a:p>
@@ -3549,7 +3631,7 @@
         </p:nvSpPr>
         <p:spPr>
           <a:xfrm>
-            <a:off x="862054" y="0"/>
+            <a:off x="846151" y="159335"/>
             <a:ext cx="10515600" cy="1325563"/>
           </a:xfrm>
         </p:spPr>
@@ -3560,7 +3642,15 @@
             <a:pPr algn="ctr"/>
             <a:r>
               <a:rPr lang="zh-TW" altLang="en-US" dirty="0" smtClean="0"/>
-              <a:t>販售商品頁面</a:t>
+              <a:t>輸入帳密</a:t>
+            </a:r>
+            <a:r>
+              <a:rPr lang="en-US" altLang="zh-TW" dirty="0" smtClean="0"/>
+              <a:t>/</a:t>
+            </a:r>
+            <a:r>
+              <a:rPr lang="zh-TW" altLang="en-US" dirty="0" smtClean="0"/>
+              <a:t>登入成功</a:t>
             </a:r>
             <a:endParaRPr lang="zh-TW" altLang="en-US" dirty="0"/>
           </a:p>
@@ -3588,8 +3678,38 @@
         </p:blipFill>
         <p:spPr>
           <a:xfrm>
-            <a:off x="557916" y="1037825"/>
-            <a:ext cx="11364125" cy="5673076"/>
+            <a:off x="0" y="1141517"/>
+            <a:ext cx="10058400" cy="4981354"/>
+          </a:xfrm>
+          <a:prstGeom prst="rect">
+            <a:avLst/>
+          </a:prstGeom>
+        </p:spPr>
+      </p:pic>
+      <p:pic>
+        <p:nvPicPr>
+          <p:cNvPr id="6" name="圖片 5"/>
+          <p:cNvPicPr>
+            <a:picLocks noChangeAspect="1"/>
+          </p:cNvPicPr>
+          <p:nvPr/>
+        </p:nvPicPr>
+        <p:blipFill>
+          <a:blip r:embed="rId3">
+            <a:extLst>
+              <a:ext uri="{28A0092B-C50C-407E-A947-70E740481C1C}">
+                <a14:useLocalDpi xmlns:a14="http://schemas.microsoft.com/office/drawing/2010/main" val="0"/>
+              </a:ext>
+            </a:extLst>
+          </a:blip>
+          <a:stretch>
+            <a:fillRect/>
+          </a:stretch>
+        </p:blipFill>
+        <p:spPr>
+          <a:xfrm>
+            <a:off x="4230094" y="1844766"/>
+            <a:ext cx="10058400" cy="5013234"/>
           </a:xfrm>
           <a:prstGeom prst="rect">
             <a:avLst/>
@@ -3599,7 +3719,7 @@
     </p:spTree>
     <p:extLst>
       <p:ext uri="{BB962C8B-B14F-4D97-AF65-F5344CB8AC3E}">
-        <p14:creationId xmlns:p14="http://schemas.microsoft.com/office/powerpoint/2010/main" val="524690949"/>
+        <p14:creationId xmlns:p14="http://schemas.microsoft.com/office/powerpoint/2010/main" val="3424059863"/>
       </p:ext>
     </p:extLst>
   </p:cSld>
@@ -3643,7 +3763,12 @@
             <p:ph type="title"/>
           </p:nvPr>
         </p:nvSpPr>
-        <p:spPr/>
+        <p:spPr>
+          <a:xfrm>
+            <a:off x="862054" y="0"/>
+            <a:ext cx="10515600" cy="1325563"/>
+          </a:xfrm>
+        </p:spPr>
         <p:txBody>
           <a:bodyPr/>
           <a:lstStyle/>
@@ -3651,15 +3776,7 @@
             <a:pPr algn="ctr"/>
             <a:r>
               <a:rPr lang="zh-TW" altLang="en-US" dirty="0" smtClean="0"/>
-              <a:t>填寫欲售商品資訊</a:t>
-            </a:r>
-            <a:r>
-              <a:rPr lang="en-US" altLang="zh-TW" dirty="0" smtClean="0"/>
-              <a:t>/</a:t>
-            </a:r>
-            <a:r>
-              <a:rPr lang="zh-TW" altLang="en-US" dirty="0" smtClean="0"/>
-              <a:t>刊登成功</a:t>
+              <a:t>販售商品頁面</a:t>
             </a:r>
             <a:endParaRPr lang="zh-TW" altLang="en-US" dirty="0"/>
           </a:p>
@@ -3667,7 +3784,7 @@
       </p:sp>
       <p:pic>
         <p:nvPicPr>
-          <p:cNvPr id="3" name="圖片 2"/>
+          <p:cNvPr id="4" name="圖片 3"/>
           <p:cNvPicPr>
             <a:picLocks noChangeAspect="1"/>
           </p:cNvPicPr>
@@ -3687,38 +3804,8 @@
         </p:blipFill>
         <p:spPr>
           <a:xfrm>
-            <a:off x="0" y="1422760"/>
-            <a:ext cx="10058400" cy="5002730"/>
-          </a:xfrm>
-          <a:prstGeom prst="rect">
-            <a:avLst/>
-          </a:prstGeom>
-        </p:spPr>
-      </p:pic>
-      <p:pic>
-        <p:nvPicPr>
-          <p:cNvPr id="4" name="圖片 3"/>
-          <p:cNvPicPr>
-            <a:picLocks noChangeAspect="1"/>
-          </p:cNvPicPr>
-          <p:nvPr/>
-        </p:nvPicPr>
-        <p:blipFill>
-          <a:blip r:embed="rId3">
-            <a:extLst>
-              <a:ext uri="{28A0092B-C50C-407E-A947-70E740481C1C}">
-                <a14:useLocalDpi xmlns:a14="http://schemas.microsoft.com/office/drawing/2010/main" val="0"/>
-              </a:ext>
-            </a:extLst>
-          </a:blip>
-          <a:stretch>
-            <a:fillRect/>
-          </a:stretch>
-        </p:blipFill>
-        <p:spPr>
-          <a:xfrm>
-            <a:off x="4293703" y="2129788"/>
-            <a:ext cx="10058400" cy="5239937"/>
+            <a:off x="1090654" y="1181225"/>
+            <a:ext cx="10058400" cy="4994552"/>
           </a:xfrm>
           <a:prstGeom prst="rect">
             <a:avLst/>
@@ -3728,7 +3815,7 @@
     </p:spTree>
     <p:extLst>
       <p:ext uri="{BB962C8B-B14F-4D97-AF65-F5344CB8AC3E}">
-        <p14:creationId xmlns:p14="http://schemas.microsoft.com/office/powerpoint/2010/main" val="3545366652"/>
+        <p14:creationId xmlns:p14="http://schemas.microsoft.com/office/powerpoint/2010/main" val="524690949"/>
       </p:ext>
     </p:extLst>
   </p:cSld>
@@ -3780,18 +3867,23 @@
             <a:pPr algn="ctr"/>
             <a:r>
               <a:rPr lang="zh-TW" altLang="en-US" dirty="0" smtClean="0"/>
-              <a:t>瀏覽商品頁</a:t>
-            </a:r>
-            <a:r>
-              <a:rPr lang="zh-TW" altLang="en-US" dirty="0"/>
-              <a:t>面</a:t>
-            </a:r>
+              <a:t>填寫欲售商品資訊</a:t>
+            </a:r>
+            <a:r>
+              <a:rPr lang="en-US" altLang="zh-TW" dirty="0" smtClean="0"/>
+              <a:t>/</a:t>
+            </a:r>
+            <a:r>
+              <a:rPr lang="zh-TW" altLang="en-US" dirty="0" smtClean="0"/>
+              <a:t>刊登成功</a:t>
+            </a:r>
+            <a:endParaRPr lang="zh-TW" altLang="en-US" dirty="0"/>
           </a:p>
         </p:txBody>
       </p:sp>
       <p:pic>
         <p:nvPicPr>
-          <p:cNvPr id="6" name="圖片 5"/>
+          <p:cNvPr id="5" name="圖片 4"/>
           <p:cNvPicPr>
             <a:picLocks noChangeAspect="1"/>
           </p:cNvPicPr>
@@ -3811,8 +3903,8 @@
         </p:blipFill>
         <p:spPr>
           <a:xfrm>
-            <a:off x="-95415" y="1363907"/>
-            <a:ext cx="10058400" cy="5008002"/>
+            <a:off x="0" y="1303191"/>
+            <a:ext cx="10058400" cy="5042582"/>
           </a:xfrm>
           <a:prstGeom prst="rect">
             <a:avLst/>
@@ -3821,7 +3913,7 @@
       </p:pic>
       <p:pic>
         <p:nvPicPr>
-          <p:cNvPr id="4" name="圖片 3"/>
+          <p:cNvPr id="6" name="圖片 5"/>
           <p:cNvPicPr>
             <a:picLocks noChangeAspect="1"/>
           </p:cNvPicPr>
@@ -3841,8 +3933,8 @@
         </p:blipFill>
         <p:spPr>
           <a:xfrm>
-            <a:off x="4277802" y="1984032"/>
-            <a:ext cx="10058400" cy="5021246"/>
+            <a:off x="3013545" y="1690688"/>
+            <a:ext cx="10058400" cy="5010523"/>
           </a:xfrm>
           <a:prstGeom prst="rect">
             <a:avLst/>
@@ -3852,7 +3944,7 @@
     </p:spTree>
     <p:extLst>
       <p:ext uri="{BB962C8B-B14F-4D97-AF65-F5344CB8AC3E}">
-        <p14:creationId xmlns:p14="http://schemas.microsoft.com/office/powerpoint/2010/main" val="3533658303"/>
+        <p14:creationId xmlns:p14="http://schemas.microsoft.com/office/powerpoint/2010/main" val="3545366652"/>
       </p:ext>
     </p:extLst>
   </p:cSld>
@@ -3904,17 +3996,12 @@
             <a:pPr algn="ctr"/>
             <a:r>
               <a:rPr lang="zh-TW" altLang="en-US" dirty="0" smtClean="0"/>
-              <a:t>單品庫存查詢</a:t>
-            </a:r>
-            <a:r>
-              <a:rPr lang="en-US" altLang="zh-TW" dirty="0" smtClean="0"/>
-              <a:t>/</a:t>
-            </a:r>
-            <a:r>
-              <a:rPr lang="zh-TW" altLang="en-US" dirty="0" smtClean="0"/>
-              <a:t>下訂單頁面</a:t>
-            </a:r>
-            <a:endParaRPr lang="zh-TW" altLang="en-US" dirty="0"/>
+              <a:t>瀏覽商品頁</a:t>
+            </a:r>
+            <a:r>
+              <a:rPr lang="zh-TW" altLang="en-US" dirty="0"/>
+              <a:t>面</a:t>
+            </a:r>
           </a:p>
         </p:txBody>
       </p:sp>
@@ -3940,8 +4027,8 @@
         </p:blipFill>
         <p:spPr>
           <a:xfrm>
-            <a:off x="-620201" y="1356733"/>
-            <a:ext cx="10058400" cy="5021255"/>
+            <a:off x="0" y="1316032"/>
+            <a:ext cx="10058400" cy="5034516"/>
           </a:xfrm>
           <a:prstGeom prst="rect">
             <a:avLst/>
@@ -3950,7 +4037,7 @@
       </p:pic>
       <p:pic>
         <p:nvPicPr>
-          <p:cNvPr id="4" name="圖片 3"/>
+          <p:cNvPr id="5" name="圖片 4"/>
           <p:cNvPicPr>
             <a:picLocks noChangeAspect="1"/>
           </p:cNvPicPr>
@@ -3970,8 +4057,8 @@
         </p:blipFill>
         <p:spPr>
           <a:xfrm>
-            <a:off x="4341412" y="1759945"/>
-            <a:ext cx="10058400" cy="4915321"/>
+            <a:off x="3768918" y="1839878"/>
+            <a:ext cx="10058400" cy="4944229"/>
           </a:xfrm>
           <a:prstGeom prst="rect">
             <a:avLst/>
@@ -3981,7 +4068,7 @@
     </p:spTree>
     <p:extLst>
       <p:ext uri="{BB962C8B-B14F-4D97-AF65-F5344CB8AC3E}">
-        <p14:creationId xmlns:p14="http://schemas.microsoft.com/office/powerpoint/2010/main" val="3911553573"/>
+        <p14:creationId xmlns:p14="http://schemas.microsoft.com/office/powerpoint/2010/main" val="3533658303"/>
       </p:ext>
     </p:extLst>
   </p:cSld>
@@ -4025,12 +4112,7 @@
             <p:ph type="title"/>
           </p:nvPr>
         </p:nvSpPr>
-        <p:spPr>
-          <a:xfrm>
-            <a:off x="838199" y="365125"/>
-            <a:ext cx="10786607" cy="1325563"/>
-          </a:xfrm>
-        </p:spPr>
+        <p:spPr/>
         <p:txBody>
           <a:bodyPr/>
           <a:lstStyle/>
@@ -4038,15 +4120,15 @@
             <a:pPr algn="ctr"/>
             <a:r>
               <a:rPr lang="zh-TW" altLang="en-US" dirty="0" smtClean="0"/>
-              <a:t>填寫表單資訊</a:t>
+              <a:t>單品庫存查詢</a:t>
             </a:r>
             <a:r>
               <a:rPr lang="en-US" altLang="zh-TW" dirty="0" smtClean="0"/>
-              <a:t>/submit</a:t>
+              <a:t>/</a:t>
             </a:r>
             <a:r>
               <a:rPr lang="zh-TW" altLang="en-US" dirty="0" smtClean="0"/>
-              <a:t>後頁面</a:t>
+              <a:t>下訂單頁面</a:t>
             </a:r>
             <a:endParaRPr lang="zh-TW" altLang="en-US" dirty="0"/>
           </a:p>
@@ -4054,7 +4136,7 @@
       </p:sp>
       <p:pic>
         <p:nvPicPr>
-          <p:cNvPr id="3" name="圖片 2"/>
+          <p:cNvPr id="5" name="圖片 4"/>
           <p:cNvPicPr>
             <a:picLocks noChangeAspect="1"/>
           </p:cNvPicPr>
@@ -4074,8 +4156,8 @@
         </p:blipFill>
         <p:spPr>
           <a:xfrm>
-            <a:off x="-341906" y="1785733"/>
-            <a:ext cx="10058400" cy="4954850"/>
+            <a:off x="0" y="1332047"/>
+            <a:ext cx="10058400" cy="4903135"/>
           </a:xfrm>
           <a:prstGeom prst="rect">
             <a:avLst/>
@@ -4084,7 +4166,7 @@
       </p:pic>
       <p:pic>
         <p:nvPicPr>
-          <p:cNvPr id="4" name="圖片 3"/>
+          <p:cNvPr id="7" name="圖片 6"/>
           <p:cNvPicPr>
             <a:picLocks noChangeAspect="1"/>
           </p:cNvPicPr>
@@ -4104,8 +4186,8 @@
         </p:blipFill>
         <p:spPr>
           <a:xfrm>
-            <a:off x="4937760" y="2935291"/>
-            <a:ext cx="10058400" cy="4955857"/>
+            <a:off x="3824578" y="1847417"/>
+            <a:ext cx="10058400" cy="5010583"/>
           </a:xfrm>
           <a:prstGeom prst="rect">
             <a:avLst/>
@@ -4115,7 +4197,7 @@
     </p:spTree>
     <p:extLst>
       <p:ext uri="{BB962C8B-B14F-4D97-AF65-F5344CB8AC3E}">
-        <p14:creationId xmlns:p14="http://schemas.microsoft.com/office/powerpoint/2010/main" val="442481425"/>
+        <p14:creationId xmlns:p14="http://schemas.microsoft.com/office/powerpoint/2010/main" val="3911553573"/>
       </p:ext>
     </p:extLst>
   </p:cSld>
@@ -4161,69 +4243,28 @@
         </p:nvSpPr>
         <p:spPr>
           <a:xfrm>
-            <a:off x="528099" y="190197"/>
-            <a:ext cx="11255734" cy="1325563"/>
-          </a:xfrm>
-        </p:spPr>
-        <p:txBody>
-          <a:bodyPr>
-            <a:normAutofit fontScale="90000"/>
-          </a:bodyPr>
+            <a:off x="838199" y="365125"/>
+            <a:ext cx="10786607" cy="1325563"/>
+          </a:xfrm>
+        </p:spPr>
+        <p:txBody>
+          <a:bodyPr/>
           <a:lstStyle/>
           <a:p>
             <a:pPr algn="ctr"/>
             <a:r>
-              <a:rPr lang="zh-TW" altLang="en-US" sz="3600" dirty="0" smtClean="0"/>
-              <a:t>點擊</a:t>
-            </a:r>
-            <a:r>
-              <a:rPr lang="en-US" altLang="zh-TW" sz="3600" dirty="0" smtClean="0"/>
-              <a:t>BUY</a:t>
-            </a:r>
-            <a:r>
-              <a:rPr lang="zh-TW" altLang="en-US" sz="3600" dirty="0" smtClean="0"/>
-              <a:t> </a:t>
-            </a:r>
-            <a:r>
-              <a:rPr lang="en-US" altLang="zh-TW" sz="3600" dirty="0" smtClean="0"/>
-              <a:t>RECORD/</a:t>
-            </a:r>
-            <a:br>
-              <a:rPr lang="en-US" altLang="zh-TW" sz="3600" dirty="0" smtClean="0"/>
-            </a:br>
-            <a:r>
-              <a:rPr lang="zh-TW" altLang="en-US" sz="3600" dirty="0" smtClean="0"/>
-              <a:t>剛下的訂單</a:t>
-            </a:r>
-            <a:r>
-              <a:rPr lang="en-US" altLang="zh-TW" sz="3600" dirty="0" smtClean="0"/>
-              <a:t>”</a:t>
-            </a:r>
-            <a:r>
-              <a:rPr lang="en-US" altLang="zh-TW" sz="3600" dirty="0" err="1" smtClean="0"/>
-              <a:t>merchandiseArriveLocker</a:t>
-            </a:r>
-            <a:r>
-              <a:rPr lang="en-US" altLang="zh-TW" sz="3600" dirty="0" smtClean="0"/>
-              <a:t>”: false</a:t>
-            </a:r>
-            <a:r>
-              <a:rPr lang="zh-TW" altLang="en-US" sz="3600" dirty="0" smtClean="0"/>
-              <a:t>且</a:t>
-            </a:r>
-            <a:r>
-              <a:rPr lang="en-US" altLang="zh-TW" sz="3600" dirty="0" smtClean="0"/>
-              <a:t>”</a:t>
-            </a:r>
-            <a:r>
-              <a:rPr lang="en-US" altLang="zh-TW" sz="3600" dirty="0" err="1" smtClean="0"/>
-              <a:t>moneyPaid</a:t>
-            </a:r>
-            <a:r>
-              <a:rPr lang="en-US" altLang="zh-TW" sz="3600" dirty="0" smtClean="0"/>
-              <a:t>”: false</a:t>
-            </a:r>
-            <a:endParaRPr lang="zh-TW" altLang="en-US" sz="3600" dirty="0"/>
+              <a:rPr lang="zh-TW" altLang="en-US" dirty="0" smtClean="0"/>
+              <a:t>填寫表單資訊</a:t>
+            </a:r>
+            <a:r>
+              <a:rPr lang="en-US" altLang="zh-TW" dirty="0" smtClean="0"/>
+              <a:t>/submit</a:t>
+            </a:r>
+            <a:r>
+              <a:rPr lang="zh-TW" altLang="en-US" dirty="0" smtClean="0"/>
+              <a:t>後頁面</a:t>
+            </a:r>
+            <a:endParaRPr lang="zh-TW" altLang="en-US" dirty="0"/>
           </a:p>
         </p:txBody>
       </p:sp>
@@ -4249,8 +4290,8 @@
         </p:blipFill>
         <p:spPr>
           <a:xfrm>
-            <a:off x="-262393" y="1690688"/>
-            <a:ext cx="10058400" cy="5013317"/>
+            <a:off x="0" y="1400846"/>
+            <a:ext cx="10058400" cy="4973290"/>
           </a:xfrm>
           <a:prstGeom prst="rect">
             <a:avLst/>
@@ -4259,7 +4300,7 @@
       </p:pic>
       <p:pic>
         <p:nvPicPr>
-          <p:cNvPr id="7" name="圖片 6"/>
+          <p:cNvPr id="6" name="圖片 5"/>
           <p:cNvPicPr>
             <a:picLocks noChangeAspect="1"/>
           </p:cNvPicPr>
@@ -4279,8 +4320,8 @@
         </p:blipFill>
         <p:spPr>
           <a:xfrm>
-            <a:off x="4766807" y="2498791"/>
-            <a:ext cx="10058400" cy="5418261"/>
+            <a:off x="3053301" y="1782135"/>
+            <a:ext cx="10058400" cy="5013267"/>
           </a:xfrm>
           <a:prstGeom prst="rect">
             <a:avLst/>
@@ -4290,7 +4331,7 @@
     </p:spTree>
     <p:extLst>
       <p:ext uri="{BB962C8B-B14F-4D97-AF65-F5344CB8AC3E}">
-        <p14:creationId xmlns:p14="http://schemas.microsoft.com/office/powerpoint/2010/main" val="2206812976"/>
+        <p14:creationId xmlns:p14="http://schemas.microsoft.com/office/powerpoint/2010/main" val="442481425"/>
       </p:ext>
     </p:extLst>
   </p:cSld>
@@ -4336,34 +4377,75 @@
         </p:nvSpPr>
         <p:spPr>
           <a:xfrm>
-            <a:off x="838199" y="365125"/>
-            <a:ext cx="10921779" cy="1325563"/>
-          </a:xfrm>
-        </p:spPr>
-        <p:txBody>
-          <a:bodyPr/>
+            <a:off x="528099" y="190197"/>
+            <a:ext cx="11255734" cy="1325563"/>
+          </a:xfrm>
+        </p:spPr>
+        <p:txBody>
+          <a:bodyPr>
+            <a:normAutofit fontScale="90000"/>
+          </a:bodyPr>
           <a:lstStyle/>
           <a:p>
             <a:pPr algn="ctr"/>
             <a:r>
-              <a:rPr lang="zh-TW" altLang="en-US" dirty="0" smtClean="0"/>
+              <a:rPr lang="zh-TW" altLang="en-US" sz="3600" dirty="0" smtClean="0"/>
               <a:t>點擊</a:t>
             </a:r>
             <a:r>
-              <a:rPr lang="en-US" altLang="zh-TW" dirty="0" smtClean="0"/>
-              <a:t>sell record/jimmy</a:t>
-            </a:r>
-            <a:r>
-              <a:rPr lang="zh-TW" altLang="en-US" dirty="0" smtClean="0"/>
-              <a:t>見到自己接到一筆訂單</a:t>
-            </a:r>
-            <a:endParaRPr lang="zh-TW" altLang="en-US" dirty="0"/>
+              <a:rPr lang="en-US" altLang="zh-TW" sz="3600" dirty="0" smtClean="0"/>
+              <a:t>BUY</a:t>
+            </a:r>
+            <a:r>
+              <a:rPr lang="zh-TW" altLang="en-US" sz="3600" dirty="0" smtClean="0"/>
+              <a:t> </a:t>
+            </a:r>
+            <a:r>
+              <a:rPr lang="en-US" altLang="zh-TW" sz="3600" dirty="0" smtClean="0"/>
+              <a:t>RECORD/</a:t>
+            </a:r>
+            <a:br>
+              <a:rPr lang="en-US" altLang="zh-TW" sz="3600" dirty="0" smtClean="0"/>
+            </a:br>
+            <a:r>
+              <a:rPr lang="zh-TW" altLang="en-US" sz="3600" dirty="0" smtClean="0"/>
+              <a:t>剛下的訂單</a:t>
+            </a:r>
+            <a:r>
+              <a:rPr lang="en-US" altLang="zh-TW" sz="3600" dirty="0" smtClean="0"/>
+              <a:t>”</a:t>
+            </a:r>
+            <a:r>
+              <a:rPr lang="en-US" altLang="zh-TW" sz="3600" dirty="0" err="1" smtClean="0"/>
+              <a:t>merchandiseArriveLocker</a:t>
+            </a:r>
+            <a:r>
+              <a:rPr lang="en-US" altLang="zh-TW" sz="3600" dirty="0" smtClean="0"/>
+              <a:t>”: false</a:t>
+            </a:r>
+            <a:r>
+              <a:rPr lang="zh-TW" altLang="en-US" sz="3600" dirty="0" smtClean="0"/>
+              <a:t>且</a:t>
+            </a:r>
+            <a:r>
+              <a:rPr lang="en-US" altLang="zh-TW" sz="3600" dirty="0" smtClean="0"/>
+              <a:t>”</a:t>
+            </a:r>
+            <a:r>
+              <a:rPr lang="en-US" altLang="zh-TW" sz="3600" dirty="0" err="1" smtClean="0"/>
+              <a:t>moneyPaid</a:t>
+            </a:r>
+            <a:r>
+              <a:rPr lang="en-US" altLang="zh-TW" sz="3600" dirty="0" smtClean="0"/>
+              <a:t>”: false</a:t>
+            </a:r>
+            <a:endParaRPr lang="zh-TW" altLang="en-US" sz="3600" dirty="0"/>
           </a:p>
         </p:txBody>
       </p:sp>
       <p:pic>
         <p:nvPicPr>
-          <p:cNvPr id="6" name="圖片 5"/>
+          <p:cNvPr id="3" name="圖片 2"/>
           <p:cNvPicPr>
             <a:picLocks noChangeAspect="1"/>
           </p:cNvPicPr>
@@ -4383,8 +4465,8 @@
         </p:blipFill>
         <p:spPr>
           <a:xfrm>
-            <a:off x="0" y="1613533"/>
-            <a:ext cx="10058400" cy="5015944"/>
+            <a:off x="0" y="1345045"/>
+            <a:ext cx="10058400" cy="4973525"/>
           </a:xfrm>
           <a:prstGeom prst="rect">
             <a:avLst/>
@@ -4413,8 +4495,8 @@
         </p:blipFill>
         <p:spPr>
           <a:xfrm>
-            <a:off x="4727051" y="2085431"/>
-            <a:ext cx="10058400" cy="5390673"/>
+            <a:off x="4214191" y="1921884"/>
+            <a:ext cx="10058400" cy="4936116"/>
           </a:xfrm>
           <a:prstGeom prst="rect">
             <a:avLst/>
@@ -4424,7 +4506,7 @@
     </p:spTree>
     <p:extLst>
       <p:ext uri="{BB962C8B-B14F-4D97-AF65-F5344CB8AC3E}">
-        <p14:creationId xmlns:p14="http://schemas.microsoft.com/office/powerpoint/2010/main" val="4033178646"/>
+        <p14:creationId xmlns:p14="http://schemas.microsoft.com/office/powerpoint/2010/main" val="2206812976"/>
       </p:ext>
     </p:extLst>
   </p:cSld>
@@ -4468,27 +4550,28 @@
             <p:ph type="title"/>
           </p:nvPr>
         </p:nvSpPr>
-        <p:spPr/>
+        <p:spPr>
+          <a:xfrm>
+            <a:off x="838199" y="365125"/>
+            <a:ext cx="10921779" cy="1325563"/>
+          </a:xfrm>
+        </p:spPr>
         <p:txBody>
           <a:bodyPr/>
           <a:lstStyle/>
           <a:p>
             <a:pPr algn="ctr"/>
             <a:r>
+              <a:rPr lang="zh-TW" altLang="en-US" dirty="0" smtClean="0"/>
+              <a:t>點擊</a:t>
+            </a:r>
+            <a:r>
               <a:rPr lang="en-US" altLang="zh-TW" dirty="0" smtClean="0"/>
-              <a:t>Mailer</a:t>
+              <a:t>sell record/jimmy</a:t>
             </a:r>
             <a:r>
               <a:rPr lang="zh-TW" altLang="en-US" dirty="0" smtClean="0"/>
-              <a:t>登入帳密</a:t>
-            </a:r>
-            <a:r>
-              <a:rPr lang="en-US" altLang="zh-TW" dirty="0" smtClean="0"/>
-              <a:t>/</a:t>
-            </a:r>
-            <a:r>
-              <a:rPr lang="zh-TW" altLang="en-US" dirty="0" smtClean="0"/>
-              <a:t>成功登入頁面</a:t>
+              <a:t>見到自己接到一筆訂單</a:t>
             </a:r>
             <a:endParaRPr lang="zh-TW" altLang="en-US" dirty="0"/>
           </a:p>
@@ -4496,7 +4579,7 @@
       </p:sp>
       <p:pic>
         <p:nvPicPr>
-          <p:cNvPr id="3" name="圖片 2"/>
+          <p:cNvPr id="7" name="圖片 6"/>
           <p:cNvPicPr>
             <a:picLocks noChangeAspect="1"/>
           </p:cNvPicPr>
@@ -4516,8 +4599,8 @@
         </p:blipFill>
         <p:spPr>
           <a:xfrm>
-            <a:off x="-111318" y="1557858"/>
-            <a:ext cx="10058400" cy="5015971"/>
+            <a:off x="0" y="1327413"/>
+            <a:ext cx="10058400" cy="5002618"/>
           </a:xfrm>
           <a:prstGeom prst="rect">
             <a:avLst/>
@@ -4526,7 +4609,7 @@
       </p:pic>
       <p:pic>
         <p:nvPicPr>
-          <p:cNvPr id="4" name="圖片 3"/>
+          <p:cNvPr id="5" name="圖片 4"/>
           <p:cNvPicPr>
             <a:picLocks noChangeAspect="1"/>
           </p:cNvPicPr>
@@ -4546,8 +4629,8 @@
         </p:blipFill>
         <p:spPr>
           <a:xfrm>
-            <a:off x="5136543" y="2320856"/>
-            <a:ext cx="10058400" cy="5357625"/>
+            <a:off x="3713259" y="1836813"/>
+            <a:ext cx="10058400" cy="5021187"/>
           </a:xfrm>
           <a:prstGeom prst="rect">
             <a:avLst/>
@@ -4557,7 +4640,7 @@
     </p:spTree>
     <p:extLst>
       <p:ext uri="{BB962C8B-B14F-4D97-AF65-F5344CB8AC3E}">
-        <p14:creationId xmlns:p14="http://schemas.microsoft.com/office/powerpoint/2010/main" val="3384940024"/>
+        <p14:creationId xmlns:p14="http://schemas.microsoft.com/office/powerpoint/2010/main" val="4033178646"/>
       </p:ext>
     </p:extLst>
   </p:cSld>
@@ -4609,11 +4692,19 @@
             <a:pPr algn="ctr"/>
             <a:r>
               <a:rPr lang="en-US" altLang="zh-TW" dirty="0" smtClean="0"/>
-              <a:t>Mailman</a:t>
+              <a:t>Mailer</a:t>
             </a:r>
             <a:r>
               <a:rPr lang="zh-TW" altLang="en-US" dirty="0" smtClean="0"/>
-              <a:t>欲放入商品的置物櫃</a:t>
+              <a:t>登入帳密</a:t>
+            </a:r>
+            <a:r>
+              <a:rPr lang="en-US" altLang="zh-TW" dirty="0" smtClean="0"/>
+              <a:t>/</a:t>
+            </a:r>
+            <a:r>
+              <a:rPr lang="zh-TW" altLang="en-US" dirty="0" smtClean="0"/>
+              <a:t>成功登入頁面</a:t>
             </a:r>
             <a:endParaRPr lang="zh-TW" altLang="en-US" dirty="0"/>
           </a:p>
@@ -4621,7 +4712,7 @@
       </p:sp>
       <p:pic>
         <p:nvPicPr>
-          <p:cNvPr id="6" name="圖片 5"/>
+          <p:cNvPr id="5" name="圖片 4"/>
           <p:cNvPicPr>
             <a:picLocks noChangeAspect="1"/>
           </p:cNvPicPr>
@@ -4641,8 +4732,8 @@
         </p:blipFill>
         <p:spPr>
           <a:xfrm>
-            <a:off x="-922351" y="1690688"/>
-            <a:ext cx="10058400" cy="5000067"/>
+            <a:off x="0" y="1337200"/>
+            <a:ext cx="10058400" cy="4973349"/>
           </a:xfrm>
           <a:prstGeom prst="rect">
             <a:avLst/>
@@ -4651,7 +4742,7 @@
       </p:pic>
       <p:pic>
         <p:nvPicPr>
-          <p:cNvPr id="9" name="圖片 8"/>
+          <p:cNvPr id="6" name="圖片 5"/>
           <p:cNvPicPr>
             <a:picLocks noChangeAspect="1"/>
           </p:cNvPicPr>
@@ -4671,8 +4762,8 @@
         </p:blipFill>
         <p:spPr>
           <a:xfrm>
-            <a:off x="2949934" y="2391464"/>
-            <a:ext cx="10058400" cy="5385435"/>
+            <a:off x="4301656" y="1690688"/>
+            <a:ext cx="10058400" cy="5018578"/>
           </a:xfrm>
           <a:prstGeom prst="rect">
             <a:avLst/>
@@ -4682,7 +4773,7 @@
     </p:spTree>
     <p:extLst>
       <p:ext uri="{BB962C8B-B14F-4D97-AF65-F5344CB8AC3E}">
-        <p14:creationId xmlns:p14="http://schemas.microsoft.com/office/powerpoint/2010/main" val="2051098822"/>
+        <p14:creationId xmlns:p14="http://schemas.microsoft.com/office/powerpoint/2010/main" val="3384940024"/>
       </p:ext>
     </p:extLst>
   </p:cSld>
@@ -4728,28 +4819,19 @@
         </p:nvSpPr>
         <p:spPr/>
         <p:txBody>
-          <a:bodyPr>
-            <a:normAutofit/>
-          </a:bodyPr>
-          <a:lstStyle/>
-          <a:p>
-            <a:r>
-              <a:rPr lang="en-US" altLang="zh-TW" sz="4000" dirty="0" err="1" smtClean="0"/>
-              <a:t>db</a:t>
-            </a:r>
-            <a:r>
-              <a:rPr lang="zh-TW" altLang="en-US" sz="4000" dirty="0" smtClean="0"/>
-              <a:t>更新商品抵達</a:t>
-            </a:r>
-            <a:r>
-              <a:rPr lang="en-US" altLang="zh-TW" sz="4000" dirty="0" smtClean="0"/>
-              <a:t>/</a:t>
-            </a:r>
-            <a:r>
-              <a:rPr lang="en-US" altLang="zh-TW" sz="4000" dirty="0" err="1" smtClean="0"/>
-              <a:t>merchandiseArriveLocker:true</a:t>
-            </a:r>
-            <a:endParaRPr lang="zh-TW" altLang="en-US" sz="4000" dirty="0"/>
+          <a:bodyPr/>
+          <a:lstStyle/>
+          <a:p>
+            <a:pPr algn="ctr"/>
+            <a:r>
+              <a:rPr lang="en-US" altLang="zh-TW" dirty="0" smtClean="0"/>
+              <a:t>Mailman</a:t>
+            </a:r>
+            <a:r>
+              <a:rPr lang="zh-TW" altLang="en-US" dirty="0" smtClean="0"/>
+              <a:t>欲放入商品的置物櫃</a:t>
+            </a:r>
+            <a:endParaRPr lang="zh-TW" altLang="en-US" dirty="0"/>
           </a:p>
         </p:txBody>
       </p:sp>
@@ -4775,8 +4857,8 @@
         </p:blipFill>
         <p:spPr>
           <a:xfrm>
-            <a:off x="222637" y="1629728"/>
-            <a:ext cx="10058400" cy="5228272"/>
+            <a:off x="0" y="1330525"/>
+            <a:ext cx="10058400" cy="5010602"/>
           </a:xfrm>
           <a:prstGeom prst="rect">
             <a:avLst/>
@@ -4785,7 +4867,7 @@
       </p:pic>
       <p:pic>
         <p:nvPicPr>
-          <p:cNvPr id="5" name="圖片 4"/>
+          <p:cNvPr id="4" name="圖片 3"/>
           <p:cNvPicPr>
             <a:picLocks noChangeAspect="1"/>
           </p:cNvPicPr>
@@ -4805,8 +4887,8 @@
         </p:blipFill>
         <p:spPr>
           <a:xfrm>
-            <a:off x="3824577" y="2278546"/>
-            <a:ext cx="10058400" cy="5374957"/>
+            <a:off x="4818490" y="1834117"/>
+            <a:ext cx="10058400" cy="5023883"/>
           </a:xfrm>
           <a:prstGeom prst="rect">
             <a:avLst/>
@@ -4816,7 +4898,7 @@
     </p:spTree>
     <p:extLst>
       <p:ext uri="{BB962C8B-B14F-4D97-AF65-F5344CB8AC3E}">
-        <p14:creationId xmlns:p14="http://schemas.microsoft.com/office/powerpoint/2010/main" val="3455872810"/>
+        <p14:creationId xmlns:p14="http://schemas.microsoft.com/office/powerpoint/2010/main" val="2051098822"/>
       </p:ext>
     </p:extLst>
   </p:cSld>
@@ -5154,49 +5236,40 @@
         </p:nvSpPr>
         <p:spPr>
           <a:xfrm>
-            <a:off x="965421" y="229953"/>
-            <a:ext cx="10515600" cy="1325563"/>
-          </a:xfrm>
-        </p:spPr>
-        <p:txBody>
-          <a:bodyPr/>
+            <a:off x="742785" y="141997"/>
+            <a:ext cx="10515600" cy="519701"/>
+          </a:xfrm>
+        </p:spPr>
+        <p:txBody>
+          <a:bodyPr>
+            <a:normAutofit fontScale="90000"/>
+          </a:bodyPr>
           <a:lstStyle/>
           <a:p>
             <a:pPr algn="ctr"/>
             <a:r>
-              <a:rPr lang="zh-TW" altLang="en-US" dirty="0" smtClean="0"/>
-              <a:t>點擊</a:t>
-            </a:r>
-            <a:r>
-              <a:rPr lang="en-US" altLang="zh-TW" dirty="0" smtClean="0"/>
-              <a:t>PAY THEN UNLOCK/</a:t>
-            </a:r>
-            <a:br>
-              <a:rPr lang="en-US" altLang="zh-TW" dirty="0" smtClean="0"/>
-            </a:br>
-            <a:r>
-              <a:rPr lang="zh-TW" altLang="en-US" dirty="0" smtClean="0"/>
-              <a:t>將上一步訂單的</a:t>
-            </a:r>
-            <a:r>
-              <a:rPr lang="en-US" altLang="zh-TW" dirty="0" smtClean="0"/>
-              <a:t>_id</a:t>
-            </a:r>
-            <a:r>
-              <a:rPr lang="zh-TW" altLang="en-US" dirty="0" smtClean="0"/>
-              <a:t>貼到輸入框並</a:t>
-            </a:r>
-            <a:r>
-              <a:rPr lang="en-US" altLang="zh-TW" dirty="0" smtClean="0"/>
-              <a:t>submit</a:t>
-            </a:r>
-            <a:endParaRPr lang="zh-TW" altLang="en-US" dirty="0"/>
+              <a:rPr lang="en-US" altLang="zh-TW" sz="4000" dirty="0" err="1" smtClean="0"/>
+              <a:t>db</a:t>
+            </a:r>
+            <a:r>
+              <a:rPr lang="zh-TW" altLang="en-US" sz="4000" dirty="0" smtClean="0"/>
+              <a:t>更新商品抵達</a:t>
+            </a:r>
+            <a:r>
+              <a:rPr lang="en-US" altLang="zh-TW" sz="4000" dirty="0" smtClean="0"/>
+              <a:t>/mailer</a:t>
+            </a:r>
+            <a:r>
+              <a:rPr lang="zh-TW" altLang="en-US" sz="4000" dirty="0" smtClean="0"/>
+              <a:t>登出</a:t>
+            </a:r>
+            <a:endParaRPr lang="zh-TW" altLang="en-US" sz="4000" dirty="0"/>
           </a:p>
         </p:txBody>
       </p:sp>
       <p:pic>
         <p:nvPicPr>
-          <p:cNvPr id="3" name="圖片 2"/>
+          <p:cNvPr id="4" name="圖片 3"/>
           <p:cNvPicPr>
             <a:picLocks noChangeAspect="1"/>
           </p:cNvPicPr>
@@ -5216,8 +5289,8 @@
         </p:blipFill>
         <p:spPr>
           <a:xfrm>
-            <a:off x="-508884" y="1690688"/>
-            <a:ext cx="10058400" cy="5013317"/>
+            <a:off x="-286247" y="657018"/>
+            <a:ext cx="10058400" cy="4989391"/>
           </a:xfrm>
           <a:prstGeom prst="rect">
             <a:avLst/>
@@ -5226,7 +5299,7 @@
       </p:pic>
       <p:pic>
         <p:nvPicPr>
-          <p:cNvPr id="4" name="圖片 3"/>
+          <p:cNvPr id="8" name="圖片 7"/>
           <p:cNvPicPr>
             <a:picLocks noChangeAspect="1"/>
           </p:cNvPicPr>
@@ -5246,8 +5319,8 @@
         </p:blipFill>
         <p:spPr>
           <a:xfrm>
-            <a:off x="4428878" y="2561469"/>
-            <a:ext cx="10058400" cy="4887753"/>
+            <a:off x="2881022" y="3149005"/>
+            <a:ext cx="10058400" cy="4994807"/>
           </a:xfrm>
           <a:prstGeom prst="rect">
             <a:avLst/>
@@ -5257,7 +5330,7 @@
     </p:spTree>
     <p:extLst>
       <p:ext uri="{BB962C8B-B14F-4D97-AF65-F5344CB8AC3E}">
-        <p14:creationId xmlns:p14="http://schemas.microsoft.com/office/powerpoint/2010/main" val="761964569"/>
+        <p14:creationId xmlns:p14="http://schemas.microsoft.com/office/powerpoint/2010/main" val="3455872810"/>
       </p:ext>
     </p:extLst>
   </p:cSld>
@@ -5301,20 +5374,34 @@
             <p:ph type="title"/>
           </p:nvPr>
         </p:nvSpPr>
-        <p:spPr>
-          <a:xfrm>
-            <a:off x="687125" y="102732"/>
-            <a:ext cx="10515600" cy="1325563"/>
-          </a:xfrm>
-        </p:spPr>
+        <p:spPr/>
         <p:txBody>
           <a:bodyPr/>
           <a:lstStyle/>
           <a:p>
-            <a:pPr algn="ctr"/>
+            <a:r>
+              <a:rPr lang="en-US" altLang="zh-TW" dirty="0" smtClean="0"/>
+              <a:t>Test3</a:t>
+            </a:r>
             <a:r>
               <a:rPr lang="zh-TW" altLang="en-US" dirty="0" smtClean="0"/>
-              <a:t>未付款</a:t>
+              <a:t>登入</a:t>
+            </a:r>
+            <a:r>
+              <a:rPr lang="en-US" altLang="zh-TW" dirty="0" smtClean="0"/>
+              <a:t>/</a:t>
+            </a:r>
+            <a:r>
+              <a:rPr lang="en-US" altLang="zh-TW" dirty="0" err="1" smtClean="0"/>
+              <a:t>merchandiseArriveLocker</a:t>
+            </a:r>
+            <a:r>
+              <a:rPr lang="zh-TW" altLang="en-US" dirty="0" smtClean="0"/>
+              <a:t>變成</a:t>
+            </a:r>
+            <a:r>
+              <a:rPr lang="en-US" altLang="zh-TW" dirty="0" smtClean="0"/>
+              <a:t>true</a:t>
             </a:r>
             <a:endParaRPr lang="zh-TW" altLang="en-US" dirty="0"/>
           </a:p>
@@ -5322,7 +5409,7 @@
       </p:sp>
       <p:pic>
         <p:nvPicPr>
-          <p:cNvPr id="7" name="圖片 6"/>
+          <p:cNvPr id="6" name="圖片 5"/>
           <p:cNvPicPr>
             <a:picLocks noChangeAspect="1"/>
           </p:cNvPicPr>
@@ -5342,8 +5429,8 @@
         </p:blipFill>
         <p:spPr>
           <a:xfrm>
-            <a:off x="-63610" y="1200627"/>
-            <a:ext cx="10058400" cy="5013317"/>
+            <a:off x="0" y="1338646"/>
+            <a:ext cx="10058400" cy="4984083"/>
           </a:xfrm>
           <a:prstGeom prst="rect">
             <a:avLst/>
@@ -5352,7 +5439,7 @@
       </p:pic>
       <p:pic>
         <p:nvPicPr>
-          <p:cNvPr id="8" name="圖片 7"/>
+          <p:cNvPr id="5" name="圖片 4"/>
           <p:cNvPicPr>
             <a:picLocks noChangeAspect="1"/>
           </p:cNvPicPr>
@@ -5372,8 +5459,8 @@
         </p:blipFill>
         <p:spPr>
           <a:xfrm>
-            <a:off x="1589599" y="1731521"/>
-            <a:ext cx="10058400" cy="5380196"/>
+            <a:off x="4158532" y="1969373"/>
+            <a:ext cx="10058400" cy="4999945"/>
           </a:xfrm>
           <a:prstGeom prst="rect">
             <a:avLst/>
@@ -5383,20 +5470,13 @@
     </p:spTree>
     <p:extLst>
       <p:ext uri="{BB962C8B-B14F-4D97-AF65-F5344CB8AC3E}">
-        <p14:creationId xmlns:p14="http://schemas.microsoft.com/office/powerpoint/2010/main" val="2114422350"/>
+        <p14:creationId xmlns:p14="http://schemas.microsoft.com/office/powerpoint/2010/main" val="2179588301"/>
       </p:ext>
     </p:extLst>
   </p:cSld>
   <p:clrMapOvr>
     <a:masterClrMapping/>
   </p:clrMapOvr>
-  <p:timing>
-    <p:tnLst>
-      <p:par>
-        <p:cTn id="1" dur="indefinite" restart="never" nodeType="tmRoot"/>
-      </p:par>
-    </p:tnLst>
-  </p:timing>
 </p:sld>
 </file>
 
@@ -5419,7 +5499,7 @@
       </p:grpSpPr>
       <p:pic>
         <p:nvPicPr>
-          <p:cNvPr id="5" name="圖片 4"/>
+          <p:cNvPr id="9" name="圖片 8"/>
           <p:cNvPicPr>
             <a:picLocks noChangeAspect="1"/>
           </p:cNvPicPr>
@@ -5439,24 +5519,76 @@
         </p:blipFill>
         <p:spPr>
           <a:xfrm>
-            <a:off x="247817" y="784240"/>
-            <a:ext cx="10058400" cy="5395912"/>
+            <a:off x="0" y="1489563"/>
+            <a:ext cx="10058400" cy="5010583"/>
           </a:xfrm>
           <a:prstGeom prst="rect">
             <a:avLst/>
           </a:prstGeom>
         </p:spPr>
       </p:pic>
+      <p:sp>
+        <p:nvSpPr>
+          <p:cNvPr id="2" name="標題 1"/>
+          <p:cNvSpPr>
+            <a:spLocks noGrp="1"/>
+          </p:cNvSpPr>
+          <p:nvPr>
+            <p:ph type="title"/>
+          </p:nvPr>
+        </p:nvSpPr>
+        <p:spPr>
+          <a:xfrm>
+            <a:off x="965421" y="229953"/>
+            <a:ext cx="10515600" cy="1325563"/>
+          </a:xfrm>
+        </p:spPr>
+        <p:txBody>
+          <a:bodyPr/>
+          <a:lstStyle/>
+          <a:p>
+            <a:pPr algn="ctr"/>
+            <a:r>
+              <a:rPr lang="zh-TW" altLang="en-US" dirty="0" smtClean="0"/>
+              <a:t>點擊</a:t>
+            </a:r>
+            <a:r>
+              <a:rPr lang="en-US" altLang="zh-TW" dirty="0" smtClean="0"/>
+              <a:t>PAY THEN UNLOCK/</a:t>
+            </a:r>
+            <a:br>
+              <a:rPr lang="en-US" altLang="zh-TW" dirty="0" smtClean="0"/>
+            </a:br>
+            <a:r>
+              <a:rPr lang="zh-TW" altLang="en-US" dirty="0" smtClean="0"/>
+              <a:t>將上一步訂單的</a:t>
+            </a:r>
+            <a:r>
+              <a:rPr lang="en-US" altLang="zh-TW" dirty="0" smtClean="0"/>
+              <a:t>_id</a:t>
+            </a:r>
+            <a:r>
+              <a:rPr lang="zh-TW" altLang="en-US" dirty="0" smtClean="0"/>
+              <a:t>貼到輸入框並</a:t>
+            </a:r>
+            <a:r>
+              <a:rPr lang="en-US" altLang="zh-TW" dirty="0" smtClean="0"/>
+              <a:t>submit</a:t>
+            </a:r>
+            <a:endParaRPr lang="zh-TW" altLang="en-US" dirty="0"/>
+          </a:p>
+        </p:txBody>
+      </p:sp>
       <p:pic>
         <p:nvPicPr>
-          <p:cNvPr id="4" name="圖片 3"/>
+          <p:cNvPr id="7" name="圖片 6"/>
           <p:cNvPicPr>
             <a:picLocks noChangeAspect="1"/>
           </p:cNvPicPr>
           <p:nvPr/>
         </p:nvPicPr>
         <p:blipFill>
-          <a:blip r:embed="rId3" cstate="print">
+          <a:blip r:embed="rId3">
             <a:extLst>
               <a:ext uri="{28A0092B-C50C-407E-A947-70E740481C1C}">
                 <a14:useLocalDpi xmlns:a14="http://schemas.microsoft.com/office/drawing/2010/main" val="0"/>
@@ -5469,48 +5601,18 @@
         </p:blipFill>
         <p:spPr>
           <a:xfrm>
-            <a:off x="4881970" y="1327867"/>
-            <a:ext cx="6575862" cy="6858000"/>
+            <a:off x="4285753" y="2143078"/>
+            <a:ext cx="10058400" cy="5021213"/>
           </a:xfrm>
           <a:prstGeom prst="rect">
             <a:avLst/>
           </a:prstGeom>
         </p:spPr>
       </p:pic>
-      <p:sp>
-        <p:nvSpPr>
-          <p:cNvPr id="6" name="文字方塊 5"/>
-          <p:cNvSpPr txBox="1"/>
-          <p:nvPr/>
-        </p:nvSpPr>
-        <p:spPr>
-          <a:xfrm>
-            <a:off x="4158762" y="143123"/>
-            <a:ext cx="2236510" cy="707886"/>
-          </a:xfrm>
-          <a:prstGeom prst="rect">
-            <a:avLst/>
-          </a:prstGeom>
-          <a:noFill/>
-        </p:spPr>
-        <p:txBody>
-          <a:bodyPr wrap="none" rtlCol="0">
-            <a:spAutoFit/>
-          </a:bodyPr>
-          <a:lstStyle/>
-          <a:p>
-            <a:r>
-              <a:rPr lang="zh-TW" altLang="en-US" sz="4000" dirty="0" smtClean="0"/>
-              <a:t>尚未付款</a:t>
-            </a:r>
-            <a:endParaRPr lang="zh-TW" altLang="en-US" sz="4000" dirty="0"/>
-          </a:p>
-        </p:txBody>
-      </p:sp>
     </p:spTree>
     <p:extLst>
       <p:ext uri="{BB962C8B-B14F-4D97-AF65-F5344CB8AC3E}">
-        <p14:creationId xmlns:p14="http://schemas.microsoft.com/office/powerpoint/2010/main" val="274921796"/>
+        <p14:creationId xmlns:p14="http://schemas.microsoft.com/office/powerpoint/2010/main" val="761964569"/>
       </p:ext>
     </p:extLst>
   </p:cSld>
@@ -5546,39 +5648,37 @@
       </p:grpSpPr>
       <p:sp>
         <p:nvSpPr>
-          <p:cNvPr id="2" name="標題 1"/>
-          <p:cNvSpPr>
-            <a:spLocks noGrp="1"/>
-          </p:cNvSpPr>
-          <p:nvPr>
-            <p:ph type="title"/>
-          </p:nvPr>
-        </p:nvSpPr>
-        <p:spPr/>
-        <p:txBody>
-          <a:bodyPr/>
-          <a:lstStyle/>
-          <a:p>
-            <a:pPr algn="ctr"/>
-            <a:r>
-              <a:rPr lang="en-US" altLang="zh-TW" dirty="0" smtClean="0"/>
-              <a:t>BUYER</a:t>
-            </a:r>
-            <a:r>
-              <a:rPr lang="zh-TW" altLang="en-US" dirty="0" smtClean="0"/>
-              <a:t> </a:t>
-            </a:r>
-            <a:r>
-              <a:rPr lang="en-US" altLang="zh-TW" dirty="0" smtClean="0"/>
-              <a:t>paid: 11eth</a:t>
-            </a:r>
-            <a:endParaRPr lang="zh-TW" altLang="en-US" dirty="0"/>
+          <p:cNvPr id="6" name="文字方塊 5"/>
+          <p:cNvSpPr txBox="1"/>
+          <p:nvPr/>
+        </p:nvSpPr>
+        <p:spPr>
+          <a:xfrm>
+            <a:off x="4158762" y="143123"/>
+            <a:ext cx="2236510" cy="707886"/>
+          </a:xfrm>
+          <a:prstGeom prst="rect">
+            <a:avLst/>
+          </a:prstGeom>
+          <a:noFill/>
+        </p:spPr>
+        <p:txBody>
+          <a:bodyPr wrap="none" rtlCol="0">
+            <a:spAutoFit/>
+          </a:bodyPr>
+          <a:lstStyle/>
+          <a:p>
+            <a:r>
+              <a:rPr lang="zh-TW" altLang="en-US" sz="4000" dirty="0" smtClean="0"/>
+              <a:t>尚未付款</a:t>
+            </a:r>
+            <a:endParaRPr lang="zh-TW" altLang="en-US" sz="4000" dirty="0"/>
           </a:p>
         </p:txBody>
       </p:sp>
       <p:pic>
         <p:nvPicPr>
-          <p:cNvPr id="7" name="圖片 6"/>
+          <p:cNvPr id="2" name="圖片 1"/>
           <p:cNvPicPr>
             <a:picLocks noChangeAspect="1"/>
           </p:cNvPicPr>
@@ -5598,8 +5698,38 @@
         </p:blipFill>
         <p:spPr>
           <a:xfrm>
-            <a:off x="0" y="1832624"/>
-            <a:ext cx="12192000" cy="5025376"/>
+            <a:off x="-389615" y="787399"/>
+            <a:ext cx="7717546" cy="5947356"/>
+          </a:xfrm>
+          <a:prstGeom prst="rect">
+            <a:avLst/>
+          </a:prstGeom>
+        </p:spPr>
+      </p:pic>
+      <p:pic>
+        <p:nvPicPr>
+          <p:cNvPr id="4" name="圖片 3"/>
+          <p:cNvPicPr>
+            <a:picLocks noChangeAspect="1"/>
+          </p:cNvPicPr>
+          <p:nvPr/>
+        </p:nvPicPr>
+        <p:blipFill>
+          <a:blip r:embed="rId3" cstate="print">
+            <a:extLst>
+              <a:ext uri="{28A0092B-C50C-407E-A947-70E740481C1C}">
+                <a14:useLocalDpi xmlns:a14="http://schemas.microsoft.com/office/drawing/2010/main" val="0"/>
+              </a:ext>
+            </a:extLst>
+          </a:blip>
+          <a:stretch>
+            <a:fillRect/>
+          </a:stretch>
+        </p:blipFill>
+        <p:spPr>
+          <a:xfrm>
+            <a:off x="6478390" y="497066"/>
+            <a:ext cx="5872636" cy="6124602"/>
           </a:xfrm>
           <a:prstGeom prst="rect">
             <a:avLst/>
@@ -5609,7 +5739,7 @@
     </p:spTree>
     <p:extLst>
       <p:ext uri="{BB962C8B-B14F-4D97-AF65-F5344CB8AC3E}">
-        <p14:creationId xmlns:p14="http://schemas.microsoft.com/office/powerpoint/2010/main" val="3523007913"/>
+        <p14:creationId xmlns:p14="http://schemas.microsoft.com/office/powerpoint/2010/main" val="274921796"/>
       </p:ext>
     </p:extLst>
   </p:cSld>
@@ -5653,7 +5783,12 @@
             <p:ph type="title"/>
           </p:nvPr>
         </p:nvSpPr>
-        <p:spPr/>
+        <p:spPr>
+          <a:xfrm>
+            <a:off x="687125" y="102732"/>
+            <a:ext cx="10515600" cy="1325563"/>
+          </a:xfrm>
+        </p:spPr>
         <p:txBody>
           <a:bodyPr/>
           <a:lstStyle/>
@@ -5661,18 +5796,15 @@
             <a:pPr algn="ctr"/>
             <a:r>
               <a:rPr lang="zh-TW" altLang="en-US" dirty="0" smtClean="0"/>
-              <a:t>已</a:t>
-            </a:r>
-            <a:r>
-              <a:rPr lang="zh-TW" altLang="en-US" dirty="0"/>
-              <a:t>付款</a:t>
-            </a:r>
+              <a:t>未付款</a:t>
+            </a:r>
+            <a:endParaRPr lang="zh-TW" altLang="en-US" dirty="0"/>
           </a:p>
         </p:txBody>
       </p:sp>
       <p:pic>
         <p:nvPicPr>
-          <p:cNvPr id="6" name="圖片 5"/>
+          <p:cNvPr id="3" name="圖片 2"/>
           <p:cNvPicPr>
             <a:picLocks noChangeAspect="1"/>
           </p:cNvPicPr>
@@ -5692,8 +5824,8 @@
         </p:blipFill>
         <p:spPr>
           <a:xfrm>
-            <a:off x="87465" y="1510728"/>
-            <a:ext cx="10058400" cy="5013317"/>
+            <a:off x="0" y="1052127"/>
+            <a:ext cx="10058400" cy="5023889"/>
           </a:xfrm>
           <a:prstGeom prst="rect">
             <a:avLst/>
@@ -5702,7 +5834,7 @@
       </p:pic>
       <p:pic>
         <p:nvPicPr>
-          <p:cNvPr id="5" name="圖片 4"/>
+          <p:cNvPr id="10" name="圖片 9"/>
           <p:cNvPicPr>
             <a:picLocks noChangeAspect="1"/>
           </p:cNvPicPr>
@@ -5722,8 +5854,8 @@
         </p:blipFill>
         <p:spPr>
           <a:xfrm>
-            <a:off x="5041127" y="2240162"/>
-            <a:ext cx="10058400" cy="5215254"/>
+            <a:off x="4063117" y="1857963"/>
+            <a:ext cx="10058400" cy="5000037"/>
           </a:xfrm>
           <a:prstGeom prst="rect">
             <a:avLst/>
@@ -5733,7 +5865,7 @@
     </p:spTree>
     <p:extLst>
       <p:ext uri="{BB962C8B-B14F-4D97-AF65-F5344CB8AC3E}">
-        <p14:creationId xmlns:p14="http://schemas.microsoft.com/office/powerpoint/2010/main" val="2664806659"/>
+        <p14:creationId xmlns:p14="http://schemas.microsoft.com/office/powerpoint/2010/main" val="2114422350"/>
       </p:ext>
     </p:extLst>
   </p:cSld>
@@ -5777,15 +5909,32 @@
             <p:ph type="title"/>
           </p:nvPr>
         </p:nvSpPr>
-        <p:spPr/>
+        <p:spPr>
+          <a:xfrm>
+            <a:off x="726881" y="0"/>
+            <a:ext cx="10515600" cy="724925"/>
+          </a:xfrm>
+        </p:spPr>
         <p:txBody>
           <a:bodyPr/>
           <a:lstStyle/>
           <a:p>
             <a:pPr algn="ctr"/>
             <a:r>
+              <a:rPr lang="en-US" altLang="zh-TW" dirty="0" smtClean="0"/>
+              <a:t>BUYER</a:t>
+            </a:r>
+            <a:r>
               <a:rPr lang="zh-TW" altLang="en-US" dirty="0" smtClean="0"/>
-              <a:t>點擊解鎖以打開置物櫃</a:t>
+              <a:t> </a:t>
+            </a:r>
+            <a:r>
+              <a:rPr lang="en-US" altLang="zh-TW" dirty="0" smtClean="0"/>
+              <a:t>paid: </a:t>
+            </a:r>
+            <a:r>
+              <a:rPr lang="en-US" altLang="zh-TW" dirty="0" smtClean="0"/>
+              <a:t>14eth</a:t>
             </a:r>
             <a:endParaRPr lang="zh-TW" altLang="en-US" dirty="0"/>
           </a:p>
@@ -5813,38 +5962,8 @@
         </p:blipFill>
         <p:spPr>
           <a:xfrm>
-            <a:off x="95416" y="1539614"/>
-            <a:ext cx="10058400" cy="5013317"/>
-          </a:xfrm>
-          <a:prstGeom prst="rect">
-            <a:avLst/>
-          </a:prstGeom>
-        </p:spPr>
-      </p:pic>
-      <p:pic>
-        <p:nvPicPr>
-          <p:cNvPr id="5" name="圖片 4"/>
-          <p:cNvPicPr>
-            <a:picLocks noChangeAspect="1"/>
-          </p:cNvPicPr>
-          <p:nvPr/>
-        </p:nvPicPr>
-        <p:blipFill>
-          <a:blip r:embed="rId3">
-            <a:extLst>
-              <a:ext uri="{28A0092B-C50C-407E-A947-70E740481C1C}">
-                <a14:useLocalDpi xmlns:a14="http://schemas.microsoft.com/office/drawing/2010/main" val="0"/>
-              </a:ext>
-            </a:extLst>
-          </a:blip>
-          <a:stretch>
-            <a:fillRect/>
-          </a:stretch>
-        </p:blipFill>
-        <p:spPr>
-          <a:xfrm>
-            <a:off x="2981739" y="2105420"/>
-            <a:ext cx="10058400" cy="4887753"/>
+            <a:off x="-1" y="552295"/>
+            <a:ext cx="12192001" cy="6305705"/>
           </a:xfrm>
           <a:prstGeom prst="rect">
             <a:avLst/>
@@ -5854,7 +5973,7 @@
     </p:spTree>
     <p:extLst>
       <p:ext uri="{BB962C8B-B14F-4D97-AF65-F5344CB8AC3E}">
-        <p14:creationId xmlns:p14="http://schemas.microsoft.com/office/powerpoint/2010/main" val="2398518547"/>
+        <p14:creationId xmlns:p14="http://schemas.microsoft.com/office/powerpoint/2010/main" val="3523007913"/>
       </p:ext>
     </p:extLst>
   </p:cSld>
@@ -5888,9 +6007,36 @@
           <a:chExt cx="0" cy="0"/>
         </a:xfrm>
       </p:grpSpPr>
+      <p:sp>
+        <p:nvSpPr>
+          <p:cNvPr id="2" name="標題 1"/>
+          <p:cNvSpPr>
+            <a:spLocks noGrp="1"/>
+          </p:cNvSpPr>
+          <p:nvPr>
+            <p:ph type="title"/>
+          </p:nvPr>
+        </p:nvSpPr>
+        <p:spPr/>
+        <p:txBody>
+          <a:bodyPr/>
+          <a:lstStyle/>
+          <a:p>
+            <a:pPr algn="ctr"/>
+            <a:r>
+              <a:rPr lang="zh-TW" altLang="en-US" dirty="0" smtClean="0"/>
+              <a:t>已</a:t>
+            </a:r>
+            <a:r>
+              <a:rPr lang="zh-TW" altLang="en-US" dirty="0"/>
+              <a:t>付款</a:t>
+            </a:r>
+          </a:p>
+        </p:txBody>
+      </p:sp>
       <p:pic>
         <p:nvPicPr>
-          <p:cNvPr id="4" name="圖片 3"/>
+          <p:cNvPr id="7" name="圖片 6"/>
           <p:cNvPicPr>
             <a:picLocks noChangeAspect="1"/>
           </p:cNvPicPr>
@@ -5910,8 +6056,296 @@
         </p:blipFill>
         <p:spPr>
           <a:xfrm>
-            <a:off x="134841" y="850790"/>
-            <a:ext cx="10058400" cy="5390673"/>
+            <a:off x="11927" y="1338374"/>
+            <a:ext cx="10058400" cy="5023889"/>
+          </a:xfrm>
+          <a:prstGeom prst="rect">
+            <a:avLst/>
+          </a:prstGeom>
+        </p:spPr>
+      </p:pic>
+      <p:pic>
+        <p:nvPicPr>
+          <p:cNvPr id="3" name="圖片 2"/>
+          <p:cNvPicPr>
+            <a:picLocks noChangeAspect="1"/>
+          </p:cNvPicPr>
+          <p:nvPr/>
+        </p:nvPicPr>
+        <p:blipFill>
+          <a:blip r:embed="rId3">
+            <a:extLst>
+              <a:ext uri="{28A0092B-C50C-407E-A947-70E740481C1C}">
+                <a14:useLocalDpi xmlns:a14="http://schemas.microsoft.com/office/drawing/2010/main" val="0"/>
+              </a:ext>
+            </a:extLst>
+          </a:blip>
+          <a:stretch>
+            <a:fillRect/>
+          </a:stretch>
+        </p:blipFill>
+        <p:spPr>
+          <a:xfrm>
+            <a:off x="4174435" y="1690688"/>
+            <a:ext cx="10058400" cy="5002702"/>
+          </a:xfrm>
+          <a:prstGeom prst="rect">
+            <a:avLst/>
+          </a:prstGeom>
+        </p:spPr>
+      </p:pic>
+    </p:spTree>
+    <p:extLst>
+      <p:ext uri="{BB962C8B-B14F-4D97-AF65-F5344CB8AC3E}">
+        <p14:creationId xmlns:p14="http://schemas.microsoft.com/office/powerpoint/2010/main" val="2664806659"/>
+      </p:ext>
+    </p:extLst>
+  </p:cSld>
+  <p:clrMapOvr>
+    <a:masterClrMapping/>
+  </p:clrMapOvr>
+  <p:timing>
+    <p:tnLst>
+      <p:par>
+        <p:cTn id="1" dur="indefinite" restart="never" nodeType="tmRoot"/>
+      </p:par>
+    </p:tnLst>
+  </p:timing>
+</p:sld>
+</file>
+
+<file path=ppt/slides/slide27.xml><?xml version="1.0" encoding="utf-8"?>
+<p:sld xmlns:a="http://schemas.openxmlformats.org/drawingml/2006/main" xmlns:r="http://schemas.openxmlformats.org/officeDocument/2006/relationships" xmlns:p="http://schemas.openxmlformats.org/presentationml/2006/main">
+  <p:cSld>
+    <p:spTree>
+      <p:nvGrpSpPr>
+        <p:cNvPr id="1" name=""/>
+        <p:cNvGrpSpPr/>
+        <p:nvPr/>
+      </p:nvGrpSpPr>
+      <p:grpSpPr>
+        <a:xfrm>
+          <a:off x="0" y="0"/>
+          <a:ext cx="0" cy="0"/>
+          <a:chOff x="0" y="0"/>
+          <a:chExt cx="0" cy="0"/>
+        </a:xfrm>
+      </p:grpSpPr>
+      <p:sp>
+        <p:nvSpPr>
+          <p:cNvPr id="2" name="標題 1"/>
+          <p:cNvSpPr>
+            <a:spLocks noGrp="1"/>
+          </p:cNvSpPr>
+          <p:nvPr>
+            <p:ph type="title"/>
+          </p:nvPr>
+        </p:nvSpPr>
+        <p:spPr/>
+        <p:txBody>
+          <a:bodyPr>
+            <a:normAutofit/>
+          </a:bodyPr>
+          <a:lstStyle/>
+          <a:p>
+            <a:pPr algn="ctr"/>
+            <a:r>
+              <a:rPr lang="zh-TW" altLang="en-US" dirty="0"/>
+              <a:t>點擊</a:t>
+            </a:r>
+            <a:r>
+              <a:rPr lang="en-US" altLang="zh-TW" dirty="0"/>
+              <a:t>PAY THEN UNLOCK/</a:t>
+            </a:r>
+            <a:br>
+              <a:rPr lang="en-US" altLang="zh-TW" dirty="0"/>
+            </a:br>
+            <a:r>
+              <a:rPr lang="zh-TW" altLang="en-US" dirty="0" smtClean="0"/>
+              <a:t>將已</a:t>
+            </a:r>
+            <a:r>
+              <a:rPr lang="zh-TW" altLang="en-US" dirty="0"/>
+              <a:t>付款</a:t>
+            </a:r>
+            <a:r>
+              <a:rPr lang="zh-TW" altLang="en-US" dirty="0" smtClean="0"/>
+              <a:t>訂單</a:t>
+            </a:r>
+            <a:r>
+              <a:rPr lang="zh-TW" altLang="en-US" dirty="0"/>
+              <a:t>的</a:t>
+            </a:r>
+            <a:r>
+              <a:rPr lang="en-US" altLang="zh-TW" dirty="0"/>
+              <a:t>_id</a:t>
+            </a:r>
+            <a:r>
+              <a:rPr lang="zh-TW" altLang="en-US" dirty="0"/>
+              <a:t>貼到輸入框並</a:t>
+            </a:r>
+            <a:r>
+              <a:rPr lang="en-US" altLang="zh-TW" dirty="0"/>
+              <a:t>submit</a:t>
+            </a:r>
+            <a:endParaRPr lang="zh-TW" altLang="en-US" dirty="0"/>
+          </a:p>
+        </p:txBody>
+      </p:sp>
+      <p:pic>
+        <p:nvPicPr>
+          <p:cNvPr id="6" name="圖片 5"/>
+          <p:cNvPicPr>
+            <a:picLocks noChangeAspect="1"/>
+          </p:cNvPicPr>
+          <p:nvPr/>
+        </p:nvPicPr>
+        <p:blipFill>
+          <a:blip r:embed="rId2">
+            <a:extLst>
+              <a:ext uri="{28A0092B-C50C-407E-A947-70E740481C1C}">
+                <a14:useLocalDpi xmlns:a14="http://schemas.microsoft.com/office/drawing/2010/main" val="0"/>
+              </a:ext>
+            </a:extLst>
+          </a:blip>
+          <a:stretch>
+            <a:fillRect/>
+          </a:stretch>
+        </p:blipFill>
+        <p:spPr>
+          <a:xfrm>
+            <a:off x="0" y="1619127"/>
+            <a:ext cx="10058400" cy="4992025"/>
+          </a:xfrm>
+          <a:prstGeom prst="rect">
+            <a:avLst/>
+          </a:prstGeom>
+        </p:spPr>
+      </p:pic>
+      <p:pic>
+        <p:nvPicPr>
+          <p:cNvPr id="7" name="圖片 6"/>
+          <p:cNvPicPr>
+            <a:picLocks noChangeAspect="1"/>
+          </p:cNvPicPr>
+          <p:nvPr/>
+        </p:nvPicPr>
+        <p:blipFill>
+          <a:blip r:embed="rId3">
+            <a:extLst>
+              <a:ext uri="{28A0092B-C50C-407E-A947-70E740481C1C}">
+                <a14:useLocalDpi xmlns:a14="http://schemas.microsoft.com/office/drawing/2010/main" val="0"/>
+              </a:ext>
+            </a:extLst>
+          </a:blip>
+          <a:stretch>
+            <a:fillRect/>
+          </a:stretch>
+        </p:blipFill>
+        <p:spPr>
+          <a:xfrm>
+            <a:off x="5120641" y="2043521"/>
+            <a:ext cx="10058400" cy="5021213"/>
+          </a:xfrm>
+          <a:prstGeom prst="rect">
+            <a:avLst/>
+          </a:prstGeom>
+        </p:spPr>
+      </p:pic>
+    </p:spTree>
+    <p:extLst>
+      <p:ext uri="{BB962C8B-B14F-4D97-AF65-F5344CB8AC3E}">
+        <p14:creationId xmlns:p14="http://schemas.microsoft.com/office/powerpoint/2010/main" val="2398518547"/>
+      </p:ext>
+    </p:extLst>
+  </p:cSld>
+  <p:clrMapOvr>
+    <a:masterClrMapping/>
+  </p:clrMapOvr>
+  <p:timing>
+    <p:tnLst>
+      <p:par>
+        <p:cTn id="1" dur="indefinite" restart="never" nodeType="tmRoot"/>
+      </p:par>
+    </p:tnLst>
+  </p:timing>
+</p:sld>
+</file>
+
+<file path=ppt/slides/slide28.xml><?xml version="1.0" encoding="utf-8"?>
+<p:sld xmlns:a="http://schemas.openxmlformats.org/drawingml/2006/main" xmlns:r="http://schemas.openxmlformats.org/officeDocument/2006/relationships" xmlns:p="http://schemas.openxmlformats.org/presentationml/2006/main">
+  <p:cSld>
+    <p:spTree>
+      <p:nvGrpSpPr>
+        <p:cNvPr id="1" name=""/>
+        <p:cNvGrpSpPr/>
+        <p:nvPr/>
+      </p:nvGrpSpPr>
+      <p:grpSpPr>
+        <a:xfrm>
+          <a:off x="0" y="0"/>
+          <a:ext cx="0" cy="0"/>
+          <a:chOff x="0" y="0"/>
+          <a:chExt cx="0" cy="0"/>
+        </a:xfrm>
+      </p:grpSpPr>
+      <p:sp>
+        <p:nvSpPr>
+          <p:cNvPr id="6" name="文字方塊 5"/>
+          <p:cNvSpPr txBox="1"/>
+          <p:nvPr/>
+        </p:nvSpPr>
+        <p:spPr>
+          <a:xfrm>
+            <a:off x="4045786" y="142904"/>
+            <a:ext cx="2236510" cy="707886"/>
+          </a:xfrm>
+          <a:prstGeom prst="rect">
+            <a:avLst/>
+          </a:prstGeom>
+          <a:noFill/>
+        </p:spPr>
+        <p:txBody>
+          <a:bodyPr wrap="none" rtlCol="0">
+            <a:spAutoFit/>
+          </a:bodyPr>
+          <a:lstStyle/>
+          <a:p>
+            <a:r>
+              <a:rPr lang="zh-TW" altLang="en-US" sz="4000" dirty="0" smtClean="0"/>
+              <a:t>點擊解</a:t>
+            </a:r>
+            <a:r>
+              <a:rPr lang="zh-TW" altLang="en-US" sz="4000" dirty="0"/>
+              <a:t>鎖</a:t>
+            </a:r>
+          </a:p>
+        </p:txBody>
+      </p:sp>
+      <p:pic>
+        <p:nvPicPr>
+          <p:cNvPr id="2" name="圖片 1"/>
+          <p:cNvPicPr>
+            <a:picLocks noChangeAspect="1"/>
+          </p:cNvPicPr>
+          <p:nvPr/>
+        </p:nvPicPr>
+        <p:blipFill>
+          <a:blip r:embed="rId2">
+            <a:extLst>
+              <a:ext uri="{28A0092B-C50C-407E-A947-70E740481C1C}">
+                <a14:useLocalDpi xmlns:a14="http://schemas.microsoft.com/office/drawing/2010/main" val="0"/>
+              </a:ext>
+            </a:extLst>
+          </a:blip>
+          <a:stretch>
+            <a:fillRect/>
+          </a:stretch>
+        </p:blipFill>
+        <p:spPr>
+          <a:xfrm>
+            <a:off x="0" y="850790"/>
+            <a:ext cx="10058400" cy="4976205"/>
           </a:xfrm>
           <a:prstGeom prst="rect">
             <a:avLst/>
@@ -5940,47 +6374,14 @@
         </p:blipFill>
         <p:spPr>
           <a:xfrm>
-            <a:off x="4628362" y="850790"/>
-            <a:ext cx="5493648" cy="6858000"/>
+            <a:off x="7036904" y="496847"/>
+            <a:ext cx="4909548" cy="6128839"/>
           </a:xfrm>
           <a:prstGeom prst="rect">
             <a:avLst/>
           </a:prstGeom>
         </p:spPr>
       </p:pic>
-      <p:sp>
-        <p:nvSpPr>
-          <p:cNvPr id="6" name="文字方塊 5"/>
-          <p:cNvSpPr txBox="1"/>
-          <p:nvPr/>
-        </p:nvSpPr>
-        <p:spPr>
-          <a:xfrm>
-            <a:off x="4045786" y="142904"/>
-            <a:ext cx="2236510" cy="707886"/>
-          </a:xfrm>
-          <a:prstGeom prst="rect">
-            <a:avLst/>
-          </a:prstGeom>
-          <a:noFill/>
-        </p:spPr>
-        <p:txBody>
-          <a:bodyPr wrap="none" rtlCol="0">
-            <a:spAutoFit/>
-          </a:bodyPr>
-          <a:lstStyle/>
-          <a:p>
-            <a:r>
-              <a:rPr lang="zh-TW" altLang="en-US" sz="4000" dirty="0" smtClean="0"/>
-              <a:t>點擊解</a:t>
-            </a:r>
-            <a:r>
-              <a:rPr lang="zh-TW" altLang="en-US" sz="4000" dirty="0"/>
-              <a:t>鎖</a:t>
-            </a:r>
-          </a:p>
-        </p:txBody>
-      </p:sp>
     </p:spTree>
     <p:extLst>
       <p:ext uri="{BB962C8B-B14F-4D97-AF65-F5344CB8AC3E}">
@@ -6001,7 +6402,7 @@
 </p:sld>
 </file>
 
-<file path=ppt/slides/slide27.xml><?xml version="1.0" encoding="utf-8"?>
+<file path=ppt/slides/slide29.xml><?xml version="1.0" encoding="utf-8"?>
 <p:sld xmlns:a="http://schemas.openxmlformats.org/drawingml/2006/main" xmlns:r="http://schemas.openxmlformats.org/officeDocument/2006/relationships" xmlns:p="http://schemas.openxmlformats.org/presentationml/2006/main">
   <p:cSld>
     <p:spTree>
@@ -6111,12 +6512,8 @@
           <a:p>
             <a:pPr algn="ctr"/>
             <a:r>
-              <a:rPr lang="en-US" altLang="zh-TW" dirty="0" err="1" smtClean="0"/>
-              <a:t>Bussiness</a:t>
-            </a:r>
-            <a:r>
               <a:rPr lang="en-US" altLang="zh-TW" dirty="0" smtClean="0"/>
-              <a:t> Goal</a:t>
+              <a:t>Business Goal</a:t>
             </a:r>
             <a:endParaRPr lang="zh-TW" altLang="en-US" dirty="0"/>
           </a:p>
@@ -6247,7 +6644,7 @@
       </p:sp>
       <p:pic>
         <p:nvPicPr>
-          <p:cNvPr id="6" name="圖片 5"/>
+          <p:cNvPr id="3" name="圖片 2"/>
           <p:cNvPicPr>
             <a:picLocks noChangeAspect="1"/>
           </p:cNvPicPr>
@@ -6267,8 +6664,8 @@
         </p:blipFill>
         <p:spPr>
           <a:xfrm>
-            <a:off x="0" y="628153"/>
-            <a:ext cx="12192000" cy="6229847"/>
+            <a:off x="0" y="636324"/>
+            <a:ext cx="12182256" cy="6221675"/>
           </a:xfrm>
           <a:prstGeom prst="rect">
             <a:avLst/>
@@ -6312,35 +6709,6 @@
           <a:chExt cx="0" cy="0"/>
         </a:xfrm>
       </p:grpSpPr>
-      <p:sp>
-        <p:nvSpPr>
-          <p:cNvPr id="2" name="標題 1"/>
-          <p:cNvSpPr>
-            <a:spLocks noGrp="1"/>
-          </p:cNvSpPr>
-          <p:nvPr>
-            <p:ph type="title"/>
-          </p:nvPr>
-        </p:nvSpPr>
-        <p:spPr>
-          <a:xfrm>
-            <a:off x="4802587" y="0"/>
-            <a:ext cx="2034871" cy="792191"/>
-          </a:xfrm>
-        </p:spPr>
-        <p:txBody>
-          <a:bodyPr/>
-          <a:lstStyle/>
-          <a:p>
-            <a:pPr algn="ctr"/>
-            <a:r>
-              <a:rPr lang="zh-TW" altLang="en-US" dirty="0" smtClean="0"/>
-              <a:t>部署圖</a:t>
-            </a:r>
-            <a:endParaRPr lang="zh-TW" altLang="en-US" dirty="0"/>
-          </a:p>
-        </p:txBody>
-      </p:sp>
       <p:pic>
         <p:nvPicPr>
           <p:cNvPr id="4" name="圖片 3"/>
@@ -6363,8 +6731,8 @@
         </p:blipFill>
         <p:spPr>
           <a:xfrm>
-            <a:off x="0" y="667909"/>
-            <a:ext cx="12117788" cy="6186349"/>
+            <a:off x="-1" y="0"/>
+            <a:ext cx="12192001" cy="6858000"/>
           </a:xfrm>
           <a:prstGeom prst="rect">
             <a:avLst/>
@@ -6374,20 +6742,13 @@
     </p:spTree>
     <p:extLst>
       <p:ext uri="{BB962C8B-B14F-4D97-AF65-F5344CB8AC3E}">
-        <p14:creationId xmlns:p14="http://schemas.microsoft.com/office/powerpoint/2010/main" val="721793664"/>
+        <p14:creationId xmlns:p14="http://schemas.microsoft.com/office/powerpoint/2010/main" val="3297757538"/>
       </p:ext>
     </p:extLst>
   </p:cSld>
   <p:clrMapOvr>
     <a:masterClrMapping/>
   </p:clrMapOvr>
-  <p:timing>
-    <p:tnLst>
-      <p:par>
-        <p:cTn id="1" dur="indefinite" restart="never" nodeType="tmRoot"/>
-      </p:par>
-    </p:tnLst>
-  </p:timing>
 </p:sld>
 </file>
 
@@ -6420,8 +6781,8 @@
         </p:nvSpPr>
         <p:spPr>
           <a:xfrm>
-            <a:off x="4961613" y="0"/>
-            <a:ext cx="1971261" cy="816045"/>
+            <a:off x="4802587" y="0"/>
+            <a:ext cx="2034871" cy="792191"/>
           </a:xfrm>
         </p:spPr>
         <p:txBody>
@@ -6431,7 +6792,7 @@
             <a:pPr algn="ctr"/>
             <a:r>
               <a:rPr lang="zh-TW" altLang="en-US" dirty="0" smtClean="0"/>
-              <a:t>類別圖</a:t>
+              <a:t>部署圖</a:t>
             </a:r>
             <a:endParaRPr lang="zh-TW" altLang="en-US" dirty="0"/>
           </a:p>
@@ -6439,14 +6800,14 @@
       </p:sp>
       <p:pic>
         <p:nvPicPr>
-          <p:cNvPr id="5" name="圖片 4"/>
+          <p:cNvPr id="3" name="圖片 2"/>
           <p:cNvPicPr>
             <a:picLocks noChangeAspect="1"/>
           </p:cNvPicPr>
           <p:nvPr/>
         </p:nvPicPr>
         <p:blipFill>
-          <a:blip r:embed="rId2">
+          <a:blip r:embed="rId3">
             <a:extLst>
               <a:ext uri="{28A0092B-C50C-407E-A947-70E740481C1C}">
                 <a14:useLocalDpi xmlns:a14="http://schemas.microsoft.com/office/drawing/2010/main" val="0"/>
@@ -6459,8 +6820,8 @@
         </p:blipFill>
         <p:spPr>
           <a:xfrm>
-            <a:off x="0" y="628153"/>
-            <a:ext cx="12192000" cy="6229847"/>
+            <a:off x="-1" y="699715"/>
+            <a:ext cx="12192001" cy="6158284"/>
           </a:xfrm>
           <a:prstGeom prst="rect">
             <a:avLst/>
@@ -6470,7 +6831,7 @@
     </p:spTree>
     <p:extLst>
       <p:ext uri="{BB962C8B-B14F-4D97-AF65-F5344CB8AC3E}">
-        <p14:creationId xmlns:p14="http://schemas.microsoft.com/office/powerpoint/2010/main" val="3822055013"/>
+        <p14:creationId xmlns:p14="http://schemas.microsoft.com/office/powerpoint/2010/main" val="721793664"/>
       </p:ext>
     </p:extLst>
   </p:cSld>
@@ -6504,9 +6865,38 @@
           <a:chExt cx="0" cy="0"/>
         </a:xfrm>
       </p:grpSpPr>
+      <p:sp>
+        <p:nvSpPr>
+          <p:cNvPr id="2" name="標題 1"/>
+          <p:cNvSpPr>
+            <a:spLocks noGrp="1"/>
+          </p:cNvSpPr>
+          <p:nvPr>
+            <p:ph type="title"/>
+          </p:nvPr>
+        </p:nvSpPr>
+        <p:spPr>
+          <a:xfrm>
+            <a:off x="4961613" y="0"/>
+            <a:ext cx="1971261" cy="816045"/>
+          </a:xfrm>
+        </p:spPr>
+        <p:txBody>
+          <a:bodyPr/>
+          <a:lstStyle/>
+          <a:p>
+            <a:pPr algn="ctr"/>
+            <a:r>
+              <a:rPr lang="zh-TW" altLang="en-US" dirty="0" smtClean="0"/>
+              <a:t>類別圖</a:t>
+            </a:r>
+            <a:endParaRPr lang="zh-TW" altLang="en-US" dirty="0"/>
+          </a:p>
+        </p:txBody>
+      </p:sp>
       <p:pic>
         <p:nvPicPr>
-          <p:cNvPr id="4" name="圖片 3"/>
+          <p:cNvPr id="5" name="圖片 4"/>
           <p:cNvPicPr>
             <a:picLocks noChangeAspect="1"/>
           </p:cNvPicPr>
@@ -6526,60 +6916,18 @@
         </p:blipFill>
         <p:spPr>
           <a:xfrm>
-            <a:off x="1017766" y="1033670"/>
-            <a:ext cx="10066351" cy="5017298"/>
+            <a:off x="0" y="628153"/>
+            <a:ext cx="12192000" cy="6229847"/>
           </a:xfrm>
           <a:prstGeom prst="rect">
             <a:avLst/>
           </a:prstGeom>
         </p:spPr>
       </p:pic>
-      <p:sp>
-        <p:nvSpPr>
-          <p:cNvPr id="5" name="文字方塊 4"/>
-          <p:cNvSpPr txBox="1"/>
-          <p:nvPr/>
-        </p:nvSpPr>
-        <p:spPr>
-          <a:xfrm>
-            <a:off x="4019382" y="151074"/>
-            <a:ext cx="3446893" cy="707886"/>
-          </a:xfrm>
-          <a:prstGeom prst="rect">
-            <a:avLst/>
-          </a:prstGeom>
-          <a:noFill/>
-        </p:spPr>
-        <p:txBody>
-          <a:bodyPr wrap="square" rtlCol="0">
-            <a:spAutoFit/>
-          </a:bodyPr>
-          <a:lstStyle/>
-          <a:p>
-            <a:r>
-              <a:rPr lang="zh-TW" altLang="en-US" sz="4000" dirty="0" smtClean="0"/>
-              <a:t>登入頁面</a:t>
-            </a:r>
-            <a:r>
-              <a:rPr lang="en-US" altLang="zh-TW" sz="4000" dirty="0" smtClean="0"/>
-              <a:t>(</a:t>
-            </a:r>
-            <a:r>
-              <a:rPr lang="zh-TW" altLang="en-US" sz="4000" dirty="0" smtClean="0"/>
-              <a:t>首頁</a:t>
-            </a:r>
-            <a:r>
-              <a:rPr lang="en-US" altLang="zh-TW" sz="4000" dirty="0" smtClean="0"/>
-              <a:t>)</a:t>
-            </a:r>
-            <a:endParaRPr lang="zh-TW" altLang="en-US" sz="4000" dirty="0"/>
-          </a:p>
-        </p:txBody>
-      </p:sp>
     </p:spTree>
     <p:extLst>
       <p:ext uri="{BB962C8B-B14F-4D97-AF65-F5344CB8AC3E}">
-        <p14:creationId xmlns:p14="http://schemas.microsoft.com/office/powerpoint/2010/main" val="4128717260"/>
+        <p14:creationId xmlns:p14="http://schemas.microsoft.com/office/powerpoint/2010/main" val="3822055013"/>
       </p:ext>
     </p:extLst>
   </p:cSld>
@@ -6615,43 +6963,49 @@
       </p:grpSpPr>
       <p:sp>
         <p:nvSpPr>
-          <p:cNvPr id="2" name="標題 1"/>
-          <p:cNvSpPr>
-            <a:spLocks noGrp="1"/>
-          </p:cNvSpPr>
-          <p:nvPr>
-            <p:ph type="title"/>
-          </p:nvPr>
-        </p:nvSpPr>
-        <p:spPr>
-          <a:xfrm>
-            <a:off x="3796085" y="284202"/>
-            <a:ext cx="5053717" cy="896810"/>
-          </a:xfrm>
-        </p:spPr>
-        <p:txBody>
-          <a:bodyPr/>
-          <a:lstStyle/>
-          <a:p>
-            <a:r>
-              <a:rPr lang="zh-TW" altLang="en-US" dirty="0" smtClean="0"/>
-              <a:t>註冊帳密</a:t>
-            </a:r>
-            <a:r>
-              <a:rPr lang="en-US" altLang="zh-TW" dirty="0" smtClean="0"/>
-              <a:t>/</a:t>
-            </a:r>
-            <a:r>
-              <a:rPr lang="zh-TW" altLang="en-US" dirty="0" smtClean="0"/>
-              <a:t>成功頁面</a:t>
-            </a:r>
-            <a:endParaRPr lang="zh-TW" altLang="en-US" dirty="0"/>
+          <p:cNvPr id="5" name="文字方塊 4"/>
+          <p:cNvSpPr txBox="1"/>
+          <p:nvPr/>
+        </p:nvSpPr>
+        <p:spPr>
+          <a:xfrm>
+            <a:off x="4019382" y="151074"/>
+            <a:ext cx="3446893" cy="707886"/>
+          </a:xfrm>
+          <a:prstGeom prst="rect">
+            <a:avLst/>
+          </a:prstGeom>
+          <a:noFill/>
+        </p:spPr>
+        <p:txBody>
+          <a:bodyPr wrap="square" rtlCol="0">
+            <a:spAutoFit/>
+          </a:bodyPr>
+          <a:lstStyle/>
+          <a:p>
+            <a:r>
+              <a:rPr lang="zh-TW" altLang="en-US" sz="4000" dirty="0" smtClean="0"/>
+              <a:t>登入頁面</a:t>
+            </a:r>
+            <a:r>
+              <a:rPr lang="en-US" altLang="zh-TW" sz="4000" dirty="0" smtClean="0"/>
+              <a:t>(</a:t>
+            </a:r>
+            <a:r>
+              <a:rPr lang="zh-TW" altLang="en-US" sz="4000" dirty="0" smtClean="0"/>
+              <a:t>首頁</a:t>
+            </a:r>
+            <a:r>
+              <a:rPr lang="en-US" altLang="zh-TW" sz="4000" dirty="0" smtClean="0"/>
+              <a:t>)</a:t>
+            </a:r>
+            <a:endParaRPr lang="zh-TW" altLang="en-US" sz="4000" dirty="0"/>
           </a:p>
         </p:txBody>
       </p:sp>
       <p:pic>
         <p:nvPicPr>
-          <p:cNvPr id="4" name="圖片 3"/>
+          <p:cNvPr id="2" name="圖片 1"/>
           <p:cNvPicPr>
             <a:picLocks noChangeAspect="1"/>
           </p:cNvPicPr>
@@ -6671,38 +7025,8 @@
         </p:blipFill>
         <p:spPr>
           <a:xfrm>
-            <a:off x="0" y="1181012"/>
-            <a:ext cx="10058400" cy="5008024"/>
-          </a:xfrm>
-          <a:prstGeom prst="rect">
-            <a:avLst/>
-          </a:prstGeom>
-        </p:spPr>
-      </p:pic>
-      <p:pic>
-        <p:nvPicPr>
-          <p:cNvPr id="5" name="圖片 4"/>
-          <p:cNvPicPr>
-            <a:picLocks noChangeAspect="1"/>
-          </p:cNvPicPr>
-          <p:nvPr/>
-        </p:nvPicPr>
-        <p:blipFill>
-          <a:blip r:embed="rId3">
-            <a:extLst>
-              <a:ext uri="{28A0092B-C50C-407E-A947-70E740481C1C}">
-                <a14:useLocalDpi xmlns:a14="http://schemas.microsoft.com/office/drawing/2010/main" val="0"/>
-              </a:ext>
-            </a:extLst>
-          </a:blip>
-          <a:stretch>
-            <a:fillRect/>
-          </a:stretch>
-        </p:blipFill>
-        <p:spPr>
-          <a:xfrm>
-            <a:off x="5216055" y="2741790"/>
-            <a:ext cx="11745963" cy="5805686"/>
+            <a:off x="713628" y="1144547"/>
+            <a:ext cx="10058400" cy="4989474"/>
           </a:xfrm>
           <a:prstGeom prst="rect">
             <a:avLst/>
@@ -6712,7 +7036,7 @@
     </p:spTree>
     <p:extLst>
       <p:ext uri="{BB962C8B-B14F-4D97-AF65-F5344CB8AC3E}">
-        <p14:creationId xmlns:p14="http://schemas.microsoft.com/office/powerpoint/2010/main" val="1428734080"/>
+        <p14:creationId xmlns:p14="http://schemas.microsoft.com/office/powerpoint/2010/main" val="4128717260"/>
       </p:ext>
     </p:extLst>
   </p:cSld>
@@ -6758,18 +7082,17 @@
         </p:nvSpPr>
         <p:spPr>
           <a:xfrm>
-            <a:off x="846151" y="159335"/>
-            <a:ext cx="10515600" cy="1325563"/>
+            <a:off x="3796085" y="284202"/>
+            <a:ext cx="5053717" cy="896810"/>
           </a:xfrm>
         </p:spPr>
         <p:txBody>
           <a:bodyPr/>
           <a:lstStyle/>
           <a:p>
-            <a:pPr algn="ctr"/>
             <a:r>
               <a:rPr lang="zh-TW" altLang="en-US" dirty="0" smtClean="0"/>
-              <a:t>輸入帳密</a:t>
+              <a:t>註冊帳密</a:t>
             </a:r>
             <a:r>
               <a:rPr lang="en-US" altLang="zh-TW" dirty="0" smtClean="0"/>
@@ -6777,7 +7100,7 @@
             </a:r>
             <a:r>
               <a:rPr lang="zh-TW" altLang="en-US" dirty="0" smtClean="0"/>
-              <a:t>登入成功</a:t>
+              <a:t>成功頁面</a:t>
             </a:r>
             <a:endParaRPr lang="zh-TW" altLang="en-US" dirty="0"/>
           </a:p>
@@ -6785,7 +7108,7 @@
       </p:sp>
       <p:pic>
         <p:nvPicPr>
-          <p:cNvPr id="4" name="圖片 3"/>
+          <p:cNvPr id="3" name="圖片 2"/>
           <p:cNvPicPr>
             <a:picLocks noChangeAspect="1"/>
           </p:cNvPicPr>
@@ -6805,8 +7128,8 @@
         </p:blipFill>
         <p:spPr>
           <a:xfrm>
-            <a:off x="-135172" y="1206401"/>
-            <a:ext cx="10058400" cy="5018611"/>
+            <a:off x="0" y="1049010"/>
+            <a:ext cx="10058400" cy="5015915"/>
           </a:xfrm>
           <a:prstGeom prst="rect">
             <a:avLst/>
@@ -6815,7 +7138,7 @@
       </p:pic>
       <p:pic>
         <p:nvPicPr>
-          <p:cNvPr id="3" name="圖片 2"/>
+          <p:cNvPr id="6" name="圖片 5"/>
           <p:cNvPicPr>
             <a:picLocks noChangeAspect="1"/>
           </p:cNvPicPr>
@@ -6835,8 +7158,8 @@
         </p:blipFill>
         <p:spPr>
           <a:xfrm>
-            <a:off x="4985468" y="2889765"/>
-            <a:ext cx="10058400" cy="5402895"/>
+            <a:off x="3673503" y="2117633"/>
+            <a:ext cx="10058400" cy="4947101"/>
           </a:xfrm>
           <a:prstGeom prst="rect">
             <a:avLst/>
@@ -6846,7 +7169,7 @@
     </p:spTree>
     <p:extLst>
       <p:ext uri="{BB962C8B-B14F-4D97-AF65-F5344CB8AC3E}">
-        <p14:creationId xmlns:p14="http://schemas.microsoft.com/office/powerpoint/2010/main" val="3424059863"/>
+        <p14:creationId xmlns:p14="http://schemas.microsoft.com/office/powerpoint/2010/main" val="1428734080"/>
       </p:ext>
     </p:extLst>
   </p:cSld>

</xml_diff>

<commit_message>
PPT done except activity diagram.
</commit_message>
<xml_diff>
--- a/CatchBo.pptx
+++ b/CatchBo.pptx
@@ -5,7 +5,7 @@
     <p:sldMasterId id="2147483648" r:id="rId1"/>
   </p:sldMasterIdLst>
   <p:notesMasterIdLst>
-    <p:notesMasterId r:id="rId31"/>
+    <p:notesMasterId r:id="rId33"/>
   </p:notesMasterIdLst>
   <p:sldIdLst>
     <p:sldId id="257" r:id="rId2"/>
@@ -20,23 +20,25 @@
     <p:sldId id="259" r:id="rId11"/>
     <p:sldId id="260" r:id="rId12"/>
     <p:sldId id="261" r:id="rId13"/>
-    <p:sldId id="262" r:id="rId14"/>
-    <p:sldId id="263" r:id="rId15"/>
-    <p:sldId id="264" r:id="rId16"/>
-    <p:sldId id="265" r:id="rId17"/>
-    <p:sldId id="282" r:id="rId18"/>
-    <p:sldId id="268" r:id="rId19"/>
-    <p:sldId id="273" r:id="rId20"/>
-    <p:sldId id="270" r:id="rId21"/>
-    <p:sldId id="284" r:id="rId22"/>
-    <p:sldId id="266" r:id="rId23"/>
-    <p:sldId id="274" r:id="rId24"/>
-    <p:sldId id="267" r:id="rId25"/>
-    <p:sldId id="269" r:id="rId26"/>
-    <p:sldId id="271" r:id="rId27"/>
-    <p:sldId id="272" r:id="rId28"/>
-    <p:sldId id="275" r:id="rId29"/>
-    <p:sldId id="281" r:id="rId30"/>
+    <p:sldId id="285" r:id="rId14"/>
+    <p:sldId id="262" r:id="rId15"/>
+    <p:sldId id="263" r:id="rId16"/>
+    <p:sldId id="264" r:id="rId17"/>
+    <p:sldId id="265" r:id="rId18"/>
+    <p:sldId id="282" r:id="rId19"/>
+    <p:sldId id="286" r:id="rId20"/>
+    <p:sldId id="268" r:id="rId21"/>
+    <p:sldId id="273" r:id="rId22"/>
+    <p:sldId id="270" r:id="rId23"/>
+    <p:sldId id="284" r:id="rId24"/>
+    <p:sldId id="266" r:id="rId25"/>
+    <p:sldId id="274" r:id="rId26"/>
+    <p:sldId id="267" r:id="rId27"/>
+    <p:sldId id="269" r:id="rId28"/>
+    <p:sldId id="271" r:id="rId29"/>
+    <p:sldId id="272" r:id="rId30"/>
+    <p:sldId id="275" r:id="rId31"/>
+    <p:sldId id="281" r:id="rId32"/>
   </p:sldIdLst>
   <p:sldSz cx="12192000" cy="6858000"/>
   <p:notesSz cx="6858000" cy="9144000"/>
@@ -225,7 +227,7 @@
           <a:p>
             <a:fld id="{35DA5B65-FF5A-4949-8C78-8AC5C84B93F6}" type="datetimeFigureOut">
               <a:rPr lang="zh-TW" altLang="en-US" smtClean="0"/>
-              <a:t>2018/7/22</a:t>
+              <a:t>2018/8/12</a:t>
             </a:fld>
             <a:endParaRPr lang="zh-TW" altLang="en-US"/>
           </a:p>
@@ -792,7 +794,7 @@
           <a:p>
             <a:fld id="{B40DF12A-1B60-4DFD-9E28-CDD98DEE53C4}" type="datetimeFigureOut">
               <a:rPr lang="zh-TW" altLang="en-US" smtClean="0"/>
-              <a:t>2018/7/22</a:t>
+              <a:t>2018/8/12</a:t>
             </a:fld>
             <a:endParaRPr lang="zh-TW" altLang="en-US"/>
           </a:p>
@@ -962,7 +964,7 @@
           <a:p>
             <a:fld id="{B40DF12A-1B60-4DFD-9E28-CDD98DEE53C4}" type="datetimeFigureOut">
               <a:rPr lang="zh-TW" altLang="en-US" smtClean="0"/>
-              <a:t>2018/7/22</a:t>
+              <a:t>2018/8/12</a:t>
             </a:fld>
             <a:endParaRPr lang="zh-TW" altLang="en-US"/>
           </a:p>
@@ -1142,7 +1144,7 @@
           <a:p>
             <a:fld id="{B40DF12A-1B60-4DFD-9E28-CDD98DEE53C4}" type="datetimeFigureOut">
               <a:rPr lang="zh-TW" altLang="en-US" smtClean="0"/>
-              <a:t>2018/7/22</a:t>
+              <a:t>2018/8/12</a:t>
             </a:fld>
             <a:endParaRPr lang="zh-TW" altLang="en-US"/>
           </a:p>
@@ -1312,7 +1314,7 @@
           <a:p>
             <a:fld id="{B40DF12A-1B60-4DFD-9E28-CDD98DEE53C4}" type="datetimeFigureOut">
               <a:rPr lang="zh-TW" altLang="en-US" smtClean="0"/>
-              <a:t>2018/7/22</a:t>
+              <a:t>2018/8/12</a:t>
             </a:fld>
             <a:endParaRPr lang="zh-TW" altLang="en-US"/>
           </a:p>
@@ -1558,7 +1560,7 @@
           <a:p>
             <a:fld id="{B40DF12A-1B60-4DFD-9E28-CDD98DEE53C4}" type="datetimeFigureOut">
               <a:rPr lang="zh-TW" altLang="en-US" smtClean="0"/>
-              <a:t>2018/7/22</a:t>
+              <a:t>2018/8/12</a:t>
             </a:fld>
             <a:endParaRPr lang="zh-TW" altLang="en-US"/>
           </a:p>
@@ -1790,7 +1792,7 @@
           <a:p>
             <a:fld id="{B40DF12A-1B60-4DFD-9E28-CDD98DEE53C4}" type="datetimeFigureOut">
               <a:rPr lang="zh-TW" altLang="en-US" smtClean="0"/>
-              <a:t>2018/7/22</a:t>
+              <a:t>2018/8/12</a:t>
             </a:fld>
             <a:endParaRPr lang="zh-TW" altLang="en-US"/>
           </a:p>
@@ -2157,7 +2159,7 @@
           <a:p>
             <a:fld id="{B40DF12A-1B60-4DFD-9E28-CDD98DEE53C4}" type="datetimeFigureOut">
               <a:rPr lang="zh-TW" altLang="en-US" smtClean="0"/>
-              <a:t>2018/7/22</a:t>
+              <a:t>2018/8/12</a:t>
             </a:fld>
             <a:endParaRPr lang="zh-TW" altLang="en-US"/>
           </a:p>
@@ -2275,7 +2277,7 @@
           <a:p>
             <a:fld id="{B40DF12A-1B60-4DFD-9E28-CDD98DEE53C4}" type="datetimeFigureOut">
               <a:rPr lang="zh-TW" altLang="en-US" smtClean="0"/>
-              <a:t>2018/7/22</a:t>
+              <a:t>2018/8/12</a:t>
             </a:fld>
             <a:endParaRPr lang="zh-TW" altLang="en-US"/>
           </a:p>
@@ -2370,7 +2372,7 @@
           <a:p>
             <a:fld id="{B40DF12A-1B60-4DFD-9E28-CDD98DEE53C4}" type="datetimeFigureOut">
               <a:rPr lang="zh-TW" altLang="en-US" smtClean="0"/>
-              <a:t>2018/7/22</a:t>
+              <a:t>2018/8/12</a:t>
             </a:fld>
             <a:endParaRPr lang="zh-TW" altLang="en-US"/>
           </a:p>
@@ -2647,7 +2649,7 @@
           <a:p>
             <a:fld id="{B40DF12A-1B60-4DFD-9E28-CDD98DEE53C4}" type="datetimeFigureOut">
               <a:rPr lang="zh-TW" altLang="en-US" smtClean="0"/>
-              <a:t>2018/7/22</a:t>
+              <a:t>2018/8/12</a:t>
             </a:fld>
             <a:endParaRPr lang="zh-TW" altLang="en-US"/>
           </a:p>
@@ -2900,7 +2902,7 @@
           <a:p>
             <a:fld id="{B40DF12A-1B60-4DFD-9E28-CDD98DEE53C4}" type="datetimeFigureOut">
               <a:rPr lang="zh-TW" altLang="en-US" smtClean="0"/>
-              <a:t>2018/7/22</a:t>
+              <a:t>2018/8/12</a:t>
             </a:fld>
             <a:endParaRPr lang="zh-TW" altLang="en-US"/>
           </a:p>
@@ -3113,7 +3115,7 @@
           <a:p>
             <a:fld id="{B40DF12A-1B60-4DFD-9E28-CDD98DEE53C4}" type="datetimeFigureOut">
               <a:rPr lang="zh-TW" altLang="en-US" smtClean="0"/>
-              <a:t>2018/7/22</a:t>
+              <a:t>2018/8/12</a:t>
             </a:fld>
             <a:endParaRPr lang="zh-TW" altLang="en-US"/>
           </a:p>
@@ -3642,7 +3644,11 @@
             <a:pPr algn="ctr"/>
             <a:r>
               <a:rPr lang="zh-TW" altLang="en-US" dirty="0" smtClean="0"/>
-              <a:t>輸入帳密</a:t>
+              <a:t>賣家輸入</a:t>
+            </a:r>
+            <a:r>
+              <a:rPr lang="zh-TW" altLang="en-US" dirty="0" smtClean="0"/>
+              <a:t>帳密</a:t>
             </a:r>
             <a:r>
               <a:rPr lang="en-US" altLang="zh-TW" dirty="0" smtClean="0"/>
@@ -3658,7 +3664,7 @@
       </p:sp>
       <p:pic>
         <p:nvPicPr>
-          <p:cNvPr id="5" name="圖片 4"/>
+          <p:cNvPr id="3" name="圖片 2"/>
           <p:cNvPicPr>
             <a:picLocks noChangeAspect="1"/>
           </p:cNvPicPr>
@@ -3678,8 +3684,8 @@
         </p:blipFill>
         <p:spPr>
           <a:xfrm>
-            <a:off x="0" y="1141517"/>
-            <a:ext cx="10058400" cy="4981354"/>
+            <a:off x="0" y="1174318"/>
+            <a:ext cx="10058400" cy="4809156"/>
           </a:xfrm>
           <a:prstGeom prst="rect">
             <a:avLst/>
@@ -3688,7 +3694,7 @@
       </p:pic>
       <p:pic>
         <p:nvPicPr>
-          <p:cNvPr id="6" name="圖片 5"/>
+          <p:cNvPr id="4" name="圖片 3"/>
           <p:cNvPicPr>
             <a:picLocks noChangeAspect="1"/>
           </p:cNvPicPr>
@@ -3708,8 +3714,8 @@
         </p:blipFill>
         <p:spPr>
           <a:xfrm>
-            <a:off x="4230094" y="1844766"/>
-            <a:ext cx="10058400" cy="5013234"/>
+            <a:off x="4055165" y="2153668"/>
+            <a:ext cx="10058400" cy="4544553"/>
           </a:xfrm>
           <a:prstGeom prst="rect">
             <a:avLst/>
@@ -3776,7 +3782,19 @@
             <a:pPr algn="ctr"/>
             <a:r>
               <a:rPr lang="zh-TW" altLang="en-US" dirty="0" smtClean="0"/>
-              <a:t>販售商品頁面</a:t>
+              <a:t>販售商品頁</a:t>
+            </a:r>
+            <a:r>
+              <a:rPr lang="zh-TW" altLang="en-US" dirty="0" smtClean="0"/>
+              <a:t>面</a:t>
+            </a:r>
+            <a:r>
+              <a:rPr lang="en-US" altLang="zh-TW" dirty="0" smtClean="0"/>
+              <a:t>/</a:t>
+            </a:r>
+            <a:r>
+              <a:rPr lang="zh-TW" altLang="en-US" dirty="0" smtClean="0"/>
+              <a:t>填寫商品資訊</a:t>
             </a:r>
             <a:endParaRPr lang="zh-TW" altLang="en-US" dirty="0"/>
           </a:p>
@@ -3784,7 +3802,7 @@
       </p:sp>
       <p:pic>
         <p:nvPicPr>
-          <p:cNvPr id="4" name="圖片 3"/>
+          <p:cNvPr id="3" name="圖片 2"/>
           <p:cNvPicPr>
             <a:picLocks noChangeAspect="1"/>
           </p:cNvPicPr>
@@ -3804,8 +3822,38 @@
         </p:blipFill>
         <p:spPr>
           <a:xfrm>
-            <a:off x="1090654" y="1181225"/>
-            <a:ext cx="10058400" cy="4994552"/>
+            <a:off x="0" y="1049049"/>
+            <a:ext cx="10058400" cy="5002730"/>
+          </a:xfrm>
+          <a:prstGeom prst="rect">
+            <a:avLst/>
+          </a:prstGeom>
+        </p:spPr>
+      </p:pic>
+      <p:pic>
+        <p:nvPicPr>
+          <p:cNvPr id="5" name="圖片 4"/>
+          <p:cNvPicPr>
+            <a:picLocks noChangeAspect="1"/>
+          </p:cNvPicPr>
+          <p:nvPr/>
+        </p:nvPicPr>
+        <p:blipFill>
+          <a:blip r:embed="rId3">
+            <a:extLst>
+              <a:ext uri="{28A0092B-C50C-407E-A947-70E740481C1C}">
+                <a14:useLocalDpi xmlns:a14="http://schemas.microsoft.com/office/drawing/2010/main" val="0"/>
+              </a:ext>
+            </a:extLst>
+          </a:blip>
+          <a:stretch>
+            <a:fillRect/>
+          </a:stretch>
+        </p:blipFill>
+        <p:spPr>
+          <a:xfrm>
+            <a:off x="3029447" y="1689829"/>
+            <a:ext cx="10058400" cy="5021255"/>
           </a:xfrm>
           <a:prstGeom prst="rect">
             <a:avLst/>
@@ -3859,7 +3907,12 @@
             <p:ph type="title"/>
           </p:nvPr>
         </p:nvSpPr>
-        <p:spPr/>
+        <p:spPr>
+          <a:xfrm>
+            <a:off x="838200" y="245855"/>
+            <a:ext cx="10515600" cy="1325563"/>
+          </a:xfrm>
+        </p:spPr>
         <p:txBody>
           <a:bodyPr/>
           <a:lstStyle/>
@@ -3867,7 +3920,7 @@
             <a:pPr algn="ctr"/>
             <a:r>
               <a:rPr lang="zh-TW" altLang="en-US" dirty="0" smtClean="0"/>
-              <a:t>填寫欲售商品資訊</a:t>
+              <a:t>刊登成功</a:t>
             </a:r>
             <a:r>
               <a:rPr lang="en-US" altLang="zh-TW" dirty="0" smtClean="0"/>
@@ -3875,7 +3928,7 @@
             </a:r>
             <a:r>
               <a:rPr lang="zh-TW" altLang="en-US" dirty="0" smtClean="0"/>
-              <a:t>刊登成功</a:t>
+              <a:t>賣家登出</a:t>
             </a:r>
             <a:endParaRPr lang="zh-TW" altLang="en-US" dirty="0"/>
           </a:p>
@@ -3883,7 +3936,7 @@
       </p:sp>
       <p:pic>
         <p:nvPicPr>
-          <p:cNvPr id="5" name="圖片 4"/>
+          <p:cNvPr id="7" name="圖片 6"/>
           <p:cNvPicPr>
             <a:picLocks noChangeAspect="1"/>
           </p:cNvPicPr>
@@ -3903,8 +3956,8 @@
         </p:blipFill>
         <p:spPr>
           <a:xfrm>
-            <a:off x="0" y="1303191"/>
-            <a:ext cx="10058400" cy="5042582"/>
+            <a:off x="2468881" y="2083175"/>
+            <a:ext cx="10058400" cy="4774825"/>
           </a:xfrm>
           <a:prstGeom prst="rect">
             <a:avLst/>
@@ -3913,7 +3966,7 @@
       </p:pic>
       <p:pic>
         <p:nvPicPr>
-          <p:cNvPr id="6" name="圖片 5"/>
+          <p:cNvPr id="3" name="圖片 2"/>
           <p:cNvPicPr>
             <a:picLocks noChangeAspect="1"/>
           </p:cNvPicPr>
@@ -3933,8 +3986,8 @@
         </p:blipFill>
         <p:spPr>
           <a:xfrm>
-            <a:off x="3013545" y="1690688"/>
-            <a:ext cx="10058400" cy="5010523"/>
+            <a:off x="-707665" y="1204880"/>
+            <a:ext cx="10058400" cy="5008002"/>
           </a:xfrm>
           <a:prstGeom prst="rect">
             <a:avLst/>
@@ -3996,18 +4049,23 @@
             <a:pPr algn="ctr"/>
             <a:r>
               <a:rPr lang="zh-TW" altLang="en-US" dirty="0" smtClean="0"/>
-              <a:t>瀏覽商品頁</a:t>
-            </a:r>
-            <a:r>
-              <a:rPr lang="zh-TW" altLang="en-US" dirty="0"/>
-              <a:t>面</a:t>
-            </a:r>
+              <a:t>買家註冊</a:t>
+            </a:r>
+            <a:r>
+              <a:rPr lang="en-US" altLang="zh-TW" dirty="0" smtClean="0"/>
+              <a:t>/</a:t>
+            </a:r>
+            <a:r>
+              <a:rPr lang="zh-TW" altLang="en-US" dirty="0" smtClean="0"/>
+              <a:t>註冊成功頁面</a:t>
+            </a:r>
+            <a:endParaRPr lang="zh-TW" altLang="en-US" dirty="0"/>
           </a:p>
         </p:txBody>
       </p:sp>
       <p:pic>
         <p:nvPicPr>
-          <p:cNvPr id="3" name="圖片 2"/>
+          <p:cNvPr id="5" name="圖片 4"/>
           <p:cNvPicPr>
             <a:picLocks noChangeAspect="1"/>
           </p:cNvPicPr>
@@ -4027,8 +4085,8 @@
         </p:blipFill>
         <p:spPr>
           <a:xfrm>
-            <a:off x="0" y="1316032"/>
-            <a:ext cx="10058400" cy="5034516"/>
+            <a:off x="0" y="1357206"/>
+            <a:ext cx="10058400" cy="4782903"/>
           </a:xfrm>
           <a:prstGeom prst="rect">
             <a:avLst/>
@@ -4037,7 +4095,7 @@
       </p:pic>
       <p:pic>
         <p:nvPicPr>
-          <p:cNvPr id="5" name="圖片 4"/>
+          <p:cNvPr id="4" name="圖片 3"/>
           <p:cNvPicPr>
             <a:picLocks noChangeAspect="1"/>
           </p:cNvPicPr>
@@ -4057,8 +4115,8 @@
         </p:blipFill>
         <p:spPr>
           <a:xfrm>
-            <a:off x="3768918" y="1839878"/>
-            <a:ext cx="10058400" cy="4944229"/>
+            <a:off x="4182386" y="2152351"/>
+            <a:ext cx="10058400" cy="4572964"/>
           </a:xfrm>
           <a:prstGeom prst="rect">
             <a:avLst/>
@@ -4068,20 +4126,13 @@
     </p:spTree>
     <p:extLst>
       <p:ext uri="{BB962C8B-B14F-4D97-AF65-F5344CB8AC3E}">
-        <p14:creationId xmlns:p14="http://schemas.microsoft.com/office/powerpoint/2010/main" val="3533658303"/>
+        <p14:creationId xmlns:p14="http://schemas.microsoft.com/office/powerpoint/2010/main" val="1128303336"/>
       </p:ext>
     </p:extLst>
   </p:cSld>
   <p:clrMapOvr>
     <a:masterClrMapping/>
   </p:clrMapOvr>
-  <p:timing>
-    <p:tnLst>
-      <p:par>
-        <p:cTn id="1" dur="indefinite" restart="never" nodeType="tmRoot"/>
-      </p:par>
-    </p:tnLst>
-  </p:timing>
 </p:sld>
 </file>
 
@@ -4120,23 +4171,18 @@
             <a:pPr algn="ctr"/>
             <a:r>
               <a:rPr lang="zh-TW" altLang="en-US" dirty="0" smtClean="0"/>
-              <a:t>單品庫存查詢</a:t>
-            </a:r>
-            <a:r>
-              <a:rPr lang="en-US" altLang="zh-TW" dirty="0" smtClean="0"/>
-              <a:t>/</a:t>
-            </a:r>
-            <a:r>
-              <a:rPr lang="zh-TW" altLang="en-US" dirty="0" smtClean="0"/>
-              <a:t>下訂單頁面</a:t>
-            </a:r>
-            <a:endParaRPr lang="zh-TW" altLang="en-US" dirty="0"/>
+              <a:t>瀏覽商品頁</a:t>
+            </a:r>
+            <a:r>
+              <a:rPr lang="zh-TW" altLang="en-US" dirty="0"/>
+              <a:t>面</a:t>
+            </a:r>
           </a:p>
         </p:txBody>
       </p:sp>
       <p:pic>
         <p:nvPicPr>
-          <p:cNvPr id="5" name="圖片 4"/>
+          <p:cNvPr id="8" name="圖片 7"/>
           <p:cNvPicPr>
             <a:picLocks noChangeAspect="1"/>
           </p:cNvPicPr>
@@ -4156,8 +4202,8 @@
         </p:blipFill>
         <p:spPr>
           <a:xfrm>
-            <a:off x="0" y="1332047"/>
-            <a:ext cx="10058400" cy="4903135"/>
+            <a:off x="0" y="1375136"/>
+            <a:ext cx="10058400" cy="4989474"/>
           </a:xfrm>
           <a:prstGeom prst="rect">
             <a:avLst/>
@@ -4186,8 +4232,8 @@
         </p:blipFill>
         <p:spPr>
           <a:xfrm>
-            <a:off x="3824578" y="1847417"/>
-            <a:ext cx="10058400" cy="5010583"/>
+            <a:off x="3912041" y="1906122"/>
+            <a:ext cx="10058400" cy="5018601"/>
           </a:xfrm>
           <a:prstGeom prst="rect">
             <a:avLst/>
@@ -4197,7 +4243,7 @@
     </p:spTree>
     <p:extLst>
       <p:ext uri="{BB962C8B-B14F-4D97-AF65-F5344CB8AC3E}">
-        <p14:creationId xmlns:p14="http://schemas.microsoft.com/office/powerpoint/2010/main" val="3911553573"/>
+        <p14:creationId xmlns:p14="http://schemas.microsoft.com/office/powerpoint/2010/main" val="3533658303"/>
       </p:ext>
     </p:extLst>
   </p:cSld>
@@ -4243,8 +4289,8 @@
         </p:nvSpPr>
         <p:spPr>
           <a:xfrm>
-            <a:off x="838199" y="365125"/>
-            <a:ext cx="10786607" cy="1325563"/>
+            <a:off x="917713" y="-562"/>
+            <a:ext cx="10515600" cy="1325563"/>
           </a:xfrm>
         </p:spPr>
         <p:txBody>
@@ -4254,15 +4300,27 @@
             <a:pPr algn="ctr"/>
             <a:r>
               <a:rPr lang="zh-TW" altLang="en-US" dirty="0" smtClean="0"/>
-              <a:t>填寫表單資訊</a:t>
+              <a:t>單品庫存查詢</a:t>
             </a:r>
             <a:r>
               <a:rPr lang="en-US" altLang="zh-TW" dirty="0" smtClean="0"/>
-              <a:t>/submit</a:t>
+              <a:t>/</a:t>
             </a:r>
             <a:r>
               <a:rPr lang="zh-TW" altLang="en-US" dirty="0" smtClean="0"/>
-              <a:t>後頁面</a:t>
+              <a:t>點擊</a:t>
+            </a:r>
+            <a:r>
+              <a:rPr lang="en-US" altLang="zh-TW" dirty="0" smtClean="0"/>
+              <a:t>buy</a:t>
+            </a:r>
+            <a:r>
+              <a:rPr lang="zh-TW" altLang="en-US" dirty="0" smtClean="0"/>
+              <a:t>後下訂單</a:t>
+            </a:r>
+            <a:r>
+              <a:rPr lang="zh-TW" altLang="en-US" dirty="0" smtClean="0"/>
+              <a:t>頁面</a:t>
             </a:r>
             <a:endParaRPr lang="zh-TW" altLang="en-US" dirty="0"/>
           </a:p>
@@ -4270,7 +4328,7 @@
       </p:sp>
       <p:pic>
         <p:nvPicPr>
-          <p:cNvPr id="5" name="圖片 4"/>
+          <p:cNvPr id="3" name="圖片 2"/>
           <p:cNvPicPr>
             <a:picLocks noChangeAspect="1"/>
           </p:cNvPicPr>
@@ -4290,8 +4348,8 @@
         </p:blipFill>
         <p:spPr>
           <a:xfrm>
-            <a:off x="0" y="1400846"/>
-            <a:ext cx="10058400" cy="4973290"/>
+            <a:off x="0" y="1964151"/>
+            <a:ext cx="10058400" cy="4893849"/>
           </a:xfrm>
           <a:prstGeom prst="rect">
             <a:avLst/>
@@ -4300,7 +4358,7 @@
       </p:pic>
       <p:pic>
         <p:nvPicPr>
-          <p:cNvPr id="6" name="圖片 5"/>
+          <p:cNvPr id="4" name="圖片 3"/>
           <p:cNvPicPr>
             <a:picLocks noChangeAspect="1"/>
           </p:cNvPicPr>
@@ -4320,8 +4378,8 @@
         </p:blipFill>
         <p:spPr>
           <a:xfrm>
-            <a:off x="3053301" y="1782135"/>
-            <a:ext cx="10058400" cy="5013267"/>
+            <a:off x="5700755" y="1458433"/>
+            <a:ext cx="10058400" cy="4143570"/>
           </a:xfrm>
           <a:prstGeom prst="rect">
             <a:avLst/>
@@ -4331,7 +4389,7 @@
     </p:spTree>
     <p:extLst>
       <p:ext uri="{BB962C8B-B14F-4D97-AF65-F5344CB8AC3E}">
-        <p14:creationId xmlns:p14="http://schemas.microsoft.com/office/powerpoint/2010/main" val="442481425"/>
+        <p14:creationId xmlns:p14="http://schemas.microsoft.com/office/powerpoint/2010/main" val="3911553573"/>
       </p:ext>
     </p:extLst>
   </p:cSld>
@@ -4377,69 +4435,28 @@
         </p:nvSpPr>
         <p:spPr>
           <a:xfrm>
-            <a:off x="528099" y="190197"/>
-            <a:ext cx="11255734" cy="1325563"/>
-          </a:xfrm>
-        </p:spPr>
-        <p:txBody>
-          <a:bodyPr>
-            <a:normAutofit fontScale="90000"/>
-          </a:bodyPr>
+            <a:off x="838199" y="365125"/>
+            <a:ext cx="10786607" cy="1325563"/>
+          </a:xfrm>
+        </p:spPr>
+        <p:txBody>
+          <a:bodyPr/>
           <a:lstStyle/>
           <a:p>
             <a:pPr algn="ctr"/>
             <a:r>
-              <a:rPr lang="zh-TW" altLang="en-US" sz="3600" dirty="0" smtClean="0"/>
-              <a:t>點擊</a:t>
-            </a:r>
-            <a:r>
-              <a:rPr lang="en-US" altLang="zh-TW" sz="3600" dirty="0" smtClean="0"/>
-              <a:t>BUY</a:t>
-            </a:r>
-            <a:r>
-              <a:rPr lang="zh-TW" altLang="en-US" sz="3600" dirty="0" smtClean="0"/>
-              <a:t> </a:t>
-            </a:r>
-            <a:r>
-              <a:rPr lang="en-US" altLang="zh-TW" sz="3600" dirty="0" smtClean="0"/>
-              <a:t>RECORD/</a:t>
-            </a:r>
-            <a:br>
-              <a:rPr lang="en-US" altLang="zh-TW" sz="3600" dirty="0" smtClean="0"/>
-            </a:br>
-            <a:r>
-              <a:rPr lang="zh-TW" altLang="en-US" sz="3600" dirty="0" smtClean="0"/>
-              <a:t>剛下的訂單</a:t>
-            </a:r>
-            <a:r>
-              <a:rPr lang="en-US" altLang="zh-TW" sz="3600" dirty="0" smtClean="0"/>
-              <a:t>”</a:t>
-            </a:r>
-            <a:r>
-              <a:rPr lang="en-US" altLang="zh-TW" sz="3600" dirty="0" err="1" smtClean="0"/>
-              <a:t>merchandiseArriveLocker</a:t>
-            </a:r>
-            <a:r>
-              <a:rPr lang="en-US" altLang="zh-TW" sz="3600" dirty="0" smtClean="0"/>
-              <a:t>”: false</a:t>
-            </a:r>
-            <a:r>
-              <a:rPr lang="zh-TW" altLang="en-US" sz="3600" dirty="0" smtClean="0"/>
-              <a:t>且</a:t>
-            </a:r>
-            <a:r>
-              <a:rPr lang="en-US" altLang="zh-TW" sz="3600" dirty="0" smtClean="0"/>
-              <a:t>”</a:t>
-            </a:r>
-            <a:r>
-              <a:rPr lang="en-US" altLang="zh-TW" sz="3600" dirty="0" err="1" smtClean="0"/>
-              <a:t>moneyPaid</a:t>
-            </a:r>
-            <a:r>
-              <a:rPr lang="en-US" altLang="zh-TW" sz="3600" dirty="0" smtClean="0"/>
-              <a:t>”: false</a:t>
-            </a:r>
-            <a:endParaRPr lang="zh-TW" altLang="en-US" sz="3600" dirty="0"/>
+              <a:rPr lang="zh-TW" altLang="en-US" dirty="0" smtClean="0"/>
+              <a:t>填寫表單資訊</a:t>
+            </a:r>
+            <a:r>
+              <a:rPr lang="en-US" altLang="zh-TW" dirty="0" smtClean="0"/>
+              <a:t>/submit</a:t>
+            </a:r>
+            <a:r>
+              <a:rPr lang="zh-TW" altLang="en-US" dirty="0" smtClean="0"/>
+              <a:t>後頁面</a:t>
+            </a:r>
+            <a:endParaRPr lang="zh-TW" altLang="en-US" dirty="0"/>
           </a:p>
         </p:txBody>
       </p:sp>
@@ -4465,8 +4482,8 @@
         </p:blipFill>
         <p:spPr>
           <a:xfrm>
-            <a:off x="0" y="1345045"/>
-            <a:ext cx="10058400" cy="4973525"/>
+            <a:off x="0" y="1429636"/>
+            <a:ext cx="10058400" cy="4164847"/>
           </a:xfrm>
           <a:prstGeom prst="rect">
             <a:avLst/>
@@ -4495,8 +4512,8 @@
         </p:blipFill>
         <p:spPr>
           <a:xfrm>
-            <a:off x="4214191" y="1921884"/>
-            <a:ext cx="10058400" cy="4936116"/>
+            <a:off x="3339548" y="2247509"/>
+            <a:ext cx="10058400" cy="4411485"/>
           </a:xfrm>
           <a:prstGeom prst="rect">
             <a:avLst/>
@@ -4506,7 +4523,7 @@
     </p:spTree>
     <p:extLst>
       <p:ext uri="{BB962C8B-B14F-4D97-AF65-F5344CB8AC3E}">
-        <p14:creationId xmlns:p14="http://schemas.microsoft.com/office/powerpoint/2010/main" val="2206812976"/>
+        <p14:creationId xmlns:p14="http://schemas.microsoft.com/office/powerpoint/2010/main" val="442481425"/>
       </p:ext>
     </p:extLst>
   </p:cSld>
@@ -4552,28 +4569,86 @@
         </p:nvSpPr>
         <p:spPr>
           <a:xfrm>
-            <a:off x="838199" y="365125"/>
-            <a:ext cx="10921779" cy="1325563"/>
-          </a:xfrm>
-        </p:spPr>
-        <p:txBody>
-          <a:bodyPr/>
+            <a:off x="567855" y="0"/>
+            <a:ext cx="11255734" cy="1325563"/>
+          </a:xfrm>
+        </p:spPr>
+        <p:txBody>
+          <a:bodyPr>
+            <a:normAutofit fontScale="90000"/>
+          </a:bodyPr>
           <a:lstStyle/>
           <a:p>
             <a:pPr algn="ctr"/>
             <a:r>
-              <a:rPr lang="zh-TW" altLang="en-US" dirty="0" smtClean="0"/>
+              <a:rPr lang="zh-TW" altLang="en-US" sz="3600" dirty="0" smtClean="0"/>
               <a:t>點擊</a:t>
             </a:r>
             <a:r>
-              <a:rPr lang="en-US" altLang="zh-TW" dirty="0" smtClean="0"/>
-              <a:t>sell record/jimmy</a:t>
-            </a:r>
-            <a:r>
-              <a:rPr lang="zh-TW" altLang="en-US" dirty="0" smtClean="0"/>
-              <a:t>見到自己接到一筆訂單</a:t>
-            </a:r>
-            <a:endParaRPr lang="zh-TW" altLang="en-US" dirty="0"/>
+              <a:rPr lang="en-US" altLang="zh-TW" sz="3600" dirty="0" smtClean="0"/>
+              <a:t>BUY</a:t>
+            </a:r>
+            <a:r>
+              <a:rPr lang="zh-TW" altLang="en-US" sz="3600" dirty="0" smtClean="0"/>
+              <a:t> </a:t>
+            </a:r>
+            <a:r>
+              <a:rPr lang="en-US" altLang="zh-TW" sz="3600" dirty="0" smtClean="0"/>
+              <a:t>RECORD</a:t>
+            </a:r>
+            <a:r>
+              <a:rPr lang="zh-TW" altLang="en-US" sz="3600" dirty="0" smtClean="0"/>
+              <a:t>，</a:t>
+            </a:r>
+            <a:r>
+              <a:rPr lang="zh-TW" altLang="en-US" sz="3600" dirty="0" smtClean="0"/>
+              <a:t>剛</a:t>
+            </a:r>
+            <a:r>
+              <a:rPr lang="zh-TW" altLang="en-US" sz="3600" dirty="0" smtClean="0"/>
+              <a:t>下的</a:t>
+            </a:r>
+            <a:r>
+              <a:rPr lang="zh-TW" altLang="en-US" sz="3600" dirty="0" smtClean="0"/>
+              <a:t>訂單</a:t>
+            </a:r>
+            <a:r>
+              <a:rPr lang="en-US" altLang="zh-TW" sz="3600" dirty="0" smtClean="0"/>
+              <a:t>“</a:t>
+            </a:r>
+            <a:r>
+              <a:rPr lang="en-US" altLang="zh-TW" sz="3600" dirty="0" err="1" smtClean="0"/>
+              <a:t>merchandiseArriveLocker</a:t>
+            </a:r>
+            <a:r>
+              <a:rPr lang="en-US" altLang="zh-TW" sz="3600" dirty="0" smtClean="0"/>
+              <a:t>”: false</a:t>
+            </a:r>
+            <a:r>
+              <a:rPr lang="zh-TW" altLang="en-US" sz="3600" dirty="0" smtClean="0"/>
+              <a:t>且</a:t>
+            </a:r>
+            <a:r>
+              <a:rPr lang="en-US" altLang="zh-TW" sz="3600" dirty="0" smtClean="0"/>
+              <a:t>“</a:t>
+            </a:r>
+            <a:r>
+              <a:rPr lang="en-US" altLang="zh-TW" sz="3600" dirty="0" err="1" smtClean="0"/>
+              <a:t>moneyPaid</a:t>
+            </a:r>
+            <a:r>
+              <a:rPr lang="en-US" altLang="zh-TW" sz="3600" dirty="0" smtClean="0"/>
+              <a:t>”: </a:t>
+            </a:r>
+            <a:r>
+              <a:rPr lang="en-US" altLang="zh-TW" sz="3600" dirty="0" smtClean="0"/>
+              <a:t>false/</a:t>
+            </a:r>
+            <a:r>
+              <a:rPr lang="zh-TW" altLang="en-US" sz="3600" dirty="0" smtClean="0"/>
+              <a:t>買家登出</a:t>
+            </a:r>
+            <a:endParaRPr lang="zh-TW" altLang="en-US" sz="3600" dirty="0"/>
           </a:p>
         </p:txBody>
       </p:sp>
@@ -4599,8 +4674,8 @@
         </p:blipFill>
         <p:spPr>
           <a:xfrm>
-            <a:off x="0" y="1327413"/>
-            <a:ext cx="10058400" cy="5002618"/>
+            <a:off x="2362502" y="2194559"/>
+            <a:ext cx="9829498" cy="4663441"/>
           </a:xfrm>
           <a:prstGeom prst="rect">
             <a:avLst/>
@@ -4609,7 +4684,7 @@
       </p:pic>
       <p:pic>
         <p:nvPicPr>
-          <p:cNvPr id="5" name="圖片 4"/>
+          <p:cNvPr id="4" name="圖片 3"/>
           <p:cNvPicPr>
             <a:picLocks noChangeAspect="1"/>
           </p:cNvPicPr>
@@ -4629,8 +4704,8 @@
         </p:blipFill>
         <p:spPr>
           <a:xfrm>
-            <a:off x="3713259" y="1836813"/>
-            <a:ext cx="10058400" cy="5021187"/>
+            <a:off x="0" y="1118195"/>
+            <a:ext cx="10058400" cy="5015957"/>
           </a:xfrm>
           <a:prstGeom prst="rect">
             <a:avLst/>
@@ -4640,7 +4715,7 @@
     </p:spTree>
     <p:extLst>
       <p:ext uri="{BB962C8B-B14F-4D97-AF65-F5344CB8AC3E}">
-        <p14:creationId xmlns:p14="http://schemas.microsoft.com/office/powerpoint/2010/main" val="4033178646"/>
+        <p14:creationId xmlns:p14="http://schemas.microsoft.com/office/powerpoint/2010/main" val="2206812976"/>
       </p:ext>
     </p:extLst>
   </p:cSld>
@@ -4684,19 +4759,20 @@
             <p:ph type="title"/>
           </p:nvPr>
         </p:nvSpPr>
-        <p:spPr/>
+        <p:spPr>
+          <a:xfrm>
+            <a:off x="838199" y="365125"/>
+            <a:ext cx="10921779" cy="1325563"/>
+          </a:xfrm>
+        </p:spPr>
         <p:txBody>
           <a:bodyPr/>
           <a:lstStyle/>
           <a:p>
             <a:pPr algn="ctr"/>
             <a:r>
-              <a:rPr lang="en-US" altLang="zh-TW" dirty="0" smtClean="0"/>
-              <a:t>Mailer</a:t>
-            </a:r>
-            <a:r>
               <a:rPr lang="zh-TW" altLang="en-US" dirty="0" smtClean="0"/>
-              <a:t>登入帳密</a:t>
+              <a:t>賣家登入</a:t>
             </a:r>
             <a:r>
               <a:rPr lang="en-US" altLang="zh-TW" dirty="0" smtClean="0"/>
@@ -4704,7 +4780,11 @@
             </a:r>
             <a:r>
               <a:rPr lang="zh-TW" altLang="en-US" dirty="0" smtClean="0"/>
-              <a:t>成功登入頁面</a:t>
+              <a:t>賣家見到</a:t>
+            </a:r>
+            <a:r>
+              <a:rPr lang="zh-TW" altLang="en-US" dirty="0" smtClean="0"/>
+              <a:t>自己接到一筆訂單</a:t>
             </a:r>
             <a:endParaRPr lang="zh-TW" altLang="en-US" dirty="0"/>
           </a:p>
@@ -4712,7 +4792,7 @@
       </p:sp>
       <p:pic>
         <p:nvPicPr>
-          <p:cNvPr id="5" name="圖片 4"/>
+          <p:cNvPr id="4" name="圖片 3"/>
           <p:cNvPicPr>
             <a:picLocks noChangeAspect="1"/>
           </p:cNvPicPr>
@@ -4732,8 +4812,8 @@
         </p:blipFill>
         <p:spPr>
           <a:xfrm>
-            <a:off x="0" y="1337200"/>
-            <a:ext cx="10058400" cy="4973349"/>
+            <a:off x="-644055" y="1364881"/>
+            <a:ext cx="10058400" cy="4573445"/>
           </a:xfrm>
           <a:prstGeom prst="rect">
             <a:avLst/>
@@ -4762,8 +4842,8 @@
         </p:blipFill>
         <p:spPr>
           <a:xfrm>
-            <a:off x="4301656" y="1690688"/>
-            <a:ext cx="10058400" cy="5018578"/>
+            <a:off x="4206240" y="1690688"/>
+            <a:ext cx="10058400" cy="4992142"/>
           </a:xfrm>
           <a:prstGeom prst="rect">
             <a:avLst/>
@@ -4773,7 +4853,7 @@
     </p:spTree>
     <p:extLst>
       <p:ext uri="{BB962C8B-B14F-4D97-AF65-F5344CB8AC3E}">
-        <p14:creationId xmlns:p14="http://schemas.microsoft.com/office/powerpoint/2010/main" val="3384940024"/>
+        <p14:creationId xmlns:p14="http://schemas.microsoft.com/office/powerpoint/2010/main" val="4033178646"/>
       </p:ext>
     </p:extLst>
   </p:cSld>
@@ -4824,12 +4904,8 @@
           <a:p>
             <a:pPr algn="ctr"/>
             <a:r>
-              <a:rPr lang="en-US" altLang="zh-TW" dirty="0" smtClean="0"/>
-              <a:t>Mailman</a:t>
-            </a:r>
-            <a:r>
               <a:rPr lang="zh-TW" altLang="en-US" dirty="0" smtClean="0"/>
-              <a:t>欲放入商品的置物櫃</a:t>
+              <a:t>賣家登出</a:t>
             </a:r>
             <a:endParaRPr lang="zh-TW" altLang="en-US" dirty="0"/>
           </a:p>
@@ -4837,7 +4913,7 @@
       </p:sp>
       <p:pic>
         <p:nvPicPr>
-          <p:cNvPr id="3" name="圖片 2"/>
+          <p:cNvPr id="4" name="圖片 3"/>
           <p:cNvPicPr>
             <a:picLocks noChangeAspect="1"/>
           </p:cNvPicPr>
@@ -4857,38 +4933,8 @@
         </p:blipFill>
         <p:spPr>
           <a:xfrm>
-            <a:off x="0" y="1330525"/>
-            <a:ext cx="10058400" cy="5010602"/>
-          </a:xfrm>
-          <a:prstGeom prst="rect">
-            <a:avLst/>
-          </a:prstGeom>
-        </p:spPr>
-      </p:pic>
-      <p:pic>
-        <p:nvPicPr>
-          <p:cNvPr id="4" name="圖片 3"/>
-          <p:cNvPicPr>
-            <a:picLocks noChangeAspect="1"/>
-          </p:cNvPicPr>
-          <p:nvPr/>
-        </p:nvPicPr>
-        <p:blipFill>
-          <a:blip r:embed="rId3">
-            <a:extLst>
-              <a:ext uri="{28A0092B-C50C-407E-A947-70E740481C1C}">
-                <a14:useLocalDpi xmlns:a14="http://schemas.microsoft.com/office/drawing/2010/main" val="0"/>
-              </a:ext>
-            </a:extLst>
-          </a:blip>
-          <a:stretch>
-            <a:fillRect/>
-          </a:stretch>
-        </p:blipFill>
-        <p:spPr>
-          <a:xfrm>
-            <a:off x="4818490" y="1834117"/>
-            <a:ext cx="10058400" cy="5023883"/>
+            <a:off x="1066800" y="1578475"/>
+            <a:ext cx="10058400" cy="4772040"/>
           </a:xfrm>
           <a:prstGeom prst="rect">
             <a:avLst/>
@@ -4898,20 +4944,13 @@
     </p:spTree>
     <p:extLst>
       <p:ext uri="{BB962C8B-B14F-4D97-AF65-F5344CB8AC3E}">
-        <p14:creationId xmlns:p14="http://schemas.microsoft.com/office/powerpoint/2010/main" val="2051098822"/>
+        <p14:creationId xmlns:p14="http://schemas.microsoft.com/office/powerpoint/2010/main" val="1761955608"/>
       </p:ext>
     </p:extLst>
   </p:cSld>
   <p:clrMapOvr>
     <a:masterClrMapping/>
   </p:clrMapOvr>
-  <p:timing>
-    <p:tnLst>
-      <p:par>
-        <p:cTn id="1" dur="indefinite" restart="never" nodeType="tmRoot"/>
-      </p:par>
-    </p:tnLst>
-  </p:timing>
 </p:sld>
 </file>
 
@@ -5236,32 +5275,44 @@
         </p:nvSpPr>
         <p:spPr>
           <a:xfrm>
-            <a:off x="742785" y="141997"/>
-            <a:ext cx="10515600" cy="519701"/>
+            <a:off x="901811" y="0"/>
+            <a:ext cx="10515600" cy="1325563"/>
           </a:xfrm>
         </p:spPr>
         <p:txBody>
           <a:bodyPr>
-            <a:normAutofit fontScale="90000"/>
+            <a:normAutofit/>
           </a:bodyPr>
           <a:lstStyle/>
           <a:p>
             <a:pPr algn="ctr"/>
             <a:r>
+              <a:rPr lang="en-US" altLang="zh-TW" sz="4000" dirty="0" err="1"/>
+              <a:t>n</a:t>
+            </a:r>
+            <a:r>
               <a:rPr lang="en-US" altLang="zh-TW" sz="4000" dirty="0" err="1" smtClean="0"/>
-              <a:t>db</a:t>
+              <a:t>ccu_delivery</a:t>
+            </a:r>
+            <a:r>
+              <a:rPr lang="en-US" altLang="zh-TW" sz="4000" dirty="0" err="1" smtClean="0"/>
+              <a:t>_company</a:t>
             </a:r>
             <a:r>
               <a:rPr lang="zh-TW" altLang="en-US" sz="4000" dirty="0" smtClean="0"/>
-              <a:t>更新商品抵達</a:t>
+              <a:t>登</a:t>
+            </a:r>
+            <a:r>
+              <a:rPr lang="zh-TW" altLang="en-US" sz="4000" dirty="0" smtClean="0"/>
+              <a:t>入帳密</a:t>
             </a:r>
             <a:r>
               <a:rPr lang="en-US" altLang="zh-TW" sz="4000" dirty="0" smtClean="0"/>
-              <a:t>/mailer</a:t>
+              <a:t>/</a:t>
             </a:r>
             <a:r>
               <a:rPr lang="zh-TW" altLang="en-US" sz="4000" dirty="0" smtClean="0"/>
-              <a:t>登出</a:t>
+              <a:t>成功登入頁面</a:t>
             </a:r>
             <a:endParaRPr lang="zh-TW" altLang="en-US" sz="4000" dirty="0"/>
           </a:p>
@@ -5269,7 +5320,7 @@
       </p:sp>
       <p:pic>
         <p:nvPicPr>
-          <p:cNvPr id="4" name="圖片 3"/>
+          <p:cNvPr id="3" name="圖片 2"/>
           <p:cNvPicPr>
             <a:picLocks noChangeAspect="1"/>
           </p:cNvPicPr>
@@ -5289,8 +5340,8 @@
         </p:blipFill>
         <p:spPr>
           <a:xfrm>
-            <a:off x="-286247" y="657018"/>
-            <a:ext cx="10058400" cy="4989391"/>
+            <a:off x="0" y="991446"/>
+            <a:ext cx="10058400" cy="4796023"/>
           </a:xfrm>
           <a:prstGeom prst="rect">
             <a:avLst/>
@@ -5299,7 +5350,7 @@
       </p:pic>
       <p:pic>
         <p:nvPicPr>
-          <p:cNvPr id="8" name="圖片 7"/>
+          <p:cNvPr id="4" name="圖片 3"/>
           <p:cNvPicPr>
             <a:picLocks noChangeAspect="1"/>
           </p:cNvPicPr>
@@ -5319,8 +5370,8 @@
         </p:blipFill>
         <p:spPr>
           <a:xfrm>
-            <a:off x="2881022" y="3149005"/>
-            <a:ext cx="10058400" cy="4994807"/>
+            <a:off x="3919993" y="1944957"/>
+            <a:ext cx="10058400" cy="4560936"/>
           </a:xfrm>
           <a:prstGeom prst="rect">
             <a:avLst/>
@@ -5330,7 +5381,7 @@
     </p:spTree>
     <p:extLst>
       <p:ext uri="{BB962C8B-B14F-4D97-AF65-F5344CB8AC3E}">
-        <p14:creationId xmlns:p14="http://schemas.microsoft.com/office/powerpoint/2010/main" val="3455872810"/>
+        <p14:creationId xmlns:p14="http://schemas.microsoft.com/office/powerpoint/2010/main" val="3384940024"/>
       </p:ext>
     </p:extLst>
   </p:cSld>
@@ -5374,34 +5425,47 @@
             <p:ph type="title"/>
           </p:nvPr>
         </p:nvSpPr>
-        <p:spPr/>
+        <p:spPr>
+          <a:xfrm>
+            <a:off x="806395" y="0"/>
+            <a:ext cx="10515600" cy="1325563"/>
+          </a:xfrm>
+        </p:spPr>
         <p:txBody>
           <a:bodyPr/>
           <a:lstStyle/>
           <a:p>
+            <a:pPr algn="ctr"/>
+            <a:r>
+              <a:rPr lang="zh-TW" altLang="en-US" dirty="0" smtClean="0"/>
+              <a:t>點擊</a:t>
+            </a:r>
             <a:r>
               <a:rPr lang="en-US" altLang="zh-TW" dirty="0" smtClean="0"/>
-              <a:t>Test3</a:t>
+              <a:t>Mailman</a:t>
             </a:r>
             <a:r>
               <a:rPr lang="zh-TW" altLang="en-US" dirty="0" smtClean="0"/>
-              <a:t>登入</a:t>
+              <a:t>進入頁面</a:t>
             </a:r>
             <a:r>
               <a:rPr lang="en-US" altLang="zh-TW" dirty="0" smtClean="0"/>
               <a:t>/</a:t>
             </a:r>
-            <a:r>
-              <a:rPr lang="en-US" altLang="zh-TW" dirty="0" err="1" smtClean="0"/>
-              <a:t>merchandiseArriveLocker</a:t>
-            </a:r>
+            <a:br>
+              <a:rPr lang="en-US" altLang="zh-TW" dirty="0" smtClean="0"/>
+            </a:br>
             <a:r>
               <a:rPr lang="zh-TW" altLang="en-US" dirty="0" smtClean="0"/>
-              <a:t>變成</a:t>
-            </a:r>
-            <a:r>
-              <a:rPr lang="en-US" altLang="zh-TW" dirty="0" smtClean="0"/>
-              <a:t>true</a:t>
+              <a:t>選取</a:t>
+            </a:r>
+            <a:r>
+              <a:rPr lang="zh-TW" altLang="en-US" dirty="0" smtClean="0"/>
+              <a:t>欲</a:t>
+            </a:r>
+            <a:r>
+              <a:rPr lang="zh-TW" altLang="en-US" dirty="0" smtClean="0"/>
+              <a:t>放入商品的置物櫃</a:t>
             </a:r>
             <a:endParaRPr lang="zh-TW" altLang="en-US" dirty="0"/>
           </a:p>
@@ -5409,7 +5473,7 @@
       </p:sp>
       <p:pic>
         <p:nvPicPr>
-          <p:cNvPr id="6" name="圖片 5"/>
+          <p:cNvPr id="7" name="圖片 6"/>
           <p:cNvPicPr>
             <a:picLocks noChangeAspect="1"/>
           </p:cNvPicPr>
@@ -5429,8 +5493,8 @@
         </p:blipFill>
         <p:spPr>
           <a:xfrm>
-            <a:off x="0" y="1338646"/>
-            <a:ext cx="10058400" cy="4984083"/>
+            <a:off x="-127221" y="1266962"/>
+            <a:ext cx="10058400" cy="4997403"/>
           </a:xfrm>
           <a:prstGeom prst="rect">
             <a:avLst/>
@@ -5439,7 +5503,7 @@
       </p:pic>
       <p:pic>
         <p:nvPicPr>
-          <p:cNvPr id="5" name="圖片 4"/>
+          <p:cNvPr id="8" name="圖片 7"/>
           <p:cNvPicPr>
             <a:picLocks noChangeAspect="1"/>
           </p:cNvPicPr>
@@ -5459,8 +5523,8 @@
         </p:blipFill>
         <p:spPr>
           <a:xfrm>
-            <a:off x="4158532" y="1969373"/>
-            <a:ext cx="10058400" cy="4999945"/>
+            <a:off x="3411109" y="1857902"/>
+            <a:ext cx="10058400" cy="5000098"/>
           </a:xfrm>
           <a:prstGeom prst="rect">
             <a:avLst/>
@@ -5470,13 +5534,20 @@
     </p:spTree>
     <p:extLst>
       <p:ext uri="{BB962C8B-B14F-4D97-AF65-F5344CB8AC3E}">
-        <p14:creationId xmlns:p14="http://schemas.microsoft.com/office/powerpoint/2010/main" val="2179588301"/>
+        <p14:creationId xmlns:p14="http://schemas.microsoft.com/office/powerpoint/2010/main" val="2051098822"/>
       </p:ext>
     </p:extLst>
   </p:cSld>
   <p:clrMapOvr>
     <a:masterClrMapping/>
   </p:clrMapOvr>
+  <p:timing>
+    <p:tnLst>
+      <p:par>
+        <p:cTn id="1" dur="indefinite" restart="never" nodeType="tmRoot"/>
+      </p:par>
+    </p:tnLst>
+  </p:timing>
 </p:sld>
 </file>
 
@@ -5497,9 +5568,52 @@
           <a:chExt cx="0" cy="0"/>
         </a:xfrm>
       </p:grpSpPr>
+      <p:sp>
+        <p:nvSpPr>
+          <p:cNvPr id="2" name="標題 1"/>
+          <p:cNvSpPr>
+            <a:spLocks noGrp="1"/>
+          </p:cNvSpPr>
+          <p:nvPr>
+            <p:ph type="title"/>
+          </p:nvPr>
+        </p:nvSpPr>
+        <p:spPr>
+          <a:xfrm>
+            <a:off x="742785" y="141997"/>
+            <a:ext cx="10515600" cy="519701"/>
+          </a:xfrm>
+        </p:spPr>
+        <p:txBody>
+          <a:bodyPr>
+            <a:normAutofit fontScale="90000"/>
+          </a:bodyPr>
+          <a:lstStyle/>
+          <a:p>
+            <a:pPr algn="ctr"/>
+            <a:r>
+              <a:rPr lang="en-US" altLang="zh-TW" sz="4000" dirty="0" err="1" smtClean="0"/>
+              <a:t>db</a:t>
+            </a:r>
+            <a:r>
+              <a:rPr lang="zh-TW" altLang="en-US" sz="4000" dirty="0" smtClean="0"/>
+              <a:t>更新商品抵達</a:t>
+            </a:r>
+            <a:r>
+              <a:rPr lang="en-US" altLang="zh-TW" sz="4000" dirty="0" smtClean="0"/>
+              <a:t>/mailer</a:t>
+            </a:r>
+            <a:r>
+              <a:rPr lang="zh-TW" altLang="en-US" sz="4000" dirty="0" smtClean="0"/>
+              <a:t>登出</a:t>
+            </a:r>
+            <a:endParaRPr lang="zh-TW" altLang="en-US" sz="4000" dirty="0"/>
+          </a:p>
+        </p:txBody>
+      </p:sp>
       <p:pic>
         <p:nvPicPr>
-          <p:cNvPr id="9" name="圖片 8"/>
+          <p:cNvPr id="7" name="圖片 6"/>
           <p:cNvPicPr>
             <a:picLocks noChangeAspect="1"/>
           </p:cNvPicPr>
@@ -5519,69 +5633,17 @@
         </p:blipFill>
         <p:spPr>
           <a:xfrm>
-            <a:off x="0" y="1489563"/>
-            <a:ext cx="10058400" cy="5010583"/>
+            <a:off x="2234317" y="2085960"/>
+            <a:ext cx="10058400" cy="4772040"/>
           </a:xfrm>
           <a:prstGeom prst="rect">
             <a:avLst/>
           </a:prstGeom>
         </p:spPr>
       </p:pic>
-      <p:sp>
-        <p:nvSpPr>
-          <p:cNvPr id="2" name="標題 1"/>
-          <p:cNvSpPr>
-            <a:spLocks noGrp="1"/>
-          </p:cNvSpPr>
-          <p:nvPr>
-            <p:ph type="title"/>
-          </p:nvPr>
-        </p:nvSpPr>
-        <p:spPr>
-          <a:xfrm>
-            <a:off x="965421" y="229953"/>
-            <a:ext cx="10515600" cy="1325563"/>
-          </a:xfrm>
-        </p:spPr>
-        <p:txBody>
-          <a:bodyPr/>
-          <a:lstStyle/>
-          <a:p>
-            <a:pPr algn="ctr"/>
-            <a:r>
-              <a:rPr lang="zh-TW" altLang="en-US" dirty="0" smtClean="0"/>
-              <a:t>點擊</a:t>
-            </a:r>
-            <a:r>
-              <a:rPr lang="en-US" altLang="zh-TW" dirty="0" smtClean="0"/>
-              <a:t>PAY THEN UNLOCK/</a:t>
-            </a:r>
-            <a:br>
-              <a:rPr lang="en-US" altLang="zh-TW" dirty="0" smtClean="0"/>
-            </a:br>
-            <a:r>
-              <a:rPr lang="zh-TW" altLang="en-US" dirty="0" smtClean="0"/>
-              <a:t>將上一步訂單的</a:t>
-            </a:r>
-            <a:r>
-              <a:rPr lang="en-US" altLang="zh-TW" dirty="0" smtClean="0"/>
-              <a:t>_id</a:t>
-            </a:r>
-            <a:r>
-              <a:rPr lang="zh-TW" altLang="en-US" dirty="0" smtClean="0"/>
-              <a:t>貼到輸入框並</a:t>
-            </a:r>
-            <a:r>
-              <a:rPr lang="en-US" altLang="zh-TW" dirty="0" smtClean="0"/>
-              <a:t>submit</a:t>
-            </a:r>
-            <a:endParaRPr lang="zh-TW" altLang="en-US" dirty="0"/>
-          </a:p>
-        </p:txBody>
-      </p:sp>
       <p:pic>
         <p:nvPicPr>
-          <p:cNvPr id="7" name="圖片 6"/>
+          <p:cNvPr id="3" name="圖片 2"/>
           <p:cNvPicPr>
             <a:picLocks noChangeAspect="1"/>
           </p:cNvPicPr>
@@ -5601,8 +5663,8 @@
         </p:blipFill>
         <p:spPr>
           <a:xfrm>
-            <a:off x="4285753" y="2143078"/>
-            <a:ext cx="10058400" cy="5021213"/>
+            <a:off x="0" y="661698"/>
+            <a:ext cx="10058400" cy="5071192"/>
           </a:xfrm>
           <a:prstGeom prst="rect">
             <a:avLst/>
@@ -5612,7 +5674,7 @@
     </p:spTree>
     <p:extLst>
       <p:ext uri="{BB962C8B-B14F-4D97-AF65-F5344CB8AC3E}">
-        <p14:creationId xmlns:p14="http://schemas.microsoft.com/office/powerpoint/2010/main" val="761964569"/>
+        <p14:creationId xmlns:p14="http://schemas.microsoft.com/office/powerpoint/2010/main" val="3455872810"/>
       </p:ext>
     </p:extLst>
   </p:cSld>
@@ -5648,37 +5710,46 @@
       </p:grpSpPr>
       <p:sp>
         <p:nvSpPr>
-          <p:cNvPr id="6" name="文字方塊 5"/>
-          <p:cNvSpPr txBox="1"/>
-          <p:nvPr/>
-        </p:nvSpPr>
-        <p:spPr>
-          <a:xfrm>
-            <a:off x="4158762" y="143123"/>
-            <a:ext cx="2236510" cy="707886"/>
-          </a:xfrm>
-          <a:prstGeom prst="rect">
-            <a:avLst/>
-          </a:prstGeom>
-          <a:noFill/>
-        </p:spPr>
-        <p:txBody>
-          <a:bodyPr wrap="none" rtlCol="0">
-            <a:spAutoFit/>
-          </a:bodyPr>
-          <a:lstStyle/>
-          <a:p>
-            <a:r>
-              <a:rPr lang="zh-TW" altLang="en-US" sz="4000" dirty="0" smtClean="0"/>
-              <a:t>尚未付款</a:t>
-            </a:r>
-            <a:endParaRPr lang="zh-TW" altLang="en-US" sz="4000" dirty="0"/>
+          <p:cNvPr id="2" name="標題 1"/>
+          <p:cNvSpPr>
+            <a:spLocks noGrp="1"/>
+          </p:cNvSpPr>
+          <p:nvPr>
+            <p:ph type="title"/>
+          </p:nvPr>
+        </p:nvSpPr>
+        <p:spPr/>
+        <p:txBody>
+          <a:bodyPr/>
+          <a:lstStyle/>
+          <a:p>
+            <a:r>
+              <a:rPr lang="zh-TW" altLang="en-US" dirty="0" smtClean="0"/>
+              <a:t>買家登入</a:t>
+            </a:r>
+            <a:r>
+              <a:rPr lang="en-US" altLang="zh-TW" dirty="0" smtClean="0"/>
+              <a:t>/</a:t>
+            </a:r>
+            <a:r>
+              <a:rPr lang="en-US" altLang="zh-TW" dirty="0" err="1" smtClean="0"/>
+              <a:t>merchandiseArriveLocker</a:t>
+            </a:r>
+            <a:r>
+              <a:rPr lang="zh-TW" altLang="en-US" dirty="0" smtClean="0"/>
+              <a:t>變成</a:t>
+            </a:r>
+            <a:r>
+              <a:rPr lang="en-US" altLang="zh-TW" dirty="0" smtClean="0"/>
+              <a:t>true</a:t>
+            </a:r>
+            <a:endParaRPr lang="zh-TW" altLang="en-US" dirty="0"/>
           </a:p>
         </p:txBody>
       </p:sp>
       <p:pic>
         <p:nvPicPr>
-          <p:cNvPr id="2" name="圖片 1"/>
+          <p:cNvPr id="3" name="圖片 2"/>
           <p:cNvPicPr>
             <a:picLocks noChangeAspect="1"/>
           </p:cNvPicPr>
@@ -5698,8 +5769,8 @@
         </p:blipFill>
         <p:spPr>
           <a:xfrm>
-            <a:off x="-389615" y="787399"/>
-            <a:ext cx="7717546" cy="5947356"/>
+            <a:off x="0" y="1350349"/>
+            <a:ext cx="10058400" cy="4164474"/>
           </a:xfrm>
           <a:prstGeom prst="rect">
             <a:avLst/>
@@ -5708,14 +5779,14 @@
       </p:pic>
       <p:pic>
         <p:nvPicPr>
-          <p:cNvPr id="4" name="圖片 3"/>
+          <p:cNvPr id="7" name="圖片 6"/>
           <p:cNvPicPr>
             <a:picLocks noChangeAspect="1"/>
           </p:cNvPicPr>
           <p:nvPr/>
         </p:nvPicPr>
         <p:blipFill>
-          <a:blip r:embed="rId3" cstate="print">
+          <a:blip r:embed="rId3">
             <a:extLst>
               <a:ext uri="{28A0092B-C50C-407E-A947-70E740481C1C}">
                 <a14:useLocalDpi xmlns:a14="http://schemas.microsoft.com/office/drawing/2010/main" val="0"/>
@@ -5728,8 +5799,8 @@
         </p:blipFill>
         <p:spPr>
           <a:xfrm>
-            <a:off x="6478390" y="497066"/>
-            <a:ext cx="5872636" cy="6124602"/>
+            <a:off x="4754880" y="1839399"/>
+            <a:ext cx="10058400" cy="5018601"/>
           </a:xfrm>
           <a:prstGeom prst="rect">
             <a:avLst/>
@@ -5739,20 +5810,13 @@
     </p:spTree>
     <p:extLst>
       <p:ext uri="{BB962C8B-B14F-4D97-AF65-F5344CB8AC3E}">
-        <p14:creationId xmlns:p14="http://schemas.microsoft.com/office/powerpoint/2010/main" val="274921796"/>
+        <p14:creationId xmlns:p14="http://schemas.microsoft.com/office/powerpoint/2010/main" val="2179588301"/>
       </p:ext>
     </p:extLst>
   </p:cSld>
   <p:clrMapOvr>
     <a:masterClrMapping/>
   </p:clrMapOvr>
-  <p:timing>
-    <p:tnLst>
-      <p:par>
-        <p:cTn id="1" dur="indefinite" restart="never" nodeType="tmRoot"/>
-      </p:par>
-    </p:tnLst>
-  </p:timing>
 </p:sld>
 </file>
 
@@ -5785,7 +5849,7 @@
         </p:nvSpPr>
         <p:spPr>
           <a:xfrm>
-            <a:off x="687125" y="102732"/>
+            <a:off x="965421" y="229953"/>
             <a:ext cx="10515600" cy="1325563"/>
           </a:xfrm>
         </p:spPr>
@@ -5796,7 +5860,46 @@
             <a:pPr algn="ctr"/>
             <a:r>
               <a:rPr lang="zh-TW" altLang="en-US" dirty="0" smtClean="0"/>
-              <a:t>未付款</a:t>
+              <a:t>複製</a:t>
+            </a:r>
+            <a:r>
+              <a:rPr lang="en-US" altLang="zh-TW" dirty="0" smtClean="0"/>
+              <a:t>_id</a:t>
+            </a:r>
+            <a:r>
+              <a:rPr lang="zh-TW" altLang="en-US" dirty="0" smtClean="0"/>
+              <a:t>並點</a:t>
+            </a:r>
+            <a:r>
+              <a:rPr lang="zh-TW" altLang="en-US" dirty="0" smtClean="0"/>
+              <a:t>擊</a:t>
+            </a:r>
+            <a:r>
+              <a:rPr lang="en-US" altLang="zh-TW" dirty="0" smtClean="0"/>
+              <a:t>PAY THEN UNLOCK/</a:t>
+            </a:r>
+            <a:br>
+              <a:rPr lang="en-US" altLang="zh-TW" dirty="0" smtClean="0"/>
+            </a:br>
+            <a:r>
+              <a:rPr lang="zh-TW" altLang="en-US" dirty="0" smtClean="0"/>
+              <a:t>將訂單</a:t>
+            </a:r>
+            <a:r>
+              <a:rPr lang="zh-TW" altLang="en-US" dirty="0" smtClean="0"/>
+              <a:t>的</a:t>
+            </a:r>
+            <a:r>
+              <a:rPr lang="en-US" altLang="zh-TW" dirty="0" smtClean="0"/>
+              <a:t>_id</a:t>
+            </a:r>
+            <a:r>
+              <a:rPr lang="zh-TW" altLang="en-US" dirty="0" smtClean="0"/>
+              <a:t>貼到輸入框並</a:t>
+            </a:r>
+            <a:r>
+              <a:rPr lang="en-US" altLang="zh-TW" dirty="0" smtClean="0"/>
+              <a:t>submit</a:t>
             </a:r>
             <a:endParaRPr lang="zh-TW" altLang="en-US" dirty="0"/>
           </a:p>
@@ -5804,7 +5907,7 @@
       </p:sp>
       <p:pic>
         <p:nvPicPr>
-          <p:cNvPr id="3" name="圖片 2"/>
+          <p:cNvPr id="5" name="圖片 4"/>
           <p:cNvPicPr>
             <a:picLocks noChangeAspect="1"/>
           </p:cNvPicPr>
@@ -5824,8 +5927,8 @@
         </p:blipFill>
         <p:spPr>
           <a:xfrm>
-            <a:off x="0" y="1052127"/>
-            <a:ext cx="10058400" cy="5023889"/>
+            <a:off x="0" y="1481628"/>
+            <a:ext cx="10058400" cy="4997435"/>
           </a:xfrm>
           <a:prstGeom prst="rect">
             <a:avLst/>
@@ -5834,7 +5937,7 @@
       </p:pic>
       <p:pic>
         <p:nvPicPr>
-          <p:cNvPr id="10" name="圖片 9"/>
+          <p:cNvPr id="6" name="圖片 5"/>
           <p:cNvPicPr>
             <a:picLocks noChangeAspect="1"/>
           </p:cNvPicPr>
@@ -5854,8 +5957,8 @@
         </p:blipFill>
         <p:spPr>
           <a:xfrm>
-            <a:off x="4063117" y="1857963"/>
-            <a:ext cx="10058400" cy="5000037"/>
+            <a:off x="4579951" y="2472748"/>
+            <a:ext cx="10058400" cy="4397896"/>
           </a:xfrm>
           <a:prstGeom prst="rect">
             <a:avLst/>
@@ -5865,7 +5968,7 @@
     </p:spTree>
     <p:extLst>
       <p:ext uri="{BB962C8B-B14F-4D97-AF65-F5344CB8AC3E}">
-        <p14:creationId xmlns:p14="http://schemas.microsoft.com/office/powerpoint/2010/main" val="2114422350"/>
+        <p14:creationId xmlns:p14="http://schemas.microsoft.com/office/powerpoint/2010/main" val="761964569"/>
       </p:ext>
     </p:extLst>
   </p:cSld>
@@ -5901,48 +6004,37 @@
       </p:grpSpPr>
       <p:sp>
         <p:nvSpPr>
-          <p:cNvPr id="2" name="標題 1"/>
-          <p:cNvSpPr>
-            <a:spLocks noGrp="1"/>
-          </p:cNvSpPr>
-          <p:nvPr>
-            <p:ph type="title"/>
-          </p:nvPr>
-        </p:nvSpPr>
-        <p:spPr>
-          <a:xfrm>
-            <a:off x="726881" y="0"/>
-            <a:ext cx="10515600" cy="724925"/>
-          </a:xfrm>
-        </p:spPr>
-        <p:txBody>
-          <a:bodyPr/>
-          <a:lstStyle/>
-          <a:p>
-            <a:pPr algn="ctr"/>
-            <a:r>
-              <a:rPr lang="en-US" altLang="zh-TW" dirty="0" smtClean="0"/>
-              <a:t>BUYER</a:t>
-            </a:r>
-            <a:r>
-              <a:rPr lang="zh-TW" altLang="en-US" dirty="0" smtClean="0"/>
-              <a:t> </a:t>
-            </a:r>
-            <a:r>
-              <a:rPr lang="en-US" altLang="zh-TW" dirty="0" smtClean="0"/>
-              <a:t>paid: </a:t>
-            </a:r>
-            <a:r>
-              <a:rPr lang="en-US" altLang="zh-TW" dirty="0" smtClean="0"/>
-              <a:t>14eth</a:t>
-            </a:r>
-            <a:endParaRPr lang="zh-TW" altLang="en-US" dirty="0"/>
+          <p:cNvPr id="6" name="文字方塊 5"/>
+          <p:cNvSpPr txBox="1"/>
+          <p:nvPr/>
+        </p:nvSpPr>
+        <p:spPr>
+          <a:xfrm>
+            <a:off x="4158762" y="143123"/>
+            <a:ext cx="2236510" cy="707886"/>
+          </a:xfrm>
+          <a:prstGeom prst="rect">
+            <a:avLst/>
+          </a:prstGeom>
+          <a:noFill/>
+        </p:spPr>
+        <p:txBody>
+          <a:bodyPr wrap="none" rtlCol="0">
+            <a:spAutoFit/>
+          </a:bodyPr>
+          <a:lstStyle/>
+          <a:p>
+            <a:r>
+              <a:rPr lang="zh-TW" altLang="en-US" sz="4000" dirty="0" smtClean="0"/>
+              <a:t>尚未付款</a:t>
+            </a:r>
+            <a:endParaRPr lang="zh-TW" altLang="en-US" sz="4000" dirty="0"/>
           </a:p>
         </p:txBody>
       </p:sp>
       <p:pic>
         <p:nvPicPr>
-          <p:cNvPr id="3" name="圖片 2"/>
+          <p:cNvPr id="5" name="圖片 4"/>
           <p:cNvPicPr>
             <a:picLocks noChangeAspect="1"/>
           </p:cNvPicPr>
@@ -5962,8 +6054,38 @@
         </p:blipFill>
         <p:spPr>
           <a:xfrm>
-            <a:off x="-1" y="552295"/>
-            <a:ext cx="12192001" cy="6305705"/>
+            <a:off x="-1351722" y="1196271"/>
+            <a:ext cx="10058400" cy="4918282"/>
+          </a:xfrm>
+          <a:prstGeom prst="rect">
+            <a:avLst/>
+          </a:prstGeom>
+        </p:spPr>
+      </p:pic>
+      <p:pic>
+        <p:nvPicPr>
+          <p:cNvPr id="4" name="圖片 3"/>
+          <p:cNvPicPr>
+            <a:picLocks noChangeAspect="1"/>
+          </p:cNvPicPr>
+          <p:nvPr/>
+        </p:nvPicPr>
+        <p:blipFill>
+          <a:blip r:embed="rId3" cstate="print">
+            <a:extLst>
+              <a:ext uri="{28A0092B-C50C-407E-A947-70E740481C1C}">
+                <a14:useLocalDpi xmlns:a14="http://schemas.microsoft.com/office/drawing/2010/main" val="0"/>
+              </a:ext>
+            </a:extLst>
+          </a:blip>
+          <a:stretch>
+            <a:fillRect/>
+          </a:stretch>
+        </p:blipFill>
+        <p:spPr>
+          <a:xfrm>
+            <a:off x="6478390" y="497066"/>
+            <a:ext cx="5872636" cy="6124602"/>
           </a:xfrm>
           <a:prstGeom prst="rect">
             <a:avLst/>
@@ -5973,7 +6095,7 @@
     </p:spTree>
     <p:extLst>
       <p:ext uri="{BB962C8B-B14F-4D97-AF65-F5344CB8AC3E}">
-        <p14:creationId xmlns:p14="http://schemas.microsoft.com/office/powerpoint/2010/main" val="3523007913"/>
+        <p14:creationId xmlns:p14="http://schemas.microsoft.com/office/powerpoint/2010/main" val="274921796"/>
       </p:ext>
     </p:extLst>
   </p:cSld>
@@ -6017,7 +6139,12 @@
             <p:ph type="title"/>
           </p:nvPr>
         </p:nvSpPr>
-        <p:spPr/>
+        <p:spPr>
+          <a:xfrm>
+            <a:off x="687125" y="102732"/>
+            <a:ext cx="10515600" cy="1325563"/>
+          </a:xfrm>
+        </p:spPr>
         <p:txBody>
           <a:bodyPr/>
           <a:lstStyle/>
@@ -6025,18 +6152,19 @@
             <a:pPr algn="ctr"/>
             <a:r>
               <a:rPr lang="zh-TW" altLang="en-US" dirty="0" smtClean="0"/>
-              <a:t>已</a:t>
-            </a:r>
-            <a:r>
-              <a:rPr lang="zh-TW" altLang="en-US" dirty="0"/>
+              <a:t>確實是未</a:t>
+            </a:r>
+            <a:r>
+              <a:rPr lang="zh-TW" altLang="en-US" dirty="0" smtClean="0"/>
               <a:t>付款</a:t>
             </a:r>
+            <a:endParaRPr lang="zh-TW" altLang="en-US" dirty="0"/>
           </a:p>
         </p:txBody>
       </p:sp>
       <p:pic>
         <p:nvPicPr>
-          <p:cNvPr id="7" name="圖片 6"/>
+          <p:cNvPr id="5" name="圖片 4"/>
           <p:cNvPicPr>
             <a:picLocks noChangeAspect="1"/>
           </p:cNvPicPr>
@@ -6056,38 +6184,8 @@
         </p:blipFill>
         <p:spPr>
           <a:xfrm>
-            <a:off x="11927" y="1338374"/>
-            <a:ext cx="10058400" cy="5023889"/>
-          </a:xfrm>
-          <a:prstGeom prst="rect">
-            <a:avLst/>
-          </a:prstGeom>
-        </p:spPr>
-      </p:pic>
-      <p:pic>
-        <p:nvPicPr>
-          <p:cNvPr id="3" name="圖片 2"/>
-          <p:cNvPicPr>
-            <a:picLocks noChangeAspect="1"/>
-          </p:cNvPicPr>
-          <p:nvPr/>
-        </p:nvPicPr>
-        <p:blipFill>
-          <a:blip r:embed="rId3">
-            <a:extLst>
-              <a:ext uri="{28A0092B-C50C-407E-A947-70E740481C1C}">
-                <a14:useLocalDpi xmlns:a14="http://schemas.microsoft.com/office/drawing/2010/main" val="0"/>
-              </a:ext>
-            </a:extLst>
-          </a:blip>
-          <a:stretch>
-            <a:fillRect/>
-          </a:stretch>
-        </p:blipFill>
-        <p:spPr>
-          <a:xfrm>
-            <a:off x="4174435" y="1690688"/>
-            <a:ext cx="10058400" cy="5002702"/>
+            <a:off x="1359673" y="1287530"/>
+            <a:ext cx="10058400" cy="5015944"/>
           </a:xfrm>
           <a:prstGeom prst="rect">
             <a:avLst/>
@@ -6097,7 +6195,7 @@
     </p:spTree>
     <p:extLst>
       <p:ext uri="{BB962C8B-B14F-4D97-AF65-F5344CB8AC3E}">
-        <p14:creationId xmlns:p14="http://schemas.microsoft.com/office/powerpoint/2010/main" val="2664806659"/>
+        <p14:creationId xmlns:p14="http://schemas.microsoft.com/office/powerpoint/2010/main" val="2114422350"/>
       </p:ext>
     </p:extLst>
   </p:cSld>
@@ -6141,52 +6239,61 @@
             <p:ph type="title"/>
           </p:nvPr>
         </p:nvSpPr>
-        <p:spPr/>
+        <p:spPr>
+          <a:xfrm>
+            <a:off x="687124" y="78697"/>
+            <a:ext cx="10508312" cy="1273260"/>
+          </a:xfrm>
+        </p:spPr>
         <p:txBody>
           <a:bodyPr>
-            <a:normAutofit/>
+            <a:normAutofit fontScale="90000"/>
           </a:bodyPr>
           <a:lstStyle/>
           <a:p>
             <a:pPr algn="ctr"/>
             <a:r>
-              <a:rPr lang="zh-TW" altLang="en-US" dirty="0"/>
-              <a:t>點擊</a:t>
-            </a:r>
-            <a:r>
-              <a:rPr lang="en-US" altLang="zh-TW" dirty="0"/>
-              <a:t>PAY THEN UNLOCK/</a:t>
+              <a:rPr lang="en-US" altLang="zh-TW" dirty="0" smtClean="0"/>
+              <a:t>Buy Record</a:t>
+            </a:r>
+            <a:r>
+              <a:rPr lang="zh-TW" altLang="en-US" dirty="0" smtClean="0"/>
+              <a:t>中找到該訂單合約地址</a:t>
+            </a:r>
+            <a:r>
+              <a:rPr lang="en-US" altLang="zh-TW" dirty="0" smtClean="0"/>
+              <a:t>/</a:t>
             </a:r>
             <a:br>
-              <a:rPr lang="en-US" altLang="zh-TW" dirty="0"/>
+              <a:rPr lang="en-US" altLang="zh-TW" dirty="0" smtClean="0"/>
             </a:br>
             <a:r>
               <a:rPr lang="zh-TW" altLang="en-US" dirty="0" smtClean="0"/>
-              <a:t>將已</a:t>
-            </a:r>
-            <a:r>
-              <a:rPr lang="zh-TW" altLang="en-US" dirty="0"/>
-              <a:t>付款</a:t>
+              <a:t>貼到</a:t>
+            </a:r>
+            <a:r>
+              <a:rPr lang="en-US" altLang="zh-TW" dirty="0" smtClean="0"/>
+              <a:t>wallet</a:t>
             </a:r>
             <a:r>
               <a:rPr lang="zh-TW" altLang="en-US" dirty="0" smtClean="0"/>
-              <a:t>訂單</a:t>
-            </a:r>
-            <a:r>
-              <a:rPr lang="zh-TW" altLang="en-US" dirty="0"/>
-              <a:t>的</a:t>
-            </a:r>
-            <a:r>
-              <a:rPr lang="en-US" altLang="zh-TW" dirty="0"/>
-              <a:t>_id</a:t>
-            </a:r>
-            <a:r>
-              <a:rPr lang="zh-TW" altLang="en-US" dirty="0"/>
-              <a:t>貼到輸入框並</a:t>
-            </a:r>
-            <a:r>
-              <a:rPr lang="en-US" altLang="zh-TW" dirty="0"/>
-              <a:t>submit</a:t>
+              <a:t> </a:t>
+            </a:r>
+            <a:r>
+              <a:rPr lang="en-US" altLang="zh-TW" dirty="0" smtClean="0"/>
+              <a:t>for</a:t>
+            </a:r>
+            <a:r>
+              <a:rPr lang="zh-TW" altLang="en-US" dirty="0" smtClean="0"/>
+              <a:t> </a:t>
+            </a:r>
+            <a:r>
+              <a:rPr lang="en-US" altLang="zh-TW" dirty="0" err="1" smtClean="0"/>
+              <a:t>catchbo</a:t>
+            </a:r>
+            <a:r>
+              <a:rPr lang="zh-TW" altLang="en-US" dirty="0" smtClean="0"/>
+              <a:t>即可付款</a:t>
             </a:r>
             <a:endParaRPr lang="zh-TW" altLang="en-US" dirty="0"/>
           </a:p>
@@ -6194,7 +6301,7 @@
       </p:sp>
       <p:pic>
         <p:nvPicPr>
-          <p:cNvPr id="6" name="圖片 5"/>
+          <p:cNvPr id="13" name="圖片 12"/>
           <p:cNvPicPr>
             <a:picLocks noChangeAspect="1"/>
           </p:cNvPicPr>
@@ -6214,8 +6321,8 @@
         </p:blipFill>
         <p:spPr>
           <a:xfrm>
-            <a:off x="0" y="1619127"/>
-            <a:ext cx="10058400" cy="4992025"/>
+            <a:off x="0" y="1247774"/>
+            <a:ext cx="10058400" cy="5015944"/>
           </a:xfrm>
           <a:prstGeom prst="rect">
             <a:avLst/>
@@ -6224,7 +6331,7 @@
       </p:pic>
       <p:pic>
         <p:nvPicPr>
-          <p:cNvPr id="7" name="圖片 6"/>
+          <p:cNvPr id="11" name="圖片 10"/>
           <p:cNvPicPr>
             <a:picLocks noChangeAspect="1"/>
           </p:cNvPicPr>
@@ -6244,8 +6351,8 @@
         </p:blipFill>
         <p:spPr>
           <a:xfrm>
-            <a:off x="5120641" y="2043521"/>
-            <a:ext cx="10058400" cy="5021213"/>
+            <a:off x="7036904" y="1844749"/>
+            <a:ext cx="10058400" cy="5013251"/>
           </a:xfrm>
           <a:prstGeom prst="rect">
             <a:avLst/>
@@ -6255,7 +6362,7 @@
     </p:spTree>
     <p:extLst>
       <p:ext uri="{BB962C8B-B14F-4D97-AF65-F5344CB8AC3E}">
-        <p14:creationId xmlns:p14="http://schemas.microsoft.com/office/powerpoint/2010/main" val="2398518547"/>
+        <p14:creationId xmlns:p14="http://schemas.microsoft.com/office/powerpoint/2010/main" val="3523007913"/>
       </p:ext>
     </p:extLst>
   </p:cSld>
@@ -6291,40 +6398,36 @@
       </p:grpSpPr>
       <p:sp>
         <p:nvSpPr>
-          <p:cNvPr id="6" name="文字方塊 5"/>
-          <p:cNvSpPr txBox="1"/>
-          <p:nvPr/>
-        </p:nvSpPr>
-        <p:spPr>
-          <a:xfrm>
-            <a:off x="4045786" y="142904"/>
-            <a:ext cx="2236510" cy="707886"/>
-          </a:xfrm>
-          <a:prstGeom prst="rect">
-            <a:avLst/>
-          </a:prstGeom>
-          <a:noFill/>
-        </p:spPr>
-        <p:txBody>
-          <a:bodyPr wrap="none" rtlCol="0">
-            <a:spAutoFit/>
-          </a:bodyPr>
-          <a:lstStyle/>
-          <a:p>
-            <a:r>
-              <a:rPr lang="zh-TW" altLang="en-US" sz="4000" dirty="0" smtClean="0"/>
-              <a:t>點擊解</a:t>
-            </a:r>
-            <a:r>
-              <a:rPr lang="zh-TW" altLang="en-US" sz="4000" dirty="0"/>
-              <a:t>鎖</a:t>
-            </a:r>
+          <p:cNvPr id="2" name="標題 1"/>
+          <p:cNvSpPr>
+            <a:spLocks noGrp="1"/>
+          </p:cNvSpPr>
+          <p:nvPr>
+            <p:ph type="title"/>
+          </p:nvPr>
+        </p:nvSpPr>
+        <p:spPr>
+          <a:xfrm>
+            <a:off x="814346" y="0"/>
+            <a:ext cx="10515600" cy="839898"/>
+          </a:xfrm>
+        </p:spPr>
+        <p:txBody>
+          <a:bodyPr/>
+          <a:lstStyle/>
+          <a:p>
+            <a:pPr algn="ctr"/>
+            <a:r>
+              <a:rPr lang="zh-TW" altLang="en-US" dirty="0" smtClean="0"/>
+              <a:t>成功付款頁面</a:t>
+            </a:r>
+            <a:endParaRPr lang="zh-TW" altLang="en-US" dirty="0"/>
           </a:p>
         </p:txBody>
       </p:sp>
       <p:pic>
         <p:nvPicPr>
-          <p:cNvPr id="2" name="圖片 1"/>
+          <p:cNvPr id="5" name="圖片 4"/>
           <p:cNvPicPr>
             <a:picLocks noChangeAspect="1"/>
           </p:cNvPicPr>
@@ -6344,8 +6447,8 @@
         </p:blipFill>
         <p:spPr>
           <a:xfrm>
-            <a:off x="0" y="850790"/>
-            <a:ext cx="10058400" cy="4976205"/>
+            <a:off x="0" y="839898"/>
+            <a:ext cx="10058400" cy="4841168"/>
           </a:xfrm>
           <a:prstGeom prst="rect">
             <a:avLst/>
@@ -6354,7 +6457,7 @@
       </p:pic>
       <p:pic>
         <p:nvPicPr>
-          <p:cNvPr id="5" name="圖片 4"/>
+          <p:cNvPr id="6" name="圖片 5"/>
           <p:cNvPicPr>
             <a:picLocks noChangeAspect="1"/>
           </p:cNvPicPr>
@@ -6374,8 +6477,8 @@
         </p:blipFill>
         <p:spPr>
           <a:xfrm>
-            <a:off x="7036904" y="496847"/>
-            <a:ext cx="4909548" cy="6128839"/>
+            <a:off x="4446147" y="3148717"/>
+            <a:ext cx="7745854" cy="3709283"/>
           </a:xfrm>
           <a:prstGeom prst="rect">
             <a:avLst/>
@@ -6385,7 +6488,7 @@
     </p:spTree>
     <p:extLst>
       <p:ext uri="{BB962C8B-B14F-4D97-AF65-F5344CB8AC3E}">
-        <p14:creationId xmlns:p14="http://schemas.microsoft.com/office/powerpoint/2010/main" val="1910811663"/>
+        <p14:creationId xmlns:p14="http://schemas.microsoft.com/office/powerpoint/2010/main" val="2664806659"/>
       </p:ext>
     </p:extLst>
   </p:cSld>
@@ -6431,37 +6534,132 @@
         </p:nvSpPr>
         <p:spPr>
           <a:xfrm>
-            <a:off x="4444778" y="3053301"/>
-            <a:ext cx="2885661" cy="545700"/>
+            <a:off x="846151" y="0"/>
+            <a:ext cx="10515600" cy="1325563"/>
           </a:xfrm>
         </p:spPr>
         <p:txBody>
           <a:bodyPr>
-            <a:normAutofit fontScale="90000"/>
+            <a:normAutofit/>
           </a:bodyPr>
           <a:lstStyle/>
           <a:p>
             <a:pPr algn="ctr"/>
             <a:r>
+              <a:rPr lang="en-US" altLang="zh-TW" dirty="0" err="1" smtClean="0"/>
+              <a:t>moneyPaid</a:t>
+            </a:r>
+            <a:r>
+              <a:rPr lang="zh-TW" altLang="en-US" dirty="0" smtClean="0"/>
+              <a:t>變為</a:t>
+            </a:r>
+            <a:r>
               <a:rPr lang="en-US" altLang="zh-TW" dirty="0" smtClean="0"/>
-              <a:t>THANK</a:t>
-            </a:r>
+              <a:t>true/</a:t>
+            </a:r>
+            <a:r>
+              <a:rPr lang="en-US" altLang="zh-TW" dirty="0"/>
+              <a:t/>
+            </a:r>
+            <a:br>
+              <a:rPr lang="en-US" altLang="zh-TW" dirty="0"/>
+            </a:br>
             <a:r>
               <a:rPr lang="zh-TW" altLang="en-US" dirty="0" smtClean="0"/>
-              <a:t> </a:t>
-            </a:r>
-            <a:r>
-              <a:rPr lang="en-US" altLang="zh-TW" dirty="0" smtClean="0"/>
-              <a:t>YOU</a:t>
+              <a:t>將已</a:t>
+            </a:r>
+            <a:r>
+              <a:rPr lang="zh-TW" altLang="en-US" dirty="0"/>
+              <a:t>付款</a:t>
+            </a:r>
+            <a:r>
+              <a:rPr lang="zh-TW" altLang="en-US" dirty="0" smtClean="0"/>
+              <a:t>訂單</a:t>
+            </a:r>
+            <a:r>
+              <a:rPr lang="zh-TW" altLang="en-US" dirty="0"/>
+              <a:t>的</a:t>
+            </a:r>
+            <a:r>
+              <a:rPr lang="en-US" altLang="zh-TW" dirty="0"/>
+              <a:t>_id</a:t>
+            </a:r>
+            <a:r>
+              <a:rPr lang="zh-TW" altLang="en-US" dirty="0"/>
+              <a:t>貼到輸入框並</a:t>
+            </a:r>
+            <a:r>
+              <a:rPr lang="en-US" altLang="zh-TW" dirty="0"/>
+              <a:t>submit</a:t>
             </a:r>
             <a:endParaRPr lang="zh-TW" altLang="en-US" dirty="0"/>
           </a:p>
         </p:txBody>
       </p:sp>
+      <p:pic>
+        <p:nvPicPr>
+          <p:cNvPr id="14" name="圖片 13"/>
+          <p:cNvPicPr>
+            <a:picLocks noChangeAspect="1"/>
+          </p:cNvPicPr>
+          <p:nvPr/>
+        </p:nvPicPr>
+        <p:blipFill>
+          <a:blip r:embed="rId2">
+            <a:extLst>
+              <a:ext uri="{28A0092B-C50C-407E-A947-70E740481C1C}">
+                <a14:useLocalDpi xmlns:a14="http://schemas.microsoft.com/office/drawing/2010/main" val="0"/>
+              </a:ext>
+            </a:extLst>
+          </a:blip>
+          <a:stretch>
+            <a:fillRect/>
+          </a:stretch>
+        </p:blipFill>
+        <p:spPr>
+          <a:xfrm>
+            <a:off x="0" y="1325563"/>
+            <a:ext cx="10058400" cy="5005390"/>
+          </a:xfrm>
+          <a:prstGeom prst="rect">
+            <a:avLst/>
+          </a:prstGeom>
+        </p:spPr>
+      </p:pic>
+      <p:pic>
+        <p:nvPicPr>
+          <p:cNvPr id="15" name="圖片 14"/>
+          <p:cNvPicPr>
+            <a:picLocks noChangeAspect="1"/>
+          </p:cNvPicPr>
+          <p:nvPr/>
+        </p:nvPicPr>
+        <p:blipFill>
+          <a:blip r:embed="rId3">
+            <a:extLst>
+              <a:ext uri="{28A0092B-C50C-407E-A947-70E740481C1C}">
+                <a14:useLocalDpi xmlns:a14="http://schemas.microsoft.com/office/drawing/2010/main" val="0"/>
+              </a:ext>
+            </a:extLst>
+          </a:blip>
+          <a:stretch>
+            <a:fillRect/>
+          </a:stretch>
+        </p:blipFill>
+        <p:spPr>
+          <a:xfrm>
+            <a:off x="6332551" y="1622190"/>
+            <a:ext cx="10058400" cy="4412136"/>
+          </a:xfrm>
+          <a:prstGeom prst="rect">
+            <a:avLst/>
+          </a:prstGeom>
+        </p:spPr>
+      </p:pic>
     </p:spTree>
     <p:extLst>
       <p:ext uri="{BB962C8B-B14F-4D97-AF65-F5344CB8AC3E}">
-        <p14:creationId xmlns:p14="http://schemas.microsoft.com/office/powerpoint/2010/main" val="2019828466"/>
+        <p14:creationId xmlns:p14="http://schemas.microsoft.com/office/powerpoint/2010/main" val="2398518547"/>
       </p:ext>
     </p:extLst>
   </p:cSld>
@@ -6576,6 +6774,220 @@
     <p:extLst>
       <p:ext uri="{BB962C8B-B14F-4D97-AF65-F5344CB8AC3E}">
         <p14:creationId xmlns:p14="http://schemas.microsoft.com/office/powerpoint/2010/main" val="3093818816"/>
+      </p:ext>
+    </p:extLst>
+  </p:cSld>
+  <p:clrMapOvr>
+    <a:masterClrMapping/>
+  </p:clrMapOvr>
+  <p:timing>
+    <p:tnLst>
+      <p:par>
+        <p:cTn id="1" dur="indefinite" restart="never" nodeType="tmRoot"/>
+      </p:par>
+    </p:tnLst>
+  </p:timing>
+</p:sld>
+</file>
+
+<file path=ppt/slides/slide30.xml><?xml version="1.0" encoding="utf-8"?>
+<p:sld xmlns:a="http://schemas.openxmlformats.org/drawingml/2006/main" xmlns:r="http://schemas.openxmlformats.org/officeDocument/2006/relationships" xmlns:p="http://schemas.openxmlformats.org/presentationml/2006/main">
+  <p:cSld>
+    <p:spTree>
+      <p:nvGrpSpPr>
+        <p:cNvPr id="1" name=""/>
+        <p:cNvGrpSpPr/>
+        <p:nvPr/>
+      </p:nvGrpSpPr>
+      <p:grpSpPr>
+        <a:xfrm>
+          <a:off x="0" y="0"/>
+          <a:ext cx="0" cy="0"/>
+          <a:chOff x="0" y="0"/>
+          <a:chExt cx="0" cy="0"/>
+        </a:xfrm>
+      </p:grpSpPr>
+      <p:sp>
+        <p:nvSpPr>
+          <p:cNvPr id="6" name="文字方塊 5"/>
+          <p:cNvSpPr txBox="1"/>
+          <p:nvPr/>
+        </p:nvSpPr>
+        <p:spPr>
+          <a:xfrm>
+            <a:off x="1823617" y="142904"/>
+            <a:ext cx="5213287" cy="707886"/>
+          </a:xfrm>
+          <a:prstGeom prst="rect">
+            <a:avLst/>
+          </a:prstGeom>
+          <a:noFill/>
+        </p:spPr>
+        <p:txBody>
+          <a:bodyPr wrap="none" rtlCol="0">
+            <a:spAutoFit/>
+          </a:bodyPr>
+          <a:lstStyle/>
+          <a:p>
+            <a:r>
+              <a:rPr lang="en-US" altLang="zh-TW" sz="4000" dirty="0" smtClean="0"/>
+              <a:t>submit</a:t>
+            </a:r>
+            <a:r>
+              <a:rPr lang="zh-TW" altLang="en-US" sz="4000" dirty="0" smtClean="0"/>
+              <a:t>後頁面點</a:t>
+            </a:r>
+            <a:r>
+              <a:rPr lang="zh-TW" altLang="en-US" sz="4000" dirty="0" smtClean="0"/>
+              <a:t>擊解</a:t>
+            </a:r>
+            <a:r>
+              <a:rPr lang="zh-TW" altLang="en-US" sz="4000" dirty="0"/>
+              <a:t>鎖</a:t>
+            </a:r>
+          </a:p>
+        </p:txBody>
+      </p:sp>
+      <p:pic>
+        <p:nvPicPr>
+          <p:cNvPr id="4" name="圖片 3"/>
+          <p:cNvPicPr>
+            <a:picLocks noChangeAspect="1"/>
+          </p:cNvPicPr>
+          <p:nvPr/>
+        </p:nvPicPr>
+        <p:blipFill>
+          <a:blip r:embed="rId2">
+            <a:extLst>
+              <a:ext uri="{28A0092B-C50C-407E-A947-70E740481C1C}">
+                <a14:useLocalDpi xmlns:a14="http://schemas.microsoft.com/office/drawing/2010/main" val="0"/>
+              </a:ext>
+            </a:extLst>
+          </a:blip>
+          <a:stretch>
+            <a:fillRect/>
+          </a:stretch>
+        </p:blipFill>
+        <p:spPr>
+          <a:xfrm>
+            <a:off x="0" y="896766"/>
+            <a:ext cx="10058400" cy="5233690"/>
+          </a:xfrm>
+          <a:prstGeom prst="rect">
+            <a:avLst/>
+          </a:prstGeom>
+        </p:spPr>
+      </p:pic>
+      <p:pic>
+        <p:nvPicPr>
+          <p:cNvPr id="5" name="圖片 4"/>
+          <p:cNvPicPr>
+            <a:picLocks noChangeAspect="1"/>
+          </p:cNvPicPr>
+          <p:nvPr/>
+        </p:nvPicPr>
+        <p:blipFill>
+          <a:blip r:embed="rId3">
+            <a:extLst>
+              <a:ext uri="{28A0092B-C50C-407E-A947-70E740481C1C}">
+                <a14:useLocalDpi xmlns:a14="http://schemas.microsoft.com/office/drawing/2010/main" val="0"/>
+              </a:ext>
+            </a:extLst>
+          </a:blip>
+          <a:stretch>
+            <a:fillRect/>
+          </a:stretch>
+        </p:blipFill>
+        <p:spPr>
+          <a:xfrm>
+            <a:off x="7036904" y="496847"/>
+            <a:ext cx="4909548" cy="6128839"/>
+          </a:xfrm>
+          <a:prstGeom prst="rect">
+            <a:avLst/>
+          </a:prstGeom>
+        </p:spPr>
+      </p:pic>
+    </p:spTree>
+    <p:extLst>
+      <p:ext uri="{BB962C8B-B14F-4D97-AF65-F5344CB8AC3E}">
+        <p14:creationId xmlns:p14="http://schemas.microsoft.com/office/powerpoint/2010/main" val="1910811663"/>
+      </p:ext>
+    </p:extLst>
+  </p:cSld>
+  <p:clrMapOvr>
+    <a:masterClrMapping/>
+  </p:clrMapOvr>
+  <p:timing>
+    <p:tnLst>
+      <p:par>
+        <p:cTn id="1" dur="indefinite" restart="never" nodeType="tmRoot"/>
+      </p:par>
+    </p:tnLst>
+  </p:timing>
+</p:sld>
+</file>
+
+<file path=ppt/slides/slide31.xml><?xml version="1.0" encoding="utf-8"?>
+<p:sld xmlns:a="http://schemas.openxmlformats.org/drawingml/2006/main" xmlns:r="http://schemas.openxmlformats.org/officeDocument/2006/relationships" xmlns:p="http://schemas.openxmlformats.org/presentationml/2006/main">
+  <p:cSld>
+    <p:spTree>
+      <p:nvGrpSpPr>
+        <p:cNvPr id="1" name=""/>
+        <p:cNvGrpSpPr/>
+        <p:nvPr/>
+      </p:nvGrpSpPr>
+      <p:grpSpPr>
+        <a:xfrm>
+          <a:off x="0" y="0"/>
+          <a:ext cx="0" cy="0"/>
+          <a:chOff x="0" y="0"/>
+          <a:chExt cx="0" cy="0"/>
+        </a:xfrm>
+      </p:grpSpPr>
+      <p:sp>
+        <p:nvSpPr>
+          <p:cNvPr id="2" name="標題 1"/>
+          <p:cNvSpPr>
+            <a:spLocks noGrp="1"/>
+          </p:cNvSpPr>
+          <p:nvPr>
+            <p:ph type="title"/>
+          </p:nvPr>
+        </p:nvSpPr>
+        <p:spPr>
+          <a:xfrm>
+            <a:off x="4444778" y="3053301"/>
+            <a:ext cx="2885661" cy="545700"/>
+          </a:xfrm>
+        </p:spPr>
+        <p:txBody>
+          <a:bodyPr>
+            <a:normAutofit fontScale="90000"/>
+          </a:bodyPr>
+          <a:lstStyle/>
+          <a:p>
+            <a:pPr algn="ctr"/>
+            <a:r>
+              <a:rPr lang="en-US" altLang="zh-TW" dirty="0" smtClean="0"/>
+              <a:t>THANK</a:t>
+            </a:r>
+            <a:r>
+              <a:rPr lang="zh-TW" altLang="en-US" dirty="0" smtClean="0"/>
+              <a:t> </a:t>
+            </a:r>
+            <a:r>
+              <a:rPr lang="en-US" altLang="zh-TW" dirty="0" smtClean="0"/>
+              <a:t>YOU</a:t>
+            </a:r>
+            <a:endParaRPr lang="zh-TW" altLang="en-US" dirty="0"/>
+          </a:p>
+        </p:txBody>
+      </p:sp>
+    </p:spTree>
+    <p:extLst>
+      <p:ext uri="{BB962C8B-B14F-4D97-AF65-F5344CB8AC3E}">
+        <p14:creationId xmlns:p14="http://schemas.microsoft.com/office/powerpoint/2010/main" val="2019828466"/>
       </p:ext>
     </p:extLst>
   </p:cSld>
@@ -7005,7 +7417,7 @@
       </p:sp>
       <p:pic>
         <p:nvPicPr>
-          <p:cNvPr id="2" name="圖片 1"/>
+          <p:cNvPr id="3" name="圖片 2"/>
           <p:cNvPicPr>
             <a:picLocks noChangeAspect="1"/>
           </p:cNvPicPr>
@@ -7025,8 +7437,8 @@
         </p:blipFill>
         <p:spPr>
           <a:xfrm>
-            <a:off x="713628" y="1144547"/>
-            <a:ext cx="10058400" cy="4989474"/>
+            <a:off x="713628" y="1384121"/>
+            <a:ext cx="10058400" cy="4804091"/>
           </a:xfrm>
           <a:prstGeom prst="rect">
             <a:avLst/>
@@ -7082,17 +7494,24 @@
         </p:nvSpPr>
         <p:spPr>
           <a:xfrm>
-            <a:off x="3796085" y="284202"/>
-            <a:ext cx="5053717" cy="896810"/>
-          </a:xfrm>
-        </p:spPr>
-        <p:txBody>
-          <a:bodyPr/>
-          <a:lstStyle/>
-          <a:p>
+            <a:off x="2759104" y="85420"/>
+            <a:ext cx="7068710" cy="896810"/>
+          </a:xfrm>
+        </p:spPr>
+        <p:txBody>
+          <a:bodyPr>
+            <a:normAutofit/>
+          </a:bodyPr>
+          <a:lstStyle/>
+          <a:p>
+            <a:pPr algn="ctr"/>
             <a:r>
               <a:rPr lang="zh-TW" altLang="en-US" dirty="0" smtClean="0"/>
-              <a:t>註冊帳密</a:t>
+              <a:t>賣家註冊</a:t>
+            </a:r>
+            <a:r>
+              <a:rPr lang="zh-TW" altLang="en-US" dirty="0" smtClean="0"/>
+              <a:t>帳密</a:t>
             </a:r>
             <a:r>
               <a:rPr lang="en-US" altLang="zh-TW" dirty="0" smtClean="0"/>
@@ -7108,7 +7527,7 @@
       </p:sp>
       <p:pic>
         <p:nvPicPr>
-          <p:cNvPr id="3" name="圖片 2"/>
+          <p:cNvPr id="4" name="圖片 3"/>
           <p:cNvPicPr>
             <a:picLocks noChangeAspect="1"/>
           </p:cNvPicPr>
@@ -7128,8 +7547,8 @@
         </p:blipFill>
         <p:spPr>
           <a:xfrm>
-            <a:off x="0" y="1049010"/>
-            <a:ext cx="10058400" cy="5015915"/>
+            <a:off x="0" y="1047105"/>
+            <a:ext cx="10058400" cy="4782903"/>
           </a:xfrm>
           <a:prstGeom prst="rect">
             <a:avLst/>
@@ -7138,7 +7557,7 @@
       </p:pic>
       <p:pic>
         <p:nvPicPr>
-          <p:cNvPr id="6" name="圖片 5"/>
+          <p:cNvPr id="5" name="圖片 4"/>
           <p:cNvPicPr>
             <a:picLocks noChangeAspect="1"/>
           </p:cNvPicPr>
@@ -7158,8 +7577,8 @@
         </p:blipFill>
         <p:spPr>
           <a:xfrm>
-            <a:off x="3673503" y="2117633"/>
-            <a:ext cx="10058400" cy="4947101"/>
+            <a:off x="4031312" y="1943915"/>
+            <a:ext cx="10058400" cy="4580685"/>
           </a:xfrm>
           <a:prstGeom prst="rect">
             <a:avLst/>

</xml_diff>

<commit_message>
(1)PPT done.(add activity diagram, wallet). (2)Need to use software to simulate multiple locks.
</commit_message>
<xml_diff>
--- a/CatchBo.pptx
+++ b/CatchBo.pptx
@@ -5,7 +5,7 @@
     <p:sldMasterId id="2147483648" r:id="rId1"/>
   </p:sldMasterIdLst>
   <p:notesMasterIdLst>
-    <p:notesMasterId r:id="rId33"/>
+    <p:notesMasterId r:id="rId34"/>
   </p:notesMasterIdLst>
   <p:sldIdLst>
     <p:sldId id="257" r:id="rId2"/>
@@ -15,30 +15,31 @@
     <p:sldId id="283" r:id="rId6"/>
     <p:sldId id="277" r:id="rId7"/>
     <p:sldId id="278" r:id="rId8"/>
-    <p:sldId id="256" r:id="rId9"/>
-    <p:sldId id="258" r:id="rId10"/>
-    <p:sldId id="259" r:id="rId11"/>
-    <p:sldId id="260" r:id="rId12"/>
-    <p:sldId id="261" r:id="rId13"/>
-    <p:sldId id="285" r:id="rId14"/>
-    <p:sldId id="262" r:id="rId15"/>
-    <p:sldId id="263" r:id="rId16"/>
-    <p:sldId id="264" r:id="rId17"/>
-    <p:sldId id="265" r:id="rId18"/>
-    <p:sldId id="282" r:id="rId19"/>
-    <p:sldId id="286" r:id="rId20"/>
-    <p:sldId id="268" r:id="rId21"/>
-    <p:sldId id="273" r:id="rId22"/>
-    <p:sldId id="270" r:id="rId23"/>
-    <p:sldId id="284" r:id="rId24"/>
-    <p:sldId id="266" r:id="rId25"/>
-    <p:sldId id="274" r:id="rId26"/>
-    <p:sldId id="267" r:id="rId27"/>
-    <p:sldId id="269" r:id="rId28"/>
-    <p:sldId id="271" r:id="rId29"/>
-    <p:sldId id="272" r:id="rId30"/>
-    <p:sldId id="275" r:id="rId31"/>
-    <p:sldId id="281" r:id="rId32"/>
+    <p:sldId id="287" r:id="rId9"/>
+    <p:sldId id="256" r:id="rId10"/>
+    <p:sldId id="258" r:id="rId11"/>
+    <p:sldId id="259" r:id="rId12"/>
+    <p:sldId id="260" r:id="rId13"/>
+    <p:sldId id="261" r:id="rId14"/>
+    <p:sldId id="285" r:id="rId15"/>
+    <p:sldId id="262" r:id="rId16"/>
+    <p:sldId id="263" r:id="rId17"/>
+    <p:sldId id="264" r:id="rId18"/>
+    <p:sldId id="265" r:id="rId19"/>
+    <p:sldId id="282" r:id="rId20"/>
+    <p:sldId id="286" r:id="rId21"/>
+    <p:sldId id="268" r:id="rId22"/>
+    <p:sldId id="273" r:id="rId23"/>
+    <p:sldId id="270" r:id="rId24"/>
+    <p:sldId id="284" r:id="rId25"/>
+    <p:sldId id="266" r:id="rId26"/>
+    <p:sldId id="274" r:id="rId27"/>
+    <p:sldId id="267" r:id="rId28"/>
+    <p:sldId id="269" r:id="rId29"/>
+    <p:sldId id="271" r:id="rId30"/>
+    <p:sldId id="272" r:id="rId31"/>
+    <p:sldId id="275" r:id="rId32"/>
+    <p:sldId id="281" r:id="rId33"/>
   </p:sldIdLst>
   <p:sldSz cx="12192000" cy="6858000"/>
   <p:notesSz cx="6858000" cy="9144000"/>
@@ -3633,18 +3634,20 @@
         </p:nvSpPr>
         <p:spPr>
           <a:xfrm>
-            <a:off x="846151" y="159335"/>
-            <a:ext cx="10515600" cy="1325563"/>
-          </a:xfrm>
-        </p:spPr>
-        <p:txBody>
-          <a:bodyPr/>
+            <a:off x="2759104" y="85420"/>
+            <a:ext cx="7068710" cy="896810"/>
+          </a:xfrm>
+        </p:spPr>
+        <p:txBody>
+          <a:bodyPr>
+            <a:normAutofit/>
+          </a:bodyPr>
           <a:lstStyle/>
           <a:p>
             <a:pPr algn="ctr"/>
             <a:r>
               <a:rPr lang="zh-TW" altLang="en-US" dirty="0" smtClean="0"/>
-              <a:t>賣家輸入</a:t>
+              <a:t>賣家註冊</a:t>
             </a:r>
             <a:r>
               <a:rPr lang="zh-TW" altLang="en-US" dirty="0" smtClean="0"/>
@@ -3656,7 +3659,7 @@
             </a:r>
             <a:r>
               <a:rPr lang="zh-TW" altLang="en-US" dirty="0" smtClean="0"/>
-              <a:t>登入成功</a:t>
+              <a:t>成功頁面</a:t>
             </a:r>
             <a:endParaRPr lang="zh-TW" altLang="en-US" dirty="0"/>
           </a:p>
@@ -3664,7 +3667,7 @@
       </p:sp>
       <p:pic>
         <p:nvPicPr>
-          <p:cNvPr id="3" name="圖片 2"/>
+          <p:cNvPr id="4" name="圖片 3"/>
           <p:cNvPicPr>
             <a:picLocks noChangeAspect="1"/>
           </p:cNvPicPr>
@@ -3684,8 +3687,8 @@
         </p:blipFill>
         <p:spPr>
           <a:xfrm>
-            <a:off x="0" y="1174318"/>
-            <a:ext cx="10058400" cy="4809156"/>
+            <a:off x="0" y="1047105"/>
+            <a:ext cx="10058400" cy="4782903"/>
           </a:xfrm>
           <a:prstGeom prst="rect">
             <a:avLst/>
@@ -3694,7 +3697,7 @@
       </p:pic>
       <p:pic>
         <p:nvPicPr>
-          <p:cNvPr id="4" name="圖片 3"/>
+          <p:cNvPr id="5" name="圖片 4"/>
           <p:cNvPicPr>
             <a:picLocks noChangeAspect="1"/>
           </p:cNvPicPr>
@@ -3714,8 +3717,8 @@
         </p:blipFill>
         <p:spPr>
           <a:xfrm>
-            <a:off x="4055165" y="2153668"/>
-            <a:ext cx="10058400" cy="4544553"/>
+            <a:off x="4031312" y="1943915"/>
+            <a:ext cx="10058400" cy="4580685"/>
           </a:xfrm>
           <a:prstGeom prst="rect">
             <a:avLst/>
@@ -3725,7 +3728,7 @@
     </p:spTree>
     <p:extLst>
       <p:ext uri="{BB962C8B-B14F-4D97-AF65-F5344CB8AC3E}">
-        <p14:creationId xmlns:p14="http://schemas.microsoft.com/office/powerpoint/2010/main" val="3424059863"/>
+        <p14:creationId xmlns:p14="http://schemas.microsoft.com/office/powerpoint/2010/main" val="1428734080"/>
       </p:ext>
     </p:extLst>
   </p:cSld>
@@ -3771,7 +3774,7 @@
         </p:nvSpPr>
         <p:spPr>
           <a:xfrm>
-            <a:off x="862054" y="0"/>
+            <a:off x="846151" y="159335"/>
             <a:ext cx="10515600" cy="1325563"/>
           </a:xfrm>
         </p:spPr>
@@ -3782,11 +3785,11 @@
             <a:pPr algn="ctr"/>
             <a:r>
               <a:rPr lang="zh-TW" altLang="en-US" dirty="0" smtClean="0"/>
-              <a:t>販售商品頁</a:t>
+              <a:t>賣家輸入</a:t>
             </a:r>
             <a:r>
               <a:rPr lang="zh-TW" altLang="en-US" dirty="0" smtClean="0"/>
-              <a:t>面</a:t>
+              <a:t>帳密</a:t>
             </a:r>
             <a:r>
               <a:rPr lang="en-US" altLang="zh-TW" dirty="0" smtClean="0"/>
@@ -3794,7 +3797,7 @@
             </a:r>
             <a:r>
               <a:rPr lang="zh-TW" altLang="en-US" dirty="0" smtClean="0"/>
-              <a:t>填寫商品資訊</a:t>
+              <a:t>登入成功</a:t>
             </a:r>
             <a:endParaRPr lang="zh-TW" altLang="en-US" dirty="0"/>
           </a:p>
@@ -3822,8 +3825,8 @@
         </p:blipFill>
         <p:spPr>
           <a:xfrm>
-            <a:off x="0" y="1049049"/>
-            <a:ext cx="10058400" cy="5002730"/>
+            <a:off x="0" y="1174318"/>
+            <a:ext cx="10058400" cy="4809156"/>
           </a:xfrm>
           <a:prstGeom prst="rect">
             <a:avLst/>
@@ -3832,7 +3835,7 @@
       </p:pic>
       <p:pic>
         <p:nvPicPr>
-          <p:cNvPr id="5" name="圖片 4"/>
+          <p:cNvPr id="4" name="圖片 3"/>
           <p:cNvPicPr>
             <a:picLocks noChangeAspect="1"/>
           </p:cNvPicPr>
@@ -3852,8 +3855,8 @@
         </p:blipFill>
         <p:spPr>
           <a:xfrm>
-            <a:off x="3029447" y="1689829"/>
-            <a:ext cx="10058400" cy="5021255"/>
+            <a:off x="4055165" y="2153668"/>
+            <a:ext cx="10058400" cy="4544553"/>
           </a:xfrm>
           <a:prstGeom prst="rect">
             <a:avLst/>
@@ -3863,7 +3866,7 @@
     </p:spTree>
     <p:extLst>
       <p:ext uri="{BB962C8B-B14F-4D97-AF65-F5344CB8AC3E}">
-        <p14:creationId xmlns:p14="http://schemas.microsoft.com/office/powerpoint/2010/main" val="524690949"/>
+        <p14:creationId xmlns:p14="http://schemas.microsoft.com/office/powerpoint/2010/main" val="3424059863"/>
       </p:ext>
     </p:extLst>
   </p:cSld>
@@ -3909,7 +3912,7 @@
         </p:nvSpPr>
         <p:spPr>
           <a:xfrm>
-            <a:off x="838200" y="245855"/>
+            <a:off x="862054" y="0"/>
             <a:ext cx="10515600" cy="1325563"/>
           </a:xfrm>
         </p:spPr>
@@ -3920,7 +3923,11 @@
             <a:pPr algn="ctr"/>
             <a:r>
               <a:rPr lang="zh-TW" altLang="en-US" dirty="0" smtClean="0"/>
-              <a:t>刊登成功</a:t>
+              <a:t>販售商品頁</a:t>
+            </a:r>
+            <a:r>
+              <a:rPr lang="zh-TW" altLang="en-US" dirty="0" smtClean="0"/>
+              <a:t>面</a:t>
             </a:r>
             <a:r>
               <a:rPr lang="en-US" altLang="zh-TW" dirty="0" smtClean="0"/>
@@ -3928,7 +3935,7 @@
             </a:r>
             <a:r>
               <a:rPr lang="zh-TW" altLang="en-US" dirty="0" smtClean="0"/>
-              <a:t>賣家登出</a:t>
+              <a:t>填寫商品資訊</a:t>
             </a:r>
             <a:endParaRPr lang="zh-TW" altLang="en-US" dirty="0"/>
           </a:p>
@@ -3936,7 +3943,7 @@
       </p:sp>
       <p:pic>
         <p:nvPicPr>
-          <p:cNvPr id="7" name="圖片 6"/>
+          <p:cNvPr id="3" name="圖片 2"/>
           <p:cNvPicPr>
             <a:picLocks noChangeAspect="1"/>
           </p:cNvPicPr>
@@ -3956,8 +3963,8 @@
         </p:blipFill>
         <p:spPr>
           <a:xfrm>
-            <a:off x="2468881" y="2083175"/>
-            <a:ext cx="10058400" cy="4774825"/>
+            <a:off x="0" y="1049049"/>
+            <a:ext cx="10058400" cy="5002730"/>
           </a:xfrm>
           <a:prstGeom prst="rect">
             <a:avLst/>
@@ -3966,7 +3973,7 @@
       </p:pic>
       <p:pic>
         <p:nvPicPr>
-          <p:cNvPr id="3" name="圖片 2"/>
+          <p:cNvPr id="5" name="圖片 4"/>
           <p:cNvPicPr>
             <a:picLocks noChangeAspect="1"/>
           </p:cNvPicPr>
@@ -3986,8 +3993,8 @@
         </p:blipFill>
         <p:spPr>
           <a:xfrm>
-            <a:off x="-707665" y="1204880"/>
-            <a:ext cx="10058400" cy="5008002"/>
+            <a:off x="3029447" y="1689829"/>
+            <a:ext cx="10058400" cy="5021255"/>
           </a:xfrm>
           <a:prstGeom prst="rect">
             <a:avLst/>
@@ -3997,7 +4004,7 @@
     </p:spTree>
     <p:extLst>
       <p:ext uri="{BB962C8B-B14F-4D97-AF65-F5344CB8AC3E}">
-        <p14:creationId xmlns:p14="http://schemas.microsoft.com/office/powerpoint/2010/main" val="3545366652"/>
+        <p14:creationId xmlns:p14="http://schemas.microsoft.com/office/powerpoint/2010/main" val="524690949"/>
       </p:ext>
     </p:extLst>
   </p:cSld>
@@ -4041,6 +4048,140 @@
             <p:ph type="title"/>
           </p:nvPr>
         </p:nvSpPr>
+        <p:spPr>
+          <a:xfrm>
+            <a:off x="838200" y="245855"/>
+            <a:ext cx="10515600" cy="1325563"/>
+          </a:xfrm>
+        </p:spPr>
+        <p:txBody>
+          <a:bodyPr/>
+          <a:lstStyle/>
+          <a:p>
+            <a:pPr algn="ctr"/>
+            <a:r>
+              <a:rPr lang="zh-TW" altLang="en-US" dirty="0" smtClean="0"/>
+              <a:t>刊登成功</a:t>
+            </a:r>
+            <a:r>
+              <a:rPr lang="en-US" altLang="zh-TW" dirty="0" smtClean="0"/>
+              <a:t>/</a:t>
+            </a:r>
+            <a:r>
+              <a:rPr lang="zh-TW" altLang="en-US" dirty="0" smtClean="0"/>
+              <a:t>賣家登出</a:t>
+            </a:r>
+            <a:endParaRPr lang="zh-TW" altLang="en-US" dirty="0"/>
+          </a:p>
+        </p:txBody>
+      </p:sp>
+      <p:pic>
+        <p:nvPicPr>
+          <p:cNvPr id="7" name="圖片 6"/>
+          <p:cNvPicPr>
+            <a:picLocks noChangeAspect="1"/>
+          </p:cNvPicPr>
+          <p:nvPr/>
+        </p:nvPicPr>
+        <p:blipFill>
+          <a:blip r:embed="rId2">
+            <a:extLst>
+              <a:ext uri="{28A0092B-C50C-407E-A947-70E740481C1C}">
+                <a14:useLocalDpi xmlns:a14="http://schemas.microsoft.com/office/drawing/2010/main" val="0"/>
+              </a:ext>
+            </a:extLst>
+          </a:blip>
+          <a:stretch>
+            <a:fillRect/>
+          </a:stretch>
+        </p:blipFill>
+        <p:spPr>
+          <a:xfrm>
+            <a:off x="2468881" y="2083175"/>
+            <a:ext cx="10058400" cy="4774825"/>
+          </a:xfrm>
+          <a:prstGeom prst="rect">
+            <a:avLst/>
+          </a:prstGeom>
+        </p:spPr>
+      </p:pic>
+      <p:pic>
+        <p:nvPicPr>
+          <p:cNvPr id="3" name="圖片 2"/>
+          <p:cNvPicPr>
+            <a:picLocks noChangeAspect="1"/>
+          </p:cNvPicPr>
+          <p:nvPr/>
+        </p:nvPicPr>
+        <p:blipFill>
+          <a:blip r:embed="rId3">
+            <a:extLst>
+              <a:ext uri="{28A0092B-C50C-407E-A947-70E740481C1C}">
+                <a14:useLocalDpi xmlns:a14="http://schemas.microsoft.com/office/drawing/2010/main" val="0"/>
+              </a:ext>
+            </a:extLst>
+          </a:blip>
+          <a:stretch>
+            <a:fillRect/>
+          </a:stretch>
+        </p:blipFill>
+        <p:spPr>
+          <a:xfrm>
+            <a:off x="-707665" y="1204880"/>
+            <a:ext cx="10058400" cy="5008002"/>
+          </a:xfrm>
+          <a:prstGeom prst="rect">
+            <a:avLst/>
+          </a:prstGeom>
+        </p:spPr>
+      </p:pic>
+    </p:spTree>
+    <p:extLst>
+      <p:ext uri="{BB962C8B-B14F-4D97-AF65-F5344CB8AC3E}">
+        <p14:creationId xmlns:p14="http://schemas.microsoft.com/office/powerpoint/2010/main" val="3545366652"/>
+      </p:ext>
+    </p:extLst>
+  </p:cSld>
+  <p:clrMapOvr>
+    <a:masterClrMapping/>
+  </p:clrMapOvr>
+  <p:timing>
+    <p:tnLst>
+      <p:par>
+        <p:cTn id="1" dur="indefinite" restart="never" nodeType="tmRoot"/>
+      </p:par>
+    </p:tnLst>
+  </p:timing>
+</p:sld>
+</file>
+
+<file path=ppt/slides/slide14.xml><?xml version="1.0" encoding="utf-8"?>
+<p:sld xmlns:a="http://schemas.openxmlformats.org/drawingml/2006/main" xmlns:r="http://schemas.openxmlformats.org/officeDocument/2006/relationships" xmlns:p="http://schemas.openxmlformats.org/presentationml/2006/main">
+  <p:cSld>
+    <p:spTree>
+      <p:nvGrpSpPr>
+        <p:cNvPr id="1" name=""/>
+        <p:cNvGrpSpPr/>
+        <p:nvPr/>
+      </p:nvGrpSpPr>
+      <p:grpSpPr>
+        <a:xfrm>
+          <a:off x="0" y="0"/>
+          <a:ext cx="0" cy="0"/>
+          <a:chOff x="0" y="0"/>
+          <a:chExt cx="0" cy="0"/>
+        </a:xfrm>
+      </p:grpSpPr>
+      <p:sp>
+        <p:nvSpPr>
+          <p:cNvPr id="2" name="標題 1"/>
+          <p:cNvSpPr>
+            <a:spLocks noGrp="1"/>
+          </p:cNvSpPr>
+          <p:nvPr>
+            <p:ph type="title"/>
+          </p:nvPr>
+        </p:nvSpPr>
         <p:spPr/>
         <p:txBody>
           <a:bodyPr/>
@@ -4136,7 +4277,7 @@
 </p:sld>
 </file>
 
-<file path=ppt/slides/slide14.xml><?xml version="1.0" encoding="utf-8"?>
+<file path=ppt/slides/slide15.xml><?xml version="1.0" encoding="utf-8"?>
 <p:sld xmlns:a="http://schemas.openxmlformats.org/drawingml/2006/main" xmlns:r="http://schemas.openxmlformats.org/officeDocument/2006/relationships" xmlns:p="http://schemas.openxmlformats.org/presentationml/2006/main">
   <p:cSld>
     <p:spTree>
@@ -4244,152 +4385,6 @@
     <p:extLst>
       <p:ext uri="{BB962C8B-B14F-4D97-AF65-F5344CB8AC3E}">
         <p14:creationId xmlns:p14="http://schemas.microsoft.com/office/powerpoint/2010/main" val="3533658303"/>
-      </p:ext>
-    </p:extLst>
-  </p:cSld>
-  <p:clrMapOvr>
-    <a:masterClrMapping/>
-  </p:clrMapOvr>
-  <p:timing>
-    <p:tnLst>
-      <p:par>
-        <p:cTn id="1" dur="indefinite" restart="never" nodeType="tmRoot"/>
-      </p:par>
-    </p:tnLst>
-  </p:timing>
-</p:sld>
-</file>
-
-<file path=ppt/slides/slide15.xml><?xml version="1.0" encoding="utf-8"?>
-<p:sld xmlns:a="http://schemas.openxmlformats.org/drawingml/2006/main" xmlns:r="http://schemas.openxmlformats.org/officeDocument/2006/relationships" xmlns:p="http://schemas.openxmlformats.org/presentationml/2006/main">
-  <p:cSld>
-    <p:spTree>
-      <p:nvGrpSpPr>
-        <p:cNvPr id="1" name=""/>
-        <p:cNvGrpSpPr/>
-        <p:nvPr/>
-      </p:nvGrpSpPr>
-      <p:grpSpPr>
-        <a:xfrm>
-          <a:off x="0" y="0"/>
-          <a:ext cx="0" cy="0"/>
-          <a:chOff x="0" y="0"/>
-          <a:chExt cx="0" cy="0"/>
-        </a:xfrm>
-      </p:grpSpPr>
-      <p:sp>
-        <p:nvSpPr>
-          <p:cNvPr id="2" name="標題 1"/>
-          <p:cNvSpPr>
-            <a:spLocks noGrp="1"/>
-          </p:cNvSpPr>
-          <p:nvPr>
-            <p:ph type="title"/>
-          </p:nvPr>
-        </p:nvSpPr>
-        <p:spPr>
-          <a:xfrm>
-            <a:off x="917713" y="-562"/>
-            <a:ext cx="10515600" cy="1325563"/>
-          </a:xfrm>
-        </p:spPr>
-        <p:txBody>
-          <a:bodyPr/>
-          <a:lstStyle/>
-          <a:p>
-            <a:pPr algn="ctr"/>
-            <a:r>
-              <a:rPr lang="zh-TW" altLang="en-US" dirty="0" smtClean="0"/>
-              <a:t>單品庫存查詢</a:t>
-            </a:r>
-            <a:r>
-              <a:rPr lang="en-US" altLang="zh-TW" dirty="0" smtClean="0"/>
-              <a:t>/</a:t>
-            </a:r>
-            <a:r>
-              <a:rPr lang="zh-TW" altLang="en-US" dirty="0" smtClean="0"/>
-              <a:t>點擊</a:t>
-            </a:r>
-            <a:r>
-              <a:rPr lang="en-US" altLang="zh-TW" dirty="0" smtClean="0"/>
-              <a:t>buy</a:t>
-            </a:r>
-            <a:r>
-              <a:rPr lang="zh-TW" altLang="en-US" dirty="0" smtClean="0"/>
-              <a:t>後下訂單</a:t>
-            </a:r>
-            <a:r>
-              <a:rPr lang="zh-TW" altLang="en-US" dirty="0" smtClean="0"/>
-              <a:t>頁面</a:t>
-            </a:r>
-            <a:endParaRPr lang="zh-TW" altLang="en-US" dirty="0"/>
-          </a:p>
-        </p:txBody>
-      </p:sp>
-      <p:pic>
-        <p:nvPicPr>
-          <p:cNvPr id="3" name="圖片 2"/>
-          <p:cNvPicPr>
-            <a:picLocks noChangeAspect="1"/>
-          </p:cNvPicPr>
-          <p:nvPr/>
-        </p:nvPicPr>
-        <p:blipFill>
-          <a:blip r:embed="rId2">
-            <a:extLst>
-              <a:ext uri="{28A0092B-C50C-407E-A947-70E740481C1C}">
-                <a14:useLocalDpi xmlns:a14="http://schemas.microsoft.com/office/drawing/2010/main" val="0"/>
-              </a:ext>
-            </a:extLst>
-          </a:blip>
-          <a:stretch>
-            <a:fillRect/>
-          </a:stretch>
-        </p:blipFill>
-        <p:spPr>
-          <a:xfrm>
-            <a:off x="0" y="1964151"/>
-            <a:ext cx="10058400" cy="4893849"/>
-          </a:xfrm>
-          <a:prstGeom prst="rect">
-            <a:avLst/>
-          </a:prstGeom>
-        </p:spPr>
-      </p:pic>
-      <p:pic>
-        <p:nvPicPr>
-          <p:cNvPr id="4" name="圖片 3"/>
-          <p:cNvPicPr>
-            <a:picLocks noChangeAspect="1"/>
-          </p:cNvPicPr>
-          <p:nvPr/>
-        </p:nvPicPr>
-        <p:blipFill>
-          <a:blip r:embed="rId3">
-            <a:extLst>
-              <a:ext uri="{28A0092B-C50C-407E-A947-70E740481C1C}">
-                <a14:useLocalDpi xmlns:a14="http://schemas.microsoft.com/office/drawing/2010/main" val="0"/>
-              </a:ext>
-            </a:extLst>
-          </a:blip>
-          <a:stretch>
-            <a:fillRect/>
-          </a:stretch>
-        </p:blipFill>
-        <p:spPr>
-          <a:xfrm>
-            <a:off x="5700755" y="1458433"/>
-            <a:ext cx="10058400" cy="4143570"/>
-          </a:xfrm>
-          <a:prstGeom prst="rect">
-            <a:avLst/>
-          </a:prstGeom>
-        </p:spPr>
-      </p:pic>
-    </p:spTree>
-    <p:extLst>
-      <p:ext uri="{BB962C8B-B14F-4D97-AF65-F5344CB8AC3E}">
-        <p14:creationId xmlns:p14="http://schemas.microsoft.com/office/powerpoint/2010/main" val="3911553573"/>
       </p:ext>
     </p:extLst>
   </p:cSld>
@@ -4435,8 +4430,8 @@
         </p:nvSpPr>
         <p:spPr>
           <a:xfrm>
-            <a:off x="838199" y="365125"/>
-            <a:ext cx="10786607" cy="1325563"/>
+            <a:off x="917713" y="-562"/>
+            <a:ext cx="10515600" cy="1325563"/>
           </a:xfrm>
         </p:spPr>
         <p:txBody>
@@ -4446,15 +4441,27 @@
             <a:pPr algn="ctr"/>
             <a:r>
               <a:rPr lang="zh-TW" altLang="en-US" dirty="0" smtClean="0"/>
-              <a:t>填寫表單資訊</a:t>
+              <a:t>單品庫存查詢</a:t>
             </a:r>
             <a:r>
               <a:rPr lang="en-US" altLang="zh-TW" dirty="0" smtClean="0"/>
-              <a:t>/submit</a:t>
+              <a:t>/</a:t>
             </a:r>
             <a:r>
               <a:rPr lang="zh-TW" altLang="en-US" dirty="0" smtClean="0"/>
-              <a:t>後頁面</a:t>
+              <a:t>點擊</a:t>
+            </a:r>
+            <a:r>
+              <a:rPr lang="en-US" altLang="zh-TW" dirty="0" smtClean="0"/>
+              <a:t>buy</a:t>
+            </a:r>
+            <a:r>
+              <a:rPr lang="zh-TW" altLang="en-US" dirty="0" smtClean="0"/>
+              <a:t>後下訂單</a:t>
+            </a:r>
+            <a:r>
+              <a:rPr lang="zh-TW" altLang="en-US" dirty="0" smtClean="0"/>
+              <a:t>頁面</a:t>
             </a:r>
             <a:endParaRPr lang="zh-TW" altLang="en-US" dirty="0"/>
           </a:p>
@@ -4482,8 +4489,8 @@
         </p:blipFill>
         <p:spPr>
           <a:xfrm>
-            <a:off x="0" y="1429636"/>
-            <a:ext cx="10058400" cy="4164847"/>
+            <a:off x="0" y="1964151"/>
+            <a:ext cx="10058400" cy="4893849"/>
           </a:xfrm>
           <a:prstGeom prst="rect">
             <a:avLst/>
@@ -4512,8 +4519,8 @@
         </p:blipFill>
         <p:spPr>
           <a:xfrm>
-            <a:off x="3339548" y="2247509"/>
-            <a:ext cx="10058400" cy="4411485"/>
+            <a:off x="5700755" y="1458433"/>
+            <a:ext cx="10058400" cy="4143570"/>
           </a:xfrm>
           <a:prstGeom prst="rect">
             <a:avLst/>
@@ -4523,7 +4530,7 @@
     </p:spTree>
     <p:extLst>
       <p:ext uri="{BB962C8B-B14F-4D97-AF65-F5344CB8AC3E}">
-        <p14:creationId xmlns:p14="http://schemas.microsoft.com/office/powerpoint/2010/main" val="442481425"/>
+        <p14:creationId xmlns:p14="http://schemas.microsoft.com/office/powerpoint/2010/main" val="3911553573"/>
       </p:ext>
     </p:extLst>
   </p:cSld>
@@ -4569,92 +4576,34 @@
         </p:nvSpPr>
         <p:spPr>
           <a:xfrm>
-            <a:off x="567855" y="0"/>
-            <a:ext cx="11255734" cy="1325563"/>
-          </a:xfrm>
-        </p:spPr>
-        <p:txBody>
-          <a:bodyPr>
-            <a:normAutofit fontScale="90000"/>
-          </a:bodyPr>
+            <a:off x="838199" y="365125"/>
+            <a:ext cx="10786607" cy="1325563"/>
+          </a:xfrm>
+        </p:spPr>
+        <p:txBody>
+          <a:bodyPr/>
           <a:lstStyle/>
           <a:p>
             <a:pPr algn="ctr"/>
             <a:r>
-              <a:rPr lang="zh-TW" altLang="en-US" sz="3600" dirty="0" smtClean="0"/>
-              <a:t>點擊</a:t>
-            </a:r>
-            <a:r>
-              <a:rPr lang="en-US" altLang="zh-TW" sz="3600" dirty="0" smtClean="0"/>
-              <a:t>BUY</a:t>
-            </a:r>
-            <a:r>
-              <a:rPr lang="zh-TW" altLang="en-US" sz="3600" dirty="0" smtClean="0"/>
-              <a:t> </a:t>
-            </a:r>
-            <a:r>
-              <a:rPr lang="en-US" altLang="zh-TW" sz="3600" dirty="0" smtClean="0"/>
-              <a:t>RECORD</a:t>
-            </a:r>
-            <a:r>
-              <a:rPr lang="zh-TW" altLang="en-US" sz="3600" dirty="0" smtClean="0"/>
-              <a:t>，</a:t>
-            </a:r>
-            <a:r>
-              <a:rPr lang="zh-TW" altLang="en-US" sz="3600" dirty="0" smtClean="0"/>
-              <a:t>剛</a:t>
-            </a:r>
-            <a:r>
-              <a:rPr lang="zh-TW" altLang="en-US" sz="3600" dirty="0" smtClean="0"/>
-              <a:t>下的</a:t>
-            </a:r>
-            <a:r>
-              <a:rPr lang="zh-TW" altLang="en-US" sz="3600" dirty="0" smtClean="0"/>
-              <a:t>訂單</a:t>
-            </a:r>
-            <a:r>
-              <a:rPr lang="en-US" altLang="zh-TW" sz="3600" dirty="0" smtClean="0"/>
-              <a:t>“</a:t>
-            </a:r>
-            <a:r>
-              <a:rPr lang="en-US" altLang="zh-TW" sz="3600" dirty="0" err="1" smtClean="0"/>
-              <a:t>merchandiseArriveLocker</a:t>
-            </a:r>
-            <a:r>
-              <a:rPr lang="en-US" altLang="zh-TW" sz="3600" dirty="0" smtClean="0"/>
-              <a:t>”: false</a:t>
-            </a:r>
-            <a:r>
-              <a:rPr lang="zh-TW" altLang="en-US" sz="3600" dirty="0" smtClean="0"/>
-              <a:t>且</a:t>
-            </a:r>
-            <a:r>
-              <a:rPr lang="en-US" altLang="zh-TW" sz="3600" dirty="0" smtClean="0"/>
-              <a:t>“</a:t>
-            </a:r>
-            <a:r>
-              <a:rPr lang="en-US" altLang="zh-TW" sz="3600" dirty="0" err="1" smtClean="0"/>
-              <a:t>moneyPaid</a:t>
-            </a:r>
-            <a:r>
-              <a:rPr lang="en-US" altLang="zh-TW" sz="3600" dirty="0" smtClean="0"/>
-              <a:t>”: </a:t>
-            </a:r>
-            <a:r>
-              <a:rPr lang="en-US" altLang="zh-TW" sz="3600" dirty="0" smtClean="0"/>
-              <a:t>false/</a:t>
-            </a:r>
-            <a:r>
-              <a:rPr lang="zh-TW" altLang="en-US" sz="3600" dirty="0" smtClean="0"/>
-              <a:t>買家登出</a:t>
-            </a:r>
-            <a:endParaRPr lang="zh-TW" altLang="en-US" sz="3600" dirty="0"/>
+              <a:rPr lang="zh-TW" altLang="en-US" dirty="0" smtClean="0"/>
+              <a:t>填寫表單資訊</a:t>
+            </a:r>
+            <a:r>
+              <a:rPr lang="en-US" altLang="zh-TW" dirty="0" smtClean="0"/>
+              <a:t>/submit</a:t>
+            </a:r>
+            <a:r>
+              <a:rPr lang="zh-TW" altLang="en-US" dirty="0" smtClean="0"/>
+              <a:t>後頁面</a:t>
+            </a:r>
+            <a:endParaRPr lang="zh-TW" altLang="en-US" dirty="0"/>
           </a:p>
         </p:txBody>
       </p:sp>
       <p:pic>
         <p:nvPicPr>
-          <p:cNvPr id="7" name="圖片 6"/>
+          <p:cNvPr id="3" name="圖片 2"/>
           <p:cNvPicPr>
             <a:picLocks noChangeAspect="1"/>
           </p:cNvPicPr>
@@ -4674,8 +4623,8 @@
         </p:blipFill>
         <p:spPr>
           <a:xfrm>
-            <a:off x="2362502" y="2194559"/>
-            <a:ext cx="9829498" cy="4663441"/>
+            <a:off x="0" y="1429636"/>
+            <a:ext cx="10058400" cy="4164847"/>
           </a:xfrm>
           <a:prstGeom prst="rect">
             <a:avLst/>
@@ -4704,8 +4653,8 @@
         </p:blipFill>
         <p:spPr>
           <a:xfrm>
-            <a:off x="0" y="1118195"/>
-            <a:ext cx="10058400" cy="5015957"/>
+            <a:off x="3339548" y="2247509"/>
+            <a:ext cx="10058400" cy="4411485"/>
           </a:xfrm>
           <a:prstGeom prst="rect">
             <a:avLst/>
@@ -4715,7 +4664,7 @@
     </p:spTree>
     <p:extLst>
       <p:ext uri="{BB962C8B-B14F-4D97-AF65-F5344CB8AC3E}">
-        <p14:creationId xmlns:p14="http://schemas.microsoft.com/office/powerpoint/2010/main" val="2206812976"/>
+        <p14:creationId xmlns:p14="http://schemas.microsoft.com/office/powerpoint/2010/main" val="442481425"/>
       </p:ext>
     </p:extLst>
   </p:cSld>
@@ -4761,38 +4710,92 @@
         </p:nvSpPr>
         <p:spPr>
           <a:xfrm>
-            <a:off x="838199" y="365125"/>
-            <a:ext cx="10921779" cy="1325563"/>
-          </a:xfrm>
-        </p:spPr>
-        <p:txBody>
-          <a:bodyPr/>
+            <a:off x="567855" y="0"/>
+            <a:ext cx="11255734" cy="1325563"/>
+          </a:xfrm>
+        </p:spPr>
+        <p:txBody>
+          <a:bodyPr>
+            <a:normAutofit fontScale="90000"/>
+          </a:bodyPr>
           <a:lstStyle/>
           <a:p>
             <a:pPr algn="ctr"/>
             <a:r>
-              <a:rPr lang="zh-TW" altLang="en-US" dirty="0" smtClean="0"/>
-              <a:t>賣家登入</a:t>
-            </a:r>
-            <a:r>
-              <a:rPr lang="en-US" altLang="zh-TW" dirty="0" smtClean="0"/>
-              <a:t>/</a:t>
-            </a:r>
-            <a:r>
-              <a:rPr lang="zh-TW" altLang="en-US" dirty="0" smtClean="0"/>
-              <a:t>賣家見到</a:t>
-            </a:r>
-            <a:r>
-              <a:rPr lang="zh-TW" altLang="en-US" dirty="0" smtClean="0"/>
-              <a:t>自己接到一筆訂單</a:t>
-            </a:r>
-            <a:endParaRPr lang="zh-TW" altLang="en-US" dirty="0"/>
+              <a:rPr lang="zh-TW" altLang="en-US" sz="3600" dirty="0" smtClean="0"/>
+              <a:t>點擊</a:t>
+            </a:r>
+            <a:r>
+              <a:rPr lang="en-US" altLang="zh-TW" sz="3600" dirty="0" smtClean="0"/>
+              <a:t>BUY</a:t>
+            </a:r>
+            <a:r>
+              <a:rPr lang="zh-TW" altLang="en-US" sz="3600" dirty="0" smtClean="0"/>
+              <a:t> </a:t>
+            </a:r>
+            <a:r>
+              <a:rPr lang="en-US" altLang="zh-TW" sz="3600" dirty="0" smtClean="0"/>
+              <a:t>RECORD</a:t>
+            </a:r>
+            <a:r>
+              <a:rPr lang="zh-TW" altLang="en-US" sz="3600" dirty="0" smtClean="0"/>
+              <a:t>，</a:t>
+            </a:r>
+            <a:r>
+              <a:rPr lang="zh-TW" altLang="en-US" sz="3600" dirty="0" smtClean="0"/>
+              <a:t>剛</a:t>
+            </a:r>
+            <a:r>
+              <a:rPr lang="zh-TW" altLang="en-US" sz="3600" dirty="0" smtClean="0"/>
+              <a:t>下的</a:t>
+            </a:r>
+            <a:r>
+              <a:rPr lang="zh-TW" altLang="en-US" sz="3600" dirty="0" smtClean="0"/>
+              <a:t>訂單</a:t>
+            </a:r>
+            <a:r>
+              <a:rPr lang="en-US" altLang="zh-TW" sz="3600" dirty="0" smtClean="0"/>
+              <a:t>“</a:t>
+            </a:r>
+            <a:r>
+              <a:rPr lang="en-US" altLang="zh-TW" sz="3600" dirty="0" err="1" smtClean="0"/>
+              <a:t>merchandiseArriveLocker</a:t>
+            </a:r>
+            <a:r>
+              <a:rPr lang="en-US" altLang="zh-TW" sz="3600" dirty="0" smtClean="0"/>
+              <a:t>”: false</a:t>
+            </a:r>
+            <a:r>
+              <a:rPr lang="zh-TW" altLang="en-US" sz="3600" dirty="0" smtClean="0"/>
+              <a:t>且</a:t>
+            </a:r>
+            <a:r>
+              <a:rPr lang="en-US" altLang="zh-TW" sz="3600" dirty="0" smtClean="0"/>
+              <a:t>“</a:t>
+            </a:r>
+            <a:r>
+              <a:rPr lang="en-US" altLang="zh-TW" sz="3600" dirty="0" err="1" smtClean="0"/>
+              <a:t>moneyPaid</a:t>
+            </a:r>
+            <a:r>
+              <a:rPr lang="en-US" altLang="zh-TW" sz="3600" dirty="0" smtClean="0"/>
+              <a:t>”: </a:t>
+            </a:r>
+            <a:r>
+              <a:rPr lang="en-US" altLang="zh-TW" sz="3600" dirty="0" smtClean="0"/>
+              <a:t>false/</a:t>
+            </a:r>
+            <a:r>
+              <a:rPr lang="zh-TW" altLang="en-US" sz="3600" dirty="0" smtClean="0"/>
+              <a:t>買家登出</a:t>
+            </a:r>
+            <a:endParaRPr lang="zh-TW" altLang="en-US" sz="3600" dirty="0"/>
           </a:p>
         </p:txBody>
       </p:sp>
       <p:pic>
         <p:nvPicPr>
-          <p:cNvPr id="4" name="圖片 3"/>
+          <p:cNvPr id="7" name="圖片 6"/>
           <p:cNvPicPr>
             <a:picLocks noChangeAspect="1"/>
           </p:cNvPicPr>
@@ -4812,8 +4815,8 @@
         </p:blipFill>
         <p:spPr>
           <a:xfrm>
-            <a:off x="-644055" y="1364881"/>
-            <a:ext cx="10058400" cy="4573445"/>
+            <a:off x="2362502" y="2194559"/>
+            <a:ext cx="9829498" cy="4663441"/>
           </a:xfrm>
           <a:prstGeom prst="rect">
             <a:avLst/>
@@ -4822,7 +4825,7 @@
       </p:pic>
       <p:pic>
         <p:nvPicPr>
-          <p:cNvPr id="6" name="圖片 5"/>
+          <p:cNvPr id="4" name="圖片 3"/>
           <p:cNvPicPr>
             <a:picLocks noChangeAspect="1"/>
           </p:cNvPicPr>
@@ -4842,8 +4845,8 @@
         </p:blipFill>
         <p:spPr>
           <a:xfrm>
-            <a:off x="4206240" y="1690688"/>
-            <a:ext cx="10058400" cy="4992142"/>
+            <a:off x="0" y="1118195"/>
+            <a:ext cx="10058400" cy="5015957"/>
           </a:xfrm>
           <a:prstGeom prst="rect">
             <a:avLst/>
@@ -4853,7 +4856,7 @@
     </p:spTree>
     <p:extLst>
       <p:ext uri="{BB962C8B-B14F-4D97-AF65-F5344CB8AC3E}">
-        <p14:creationId xmlns:p14="http://schemas.microsoft.com/office/powerpoint/2010/main" val="4033178646"/>
+        <p14:creationId xmlns:p14="http://schemas.microsoft.com/office/powerpoint/2010/main" val="2206812976"/>
       </p:ext>
     </p:extLst>
   </p:cSld>
@@ -4897,7 +4900,12 @@
             <p:ph type="title"/>
           </p:nvPr>
         </p:nvSpPr>
-        <p:spPr/>
+        <p:spPr>
+          <a:xfrm>
+            <a:off x="838199" y="365125"/>
+            <a:ext cx="10921779" cy="1325563"/>
+          </a:xfrm>
+        </p:spPr>
         <p:txBody>
           <a:bodyPr/>
           <a:lstStyle/>
@@ -4905,7 +4913,19 @@
             <a:pPr algn="ctr"/>
             <a:r>
               <a:rPr lang="zh-TW" altLang="en-US" dirty="0" smtClean="0"/>
-              <a:t>賣家登出</a:t>
+              <a:t>賣家登入</a:t>
+            </a:r>
+            <a:r>
+              <a:rPr lang="en-US" altLang="zh-TW" dirty="0" smtClean="0"/>
+              <a:t>/</a:t>
+            </a:r>
+            <a:r>
+              <a:rPr lang="zh-TW" altLang="en-US" dirty="0" smtClean="0"/>
+              <a:t>賣家見到</a:t>
+            </a:r>
+            <a:r>
+              <a:rPr lang="zh-TW" altLang="en-US" dirty="0" smtClean="0"/>
+              <a:t>自己接到一筆訂單</a:t>
             </a:r>
             <a:endParaRPr lang="zh-TW" altLang="en-US" dirty="0"/>
           </a:p>
@@ -4933,8 +4953,38 @@
         </p:blipFill>
         <p:spPr>
           <a:xfrm>
-            <a:off x="1066800" y="1578475"/>
-            <a:ext cx="10058400" cy="4772040"/>
+            <a:off x="-644055" y="1364881"/>
+            <a:ext cx="10058400" cy="4573445"/>
+          </a:xfrm>
+          <a:prstGeom prst="rect">
+            <a:avLst/>
+          </a:prstGeom>
+        </p:spPr>
+      </p:pic>
+      <p:pic>
+        <p:nvPicPr>
+          <p:cNvPr id="6" name="圖片 5"/>
+          <p:cNvPicPr>
+            <a:picLocks noChangeAspect="1"/>
+          </p:cNvPicPr>
+          <p:nvPr/>
+        </p:nvPicPr>
+        <p:blipFill>
+          <a:blip r:embed="rId3">
+            <a:extLst>
+              <a:ext uri="{28A0092B-C50C-407E-A947-70E740481C1C}">
+                <a14:useLocalDpi xmlns:a14="http://schemas.microsoft.com/office/drawing/2010/main" val="0"/>
+              </a:ext>
+            </a:extLst>
+          </a:blip>
+          <a:stretch>
+            <a:fillRect/>
+          </a:stretch>
+        </p:blipFill>
+        <p:spPr>
+          <a:xfrm>
+            <a:off x="4206240" y="1690688"/>
+            <a:ext cx="10058400" cy="4992142"/>
           </a:xfrm>
           <a:prstGeom prst="rect">
             <a:avLst/>
@@ -4944,13 +4994,20 @@
     </p:spTree>
     <p:extLst>
       <p:ext uri="{BB962C8B-B14F-4D97-AF65-F5344CB8AC3E}">
-        <p14:creationId xmlns:p14="http://schemas.microsoft.com/office/powerpoint/2010/main" val="1761955608"/>
+        <p14:creationId xmlns:p14="http://schemas.microsoft.com/office/powerpoint/2010/main" val="4033178646"/>
       </p:ext>
     </p:extLst>
   </p:cSld>
   <p:clrMapOvr>
     <a:masterClrMapping/>
   </p:clrMapOvr>
+  <p:timing>
+    <p:tnLst>
+      <p:par>
+        <p:cTn id="1" dur="indefinite" restart="never" nodeType="tmRoot"/>
+      </p:par>
+    </p:tnLst>
+  </p:timing>
 </p:sld>
 </file>
 
@@ -5273,6 +5330,90 @@
             <p:ph type="title"/>
           </p:nvPr>
         </p:nvSpPr>
+        <p:spPr/>
+        <p:txBody>
+          <a:bodyPr/>
+          <a:lstStyle/>
+          <a:p>
+            <a:pPr algn="ctr"/>
+            <a:r>
+              <a:rPr lang="zh-TW" altLang="en-US" dirty="0" smtClean="0"/>
+              <a:t>賣家登出</a:t>
+            </a:r>
+            <a:endParaRPr lang="zh-TW" altLang="en-US" dirty="0"/>
+          </a:p>
+        </p:txBody>
+      </p:sp>
+      <p:pic>
+        <p:nvPicPr>
+          <p:cNvPr id="4" name="圖片 3"/>
+          <p:cNvPicPr>
+            <a:picLocks noChangeAspect="1"/>
+          </p:cNvPicPr>
+          <p:nvPr/>
+        </p:nvPicPr>
+        <p:blipFill>
+          <a:blip r:embed="rId2">
+            <a:extLst>
+              <a:ext uri="{28A0092B-C50C-407E-A947-70E740481C1C}">
+                <a14:useLocalDpi xmlns:a14="http://schemas.microsoft.com/office/drawing/2010/main" val="0"/>
+              </a:ext>
+            </a:extLst>
+          </a:blip>
+          <a:stretch>
+            <a:fillRect/>
+          </a:stretch>
+        </p:blipFill>
+        <p:spPr>
+          <a:xfrm>
+            <a:off x="1066800" y="1578475"/>
+            <a:ext cx="10058400" cy="4772040"/>
+          </a:xfrm>
+          <a:prstGeom prst="rect">
+            <a:avLst/>
+          </a:prstGeom>
+        </p:spPr>
+      </p:pic>
+    </p:spTree>
+    <p:extLst>
+      <p:ext uri="{BB962C8B-B14F-4D97-AF65-F5344CB8AC3E}">
+        <p14:creationId xmlns:p14="http://schemas.microsoft.com/office/powerpoint/2010/main" val="1761955608"/>
+      </p:ext>
+    </p:extLst>
+  </p:cSld>
+  <p:clrMapOvr>
+    <a:masterClrMapping/>
+  </p:clrMapOvr>
+</p:sld>
+</file>
+
+<file path=ppt/slides/slide21.xml><?xml version="1.0" encoding="utf-8"?>
+<p:sld xmlns:a="http://schemas.openxmlformats.org/drawingml/2006/main" xmlns:r="http://schemas.openxmlformats.org/officeDocument/2006/relationships" xmlns:p="http://schemas.openxmlformats.org/presentationml/2006/main">
+  <p:cSld>
+    <p:spTree>
+      <p:nvGrpSpPr>
+        <p:cNvPr id="1" name=""/>
+        <p:cNvGrpSpPr/>
+        <p:nvPr/>
+      </p:nvGrpSpPr>
+      <p:grpSpPr>
+        <a:xfrm>
+          <a:off x="0" y="0"/>
+          <a:ext cx="0" cy="0"/>
+          <a:chOff x="0" y="0"/>
+          <a:chExt cx="0" cy="0"/>
+        </a:xfrm>
+      </p:grpSpPr>
+      <p:sp>
+        <p:nvSpPr>
+          <p:cNvPr id="2" name="標題 1"/>
+          <p:cNvSpPr>
+            <a:spLocks noGrp="1"/>
+          </p:cNvSpPr>
+          <p:nvPr>
+            <p:ph type="title"/>
+          </p:nvPr>
+        </p:nvSpPr>
         <p:spPr>
           <a:xfrm>
             <a:off x="901811" y="0"/>
@@ -5382,159 +5523,6 @@
     <p:extLst>
       <p:ext uri="{BB962C8B-B14F-4D97-AF65-F5344CB8AC3E}">
         <p14:creationId xmlns:p14="http://schemas.microsoft.com/office/powerpoint/2010/main" val="3384940024"/>
-      </p:ext>
-    </p:extLst>
-  </p:cSld>
-  <p:clrMapOvr>
-    <a:masterClrMapping/>
-  </p:clrMapOvr>
-  <p:timing>
-    <p:tnLst>
-      <p:par>
-        <p:cTn id="1" dur="indefinite" restart="never" nodeType="tmRoot"/>
-      </p:par>
-    </p:tnLst>
-  </p:timing>
-</p:sld>
-</file>
-
-<file path=ppt/slides/slide21.xml><?xml version="1.0" encoding="utf-8"?>
-<p:sld xmlns:a="http://schemas.openxmlformats.org/drawingml/2006/main" xmlns:r="http://schemas.openxmlformats.org/officeDocument/2006/relationships" xmlns:p="http://schemas.openxmlformats.org/presentationml/2006/main">
-  <p:cSld>
-    <p:spTree>
-      <p:nvGrpSpPr>
-        <p:cNvPr id="1" name=""/>
-        <p:cNvGrpSpPr/>
-        <p:nvPr/>
-      </p:nvGrpSpPr>
-      <p:grpSpPr>
-        <a:xfrm>
-          <a:off x="0" y="0"/>
-          <a:ext cx="0" cy="0"/>
-          <a:chOff x="0" y="0"/>
-          <a:chExt cx="0" cy="0"/>
-        </a:xfrm>
-      </p:grpSpPr>
-      <p:sp>
-        <p:nvSpPr>
-          <p:cNvPr id="2" name="標題 1"/>
-          <p:cNvSpPr>
-            <a:spLocks noGrp="1"/>
-          </p:cNvSpPr>
-          <p:nvPr>
-            <p:ph type="title"/>
-          </p:nvPr>
-        </p:nvSpPr>
-        <p:spPr>
-          <a:xfrm>
-            <a:off x="806395" y="0"/>
-            <a:ext cx="10515600" cy="1325563"/>
-          </a:xfrm>
-        </p:spPr>
-        <p:txBody>
-          <a:bodyPr/>
-          <a:lstStyle/>
-          <a:p>
-            <a:pPr algn="ctr"/>
-            <a:r>
-              <a:rPr lang="zh-TW" altLang="en-US" dirty="0" smtClean="0"/>
-              <a:t>點擊</a:t>
-            </a:r>
-            <a:r>
-              <a:rPr lang="en-US" altLang="zh-TW" dirty="0" smtClean="0"/>
-              <a:t>Mailman</a:t>
-            </a:r>
-            <a:r>
-              <a:rPr lang="zh-TW" altLang="en-US" dirty="0" smtClean="0"/>
-              <a:t>進入頁面</a:t>
-            </a:r>
-            <a:r>
-              <a:rPr lang="en-US" altLang="zh-TW" dirty="0" smtClean="0"/>
-              <a:t>/</a:t>
-            </a:r>
-            <a:br>
-              <a:rPr lang="en-US" altLang="zh-TW" dirty="0" smtClean="0"/>
-            </a:br>
-            <a:r>
-              <a:rPr lang="zh-TW" altLang="en-US" dirty="0" smtClean="0"/>
-              <a:t>選取</a:t>
-            </a:r>
-            <a:r>
-              <a:rPr lang="zh-TW" altLang="en-US" dirty="0" smtClean="0"/>
-              <a:t>欲</a:t>
-            </a:r>
-            <a:r>
-              <a:rPr lang="zh-TW" altLang="en-US" dirty="0" smtClean="0"/>
-              <a:t>放入商品的置物櫃</a:t>
-            </a:r>
-            <a:endParaRPr lang="zh-TW" altLang="en-US" dirty="0"/>
-          </a:p>
-        </p:txBody>
-      </p:sp>
-      <p:pic>
-        <p:nvPicPr>
-          <p:cNvPr id="7" name="圖片 6"/>
-          <p:cNvPicPr>
-            <a:picLocks noChangeAspect="1"/>
-          </p:cNvPicPr>
-          <p:nvPr/>
-        </p:nvPicPr>
-        <p:blipFill>
-          <a:blip r:embed="rId2">
-            <a:extLst>
-              <a:ext uri="{28A0092B-C50C-407E-A947-70E740481C1C}">
-                <a14:useLocalDpi xmlns:a14="http://schemas.microsoft.com/office/drawing/2010/main" val="0"/>
-              </a:ext>
-            </a:extLst>
-          </a:blip>
-          <a:stretch>
-            <a:fillRect/>
-          </a:stretch>
-        </p:blipFill>
-        <p:spPr>
-          <a:xfrm>
-            <a:off x="-127221" y="1266962"/>
-            <a:ext cx="10058400" cy="4997403"/>
-          </a:xfrm>
-          <a:prstGeom prst="rect">
-            <a:avLst/>
-          </a:prstGeom>
-        </p:spPr>
-      </p:pic>
-      <p:pic>
-        <p:nvPicPr>
-          <p:cNvPr id="8" name="圖片 7"/>
-          <p:cNvPicPr>
-            <a:picLocks noChangeAspect="1"/>
-          </p:cNvPicPr>
-          <p:nvPr/>
-        </p:nvPicPr>
-        <p:blipFill>
-          <a:blip r:embed="rId3">
-            <a:extLst>
-              <a:ext uri="{28A0092B-C50C-407E-A947-70E740481C1C}">
-                <a14:useLocalDpi xmlns:a14="http://schemas.microsoft.com/office/drawing/2010/main" val="0"/>
-              </a:ext>
-            </a:extLst>
-          </a:blip>
-          <a:stretch>
-            <a:fillRect/>
-          </a:stretch>
-        </p:blipFill>
-        <p:spPr>
-          <a:xfrm>
-            <a:off x="3411109" y="1857902"/>
-            <a:ext cx="10058400" cy="5000098"/>
-          </a:xfrm>
-          <a:prstGeom prst="rect">
-            <a:avLst/>
-          </a:prstGeom>
-        </p:spPr>
-      </p:pic>
-    </p:spTree>
-    <p:extLst>
-      <p:ext uri="{BB962C8B-B14F-4D97-AF65-F5344CB8AC3E}">
-        <p14:creationId xmlns:p14="http://schemas.microsoft.com/office/powerpoint/2010/main" val="2051098822"/>
       </p:ext>
     </p:extLst>
   </p:cSld>
@@ -5580,34 +5568,47 @@
         </p:nvSpPr>
         <p:spPr>
           <a:xfrm>
-            <a:off x="742785" y="141997"/>
-            <a:ext cx="10515600" cy="519701"/>
-          </a:xfrm>
-        </p:spPr>
-        <p:txBody>
-          <a:bodyPr>
-            <a:normAutofit fontScale="90000"/>
-          </a:bodyPr>
+            <a:off x="806395" y="0"/>
+            <a:ext cx="10515600" cy="1325563"/>
+          </a:xfrm>
+        </p:spPr>
+        <p:txBody>
+          <a:bodyPr/>
           <a:lstStyle/>
           <a:p>
             <a:pPr algn="ctr"/>
             <a:r>
-              <a:rPr lang="en-US" altLang="zh-TW" sz="4000" dirty="0" err="1" smtClean="0"/>
-              <a:t>db</a:t>
-            </a:r>
-            <a:r>
-              <a:rPr lang="zh-TW" altLang="en-US" sz="4000" dirty="0" smtClean="0"/>
-              <a:t>更新商品抵達</a:t>
-            </a:r>
-            <a:r>
-              <a:rPr lang="en-US" altLang="zh-TW" sz="4000" dirty="0" smtClean="0"/>
-              <a:t>/mailer</a:t>
-            </a:r>
-            <a:r>
-              <a:rPr lang="zh-TW" altLang="en-US" sz="4000" dirty="0" smtClean="0"/>
-              <a:t>登出</a:t>
-            </a:r>
-            <a:endParaRPr lang="zh-TW" altLang="en-US" sz="4000" dirty="0"/>
+              <a:rPr lang="zh-TW" altLang="en-US" dirty="0" smtClean="0"/>
+              <a:t>點擊</a:t>
+            </a:r>
+            <a:r>
+              <a:rPr lang="en-US" altLang="zh-TW" dirty="0" smtClean="0"/>
+              <a:t>Mailman</a:t>
+            </a:r>
+            <a:r>
+              <a:rPr lang="zh-TW" altLang="en-US" dirty="0" smtClean="0"/>
+              <a:t>進入頁面</a:t>
+            </a:r>
+            <a:r>
+              <a:rPr lang="en-US" altLang="zh-TW" dirty="0" smtClean="0"/>
+              <a:t>/</a:t>
+            </a:r>
+            <a:br>
+              <a:rPr lang="en-US" altLang="zh-TW" dirty="0" smtClean="0"/>
+            </a:br>
+            <a:r>
+              <a:rPr lang="zh-TW" altLang="en-US" dirty="0" smtClean="0"/>
+              <a:t>選取</a:t>
+            </a:r>
+            <a:r>
+              <a:rPr lang="zh-TW" altLang="en-US" dirty="0" smtClean="0"/>
+              <a:t>欲</a:t>
+            </a:r>
+            <a:r>
+              <a:rPr lang="zh-TW" altLang="en-US" dirty="0" smtClean="0"/>
+              <a:t>放入商品的置物櫃</a:t>
+            </a:r>
+            <a:endParaRPr lang="zh-TW" altLang="en-US" dirty="0"/>
           </a:p>
         </p:txBody>
       </p:sp>
@@ -5633,8 +5634,8 @@
         </p:blipFill>
         <p:spPr>
           <a:xfrm>
-            <a:off x="2234317" y="2085960"/>
-            <a:ext cx="10058400" cy="4772040"/>
+            <a:off x="-127221" y="1266962"/>
+            <a:ext cx="10058400" cy="4997403"/>
           </a:xfrm>
           <a:prstGeom prst="rect">
             <a:avLst/>
@@ -5643,7 +5644,7 @@
       </p:pic>
       <p:pic>
         <p:nvPicPr>
-          <p:cNvPr id="3" name="圖片 2"/>
+          <p:cNvPr id="8" name="圖片 7"/>
           <p:cNvPicPr>
             <a:picLocks noChangeAspect="1"/>
           </p:cNvPicPr>
@@ -5663,8 +5664,8 @@
         </p:blipFill>
         <p:spPr>
           <a:xfrm>
-            <a:off x="0" y="661698"/>
-            <a:ext cx="10058400" cy="5071192"/>
+            <a:off x="3411109" y="1857902"/>
+            <a:ext cx="10058400" cy="5000098"/>
           </a:xfrm>
           <a:prstGeom prst="rect">
             <a:avLst/>
@@ -5674,7 +5675,7 @@
     </p:spTree>
     <p:extLst>
       <p:ext uri="{BB962C8B-B14F-4D97-AF65-F5344CB8AC3E}">
-        <p14:creationId xmlns:p14="http://schemas.microsoft.com/office/powerpoint/2010/main" val="3455872810"/>
+        <p14:creationId xmlns:p14="http://schemas.microsoft.com/office/powerpoint/2010/main" val="2051098822"/>
       </p:ext>
     </p:extLst>
   </p:cSld>
@@ -5718,6 +5719,146 @@
             <p:ph type="title"/>
           </p:nvPr>
         </p:nvSpPr>
+        <p:spPr>
+          <a:xfrm>
+            <a:off x="742785" y="141997"/>
+            <a:ext cx="10515600" cy="519701"/>
+          </a:xfrm>
+        </p:spPr>
+        <p:txBody>
+          <a:bodyPr>
+            <a:normAutofit fontScale="90000"/>
+          </a:bodyPr>
+          <a:lstStyle/>
+          <a:p>
+            <a:pPr algn="ctr"/>
+            <a:r>
+              <a:rPr lang="en-US" altLang="zh-TW" sz="4000" dirty="0" err="1" smtClean="0"/>
+              <a:t>db</a:t>
+            </a:r>
+            <a:r>
+              <a:rPr lang="zh-TW" altLang="en-US" sz="4000" dirty="0" smtClean="0"/>
+              <a:t>更新商品抵達</a:t>
+            </a:r>
+            <a:r>
+              <a:rPr lang="en-US" altLang="zh-TW" sz="4000" dirty="0" smtClean="0"/>
+              <a:t>/mailer</a:t>
+            </a:r>
+            <a:r>
+              <a:rPr lang="zh-TW" altLang="en-US" sz="4000" dirty="0" smtClean="0"/>
+              <a:t>登出</a:t>
+            </a:r>
+            <a:endParaRPr lang="zh-TW" altLang="en-US" sz="4000" dirty="0"/>
+          </a:p>
+        </p:txBody>
+      </p:sp>
+      <p:pic>
+        <p:nvPicPr>
+          <p:cNvPr id="7" name="圖片 6"/>
+          <p:cNvPicPr>
+            <a:picLocks noChangeAspect="1"/>
+          </p:cNvPicPr>
+          <p:nvPr/>
+        </p:nvPicPr>
+        <p:blipFill>
+          <a:blip r:embed="rId2">
+            <a:extLst>
+              <a:ext uri="{28A0092B-C50C-407E-A947-70E740481C1C}">
+                <a14:useLocalDpi xmlns:a14="http://schemas.microsoft.com/office/drawing/2010/main" val="0"/>
+              </a:ext>
+            </a:extLst>
+          </a:blip>
+          <a:stretch>
+            <a:fillRect/>
+          </a:stretch>
+        </p:blipFill>
+        <p:spPr>
+          <a:xfrm>
+            <a:off x="2234317" y="2085960"/>
+            <a:ext cx="10058400" cy="4772040"/>
+          </a:xfrm>
+          <a:prstGeom prst="rect">
+            <a:avLst/>
+          </a:prstGeom>
+        </p:spPr>
+      </p:pic>
+      <p:pic>
+        <p:nvPicPr>
+          <p:cNvPr id="3" name="圖片 2"/>
+          <p:cNvPicPr>
+            <a:picLocks noChangeAspect="1"/>
+          </p:cNvPicPr>
+          <p:nvPr/>
+        </p:nvPicPr>
+        <p:blipFill>
+          <a:blip r:embed="rId3">
+            <a:extLst>
+              <a:ext uri="{28A0092B-C50C-407E-A947-70E740481C1C}">
+                <a14:useLocalDpi xmlns:a14="http://schemas.microsoft.com/office/drawing/2010/main" val="0"/>
+              </a:ext>
+            </a:extLst>
+          </a:blip>
+          <a:stretch>
+            <a:fillRect/>
+          </a:stretch>
+        </p:blipFill>
+        <p:spPr>
+          <a:xfrm>
+            <a:off x="0" y="661698"/>
+            <a:ext cx="10058400" cy="5071192"/>
+          </a:xfrm>
+          <a:prstGeom prst="rect">
+            <a:avLst/>
+          </a:prstGeom>
+        </p:spPr>
+      </p:pic>
+    </p:spTree>
+    <p:extLst>
+      <p:ext uri="{BB962C8B-B14F-4D97-AF65-F5344CB8AC3E}">
+        <p14:creationId xmlns:p14="http://schemas.microsoft.com/office/powerpoint/2010/main" val="3455872810"/>
+      </p:ext>
+    </p:extLst>
+  </p:cSld>
+  <p:clrMapOvr>
+    <a:masterClrMapping/>
+  </p:clrMapOvr>
+  <p:timing>
+    <p:tnLst>
+      <p:par>
+        <p:cTn id="1" dur="indefinite" restart="never" nodeType="tmRoot"/>
+      </p:par>
+    </p:tnLst>
+  </p:timing>
+</p:sld>
+</file>
+
+<file path=ppt/slides/slide24.xml><?xml version="1.0" encoding="utf-8"?>
+<p:sld xmlns:a="http://schemas.openxmlformats.org/drawingml/2006/main" xmlns:r="http://schemas.openxmlformats.org/officeDocument/2006/relationships" xmlns:p="http://schemas.openxmlformats.org/presentationml/2006/main">
+  <p:cSld>
+    <p:spTree>
+      <p:nvGrpSpPr>
+        <p:cNvPr id="1" name=""/>
+        <p:cNvGrpSpPr/>
+        <p:nvPr/>
+      </p:nvGrpSpPr>
+      <p:grpSpPr>
+        <a:xfrm>
+          <a:off x="0" y="0"/>
+          <a:ext cx="0" cy="0"/>
+          <a:chOff x="0" y="0"/>
+          <a:chExt cx="0" cy="0"/>
+        </a:xfrm>
+      </p:grpSpPr>
+      <p:sp>
+        <p:nvSpPr>
+          <p:cNvPr id="2" name="標題 1"/>
+          <p:cNvSpPr>
+            <a:spLocks noGrp="1"/>
+          </p:cNvSpPr>
+          <p:nvPr>
+            <p:ph type="title"/>
+          </p:nvPr>
+        </p:nvSpPr>
         <p:spPr/>
         <p:txBody>
           <a:bodyPr/>
@@ -5820,7 +5961,7 @@
 </p:sld>
 </file>
 
-<file path=ppt/slides/slide24.xml><?xml version="1.0" encoding="utf-8"?>
+<file path=ppt/slides/slide25.xml><?xml version="1.0" encoding="utf-8"?>
 <p:sld xmlns:a="http://schemas.openxmlformats.org/drawingml/2006/main" xmlns:r="http://schemas.openxmlformats.org/officeDocument/2006/relationships" xmlns:p="http://schemas.openxmlformats.org/presentationml/2006/main">
   <p:cSld>
     <p:spTree>
@@ -5969,133 +6110,6 @@
     <p:extLst>
       <p:ext uri="{BB962C8B-B14F-4D97-AF65-F5344CB8AC3E}">
         <p14:creationId xmlns:p14="http://schemas.microsoft.com/office/powerpoint/2010/main" val="761964569"/>
-      </p:ext>
-    </p:extLst>
-  </p:cSld>
-  <p:clrMapOvr>
-    <a:masterClrMapping/>
-  </p:clrMapOvr>
-  <p:timing>
-    <p:tnLst>
-      <p:par>
-        <p:cTn id="1" dur="indefinite" restart="never" nodeType="tmRoot"/>
-      </p:par>
-    </p:tnLst>
-  </p:timing>
-</p:sld>
-</file>
-
-<file path=ppt/slides/slide25.xml><?xml version="1.0" encoding="utf-8"?>
-<p:sld xmlns:a="http://schemas.openxmlformats.org/drawingml/2006/main" xmlns:r="http://schemas.openxmlformats.org/officeDocument/2006/relationships" xmlns:p="http://schemas.openxmlformats.org/presentationml/2006/main">
-  <p:cSld>
-    <p:spTree>
-      <p:nvGrpSpPr>
-        <p:cNvPr id="1" name=""/>
-        <p:cNvGrpSpPr/>
-        <p:nvPr/>
-      </p:nvGrpSpPr>
-      <p:grpSpPr>
-        <a:xfrm>
-          <a:off x="0" y="0"/>
-          <a:ext cx="0" cy="0"/>
-          <a:chOff x="0" y="0"/>
-          <a:chExt cx="0" cy="0"/>
-        </a:xfrm>
-      </p:grpSpPr>
-      <p:sp>
-        <p:nvSpPr>
-          <p:cNvPr id="6" name="文字方塊 5"/>
-          <p:cNvSpPr txBox="1"/>
-          <p:nvPr/>
-        </p:nvSpPr>
-        <p:spPr>
-          <a:xfrm>
-            <a:off x="4158762" y="143123"/>
-            <a:ext cx="2236510" cy="707886"/>
-          </a:xfrm>
-          <a:prstGeom prst="rect">
-            <a:avLst/>
-          </a:prstGeom>
-          <a:noFill/>
-        </p:spPr>
-        <p:txBody>
-          <a:bodyPr wrap="none" rtlCol="0">
-            <a:spAutoFit/>
-          </a:bodyPr>
-          <a:lstStyle/>
-          <a:p>
-            <a:r>
-              <a:rPr lang="zh-TW" altLang="en-US" sz="4000" dirty="0" smtClean="0"/>
-              <a:t>尚未付款</a:t>
-            </a:r>
-            <a:endParaRPr lang="zh-TW" altLang="en-US" sz="4000" dirty="0"/>
-          </a:p>
-        </p:txBody>
-      </p:sp>
-      <p:pic>
-        <p:nvPicPr>
-          <p:cNvPr id="5" name="圖片 4"/>
-          <p:cNvPicPr>
-            <a:picLocks noChangeAspect="1"/>
-          </p:cNvPicPr>
-          <p:nvPr/>
-        </p:nvPicPr>
-        <p:blipFill>
-          <a:blip r:embed="rId2">
-            <a:extLst>
-              <a:ext uri="{28A0092B-C50C-407E-A947-70E740481C1C}">
-                <a14:useLocalDpi xmlns:a14="http://schemas.microsoft.com/office/drawing/2010/main" val="0"/>
-              </a:ext>
-            </a:extLst>
-          </a:blip>
-          <a:stretch>
-            <a:fillRect/>
-          </a:stretch>
-        </p:blipFill>
-        <p:spPr>
-          <a:xfrm>
-            <a:off x="-1351722" y="1196271"/>
-            <a:ext cx="10058400" cy="4918282"/>
-          </a:xfrm>
-          <a:prstGeom prst="rect">
-            <a:avLst/>
-          </a:prstGeom>
-        </p:spPr>
-      </p:pic>
-      <p:pic>
-        <p:nvPicPr>
-          <p:cNvPr id="4" name="圖片 3"/>
-          <p:cNvPicPr>
-            <a:picLocks noChangeAspect="1"/>
-          </p:cNvPicPr>
-          <p:nvPr/>
-        </p:nvPicPr>
-        <p:blipFill>
-          <a:blip r:embed="rId3" cstate="print">
-            <a:extLst>
-              <a:ext uri="{28A0092B-C50C-407E-A947-70E740481C1C}">
-                <a14:useLocalDpi xmlns:a14="http://schemas.microsoft.com/office/drawing/2010/main" val="0"/>
-              </a:ext>
-            </a:extLst>
-          </a:blip>
-          <a:stretch>
-            <a:fillRect/>
-          </a:stretch>
-        </p:blipFill>
-        <p:spPr>
-          <a:xfrm>
-            <a:off x="6478390" y="497066"/>
-            <a:ext cx="5872636" cy="6124602"/>
-          </a:xfrm>
-          <a:prstGeom prst="rect">
-            <a:avLst/>
-          </a:prstGeom>
-        </p:spPr>
-      </p:pic>
-    </p:spTree>
-    <p:extLst>
-      <p:ext uri="{BB962C8B-B14F-4D97-AF65-F5344CB8AC3E}">
-        <p14:creationId xmlns:p14="http://schemas.microsoft.com/office/powerpoint/2010/main" val="274921796"/>
       </p:ext>
     </p:extLst>
   </p:cSld>
@@ -6131,34 +6145,31 @@
       </p:grpSpPr>
       <p:sp>
         <p:nvSpPr>
-          <p:cNvPr id="2" name="標題 1"/>
-          <p:cNvSpPr>
-            <a:spLocks noGrp="1"/>
-          </p:cNvSpPr>
-          <p:nvPr>
-            <p:ph type="title"/>
-          </p:nvPr>
-        </p:nvSpPr>
-        <p:spPr>
-          <a:xfrm>
-            <a:off x="687125" y="102732"/>
-            <a:ext cx="10515600" cy="1325563"/>
-          </a:xfrm>
-        </p:spPr>
-        <p:txBody>
-          <a:bodyPr/>
-          <a:lstStyle/>
-          <a:p>
-            <a:pPr algn="ctr"/>
-            <a:r>
-              <a:rPr lang="zh-TW" altLang="en-US" dirty="0" smtClean="0"/>
-              <a:t>確實是未</a:t>
-            </a:r>
-            <a:r>
-              <a:rPr lang="zh-TW" altLang="en-US" dirty="0" smtClean="0"/>
-              <a:t>付款</a:t>
-            </a:r>
-            <a:endParaRPr lang="zh-TW" altLang="en-US" dirty="0"/>
+          <p:cNvPr id="6" name="文字方塊 5"/>
+          <p:cNvSpPr txBox="1"/>
+          <p:nvPr/>
+        </p:nvSpPr>
+        <p:spPr>
+          <a:xfrm>
+            <a:off x="4158762" y="143123"/>
+            <a:ext cx="2236510" cy="707886"/>
+          </a:xfrm>
+          <a:prstGeom prst="rect">
+            <a:avLst/>
+          </a:prstGeom>
+          <a:noFill/>
+        </p:spPr>
+        <p:txBody>
+          <a:bodyPr wrap="none" rtlCol="0">
+            <a:spAutoFit/>
+          </a:bodyPr>
+          <a:lstStyle/>
+          <a:p>
+            <a:r>
+              <a:rPr lang="zh-TW" altLang="en-US" sz="4000" dirty="0" smtClean="0"/>
+              <a:t>尚未付款</a:t>
+            </a:r>
+            <a:endParaRPr lang="zh-TW" altLang="en-US" sz="4000" dirty="0"/>
           </a:p>
         </p:txBody>
       </p:sp>
@@ -6184,8 +6195,38 @@
         </p:blipFill>
         <p:spPr>
           <a:xfrm>
-            <a:off x="1359673" y="1287530"/>
-            <a:ext cx="10058400" cy="5015944"/>
+            <a:off x="-1351722" y="1196271"/>
+            <a:ext cx="10058400" cy="4918282"/>
+          </a:xfrm>
+          <a:prstGeom prst="rect">
+            <a:avLst/>
+          </a:prstGeom>
+        </p:spPr>
+      </p:pic>
+      <p:pic>
+        <p:nvPicPr>
+          <p:cNvPr id="4" name="圖片 3"/>
+          <p:cNvPicPr>
+            <a:picLocks noChangeAspect="1"/>
+          </p:cNvPicPr>
+          <p:nvPr/>
+        </p:nvPicPr>
+        <p:blipFill>
+          <a:blip r:embed="rId3" cstate="print">
+            <a:extLst>
+              <a:ext uri="{28A0092B-C50C-407E-A947-70E740481C1C}">
+                <a14:useLocalDpi xmlns:a14="http://schemas.microsoft.com/office/drawing/2010/main" val="0"/>
+              </a:ext>
+            </a:extLst>
+          </a:blip>
+          <a:stretch>
+            <a:fillRect/>
+          </a:stretch>
+        </p:blipFill>
+        <p:spPr>
+          <a:xfrm>
+            <a:off x="6478390" y="497066"/>
+            <a:ext cx="5872636" cy="6124602"/>
           </a:xfrm>
           <a:prstGeom prst="rect">
             <a:avLst/>
@@ -6195,7 +6236,7 @@
     </p:spTree>
     <p:extLst>
       <p:ext uri="{BB962C8B-B14F-4D97-AF65-F5344CB8AC3E}">
-        <p14:creationId xmlns:p14="http://schemas.microsoft.com/office/powerpoint/2010/main" val="2114422350"/>
+        <p14:creationId xmlns:p14="http://schemas.microsoft.com/office/powerpoint/2010/main" val="274921796"/>
       </p:ext>
     </p:extLst>
   </p:cSld>
@@ -6241,59 +6282,22 @@
         </p:nvSpPr>
         <p:spPr>
           <a:xfrm>
-            <a:off x="687124" y="78697"/>
-            <a:ext cx="10508312" cy="1273260"/>
-          </a:xfrm>
-        </p:spPr>
-        <p:txBody>
-          <a:bodyPr>
-            <a:normAutofit fontScale="90000"/>
-          </a:bodyPr>
+            <a:off x="687125" y="102732"/>
+            <a:ext cx="10515600" cy="1325563"/>
+          </a:xfrm>
+        </p:spPr>
+        <p:txBody>
+          <a:bodyPr/>
           <a:lstStyle/>
           <a:p>
             <a:pPr algn="ctr"/>
             <a:r>
-              <a:rPr lang="en-US" altLang="zh-TW" dirty="0" smtClean="0"/>
-              <a:t>Buy Record</a:t>
-            </a:r>
-            <a:r>
               <a:rPr lang="zh-TW" altLang="en-US" dirty="0" smtClean="0"/>
-              <a:t>中找到該訂單合約地址</a:t>
-            </a:r>
-            <a:r>
-              <a:rPr lang="en-US" altLang="zh-TW" dirty="0" smtClean="0"/>
-              <a:t>/</a:t>
-            </a:r>
-            <a:br>
-              <a:rPr lang="en-US" altLang="zh-TW" dirty="0" smtClean="0"/>
-            </a:br>
+              <a:t>確實是未</a:t>
+            </a:r>
             <a:r>
               <a:rPr lang="zh-TW" altLang="en-US" dirty="0" smtClean="0"/>
-              <a:t>貼到</a:t>
-            </a:r>
-            <a:r>
-              <a:rPr lang="en-US" altLang="zh-TW" dirty="0" smtClean="0"/>
-              <a:t>wallet</a:t>
-            </a:r>
-            <a:r>
-              <a:rPr lang="zh-TW" altLang="en-US" dirty="0" smtClean="0"/>
-              <a:t> </a:t>
-            </a:r>
-            <a:r>
-              <a:rPr lang="en-US" altLang="zh-TW" dirty="0" smtClean="0"/>
-              <a:t>for</a:t>
-            </a:r>
-            <a:r>
-              <a:rPr lang="zh-TW" altLang="en-US" dirty="0" smtClean="0"/>
-              <a:t> </a:t>
-            </a:r>
-            <a:r>
-              <a:rPr lang="en-US" altLang="zh-TW" dirty="0" err="1" smtClean="0"/>
-              <a:t>catchbo</a:t>
-            </a:r>
-            <a:r>
-              <a:rPr lang="zh-TW" altLang="en-US" dirty="0" smtClean="0"/>
-              <a:t>即可付款</a:t>
+              <a:t>付款</a:t>
             </a:r>
             <a:endParaRPr lang="zh-TW" altLang="en-US" dirty="0"/>
           </a:p>
@@ -6301,7 +6305,7 @@
       </p:sp>
       <p:pic>
         <p:nvPicPr>
-          <p:cNvPr id="13" name="圖片 12"/>
+          <p:cNvPr id="5" name="圖片 4"/>
           <p:cNvPicPr>
             <a:picLocks noChangeAspect="1"/>
           </p:cNvPicPr>
@@ -6321,38 +6325,8 @@
         </p:blipFill>
         <p:spPr>
           <a:xfrm>
-            <a:off x="0" y="1247774"/>
+            <a:off x="1359673" y="1287530"/>
             <a:ext cx="10058400" cy="5015944"/>
-          </a:xfrm>
-          <a:prstGeom prst="rect">
-            <a:avLst/>
-          </a:prstGeom>
-        </p:spPr>
-      </p:pic>
-      <p:pic>
-        <p:nvPicPr>
-          <p:cNvPr id="11" name="圖片 10"/>
-          <p:cNvPicPr>
-            <a:picLocks noChangeAspect="1"/>
-          </p:cNvPicPr>
-          <p:nvPr/>
-        </p:nvPicPr>
-        <p:blipFill>
-          <a:blip r:embed="rId3">
-            <a:extLst>
-              <a:ext uri="{28A0092B-C50C-407E-A947-70E740481C1C}">
-                <a14:useLocalDpi xmlns:a14="http://schemas.microsoft.com/office/drawing/2010/main" val="0"/>
-              </a:ext>
-            </a:extLst>
-          </a:blip>
-          <a:stretch>
-            <a:fillRect/>
-          </a:stretch>
-        </p:blipFill>
-        <p:spPr>
-          <a:xfrm>
-            <a:off x="7036904" y="1844749"/>
-            <a:ext cx="10058400" cy="5013251"/>
           </a:xfrm>
           <a:prstGeom prst="rect">
             <a:avLst/>
@@ -6362,7 +6336,7 @@
     </p:spTree>
     <p:extLst>
       <p:ext uri="{BB962C8B-B14F-4D97-AF65-F5344CB8AC3E}">
-        <p14:creationId xmlns:p14="http://schemas.microsoft.com/office/powerpoint/2010/main" val="3523007913"/>
+        <p14:creationId xmlns:p14="http://schemas.microsoft.com/office/powerpoint/2010/main" val="2114422350"/>
       </p:ext>
     </p:extLst>
   </p:cSld>
@@ -6408,18 +6382,59 @@
         </p:nvSpPr>
         <p:spPr>
           <a:xfrm>
-            <a:off x="814346" y="0"/>
-            <a:ext cx="10515600" cy="839898"/>
-          </a:xfrm>
-        </p:spPr>
-        <p:txBody>
-          <a:bodyPr/>
+            <a:off x="687124" y="78697"/>
+            <a:ext cx="10508312" cy="1273260"/>
+          </a:xfrm>
+        </p:spPr>
+        <p:txBody>
+          <a:bodyPr>
+            <a:normAutofit fontScale="90000"/>
+          </a:bodyPr>
           <a:lstStyle/>
           <a:p>
             <a:pPr algn="ctr"/>
             <a:r>
+              <a:rPr lang="en-US" altLang="zh-TW" dirty="0" smtClean="0"/>
+              <a:t>Buy Record</a:t>
+            </a:r>
+            <a:r>
               <a:rPr lang="zh-TW" altLang="en-US" dirty="0" smtClean="0"/>
-              <a:t>成功付款頁面</a:t>
+              <a:t>中找到該訂單合約地址</a:t>
+            </a:r>
+            <a:r>
+              <a:rPr lang="en-US" altLang="zh-TW" dirty="0" smtClean="0"/>
+              <a:t>/</a:t>
+            </a:r>
+            <a:br>
+              <a:rPr lang="en-US" altLang="zh-TW" dirty="0" smtClean="0"/>
+            </a:br>
+            <a:r>
+              <a:rPr lang="zh-TW" altLang="en-US" dirty="0" smtClean="0"/>
+              <a:t>貼到</a:t>
+            </a:r>
+            <a:r>
+              <a:rPr lang="en-US" altLang="zh-TW" dirty="0" smtClean="0"/>
+              <a:t>wallet</a:t>
+            </a:r>
+            <a:r>
+              <a:rPr lang="zh-TW" altLang="en-US" dirty="0" smtClean="0"/>
+              <a:t> </a:t>
+            </a:r>
+            <a:r>
+              <a:rPr lang="en-US" altLang="zh-TW" dirty="0" smtClean="0"/>
+              <a:t>for</a:t>
+            </a:r>
+            <a:r>
+              <a:rPr lang="zh-TW" altLang="en-US" dirty="0" smtClean="0"/>
+              <a:t> </a:t>
+            </a:r>
+            <a:r>
+              <a:rPr lang="en-US" altLang="zh-TW" dirty="0" err="1" smtClean="0"/>
+              <a:t>catchbo</a:t>
+            </a:r>
+            <a:r>
+              <a:rPr lang="zh-TW" altLang="en-US" dirty="0" smtClean="0"/>
+              <a:t>即可付款</a:t>
             </a:r>
             <a:endParaRPr lang="zh-TW" altLang="en-US" dirty="0"/>
           </a:p>
@@ -6427,7 +6442,7 @@
       </p:sp>
       <p:pic>
         <p:nvPicPr>
-          <p:cNvPr id="5" name="圖片 4"/>
+          <p:cNvPr id="13" name="圖片 12"/>
           <p:cNvPicPr>
             <a:picLocks noChangeAspect="1"/>
           </p:cNvPicPr>
@@ -6447,8 +6462,8 @@
         </p:blipFill>
         <p:spPr>
           <a:xfrm>
-            <a:off x="0" y="839898"/>
-            <a:ext cx="10058400" cy="4841168"/>
+            <a:off x="0" y="1247774"/>
+            <a:ext cx="10058400" cy="5015944"/>
           </a:xfrm>
           <a:prstGeom prst="rect">
             <a:avLst/>
@@ -6457,7 +6472,7 @@
       </p:pic>
       <p:pic>
         <p:nvPicPr>
-          <p:cNvPr id="6" name="圖片 5"/>
+          <p:cNvPr id="11" name="圖片 10"/>
           <p:cNvPicPr>
             <a:picLocks noChangeAspect="1"/>
           </p:cNvPicPr>
@@ -6477,8 +6492,8 @@
         </p:blipFill>
         <p:spPr>
           <a:xfrm>
-            <a:off x="4446147" y="3148717"/>
-            <a:ext cx="7745854" cy="3709283"/>
+            <a:off x="7036904" y="1844749"/>
+            <a:ext cx="10058400" cy="5013251"/>
           </a:xfrm>
           <a:prstGeom prst="rect">
             <a:avLst/>
@@ -6488,7 +6503,7 @@
     </p:spTree>
     <p:extLst>
       <p:ext uri="{BB962C8B-B14F-4D97-AF65-F5344CB8AC3E}">
-        <p14:creationId xmlns:p14="http://schemas.microsoft.com/office/powerpoint/2010/main" val="2664806659"/>
+        <p14:creationId xmlns:p14="http://schemas.microsoft.com/office/powerpoint/2010/main" val="3523007913"/>
       </p:ext>
     </p:extLst>
   </p:cSld>
@@ -6534,63 +6549,18 @@
         </p:nvSpPr>
         <p:spPr>
           <a:xfrm>
-            <a:off x="846151" y="0"/>
-            <a:ext cx="10515600" cy="1325563"/>
-          </a:xfrm>
-        </p:spPr>
-        <p:txBody>
-          <a:bodyPr>
-            <a:normAutofit/>
-          </a:bodyPr>
+            <a:off x="814346" y="0"/>
+            <a:ext cx="10515600" cy="839898"/>
+          </a:xfrm>
+        </p:spPr>
+        <p:txBody>
+          <a:bodyPr/>
           <a:lstStyle/>
           <a:p>
             <a:pPr algn="ctr"/>
             <a:r>
-              <a:rPr lang="en-US" altLang="zh-TW" dirty="0" err="1" smtClean="0"/>
-              <a:t>moneyPaid</a:t>
-            </a:r>
-            <a:r>
               <a:rPr lang="zh-TW" altLang="en-US" dirty="0" smtClean="0"/>
-              <a:t>變為</a:t>
-            </a:r>
-            <a:r>
-              <a:rPr lang="en-US" altLang="zh-TW" dirty="0" smtClean="0"/>
-              <a:t>true/</a:t>
-            </a:r>
-            <a:r>
-              <a:rPr lang="en-US" altLang="zh-TW" dirty="0"/>
-              <a:t/>
-            </a:r>
-            <a:br>
-              <a:rPr lang="en-US" altLang="zh-TW" dirty="0"/>
-            </a:br>
-            <a:r>
-              <a:rPr lang="zh-TW" altLang="en-US" dirty="0" smtClean="0"/>
-              <a:t>將已</a:t>
-            </a:r>
-            <a:r>
-              <a:rPr lang="zh-TW" altLang="en-US" dirty="0"/>
-              <a:t>付款</a:t>
-            </a:r>
-            <a:r>
-              <a:rPr lang="zh-TW" altLang="en-US" dirty="0" smtClean="0"/>
-              <a:t>訂單</a:t>
-            </a:r>
-            <a:r>
-              <a:rPr lang="zh-TW" altLang="en-US" dirty="0"/>
-              <a:t>的</a:t>
-            </a:r>
-            <a:r>
-              <a:rPr lang="en-US" altLang="zh-TW" dirty="0"/>
-              <a:t>_id</a:t>
-            </a:r>
-            <a:r>
-              <a:rPr lang="zh-TW" altLang="en-US" dirty="0"/>
-              <a:t>貼到輸入框並</a:t>
-            </a:r>
-            <a:r>
-              <a:rPr lang="en-US" altLang="zh-TW" dirty="0"/>
-              <a:t>submit</a:t>
+              <a:t>成功付款頁面</a:t>
             </a:r>
             <a:endParaRPr lang="zh-TW" altLang="en-US" dirty="0"/>
           </a:p>
@@ -6598,7 +6568,7 @@
       </p:sp>
       <p:pic>
         <p:nvPicPr>
-          <p:cNvPr id="14" name="圖片 13"/>
+          <p:cNvPr id="5" name="圖片 4"/>
           <p:cNvPicPr>
             <a:picLocks noChangeAspect="1"/>
           </p:cNvPicPr>
@@ -6618,8 +6588,8 @@
         </p:blipFill>
         <p:spPr>
           <a:xfrm>
-            <a:off x="0" y="1325563"/>
-            <a:ext cx="10058400" cy="5005390"/>
+            <a:off x="0" y="839898"/>
+            <a:ext cx="10058400" cy="4841168"/>
           </a:xfrm>
           <a:prstGeom prst="rect">
             <a:avLst/>
@@ -6628,7 +6598,7 @@
       </p:pic>
       <p:pic>
         <p:nvPicPr>
-          <p:cNvPr id="15" name="圖片 14"/>
+          <p:cNvPr id="6" name="圖片 5"/>
           <p:cNvPicPr>
             <a:picLocks noChangeAspect="1"/>
           </p:cNvPicPr>
@@ -6648,8 +6618,8 @@
         </p:blipFill>
         <p:spPr>
           <a:xfrm>
-            <a:off x="6332551" y="1622190"/>
-            <a:ext cx="10058400" cy="4412136"/>
+            <a:off x="4446147" y="3148717"/>
+            <a:ext cx="7745854" cy="3709283"/>
           </a:xfrm>
           <a:prstGeom prst="rect">
             <a:avLst/>
@@ -6659,7 +6629,7 @@
     </p:spTree>
     <p:extLst>
       <p:ext uri="{BB962C8B-B14F-4D97-AF65-F5344CB8AC3E}">
-        <p14:creationId xmlns:p14="http://schemas.microsoft.com/office/powerpoint/2010/main" val="2398518547"/>
+        <p14:creationId xmlns:p14="http://schemas.microsoft.com/office/powerpoint/2010/main" val="2664806659"/>
       </p:ext>
     </p:extLst>
   </p:cSld>
@@ -6809,6 +6779,177 @@
       </p:grpSpPr>
       <p:sp>
         <p:nvSpPr>
+          <p:cNvPr id="2" name="標題 1"/>
+          <p:cNvSpPr>
+            <a:spLocks noGrp="1"/>
+          </p:cNvSpPr>
+          <p:nvPr>
+            <p:ph type="title"/>
+          </p:nvPr>
+        </p:nvSpPr>
+        <p:spPr>
+          <a:xfrm>
+            <a:off x="846151" y="0"/>
+            <a:ext cx="10515600" cy="1325563"/>
+          </a:xfrm>
+        </p:spPr>
+        <p:txBody>
+          <a:bodyPr>
+            <a:normAutofit/>
+          </a:bodyPr>
+          <a:lstStyle/>
+          <a:p>
+            <a:pPr algn="ctr"/>
+            <a:r>
+              <a:rPr lang="en-US" altLang="zh-TW" dirty="0" err="1" smtClean="0"/>
+              <a:t>moneyPaid</a:t>
+            </a:r>
+            <a:r>
+              <a:rPr lang="zh-TW" altLang="en-US" dirty="0" smtClean="0"/>
+              <a:t>變為</a:t>
+            </a:r>
+            <a:r>
+              <a:rPr lang="en-US" altLang="zh-TW" dirty="0" smtClean="0"/>
+              <a:t>true/</a:t>
+            </a:r>
+            <a:r>
+              <a:rPr lang="en-US" altLang="zh-TW" dirty="0"/>
+              <a:t/>
+            </a:r>
+            <a:br>
+              <a:rPr lang="en-US" altLang="zh-TW" dirty="0"/>
+            </a:br>
+            <a:r>
+              <a:rPr lang="zh-TW" altLang="en-US" dirty="0" smtClean="0"/>
+              <a:t>將已</a:t>
+            </a:r>
+            <a:r>
+              <a:rPr lang="zh-TW" altLang="en-US" dirty="0"/>
+              <a:t>付款</a:t>
+            </a:r>
+            <a:r>
+              <a:rPr lang="zh-TW" altLang="en-US" dirty="0" smtClean="0"/>
+              <a:t>訂單</a:t>
+            </a:r>
+            <a:r>
+              <a:rPr lang="zh-TW" altLang="en-US" dirty="0"/>
+              <a:t>的</a:t>
+            </a:r>
+            <a:r>
+              <a:rPr lang="en-US" altLang="zh-TW" dirty="0"/>
+              <a:t>_id</a:t>
+            </a:r>
+            <a:r>
+              <a:rPr lang="zh-TW" altLang="en-US" dirty="0"/>
+              <a:t>貼到輸入框並</a:t>
+            </a:r>
+            <a:r>
+              <a:rPr lang="en-US" altLang="zh-TW" dirty="0"/>
+              <a:t>submit</a:t>
+            </a:r>
+            <a:endParaRPr lang="zh-TW" altLang="en-US" dirty="0"/>
+          </a:p>
+        </p:txBody>
+      </p:sp>
+      <p:pic>
+        <p:nvPicPr>
+          <p:cNvPr id="14" name="圖片 13"/>
+          <p:cNvPicPr>
+            <a:picLocks noChangeAspect="1"/>
+          </p:cNvPicPr>
+          <p:nvPr/>
+        </p:nvPicPr>
+        <p:blipFill>
+          <a:blip r:embed="rId2">
+            <a:extLst>
+              <a:ext uri="{28A0092B-C50C-407E-A947-70E740481C1C}">
+                <a14:useLocalDpi xmlns:a14="http://schemas.microsoft.com/office/drawing/2010/main" val="0"/>
+              </a:ext>
+            </a:extLst>
+          </a:blip>
+          <a:stretch>
+            <a:fillRect/>
+          </a:stretch>
+        </p:blipFill>
+        <p:spPr>
+          <a:xfrm>
+            <a:off x="0" y="1325563"/>
+            <a:ext cx="10058400" cy="5005390"/>
+          </a:xfrm>
+          <a:prstGeom prst="rect">
+            <a:avLst/>
+          </a:prstGeom>
+        </p:spPr>
+      </p:pic>
+      <p:pic>
+        <p:nvPicPr>
+          <p:cNvPr id="15" name="圖片 14"/>
+          <p:cNvPicPr>
+            <a:picLocks noChangeAspect="1"/>
+          </p:cNvPicPr>
+          <p:nvPr/>
+        </p:nvPicPr>
+        <p:blipFill>
+          <a:blip r:embed="rId3">
+            <a:extLst>
+              <a:ext uri="{28A0092B-C50C-407E-A947-70E740481C1C}">
+                <a14:useLocalDpi xmlns:a14="http://schemas.microsoft.com/office/drawing/2010/main" val="0"/>
+              </a:ext>
+            </a:extLst>
+          </a:blip>
+          <a:stretch>
+            <a:fillRect/>
+          </a:stretch>
+        </p:blipFill>
+        <p:spPr>
+          <a:xfrm>
+            <a:off x="6332551" y="1622190"/>
+            <a:ext cx="10058400" cy="4412136"/>
+          </a:xfrm>
+          <a:prstGeom prst="rect">
+            <a:avLst/>
+          </a:prstGeom>
+        </p:spPr>
+      </p:pic>
+    </p:spTree>
+    <p:extLst>
+      <p:ext uri="{BB962C8B-B14F-4D97-AF65-F5344CB8AC3E}">
+        <p14:creationId xmlns:p14="http://schemas.microsoft.com/office/powerpoint/2010/main" val="2398518547"/>
+      </p:ext>
+    </p:extLst>
+  </p:cSld>
+  <p:clrMapOvr>
+    <a:masterClrMapping/>
+  </p:clrMapOvr>
+  <p:timing>
+    <p:tnLst>
+      <p:par>
+        <p:cTn id="1" dur="indefinite" restart="never" nodeType="tmRoot"/>
+      </p:par>
+    </p:tnLst>
+  </p:timing>
+</p:sld>
+</file>
+
+<file path=ppt/slides/slide31.xml><?xml version="1.0" encoding="utf-8"?>
+<p:sld xmlns:a="http://schemas.openxmlformats.org/drawingml/2006/main" xmlns:r="http://schemas.openxmlformats.org/officeDocument/2006/relationships" xmlns:p="http://schemas.openxmlformats.org/presentationml/2006/main">
+  <p:cSld>
+    <p:spTree>
+      <p:nvGrpSpPr>
+        <p:cNvPr id="1" name=""/>
+        <p:cNvGrpSpPr/>
+        <p:nvPr/>
+      </p:nvGrpSpPr>
+      <p:grpSpPr>
+        <a:xfrm>
+          <a:off x="0" y="0"/>
+          <a:ext cx="0" cy="0"/>
+          <a:chOff x="0" y="0"/>
+          <a:chExt cx="0" cy="0"/>
+        </a:xfrm>
+      </p:grpSpPr>
+      <p:sp>
+        <p:nvSpPr>
           <p:cNvPr id="6" name="文字方塊 5"/>
           <p:cNvSpPr txBox="1"/>
           <p:nvPr/>
@@ -6928,7 +7069,7 @@
 </p:sld>
 </file>
 
-<file path=ppt/slides/slide31.xml><?xml version="1.0" encoding="utf-8"?>
+<file path=ppt/slides/slide32.xml><?xml version="1.0" encoding="utf-8"?>
 <p:sld xmlns:a="http://schemas.openxmlformats.org/drawingml/2006/main" xmlns:r="http://schemas.openxmlformats.org/officeDocument/2006/relationships" xmlns:p="http://schemas.openxmlformats.org/presentationml/2006/main">
   <p:cSld>
     <p:spTree>
@@ -7375,6 +7516,101 @@
       </p:grpSpPr>
       <p:sp>
         <p:nvSpPr>
+          <p:cNvPr id="2" name="標題 1"/>
+          <p:cNvSpPr>
+            <a:spLocks noGrp="1"/>
+          </p:cNvSpPr>
+          <p:nvPr>
+            <p:ph type="title"/>
+          </p:nvPr>
+        </p:nvSpPr>
+        <p:spPr>
+          <a:xfrm>
+            <a:off x="4149586" y="7951"/>
+            <a:ext cx="3892825" cy="462252"/>
+          </a:xfrm>
+        </p:spPr>
+        <p:txBody>
+          <a:bodyPr>
+            <a:normAutofit fontScale="90000"/>
+          </a:bodyPr>
+          <a:lstStyle/>
+          <a:p>
+            <a:pPr algn="ctr"/>
+            <a:r>
+              <a:rPr lang="en-US" altLang="zh-TW" dirty="0"/>
+              <a:t>a</a:t>
+            </a:r>
+            <a:r>
+              <a:rPr lang="en-US" altLang="zh-TW" dirty="0" smtClean="0"/>
+              <a:t>ctivity diagram</a:t>
+            </a:r>
+            <a:endParaRPr lang="zh-TW" altLang="en-US" dirty="0"/>
+          </a:p>
+        </p:txBody>
+      </p:sp>
+      <p:pic>
+        <p:nvPicPr>
+          <p:cNvPr id="4" name="圖片 3"/>
+          <p:cNvPicPr>
+            <a:picLocks noChangeAspect="1"/>
+          </p:cNvPicPr>
+          <p:nvPr/>
+        </p:nvPicPr>
+        <p:blipFill>
+          <a:blip r:embed="rId2">
+            <a:extLst>
+              <a:ext uri="{28A0092B-C50C-407E-A947-70E740481C1C}">
+                <a14:useLocalDpi xmlns:a14="http://schemas.microsoft.com/office/drawing/2010/main" val="0"/>
+              </a:ext>
+            </a:extLst>
+          </a:blip>
+          <a:stretch>
+            <a:fillRect/>
+          </a:stretch>
+        </p:blipFill>
+        <p:spPr>
+          <a:xfrm>
+            <a:off x="3371351" y="470203"/>
+            <a:ext cx="5449294" cy="6395709"/>
+          </a:xfrm>
+          <a:prstGeom prst="rect">
+            <a:avLst/>
+          </a:prstGeom>
+        </p:spPr>
+      </p:pic>
+    </p:spTree>
+    <p:extLst>
+      <p:ext uri="{BB962C8B-B14F-4D97-AF65-F5344CB8AC3E}">
+        <p14:creationId xmlns:p14="http://schemas.microsoft.com/office/powerpoint/2010/main" val="952929357"/>
+      </p:ext>
+    </p:extLst>
+  </p:cSld>
+  <p:clrMapOvr>
+    <a:masterClrMapping/>
+  </p:clrMapOvr>
+</p:sld>
+</file>
+
+<file path=ppt/slides/slide9.xml><?xml version="1.0" encoding="utf-8"?>
+<p:sld xmlns:a="http://schemas.openxmlformats.org/drawingml/2006/main" xmlns:r="http://schemas.openxmlformats.org/officeDocument/2006/relationships" xmlns:p="http://schemas.openxmlformats.org/presentationml/2006/main">
+  <p:cSld>
+    <p:spTree>
+      <p:nvGrpSpPr>
+        <p:cNvPr id="1" name=""/>
+        <p:cNvGrpSpPr/>
+        <p:nvPr/>
+      </p:nvGrpSpPr>
+      <p:grpSpPr>
+        <a:xfrm>
+          <a:off x="0" y="0"/>
+          <a:ext cx="0" cy="0"/>
+          <a:chOff x="0" y="0"/>
+          <a:chExt cx="0" cy="0"/>
+        </a:xfrm>
+      </p:grpSpPr>
+      <p:sp>
+        <p:nvSpPr>
           <p:cNvPr id="5" name="文字方塊 4"/>
           <p:cNvSpPr txBox="1"/>
           <p:nvPr/>
@@ -7449,146 +7685,6 @@
     <p:extLst>
       <p:ext uri="{BB962C8B-B14F-4D97-AF65-F5344CB8AC3E}">
         <p14:creationId xmlns:p14="http://schemas.microsoft.com/office/powerpoint/2010/main" val="4128717260"/>
-      </p:ext>
-    </p:extLst>
-  </p:cSld>
-  <p:clrMapOvr>
-    <a:masterClrMapping/>
-  </p:clrMapOvr>
-  <p:timing>
-    <p:tnLst>
-      <p:par>
-        <p:cTn id="1" dur="indefinite" restart="never" nodeType="tmRoot"/>
-      </p:par>
-    </p:tnLst>
-  </p:timing>
-</p:sld>
-</file>
-
-<file path=ppt/slides/slide9.xml><?xml version="1.0" encoding="utf-8"?>
-<p:sld xmlns:a="http://schemas.openxmlformats.org/drawingml/2006/main" xmlns:r="http://schemas.openxmlformats.org/officeDocument/2006/relationships" xmlns:p="http://schemas.openxmlformats.org/presentationml/2006/main">
-  <p:cSld>
-    <p:spTree>
-      <p:nvGrpSpPr>
-        <p:cNvPr id="1" name=""/>
-        <p:cNvGrpSpPr/>
-        <p:nvPr/>
-      </p:nvGrpSpPr>
-      <p:grpSpPr>
-        <a:xfrm>
-          <a:off x="0" y="0"/>
-          <a:ext cx="0" cy="0"/>
-          <a:chOff x="0" y="0"/>
-          <a:chExt cx="0" cy="0"/>
-        </a:xfrm>
-      </p:grpSpPr>
-      <p:sp>
-        <p:nvSpPr>
-          <p:cNvPr id="2" name="標題 1"/>
-          <p:cNvSpPr>
-            <a:spLocks noGrp="1"/>
-          </p:cNvSpPr>
-          <p:nvPr>
-            <p:ph type="title"/>
-          </p:nvPr>
-        </p:nvSpPr>
-        <p:spPr>
-          <a:xfrm>
-            <a:off x="2759104" y="85420"/>
-            <a:ext cx="7068710" cy="896810"/>
-          </a:xfrm>
-        </p:spPr>
-        <p:txBody>
-          <a:bodyPr>
-            <a:normAutofit/>
-          </a:bodyPr>
-          <a:lstStyle/>
-          <a:p>
-            <a:pPr algn="ctr"/>
-            <a:r>
-              <a:rPr lang="zh-TW" altLang="en-US" dirty="0" smtClean="0"/>
-              <a:t>賣家註冊</a:t>
-            </a:r>
-            <a:r>
-              <a:rPr lang="zh-TW" altLang="en-US" dirty="0" smtClean="0"/>
-              <a:t>帳密</a:t>
-            </a:r>
-            <a:r>
-              <a:rPr lang="en-US" altLang="zh-TW" dirty="0" smtClean="0"/>
-              <a:t>/</a:t>
-            </a:r>
-            <a:r>
-              <a:rPr lang="zh-TW" altLang="en-US" dirty="0" smtClean="0"/>
-              <a:t>成功頁面</a:t>
-            </a:r>
-            <a:endParaRPr lang="zh-TW" altLang="en-US" dirty="0"/>
-          </a:p>
-        </p:txBody>
-      </p:sp>
-      <p:pic>
-        <p:nvPicPr>
-          <p:cNvPr id="4" name="圖片 3"/>
-          <p:cNvPicPr>
-            <a:picLocks noChangeAspect="1"/>
-          </p:cNvPicPr>
-          <p:nvPr/>
-        </p:nvPicPr>
-        <p:blipFill>
-          <a:blip r:embed="rId2">
-            <a:extLst>
-              <a:ext uri="{28A0092B-C50C-407E-A947-70E740481C1C}">
-                <a14:useLocalDpi xmlns:a14="http://schemas.microsoft.com/office/drawing/2010/main" val="0"/>
-              </a:ext>
-            </a:extLst>
-          </a:blip>
-          <a:stretch>
-            <a:fillRect/>
-          </a:stretch>
-        </p:blipFill>
-        <p:spPr>
-          <a:xfrm>
-            <a:off x="0" y="1047105"/>
-            <a:ext cx="10058400" cy="4782903"/>
-          </a:xfrm>
-          <a:prstGeom prst="rect">
-            <a:avLst/>
-          </a:prstGeom>
-        </p:spPr>
-      </p:pic>
-      <p:pic>
-        <p:nvPicPr>
-          <p:cNvPr id="5" name="圖片 4"/>
-          <p:cNvPicPr>
-            <a:picLocks noChangeAspect="1"/>
-          </p:cNvPicPr>
-          <p:nvPr/>
-        </p:nvPicPr>
-        <p:blipFill>
-          <a:blip r:embed="rId3">
-            <a:extLst>
-              <a:ext uri="{28A0092B-C50C-407E-A947-70E740481C1C}">
-                <a14:useLocalDpi xmlns:a14="http://schemas.microsoft.com/office/drawing/2010/main" val="0"/>
-              </a:ext>
-            </a:extLst>
-          </a:blip>
-          <a:stretch>
-            <a:fillRect/>
-          </a:stretch>
-        </p:blipFill>
-        <p:spPr>
-          <a:xfrm>
-            <a:off x="4031312" y="1943915"/>
-            <a:ext cx="10058400" cy="4580685"/>
-          </a:xfrm>
-          <a:prstGeom prst="rect">
-            <a:avLst/>
-          </a:prstGeom>
-        </p:spPr>
-      </p:pic>
-    </p:spTree>
-    <p:extLst>
-      <p:ext uri="{BB962C8B-B14F-4D97-AF65-F5344CB8AC3E}">
-        <p14:creationId xmlns:p14="http://schemas.microsoft.com/office/powerpoint/2010/main" val="1428734080"/>
       </p:ext>
     </p:extLst>
   </p:cSld>

</xml_diff>

<commit_message>
PPT astah diagram updated.
</commit_message>
<xml_diff>
--- a/CatchBo.pptx
+++ b/CatchBo.pptx
@@ -5,7 +5,7 @@
     <p:sldMasterId id="2147483648" r:id="rId1"/>
   </p:sldMasterIdLst>
   <p:notesMasterIdLst>
-    <p:notesMasterId r:id="rId36"/>
+    <p:notesMasterId r:id="rId37"/>
   </p:notesMasterIdLst>
   <p:sldIdLst>
     <p:sldId id="257" r:id="rId2"/>
@@ -15,33 +15,34 @@
     <p:sldId id="283" r:id="rId6"/>
     <p:sldId id="277" r:id="rId7"/>
     <p:sldId id="278" r:id="rId8"/>
-    <p:sldId id="290" r:id="rId9"/>
-    <p:sldId id="289" r:id="rId10"/>
-    <p:sldId id="287" r:id="rId11"/>
-    <p:sldId id="256" r:id="rId12"/>
-    <p:sldId id="258" r:id="rId13"/>
-    <p:sldId id="259" r:id="rId14"/>
-    <p:sldId id="260" r:id="rId15"/>
-    <p:sldId id="261" r:id="rId16"/>
-    <p:sldId id="285" r:id="rId17"/>
-    <p:sldId id="262" r:id="rId18"/>
-    <p:sldId id="263" r:id="rId19"/>
-    <p:sldId id="264" r:id="rId20"/>
-    <p:sldId id="265" r:id="rId21"/>
-    <p:sldId id="282" r:id="rId22"/>
-    <p:sldId id="286" r:id="rId23"/>
-    <p:sldId id="268" r:id="rId24"/>
-    <p:sldId id="273" r:id="rId25"/>
-    <p:sldId id="270" r:id="rId26"/>
-    <p:sldId id="284" r:id="rId27"/>
-    <p:sldId id="266" r:id="rId28"/>
-    <p:sldId id="274" r:id="rId29"/>
-    <p:sldId id="267" r:id="rId30"/>
-    <p:sldId id="269" r:id="rId31"/>
-    <p:sldId id="271" r:id="rId32"/>
-    <p:sldId id="272" r:id="rId33"/>
-    <p:sldId id="275" r:id="rId34"/>
-    <p:sldId id="281" r:id="rId35"/>
+    <p:sldId id="287" r:id="rId9"/>
+    <p:sldId id="290" r:id="rId10"/>
+    <p:sldId id="289" r:id="rId11"/>
+    <p:sldId id="291" r:id="rId12"/>
+    <p:sldId id="256" r:id="rId13"/>
+    <p:sldId id="258" r:id="rId14"/>
+    <p:sldId id="259" r:id="rId15"/>
+    <p:sldId id="260" r:id="rId16"/>
+    <p:sldId id="261" r:id="rId17"/>
+    <p:sldId id="285" r:id="rId18"/>
+    <p:sldId id="262" r:id="rId19"/>
+    <p:sldId id="263" r:id="rId20"/>
+    <p:sldId id="264" r:id="rId21"/>
+    <p:sldId id="265" r:id="rId22"/>
+    <p:sldId id="282" r:id="rId23"/>
+    <p:sldId id="286" r:id="rId24"/>
+    <p:sldId id="268" r:id="rId25"/>
+    <p:sldId id="273" r:id="rId26"/>
+    <p:sldId id="270" r:id="rId27"/>
+    <p:sldId id="284" r:id="rId28"/>
+    <p:sldId id="266" r:id="rId29"/>
+    <p:sldId id="274" r:id="rId30"/>
+    <p:sldId id="267" r:id="rId31"/>
+    <p:sldId id="269" r:id="rId32"/>
+    <p:sldId id="271" r:id="rId33"/>
+    <p:sldId id="272" r:id="rId34"/>
+    <p:sldId id="275" r:id="rId35"/>
+    <p:sldId id="281" r:id="rId36"/>
   </p:sldIdLst>
   <p:sldSz cx="12192000" cy="6858000"/>
   <p:notesSz cx="6858000" cy="9144000"/>
@@ -230,7 +231,7 @@
           <a:p>
             <a:fld id="{35DA5B65-FF5A-4949-8C78-8AC5C84B93F6}" type="datetimeFigureOut">
               <a:rPr lang="zh-TW" altLang="en-US" smtClean="0"/>
-              <a:t>2018/8/20</a:t>
+              <a:t>2018/9/24</a:t>
             </a:fld>
             <a:endParaRPr lang="zh-TW" altLang="en-US"/>
           </a:p>
@@ -666,6 +667,105 @@
 </p:notes>
 </file>
 
+<file path=ppt/notesSlides/notesSlide3.xml><?xml version="1.0" encoding="utf-8"?>
+<p:notes xmlns:a="http://schemas.openxmlformats.org/drawingml/2006/main" xmlns:r="http://schemas.openxmlformats.org/officeDocument/2006/relationships" xmlns:p="http://schemas.openxmlformats.org/presentationml/2006/main">
+  <p:cSld>
+    <p:spTree>
+      <p:nvGrpSpPr>
+        <p:cNvPr id="1" name=""/>
+        <p:cNvGrpSpPr/>
+        <p:nvPr/>
+      </p:nvGrpSpPr>
+      <p:grpSpPr>
+        <a:xfrm>
+          <a:off x="0" y="0"/>
+          <a:ext cx="0" cy="0"/>
+          <a:chOff x="0" y="0"/>
+          <a:chExt cx="0" cy="0"/>
+        </a:xfrm>
+      </p:grpSpPr>
+      <p:sp>
+        <p:nvSpPr>
+          <p:cNvPr id="2" name="投影片圖像版面配置區 1"/>
+          <p:cNvSpPr>
+            <a:spLocks noGrp="1" noRot="1" noChangeAspect="1"/>
+          </p:cNvSpPr>
+          <p:nvPr>
+            <p:ph type="sldImg"/>
+          </p:nvPr>
+        </p:nvSpPr>
+        <p:spPr/>
+      </p:sp>
+      <p:sp>
+        <p:nvSpPr>
+          <p:cNvPr id="3" name="備忘稿版面配置區 2"/>
+          <p:cNvSpPr>
+            <a:spLocks noGrp="1"/>
+          </p:cNvSpPr>
+          <p:nvPr>
+            <p:ph type="body" idx="1"/>
+          </p:nvPr>
+        </p:nvSpPr>
+        <p:spPr/>
+        <p:txBody>
+          <a:bodyPr/>
+          <a:lstStyle/>
+          <a:p>
+            <a:r>
+              <a:rPr lang="zh-TW" altLang="en-US" dirty="0" smtClean="0"/>
+              <a:t>賣家畫到收款為止</a:t>
+            </a:r>
+            <a:endParaRPr lang="en-US" altLang="zh-TW" smtClean="0"/>
+          </a:p>
+          <a:p>
+            <a:r>
+              <a:rPr lang="zh-TW" altLang="en-US" smtClean="0"/>
+              <a:t>郵遞</a:t>
+            </a:r>
+            <a:r>
+              <a:rPr lang="zh-TW" altLang="en-US" dirty="0" smtClean="0"/>
+              <a:t>公司另起一個完整故事</a:t>
+            </a:r>
+            <a:endParaRPr lang="zh-TW" altLang="en-US" dirty="0"/>
+          </a:p>
+        </p:txBody>
+      </p:sp>
+      <p:sp>
+        <p:nvSpPr>
+          <p:cNvPr id="4" name="投影片編號版面配置區 3"/>
+          <p:cNvSpPr>
+            <a:spLocks noGrp="1"/>
+          </p:cNvSpPr>
+          <p:nvPr>
+            <p:ph type="sldNum" sz="quarter" idx="10"/>
+          </p:nvPr>
+        </p:nvSpPr>
+        <p:spPr/>
+        <p:txBody>
+          <a:bodyPr/>
+          <a:lstStyle/>
+          <a:p>
+            <a:fld id="{72DAF05B-E42E-49AC-BE56-1348F132AD9A}" type="slidenum">
+              <a:rPr lang="zh-TW" altLang="en-US" smtClean="0"/>
+              <a:t>9</a:t>
+            </a:fld>
+            <a:endParaRPr lang="zh-TW" altLang="en-US"/>
+          </a:p>
+        </p:txBody>
+      </p:sp>
+    </p:spTree>
+    <p:extLst>
+      <p:ext uri="{BB962C8B-B14F-4D97-AF65-F5344CB8AC3E}">
+        <p14:creationId xmlns:p14="http://schemas.microsoft.com/office/powerpoint/2010/main" val="1815974759"/>
+      </p:ext>
+    </p:extLst>
+  </p:cSld>
+  <p:clrMapOvr>
+    <a:masterClrMapping/>
+  </p:clrMapOvr>
+</p:notes>
+</file>
+
 <file path=ppt/slideLayouts/slideLayout1.xml><?xml version="1.0" encoding="utf-8"?>
 <p:sldLayout xmlns:a="http://schemas.openxmlformats.org/drawingml/2006/main" xmlns:r="http://schemas.openxmlformats.org/officeDocument/2006/relationships" xmlns:p="http://schemas.openxmlformats.org/presentationml/2006/main" type="title" preserve="1">
   <p:cSld name="標題投影片">
@@ -797,7 +897,7 @@
           <a:p>
             <a:fld id="{B40DF12A-1B60-4DFD-9E28-CDD98DEE53C4}" type="datetimeFigureOut">
               <a:rPr lang="zh-TW" altLang="en-US" smtClean="0"/>
-              <a:t>2018/8/20</a:t>
+              <a:t>2018/9/24</a:t>
             </a:fld>
             <a:endParaRPr lang="zh-TW" altLang="en-US"/>
           </a:p>
@@ -967,7 +1067,7 @@
           <a:p>
             <a:fld id="{B40DF12A-1B60-4DFD-9E28-CDD98DEE53C4}" type="datetimeFigureOut">
               <a:rPr lang="zh-TW" altLang="en-US" smtClean="0"/>
-              <a:t>2018/8/20</a:t>
+              <a:t>2018/9/24</a:t>
             </a:fld>
             <a:endParaRPr lang="zh-TW" altLang="en-US"/>
           </a:p>
@@ -1147,7 +1247,7 @@
           <a:p>
             <a:fld id="{B40DF12A-1B60-4DFD-9E28-CDD98DEE53C4}" type="datetimeFigureOut">
               <a:rPr lang="zh-TW" altLang="en-US" smtClean="0"/>
-              <a:t>2018/8/20</a:t>
+              <a:t>2018/9/24</a:t>
             </a:fld>
             <a:endParaRPr lang="zh-TW" altLang="en-US"/>
           </a:p>
@@ -1317,7 +1417,7 @@
           <a:p>
             <a:fld id="{B40DF12A-1B60-4DFD-9E28-CDD98DEE53C4}" type="datetimeFigureOut">
               <a:rPr lang="zh-TW" altLang="en-US" smtClean="0"/>
-              <a:t>2018/8/20</a:t>
+              <a:t>2018/9/24</a:t>
             </a:fld>
             <a:endParaRPr lang="zh-TW" altLang="en-US"/>
           </a:p>
@@ -1563,7 +1663,7 @@
           <a:p>
             <a:fld id="{B40DF12A-1B60-4DFD-9E28-CDD98DEE53C4}" type="datetimeFigureOut">
               <a:rPr lang="zh-TW" altLang="en-US" smtClean="0"/>
-              <a:t>2018/8/20</a:t>
+              <a:t>2018/9/24</a:t>
             </a:fld>
             <a:endParaRPr lang="zh-TW" altLang="en-US"/>
           </a:p>
@@ -1795,7 +1895,7 @@
           <a:p>
             <a:fld id="{B40DF12A-1B60-4DFD-9E28-CDD98DEE53C4}" type="datetimeFigureOut">
               <a:rPr lang="zh-TW" altLang="en-US" smtClean="0"/>
-              <a:t>2018/8/20</a:t>
+              <a:t>2018/9/24</a:t>
             </a:fld>
             <a:endParaRPr lang="zh-TW" altLang="en-US"/>
           </a:p>
@@ -2162,7 +2262,7 @@
           <a:p>
             <a:fld id="{B40DF12A-1B60-4DFD-9E28-CDD98DEE53C4}" type="datetimeFigureOut">
               <a:rPr lang="zh-TW" altLang="en-US" smtClean="0"/>
-              <a:t>2018/8/20</a:t>
+              <a:t>2018/9/24</a:t>
             </a:fld>
             <a:endParaRPr lang="zh-TW" altLang="en-US"/>
           </a:p>
@@ -2280,7 +2380,7 @@
           <a:p>
             <a:fld id="{B40DF12A-1B60-4DFD-9E28-CDD98DEE53C4}" type="datetimeFigureOut">
               <a:rPr lang="zh-TW" altLang="en-US" smtClean="0"/>
-              <a:t>2018/8/20</a:t>
+              <a:t>2018/9/24</a:t>
             </a:fld>
             <a:endParaRPr lang="zh-TW" altLang="en-US"/>
           </a:p>
@@ -2375,7 +2475,7 @@
           <a:p>
             <a:fld id="{B40DF12A-1B60-4DFD-9E28-CDD98DEE53C4}" type="datetimeFigureOut">
               <a:rPr lang="zh-TW" altLang="en-US" smtClean="0"/>
-              <a:t>2018/8/20</a:t>
+              <a:t>2018/9/24</a:t>
             </a:fld>
             <a:endParaRPr lang="zh-TW" altLang="en-US"/>
           </a:p>
@@ -2652,7 +2752,7 @@
           <a:p>
             <a:fld id="{B40DF12A-1B60-4DFD-9E28-CDD98DEE53C4}" type="datetimeFigureOut">
               <a:rPr lang="zh-TW" altLang="en-US" smtClean="0"/>
-              <a:t>2018/8/20</a:t>
+              <a:t>2018/9/24</a:t>
             </a:fld>
             <a:endParaRPr lang="zh-TW" altLang="en-US"/>
           </a:p>
@@ -2905,7 +3005,7 @@
           <a:p>
             <a:fld id="{B40DF12A-1B60-4DFD-9E28-CDD98DEE53C4}" type="datetimeFigureOut">
               <a:rPr lang="zh-TW" altLang="en-US" smtClean="0"/>
-              <a:t>2018/8/20</a:t>
+              <a:t>2018/9/24</a:t>
             </a:fld>
             <a:endParaRPr lang="zh-TW" altLang="en-US"/>
           </a:p>
@@ -3118,7 +3218,7 @@
           <a:p>
             <a:fld id="{B40DF12A-1B60-4DFD-9E28-CDD98DEE53C4}" type="datetimeFigureOut">
               <a:rPr lang="zh-TW" altLang="en-US" smtClean="0"/>
-              <a:t>2018/8/20</a:t>
+              <a:t>2018/9/24</a:t>
             </a:fld>
             <a:endParaRPr lang="zh-TW" altLang="en-US"/>
           </a:p>
@@ -3624,52 +3724,9 @@
           <a:chExt cx="0" cy="0"/>
         </a:xfrm>
       </p:grpSpPr>
-      <p:sp>
-        <p:nvSpPr>
-          <p:cNvPr id="2" name="標題 1"/>
-          <p:cNvSpPr>
-            <a:spLocks noGrp="1"/>
-          </p:cNvSpPr>
-          <p:nvPr>
-            <p:ph type="title"/>
-          </p:nvPr>
-        </p:nvSpPr>
-        <p:spPr>
-          <a:xfrm>
-            <a:off x="3895144" y="7951"/>
-            <a:ext cx="4612751" cy="462252"/>
-          </a:xfrm>
-        </p:spPr>
-        <p:txBody>
-          <a:bodyPr>
-            <a:normAutofit fontScale="90000"/>
-          </a:bodyPr>
-          <a:lstStyle/>
-          <a:p>
-            <a:pPr algn="ctr"/>
-            <a:r>
-              <a:rPr lang="zh-TW" altLang="en-US" dirty="0" smtClean="0"/>
-              <a:t>活動圖</a:t>
-            </a:r>
-            <a:r>
-              <a:rPr lang="en-US" altLang="zh-TW" dirty="0" smtClean="0"/>
-              <a:t>(</a:t>
-            </a:r>
-            <a:r>
-              <a:rPr lang="zh-TW" altLang="en-US" dirty="0"/>
-              <a:t>簡介</a:t>
-            </a:r>
-            <a:r>
-              <a:rPr lang="en-US" altLang="zh-TW" dirty="0" smtClean="0"/>
-              <a:t>)</a:t>
-            </a:r>
-            <a:endParaRPr lang="zh-TW" altLang="en-US" dirty="0"/>
-          </a:p>
-        </p:txBody>
-      </p:sp>
       <p:pic>
         <p:nvPicPr>
-          <p:cNvPr id="4" name="圖片 3"/>
+          <p:cNvPr id="3" name="圖片 2"/>
           <p:cNvPicPr>
             <a:picLocks noChangeAspect="1"/>
           </p:cNvPicPr>
@@ -3689,8 +3746,8 @@
         </p:blipFill>
         <p:spPr>
           <a:xfrm>
-            <a:off x="3371351" y="470203"/>
-            <a:ext cx="5449294" cy="6395709"/>
+            <a:off x="1184744" y="0"/>
+            <a:ext cx="9925878" cy="6858000"/>
           </a:xfrm>
           <a:prstGeom prst="rect">
             <a:avLst/>
@@ -3700,7 +3757,7 @@
     </p:spTree>
     <p:extLst>
       <p:ext uri="{BB962C8B-B14F-4D97-AF65-F5344CB8AC3E}">
-        <p14:creationId xmlns:p14="http://schemas.microsoft.com/office/powerpoint/2010/main" val="952929357"/>
+        <p14:creationId xmlns:p14="http://schemas.microsoft.com/office/powerpoint/2010/main" val="297335561"/>
       </p:ext>
     </p:extLst>
   </p:cSld>
@@ -3727,6 +3784,66 @@
           <a:chExt cx="0" cy="0"/>
         </a:xfrm>
       </p:grpSpPr>
+      <p:pic>
+        <p:nvPicPr>
+          <p:cNvPr id="4" name="圖片 3"/>
+          <p:cNvPicPr>
+            <a:picLocks noChangeAspect="1"/>
+          </p:cNvPicPr>
+          <p:nvPr/>
+        </p:nvPicPr>
+        <p:blipFill>
+          <a:blip r:embed="rId2">
+            <a:extLst>
+              <a:ext uri="{28A0092B-C50C-407E-A947-70E740481C1C}">
+                <a14:useLocalDpi xmlns:a14="http://schemas.microsoft.com/office/drawing/2010/main" val="0"/>
+              </a:ext>
+            </a:extLst>
+          </a:blip>
+          <a:stretch>
+            <a:fillRect/>
+          </a:stretch>
+        </p:blipFill>
+        <p:spPr>
+          <a:xfrm>
+            <a:off x="3045350" y="0"/>
+            <a:ext cx="7227734" cy="6858000"/>
+          </a:xfrm>
+          <a:prstGeom prst="rect">
+            <a:avLst/>
+          </a:prstGeom>
+        </p:spPr>
+      </p:pic>
+    </p:spTree>
+    <p:extLst>
+      <p:ext uri="{BB962C8B-B14F-4D97-AF65-F5344CB8AC3E}">
+        <p14:creationId xmlns:p14="http://schemas.microsoft.com/office/powerpoint/2010/main" val="3339410796"/>
+      </p:ext>
+    </p:extLst>
+  </p:cSld>
+  <p:clrMapOvr>
+    <a:masterClrMapping/>
+  </p:clrMapOvr>
+</p:sld>
+</file>
+
+<file path=ppt/slides/slide12.xml><?xml version="1.0" encoding="utf-8"?>
+<p:sld xmlns:a="http://schemas.openxmlformats.org/drawingml/2006/main" xmlns:r="http://schemas.openxmlformats.org/officeDocument/2006/relationships" xmlns:p="http://schemas.openxmlformats.org/presentationml/2006/main">
+  <p:cSld>
+    <p:spTree>
+      <p:nvGrpSpPr>
+        <p:cNvPr id="1" name=""/>
+        <p:cNvGrpSpPr/>
+        <p:nvPr/>
+      </p:nvGrpSpPr>
+      <p:grpSpPr>
+        <a:xfrm>
+          <a:off x="0" y="0"/>
+          <a:ext cx="0" cy="0"/>
+          <a:chOff x="0" y="0"/>
+          <a:chExt cx="0" cy="0"/>
+        </a:xfrm>
+      </p:grpSpPr>
       <p:sp>
         <p:nvSpPr>
           <p:cNvPr id="5" name="文字方塊 4"/>
@@ -3803,142 +3920,6 @@
     <p:extLst>
       <p:ext uri="{BB962C8B-B14F-4D97-AF65-F5344CB8AC3E}">
         <p14:creationId xmlns:p14="http://schemas.microsoft.com/office/powerpoint/2010/main" val="4128717260"/>
-      </p:ext>
-    </p:extLst>
-  </p:cSld>
-  <p:clrMapOvr>
-    <a:masterClrMapping/>
-  </p:clrMapOvr>
-  <p:timing>
-    <p:tnLst>
-      <p:par>
-        <p:cTn id="1" dur="indefinite" restart="never" nodeType="tmRoot"/>
-      </p:par>
-    </p:tnLst>
-  </p:timing>
-</p:sld>
-</file>
-
-<file path=ppt/slides/slide12.xml><?xml version="1.0" encoding="utf-8"?>
-<p:sld xmlns:a="http://schemas.openxmlformats.org/drawingml/2006/main" xmlns:r="http://schemas.openxmlformats.org/officeDocument/2006/relationships" xmlns:p="http://schemas.openxmlformats.org/presentationml/2006/main">
-  <p:cSld>
-    <p:spTree>
-      <p:nvGrpSpPr>
-        <p:cNvPr id="1" name=""/>
-        <p:cNvGrpSpPr/>
-        <p:nvPr/>
-      </p:nvGrpSpPr>
-      <p:grpSpPr>
-        <a:xfrm>
-          <a:off x="0" y="0"/>
-          <a:ext cx="0" cy="0"/>
-          <a:chOff x="0" y="0"/>
-          <a:chExt cx="0" cy="0"/>
-        </a:xfrm>
-      </p:grpSpPr>
-      <p:sp>
-        <p:nvSpPr>
-          <p:cNvPr id="2" name="標題 1"/>
-          <p:cNvSpPr>
-            <a:spLocks noGrp="1"/>
-          </p:cNvSpPr>
-          <p:nvPr>
-            <p:ph type="title"/>
-          </p:nvPr>
-        </p:nvSpPr>
-        <p:spPr>
-          <a:xfrm>
-            <a:off x="2759104" y="85420"/>
-            <a:ext cx="7068710" cy="896810"/>
-          </a:xfrm>
-        </p:spPr>
-        <p:txBody>
-          <a:bodyPr>
-            <a:normAutofit/>
-          </a:bodyPr>
-          <a:lstStyle/>
-          <a:p>
-            <a:pPr algn="ctr"/>
-            <a:r>
-              <a:rPr lang="zh-TW" altLang="en-US" dirty="0" smtClean="0"/>
-              <a:t>賣家註冊帳密</a:t>
-            </a:r>
-            <a:r>
-              <a:rPr lang="en-US" altLang="zh-TW" dirty="0" smtClean="0"/>
-              <a:t>/</a:t>
-            </a:r>
-            <a:r>
-              <a:rPr lang="zh-TW" altLang="en-US" dirty="0" smtClean="0"/>
-              <a:t>成功頁面</a:t>
-            </a:r>
-            <a:endParaRPr lang="zh-TW" altLang="en-US" dirty="0"/>
-          </a:p>
-        </p:txBody>
-      </p:sp>
-      <p:pic>
-        <p:nvPicPr>
-          <p:cNvPr id="4" name="圖片 3"/>
-          <p:cNvPicPr>
-            <a:picLocks noChangeAspect="1"/>
-          </p:cNvPicPr>
-          <p:nvPr/>
-        </p:nvPicPr>
-        <p:blipFill>
-          <a:blip r:embed="rId2">
-            <a:extLst>
-              <a:ext uri="{28A0092B-C50C-407E-A947-70E740481C1C}">
-                <a14:useLocalDpi xmlns:a14="http://schemas.microsoft.com/office/drawing/2010/main" val="0"/>
-              </a:ext>
-            </a:extLst>
-          </a:blip>
-          <a:stretch>
-            <a:fillRect/>
-          </a:stretch>
-        </p:blipFill>
-        <p:spPr>
-          <a:xfrm>
-            <a:off x="0" y="1047105"/>
-            <a:ext cx="10058400" cy="4782903"/>
-          </a:xfrm>
-          <a:prstGeom prst="rect">
-            <a:avLst/>
-          </a:prstGeom>
-        </p:spPr>
-      </p:pic>
-      <p:pic>
-        <p:nvPicPr>
-          <p:cNvPr id="5" name="圖片 4"/>
-          <p:cNvPicPr>
-            <a:picLocks noChangeAspect="1"/>
-          </p:cNvPicPr>
-          <p:nvPr/>
-        </p:nvPicPr>
-        <p:blipFill>
-          <a:blip r:embed="rId3">
-            <a:extLst>
-              <a:ext uri="{28A0092B-C50C-407E-A947-70E740481C1C}">
-                <a14:useLocalDpi xmlns:a14="http://schemas.microsoft.com/office/drawing/2010/main" val="0"/>
-              </a:ext>
-            </a:extLst>
-          </a:blip>
-          <a:stretch>
-            <a:fillRect/>
-          </a:stretch>
-        </p:blipFill>
-        <p:spPr>
-          <a:xfrm>
-            <a:off x="4031312" y="1943915"/>
-            <a:ext cx="10058400" cy="4580685"/>
-          </a:xfrm>
-          <a:prstGeom prst="rect">
-            <a:avLst/>
-          </a:prstGeom>
-        </p:spPr>
-      </p:pic>
-    </p:spTree>
-    <p:extLst>
-      <p:ext uri="{BB962C8B-B14F-4D97-AF65-F5344CB8AC3E}">
-        <p14:creationId xmlns:p14="http://schemas.microsoft.com/office/powerpoint/2010/main" val="1428734080"/>
       </p:ext>
     </p:extLst>
   </p:cSld>
@@ -3984,18 +3965,20 @@
         </p:nvSpPr>
         <p:spPr>
           <a:xfrm>
-            <a:off x="846151" y="159335"/>
-            <a:ext cx="10515600" cy="1325563"/>
-          </a:xfrm>
-        </p:spPr>
-        <p:txBody>
-          <a:bodyPr/>
+            <a:off x="2759104" y="85420"/>
+            <a:ext cx="7068710" cy="896810"/>
+          </a:xfrm>
+        </p:spPr>
+        <p:txBody>
+          <a:bodyPr>
+            <a:normAutofit/>
+          </a:bodyPr>
           <a:lstStyle/>
           <a:p>
             <a:pPr algn="ctr"/>
             <a:r>
               <a:rPr lang="zh-TW" altLang="en-US" dirty="0" smtClean="0"/>
-              <a:t>賣家輸入帳密</a:t>
+              <a:t>賣家註冊帳密</a:t>
             </a:r>
             <a:r>
               <a:rPr lang="en-US" altLang="zh-TW" dirty="0" smtClean="0"/>
@@ -4003,7 +3986,7 @@
             </a:r>
             <a:r>
               <a:rPr lang="zh-TW" altLang="en-US" dirty="0" smtClean="0"/>
-              <a:t>登入成功</a:t>
+              <a:t>成功頁面</a:t>
             </a:r>
             <a:endParaRPr lang="zh-TW" altLang="en-US" dirty="0"/>
           </a:p>
@@ -4011,7 +3994,7 @@
       </p:sp>
       <p:pic>
         <p:nvPicPr>
-          <p:cNvPr id="3" name="圖片 2"/>
+          <p:cNvPr id="4" name="圖片 3"/>
           <p:cNvPicPr>
             <a:picLocks noChangeAspect="1"/>
           </p:cNvPicPr>
@@ -4031,8 +4014,8 @@
         </p:blipFill>
         <p:spPr>
           <a:xfrm>
-            <a:off x="0" y="1174318"/>
-            <a:ext cx="10058400" cy="4809156"/>
+            <a:off x="0" y="1047105"/>
+            <a:ext cx="10058400" cy="4782903"/>
           </a:xfrm>
           <a:prstGeom prst="rect">
             <a:avLst/>
@@ -4041,7 +4024,7 @@
       </p:pic>
       <p:pic>
         <p:nvPicPr>
-          <p:cNvPr id="4" name="圖片 3"/>
+          <p:cNvPr id="5" name="圖片 4"/>
           <p:cNvPicPr>
             <a:picLocks noChangeAspect="1"/>
           </p:cNvPicPr>
@@ -4061,8 +4044,8 @@
         </p:blipFill>
         <p:spPr>
           <a:xfrm>
-            <a:off x="4055165" y="2153668"/>
-            <a:ext cx="10058400" cy="4544553"/>
+            <a:off x="4031312" y="1943915"/>
+            <a:ext cx="10058400" cy="4580685"/>
           </a:xfrm>
           <a:prstGeom prst="rect">
             <a:avLst/>
@@ -4072,7 +4055,7 @@
     </p:spTree>
     <p:extLst>
       <p:ext uri="{BB962C8B-B14F-4D97-AF65-F5344CB8AC3E}">
-        <p14:creationId xmlns:p14="http://schemas.microsoft.com/office/powerpoint/2010/main" val="3424059863"/>
+        <p14:creationId xmlns:p14="http://schemas.microsoft.com/office/powerpoint/2010/main" val="1428734080"/>
       </p:ext>
     </p:extLst>
   </p:cSld>
@@ -4118,7 +4101,7 @@
         </p:nvSpPr>
         <p:spPr>
           <a:xfrm>
-            <a:off x="862054" y="0"/>
+            <a:off x="846151" y="159335"/>
             <a:ext cx="10515600" cy="1325563"/>
           </a:xfrm>
         </p:spPr>
@@ -4129,7 +4112,7 @@
             <a:pPr algn="ctr"/>
             <a:r>
               <a:rPr lang="zh-TW" altLang="en-US" dirty="0" smtClean="0"/>
-              <a:t>販售商品頁面</a:t>
+              <a:t>賣家輸入帳密</a:t>
             </a:r>
             <a:r>
               <a:rPr lang="en-US" altLang="zh-TW" dirty="0" smtClean="0"/>
@@ -4137,7 +4120,7 @@
             </a:r>
             <a:r>
               <a:rPr lang="zh-TW" altLang="en-US" dirty="0" smtClean="0"/>
-              <a:t>填寫商品資訊</a:t>
+              <a:t>登入成功</a:t>
             </a:r>
             <a:endParaRPr lang="zh-TW" altLang="en-US" dirty="0"/>
           </a:p>
@@ -4165,8 +4148,8 @@
         </p:blipFill>
         <p:spPr>
           <a:xfrm>
-            <a:off x="0" y="1049049"/>
-            <a:ext cx="10058400" cy="5002730"/>
+            <a:off x="0" y="1174318"/>
+            <a:ext cx="10058400" cy="4809156"/>
           </a:xfrm>
           <a:prstGeom prst="rect">
             <a:avLst/>
@@ -4175,7 +4158,7 @@
       </p:pic>
       <p:pic>
         <p:nvPicPr>
-          <p:cNvPr id="5" name="圖片 4"/>
+          <p:cNvPr id="4" name="圖片 3"/>
           <p:cNvPicPr>
             <a:picLocks noChangeAspect="1"/>
           </p:cNvPicPr>
@@ -4195,8 +4178,8 @@
         </p:blipFill>
         <p:spPr>
           <a:xfrm>
-            <a:off x="3029447" y="1689829"/>
-            <a:ext cx="10058400" cy="5021255"/>
+            <a:off x="4055165" y="2153668"/>
+            <a:ext cx="10058400" cy="4544553"/>
           </a:xfrm>
           <a:prstGeom prst="rect">
             <a:avLst/>
@@ -4206,7 +4189,7 @@
     </p:spTree>
     <p:extLst>
       <p:ext uri="{BB962C8B-B14F-4D97-AF65-F5344CB8AC3E}">
-        <p14:creationId xmlns:p14="http://schemas.microsoft.com/office/powerpoint/2010/main" val="524690949"/>
+        <p14:creationId xmlns:p14="http://schemas.microsoft.com/office/powerpoint/2010/main" val="3424059863"/>
       </p:ext>
     </p:extLst>
   </p:cSld>
@@ -4252,7 +4235,7 @@
         </p:nvSpPr>
         <p:spPr>
           <a:xfrm>
-            <a:off x="838200" y="245855"/>
+            <a:off x="862054" y="0"/>
             <a:ext cx="10515600" cy="1325563"/>
           </a:xfrm>
         </p:spPr>
@@ -4263,7 +4246,7 @@
             <a:pPr algn="ctr"/>
             <a:r>
               <a:rPr lang="zh-TW" altLang="en-US" dirty="0" smtClean="0"/>
-              <a:t>刊登成功</a:t>
+              <a:t>販售商品頁面</a:t>
             </a:r>
             <a:r>
               <a:rPr lang="en-US" altLang="zh-TW" dirty="0" smtClean="0"/>
@@ -4271,7 +4254,7 @@
             </a:r>
             <a:r>
               <a:rPr lang="zh-TW" altLang="en-US" dirty="0" smtClean="0"/>
-              <a:t>賣家登出</a:t>
+              <a:t>填寫商品資訊</a:t>
             </a:r>
             <a:endParaRPr lang="zh-TW" altLang="en-US" dirty="0"/>
           </a:p>
@@ -4279,7 +4262,7 @@
       </p:sp>
       <p:pic>
         <p:nvPicPr>
-          <p:cNvPr id="7" name="圖片 6"/>
+          <p:cNvPr id="3" name="圖片 2"/>
           <p:cNvPicPr>
             <a:picLocks noChangeAspect="1"/>
           </p:cNvPicPr>
@@ -4299,8 +4282,8 @@
         </p:blipFill>
         <p:spPr>
           <a:xfrm>
-            <a:off x="2468881" y="2083175"/>
-            <a:ext cx="10058400" cy="4774825"/>
+            <a:off x="0" y="1049049"/>
+            <a:ext cx="10058400" cy="5002730"/>
           </a:xfrm>
           <a:prstGeom prst="rect">
             <a:avLst/>
@@ -4309,7 +4292,7 @@
       </p:pic>
       <p:pic>
         <p:nvPicPr>
-          <p:cNvPr id="3" name="圖片 2"/>
+          <p:cNvPr id="5" name="圖片 4"/>
           <p:cNvPicPr>
             <a:picLocks noChangeAspect="1"/>
           </p:cNvPicPr>
@@ -4329,8 +4312,8 @@
         </p:blipFill>
         <p:spPr>
           <a:xfrm>
-            <a:off x="-707665" y="1204880"/>
-            <a:ext cx="10058400" cy="5008002"/>
+            <a:off x="3029447" y="1689829"/>
+            <a:ext cx="10058400" cy="5021255"/>
           </a:xfrm>
           <a:prstGeom prst="rect">
             <a:avLst/>
@@ -4340,7 +4323,7 @@
     </p:spTree>
     <p:extLst>
       <p:ext uri="{BB962C8B-B14F-4D97-AF65-F5344CB8AC3E}">
-        <p14:creationId xmlns:p14="http://schemas.microsoft.com/office/powerpoint/2010/main" val="3545366652"/>
+        <p14:creationId xmlns:p14="http://schemas.microsoft.com/office/powerpoint/2010/main" val="524690949"/>
       </p:ext>
     </p:extLst>
   </p:cSld>
@@ -4384,6 +4367,140 @@
             <p:ph type="title"/>
           </p:nvPr>
         </p:nvSpPr>
+        <p:spPr>
+          <a:xfrm>
+            <a:off x="838200" y="245855"/>
+            <a:ext cx="10515600" cy="1325563"/>
+          </a:xfrm>
+        </p:spPr>
+        <p:txBody>
+          <a:bodyPr/>
+          <a:lstStyle/>
+          <a:p>
+            <a:pPr algn="ctr"/>
+            <a:r>
+              <a:rPr lang="zh-TW" altLang="en-US" dirty="0" smtClean="0"/>
+              <a:t>刊登成功</a:t>
+            </a:r>
+            <a:r>
+              <a:rPr lang="en-US" altLang="zh-TW" dirty="0" smtClean="0"/>
+              <a:t>/</a:t>
+            </a:r>
+            <a:r>
+              <a:rPr lang="zh-TW" altLang="en-US" dirty="0" smtClean="0"/>
+              <a:t>賣家登出</a:t>
+            </a:r>
+            <a:endParaRPr lang="zh-TW" altLang="en-US" dirty="0"/>
+          </a:p>
+        </p:txBody>
+      </p:sp>
+      <p:pic>
+        <p:nvPicPr>
+          <p:cNvPr id="7" name="圖片 6"/>
+          <p:cNvPicPr>
+            <a:picLocks noChangeAspect="1"/>
+          </p:cNvPicPr>
+          <p:nvPr/>
+        </p:nvPicPr>
+        <p:blipFill>
+          <a:blip r:embed="rId2">
+            <a:extLst>
+              <a:ext uri="{28A0092B-C50C-407E-A947-70E740481C1C}">
+                <a14:useLocalDpi xmlns:a14="http://schemas.microsoft.com/office/drawing/2010/main" val="0"/>
+              </a:ext>
+            </a:extLst>
+          </a:blip>
+          <a:stretch>
+            <a:fillRect/>
+          </a:stretch>
+        </p:blipFill>
+        <p:spPr>
+          <a:xfrm>
+            <a:off x="2468881" y="2083175"/>
+            <a:ext cx="10058400" cy="4774825"/>
+          </a:xfrm>
+          <a:prstGeom prst="rect">
+            <a:avLst/>
+          </a:prstGeom>
+        </p:spPr>
+      </p:pic>
+      <p:pic>
+        <p:nvPicPr>
+          <p:cNvPr id="3" name="圖片 2"/>
+          <p:cNvPicPr>
+            <a:picLocks noChangeAspect="1"/>
+          </p:cNvPicPr>
+          <p:nvPr/>
+        </p:nvPicPr>
+        <p:blipFill>
+          <a:blip r:embed="rId3">
+            <a:extLst>
+              <a:ext uri="{28A0092B-C50C-407E-A947-70E740481C1C}">
+                <a14:useLocalDpi xmlns:a14="http://schemas.microsoft.com/office/drawing/2010/main" val="0"/>
+              </a:ext>
+            </a:extLst>
+          </a:blip>
+          <a:stretch>
+            <a:fillRect/>
+          </a:stretch>
+        </p:blipFill>
+        <p:spPr>
+          <a:xfrm>
+            <a:off x="-707665" y="1204880"/>
+            <a:ext cx="10058400" cy="5008002"/>
+          </a:xfrm>
+          <a:prstGeom prst="rect">
+            <a:avLst/>
+          </a:prstGeom>
+        </p:spPr>
+      </p:pic>
+    </p:spTree>
+    <p:extLst>
+      <p:ext uri="{BB962C8B-B14F-4D97-AF65-F5344CB8AC3E}">
+        <p14:creationId xmlns:p14="http://schemas.microsoft.com/office/powerpoint/2010/main" val="3545366652"/>
+      </p:ext>
+    </p:extLst>
+  </p:cSld>
+  <p:clrMapOvr>
+    <a:masterClrMapping/>
+  </p:clrMapOvr>
+  <p:timing>
+    <p:tnLst>
+      <p:par>
+        <p:cTn id="1" dur="indefinite" restart="never" nodeType="tmRoot"/>
+      </p:par>
+    </p:tnLst>
+  </p:timing>
+</p:sld>
+</file>
+
+<file path=ppt/slides/slide17.xml><?xml version="1.0" encoding="utf-8"?>
+<p:sld xmlns:a="http://schemas.openxmlformats.org/drawingml/2006/main" xmlns:r="http://schemas.openxmlformats.org/officeDocument/2006/relationships" xmlns:p="http://schemas.openxmlformats.org/presentationml/2006/main">
+  <p:cSld>
+    <p:spTree>
+      <p:nvGrpSpPr>
+        <p:cNvPr id="1" name=""/>
+        <p:cNvGrpSpPr/>
+        <p:nvPr/>
+      </p:nvGrpSpPr>
+      <p:grpSpPr>
+        <a:xfrm>
+          <a:off x="0" y="0"/>
+          <a:ext cx="0" cy="0"/>
+          <a:chOff x="0" y="0"/>
+          <a:chExt cx="0" cy="0"/>
+        </a:xfrm>
+      </p:grpSpPr>
+      <p:sp>
+        <p:nvSpPr>
+          <p:cNvPr id="2" name="標題 1"/>
+          <p:cNvSpPr>
+            <a:spLocks noGrp="1"/>
+          </p:cNvSpPr>
+          <p:nvPr>
+            <p:ph type="title"/>
+          </p:nvPr>
+        </p:nvSpPr>
         <p:spPr/>
         <p:txBody>
           <a:bodyPr/>
@@ -4479,7 +4596,7 @@
 </p:sld>
 </file>
 
-<file path=ppt/slides/slide17.xml><?xml version="1.0" encoding="utf-8"?>
+<file path=ppt/slides/slide18.xml><?xml version="1.0" encoding="utf-8"?>
 <p:sld xmlns:a="http://schemas.openxmlformats.org/drawingml/2006/main" xmlns:r="http://schemas.openxmlformats.org/officeDocument/2006/relationships" xmlns:p="http://schemas.openxmlformats.org/presentationml/2006/main">
   <p:cSld>
     <p:spTree>
@@ -4587,148 +4704,6 @@
     <p:extLst>
       <p:ext uri="{BB962C8B-B14F-4D97-AF65-F5344CB8AC3E}">
         <p14:creationId xmlns:p14="http://schemas.microsoft.com/office/powerpoint/2010/main" val="3533658303"/>
-      </p:ext>
-    </p:extLst>
-  </p:cSld>
-  <p:clrMapOvr>
-    <a:masterClrMapping/>
-  </p:clrMapOvr>
-  <p:timing>
-    <p:tnLst>
-      <p:par>
-        <p:cTn id="1" dur="indefinite" restart="never" nodeType="tmRoot"/>
-      </p:par>
-    </p:tnLst>
-  </p:timing>
-</p:sld>
-</file>
-
-<file path=ppt/slides/slide18.xml><?xml version="1.0" encoding="utf-8"?>
-<p:sld xmlns:a="http://schemas.openxmlformats.org/drawingml/2006/main" xmlns:r="http://schemas.openxmlformats.org/officeDocument/2006/relationships" xmlns:p="http://schemas.openxmlformats.org/presentationml/2006/main">
-  <p:cSld>
-    <p:spTree>
-      <p:nvGrpSpPr>
-        <p:cNvPr id="1" name=""/>
-        <p:cNvGrpSpPr/>
-        <p:nvPr/>
-      </p:nvGrpSpPr>
-      <p:grpSpPr>
-        <a:xfrm>
-          <a:off x="0" y="0"/>
-          <a:ext cx="0" cy="0"/>
-          <a:chOff x="0" y="0"/>
-          <a:chExt cx="0" cy="0"/>
-        </a:xfrm>
-      </p:grpSpPr>
-      <p:sp>
-        <p:nvSpPr>
-          <p:cNvPr id="2" name="標題 1"/>
-          <p:cNvSpPr>
-            <a:spLocks noGrp="1"/>
-          </p:cNvSpPr>
-          <p:nvPr>
-            <p:ph type="title"/>
-          </p:nvPr>
-        </p:nvSpPr>
-        <p:spPr>
-          <a:xfrm>
-            <a:off x="917713" y="-562"/>
-            <a:ext cx="10515600" cy="1325563"/>
-          </a:xfrm>
-        </p:spPr>
-        <p:txBody>
-          <a:bodyPr/>
-          <a:lstStyle/>
-          <a:p>
-            <a:pPr algn="ctr"/>
-            <a:r>
-              <a:rPr lang="zh-TW" altLang="en-US" dirty="0" smtClean="0"/>
-              <a:t>單品庫存查詢</a:t>
-            </a:r>
-            <a:r>
-              <a:rPr lang="en-US" altLang="zh-TW" dirty="0" smtClean="0"/>
-              <a:t>/</a:t>
-            </a:r>
-            <a:r>
-              <a:rPr lang="zh-TW" altLang="en-US" dirty="0" smtClean="0"/>
-              <a:t>點擊</a:t>
-            </a:r>
-            <a:r>
-              <a:rPr lang="en-US" altLang="zh-TW" dirty="0" smtClean="0"/>
-              <a:t>buy</a:t>
-            </a:r>
-            <a:r>
-              <a:rPr lang="zh-TW" altLang="en-US" dirty="0" smtClean="0"/>
-              <a:t>後下訂單頁面</a:t>
-            </a:r>
-            <a:endParaRPr lang="zh-TW" altLang="en-US" dirty="0"/>
-          </a:p>
-        </p:txBody>
-      </p:sp>
-      <p:pic>
-        <p:nvPicPr>
-          <p:cNvPr id="3" name="圖片 2"/>
-          <p:cNvPicPr>
-            <a:picLocks noChangeAspect="1"/>
-          </p:cNvPicPr>
-          <p:nvPr/>
-        </p:nvPicPr>
-        <p:blipFill>
-          <a:blip r:embed="rId2">
-            <a:extLst>
-              <a:ext uri="{28A0092B-C50C-407E-A947-70E740481C1C}">
-                <a14:useLocalDpi xmlns:a14="http://schemas.microsoft.com/office/drawing/2010/main" val="0"/>
-              </a:ext>
-            </a:extLst>
-          </a:blip>
-          <a:stretch>
-            <a:fillRect/>
-          </a:stretch>
-        </p:blipFill>
-        <p:spPr>
-          <a:xfrm>
-            <a:off x="0" y="1964151"/>
-            <a:ext cx="10058400" cy="4893849"/>
-          </a:xfrm>
-          <a:prstGeom prst="rect">
-            <a:avLst/>
-          </a:prstGeom>
-        </p:spPr>
-      </p:pic>
-      <p:pic>
-        <p:nvPicPr>
-          <p:cNvPr id="4" name="圖片 3"/>
-          <p:cNvPicPr>
-            <a:picLocks noChangeAspect="1"/>
-          </p:cNvPicPr>
-          <p:nvPr/>
-        </p:nvPicPr>
-        <p:blipFill>
-          <a:blip r:embed="rId3">
-            <a:extLst>
-              <a:ext uri="{28A0092B-C50C-407E-A947-70E740481C1C}">
-                <a14:useLocalDpi xmlns:a14="http://schemas.microsoft.com/office/drawing/2010/main" val="0"/>
-              </a:ext>
-            </a:extLst>
-          </a:blip>
-          <a:stretch>
-            <a:fillRect/>
-          </a:stretch>
-        </p:blipFill>
-        <p:spPr>
-          <a:xfrm>
-            <a:off x="5700755" y="1458433"/>
-            <a:ext cx="10058400" cy="4143570"/>
-          </a:xfrm>
-          <a:prstGeom prst="rect">
-            <a:avLst/>
-          </a:prstGeom>
-        </p:spPr>
-      </p:pic>
-    </p:spTree>
-    <p:extLst>
-      <p:ext uri="{BB962C8B-B14F-4D97-AF65-F5344CB8AC3E}">
-        <p14:creationId xmlns:p14="http://schemas.microsoft.com/office/powerpoint/2010/main" val="3911553573"/>
       </p:ext>
     </p:extLst>
   </p:cSld>
@@ -4774,8 +4749,8 @@
         </p:nvSpPr>
         <p:spPr>
           <a:xfrm>
-            <a:off x="838199" y="365125"/>
-            <a:ext cx="10786607" cy="1325563"/>
+            <a:off x="917713" y="-562"/>
+            <a:ext cx="10515600" cy="1325563"/>
           </a:xfrm>
         </p:spPr>
         <p:txBody>
@@ -4785,15 +4760,23 @@
             <a:pPr algn="ctr"/>
             <a:r>
               <a:rPr lang="zh-TW" altLang="en-US" dirty="0" smtClean="0"/>
-              <a:t>填寫表單資訊</a:t>
+              <a:t>單品庫存查詢</a:t>
             </a:r>
             <a:r>
               <a:rPr lang="en-US" altLang="zh-TW" dirty="0" smtClean="0"/>
-              <a:t>/submit</a:t>
+              <a:t>/</a:t>
             </a:r>
             <a:r>
               <a:rPr lang="zh-TW" altLang="en-US" dirty="0" smtClean="0"/>
-              <a:t>後頁面</a:t>
+              <a:t>點擊</a:t>
+            </a:r>
+            <a:r>
+              <a:rPr lang="en-US" altLang="zh-TW" dirty="0" smtClean="0"/>
+              <a:t>buy</a:t>
+            </a:r>
+            <a:r>
+              <a:rPr lang="zh-TW" altLang="en-US" dirty="0" smtClean="0"/>
+              <a:t>後下訂單頁面</a:t>
             </a:r>
             <a:endParaRPr lang="zh-TW" altLang="en-US" dirty="0"/>
           </a:p>
@@ -4821,8 +4804,8 @@
         </p:blipFill>
         <p:spPr>
           <a:xfrm>
-            <a:off x="0" y="1429636"/>
-            <a:ext cx="10058400" cy="4164847"/>
+            <a:off x="0" y="1964151"/>
+            <a:ext cx="10058400" cy="4893849"/>
           </a:xfrm>
           <a:prstGeom prst="rect">
             <a:avLst/>
@@ -4851,8 +4834,8 @@
         </p:blipFill>
         <p:spPr>
           <a:xfrm>
-            <a:off x="3339548" y="2247509"/>
-            <a:ext cx="10058400" cy="4411485"/>
+            <a:off x="5700755" y="1458433"/>
+            <a:ext cx="10058400" cy="4143570"/>
           </a:xfrm>
           <a:prstGeom prst="rect">
             <a:avLst/>
@@ -4862,7 +4845,7 @@
     </p:spTree>
     <p:extLst>
       <p:ext uri="{BB962C8B-B14F-4D97-AF65-F5344CB8AC3E}">
-        <p14:creationId xmlns:p14="http://schemas.microsoft.com/office/powerpoint/2010/main" val="442481425"/>
+        <p14:creationId xmlns:p14="http://schemas.microsoft.com/office/powerpoint/2010/main" val="3911553573"/>
       </p:ext>
     </p:extLst>
   </p:cSld>
@@ -5200,76 +5183,34 @@
         </p:nvSpPr>
         <p:spPr>
           <a:xfrm>
-            <a:off x="567855" y="0"/>
-            <a:ext cx="11255734" cy="1325563"/>
-          </a:xfrm>
-        </p:spPr>
-        <p:txBody>
-          <a:bodyPr>
-            <a:normAutofit fontScale="90000"/>
-          </a:bodyPr>
+            <a:off x="838199" y="365125"/>
+            <a:ext cx="10786607" cy="1325563"/>
+          </a:xfrm>
+        </p:spPr>
+        <p:txBody>
+          <a:bodyPr/>
           <a:lstStyle/>
           <a:p>
             <a:pPr algn="ctr"/>
             <a:r>
-              <a:rPr lang="zh-TW" altLang="en-US" sz="3600" dirty="0" smtClean="0"/>
-              <a:t>點擊</a:t>
-            </a:r>
-            <a:r>
-              <a:rPr lang="en-US" altLang="zh-TW" sz="3600" dirty="0" smtClean="0"/>
-              <a:t>BUY</a:t>
-            </a:r>
-            <a:r>
-              <a:rPr lang="zh-TW" altLang="en-US" sz="3600" dirty="0" smtClean="0"/>
-              <a:t> </a:t>
-            </a:r>
-            <a:r>
-              <a:rPr lang="en-US" altLang="zh-TW" sz="3600" dirty="0" smtClean="0"/>
-              <a:t>RECORD</a:t>
-            </a:r>
-            <a:r>
-              <a:rPr lang="zh-TW" altLang="en-US" sz="3600" dirty="0" smtClean="0"/>
-              <a:t>，剛下的訂單</a:t>
-            </a:r>
-            <a:r>
-              <a:rPr lang="en-US" altLang="zh-TW" sz="3600" dirty="0" smtClean="0"/>
-              <a:t>“</a:t>
-            </a:r>
-            <a:r>
-              <a:rPr lang="en-US" altLang="zh-TW" sz="3600" dirty="0" err="1" smtClean="0"/>
-              <a:t>merchandiseArriveLocker</a:t>
-            </a:r>
-            <a:r>
-              <a:rPr lang="en-US" altLang="zh-TW" sz="3600" dirty="0" smtClean="0"/>
-              <a:t>”: false</a:t>
-            </a:r>
-            <a:r>
-              <a:rPr lang="zh-TW" altLang="en-US" sz="3600" dirty="0" smtClean="0"/>
-              <a:t>且</a:t>
-            </a:r>
-            <a:r>
-              <a:rPr lang="en-US" altLang="zh-TW" sz="3600" dirty="0" smtClean="0"/>
-              <a:t>“</a:t>
-            </a:r>
-            <a:r>
-              <a:rPr lang="en-US" altLang="zh-TW" sz="3600" dirty="0" err="1" smtClean="0"/>
-              <a:t>moneyPaid</a:t>
-            </a:r>
-            <a:r>
-              <a:rPr lang="en-US" altLang="zh-TW" sz="3600" dirty="0" smtClean="0"/>
-              <a:t>”: false/</a:t>
-            </a:r>
-            <a:r>
-              <a:rPr lang="zh-TW" altLang="en-US" sz="3600" dirty="0" smtClean="0"/>
-              <a:t>買家登出</a:t>
-            </a:r>
-            <a:endParaRPr lang="zh-TW" altLang="en-US" sz="3600" dirty="0"/>
+              <a:rPr lang="zh-TW" altLang="en-US" dirty="0" smtClean="0"/>
+              <a:t>填寫表單資訊</a:t>
+            </a:r>
+            <a:r>
+              <a:rPr lang="en-US" altLang="zh-TW" dirty="0" smtClean="0"/>
+              <a:t>/submit</a:t>
+            </a:r>
+            <a:r>
+              <a:rPr lang="zh-TW" altLang="en-US" dirty="0" smtClean="0"/>
+              <a:t>後頁面</a:t>
+            </a:r>
+            <a:endParaRPr lang="zh-TW" altLang="en-US" dirty="0"/>
           </a:p>
         </p:txBody>
       </p:sp>
       <p:pic>
         <p:nvPicPr>
-          <p:cNvPr id="7" name="圖片 6"/>
+          <p:cNvPr id="3" name="圖片 2"/>
           <p:cNvPicPr>
             <a:picLocks noChangeAspect="1"/>
           </p:cNvPicPr>
@@ -5289,8 +5230,8 @@
         </p:blipFill>
         <p:spPr>
           <a:xfrm>
-            <a:off x="2362502" y="2194559"/>
-            <a:ext cx="9829498" cy="4663441"/>
+            <a:off x="0" y="1429636"/>
+            <a:ext cx="10058400" cy="4164847"/>
           </a:xfrm>
           <a:prstGeom prst="rect">
             <a:avLst/>
@@ -5319,8 +5260,8 @@
         </p:blipFill>
         <p:spPr>
           <a:xfrm>
-            <a:off x="0" y="1118195"/>
-            <a:ext cx="10058400" cy="5015957"/>
+            <a:off x="3339548" y="2247509"/>
+            <a:ext cx="10058400" cy="4411485"/>
           </a:xfrm>
           <a:prstGeom prst="rect">
             <a:avLst/>
@@ -5330,7 +5271,7 @@
     </p:spTree>
     <p:extLst>
       <p:ext uri="{BB962C8B-B14F-4D97-AF65-F5344CB8AC3E}">
-        <p14:creationId xmlns:p14="http://schemas.microsoft.com/office/powerpoint/2010/main" val="2206812976"/>
+        <p14:creationId xmlns:p14="http://schemas.microsoft.com/office/powerpoint/2010/main" val="442481425"/>
       </p:ext>
     </p:extLst>
   </p:cSld>
@@ -5376,34 +5317,76 @@
         </p:nvSpPr>
         <p:spPr>
           <a:xfrm>
-            <a:off x="838199" y="365125"/>
-            <a:ext cx="10921779" cy="1325563"/>
-          </a:xfrm>
-        </p:spPr>
-        <p:txBody>
-          <a:bodyPr/>
+            <a:off x="567855" y="0"/>
+            <a:ext cx="11255734" cy="1325563"/>
+          </a:xfrm>
+        </p:spPr>
+        <p:txBody>
+          <a:bodyPr>
+            <a:normAutofit fontScale="90000"/>
+          </a:bodyPr>
           <a:lstStyle/>
           <a:p>
             <a:pPr algn="ctr"/>
             <a:r>
-              <a:rPr lang="zh-TW" altLang="en-US" dirty="0" smtClean="0"/>
-              <a:t>賣家登入</a:t>
-            </a:r>
-            <a:r>
-              <a:rPr lang="en-US" altLang="zh-TW" dirty="0" smtClean="0"/>
-              <a:t>/</a:t>
-            </a:r>
-            <a:r>
-              <a:rPr lang="zh-TW" altLang="en-US" dirty="0" smtClean="0"/>
-              <a:t>賣家見到自己接到一筆訂單</a:t>
-            </a:r>
-            <a:endParaRPr lang="zh-TW" altLang="en-US" dirty="0"/>
+              <a:rPr lang="zh-TW" altLang="en-US" sz="3600" dirty="0" smtClean="0"/>
+              <a:t>點擊</a:t>
+            </a:r>
+            <a:r>
+              <a:rPr lang="en-US" altLang="zh-TW" sz="3600" dirty="0" smtClean="0"/>
+              <a:t>BUY</a:t>
+            </a:r>
+            <a:r>
+              <a:rPr lang="zh-TW" altLang="en-US" sz="3600" dirty="0" smtClean="0"/>
+              <a:t> </a:t>
+            </a:r>
+            <a:r>
+              <a:rPr lang="en-US" altLang="zh-TW" sz="3600" dirty="0" smtClean="0"/>
+              <a:t>RECORD</a:t>
+            </a:r>
+            <a:r>
+              <a:rPr lang="zh-TW" altLang="en-US" sz="3600" dirty="0" smtClean="0"/>
+              <a:t>，剛下的訂單</a:t>
+            </a:r>
+            <a:r>
+              <a:rPr lang="en-US" altLang="zh-TW" sz="3600" dirty="0" smtClean="0"/>
+              <a:t>“</a:t>
+            </a:r>
+            <a:r>
+              <a:rPr lang="en-US" altLang="zh-TW" sz="3600" dirty="0" err="1" smtClean="0"/>
+              <a:t>merchandiseArriveLocker</a:t>
+            </a:r>
+            <a:r>
+              <a:rPr lang="en-US" altLang="zh-TW" sz="3600" dirty="0" smtClean="0"/>
+              <a:t>”: false</a:t>
+            </a:r>
+            <a:r>
+              <a:rPr lang="zh-TW" altLang="en-US" sz="3600" dirty="0" smtClean="0"/>
+              <a:t>且</a:t>
+            </a:r>
+            <a:r>
+              <a:rPr lang="en-US" altLang="zh-TW" sz="3600" dirty="0" smtClean="0"/>
+              <a:t>“</a:t>
+            </a:r>
+            <a:r>
+              <a:rPr lang="en-US" altLang="zh-TW" sz="3600" dirty="0" err="1" smtClean="0"/>
+              <a:t>moneyPaid</a:t>
+            </a:r>
+            <a:r>
+              <a:rPr lang="en-US" altLang="zh-TW" sz="3600" dirty="0" smtClean="0"/>
+              <a:t>”: false/</a:t>
+            </a:r>
+            <a:r>
+              <a:rPr lang="zh-TW" altLang="en-US" sz="3600" dirty="0" smtClean="0"/>
+              <a:t>買家登出</a:t>
+            </a:r>
+            <a:endParaRPr lang="zh-TW" altLang="en-US" sz="3600" dirty="0"/>
           </a:p>
         </p:txBody>
       </p:sp>
       <p:pic>
         <p:nvPicPr>
-          <p:cNvPr id="4" name="圖片 3"/>
+          <p:cNvPr id="7" name="圖片 6"/>
           <p:cNvPicPr>
             <a:picLocks noChangeAspect="1"/>
           </p:cNvPicPr>
@@ -5423,8 +5406,8 @@
         </p:blipFill>
         <p:spPr>
           <a:xfrm>
-            <a:off x="-644055" y="1364881"/>
-            <a:ext cx="10058400" cy="4573445"/>
+            <a:off x="2362502" y="2194559"/>
+            <a:ext cx="9829498" cy="4663441"/>
           </a:xfrm>
           <a:prstGeom prst="rect">
             <a:avLst/>
@@ -5433,7 +5416,7 @@
       </p:pic>
       <p:pic>
         <p:nvPicPr>
-          <p:cNvPr id="6" name="圖片 5"/>
+          <p:cNvPr id="4" name="圖片 3"/>
           <p:cNvPicPr>
             <a:picLocks noChangeAspect="1"/>
           </p:cNvPicPr>
@@ -5453,8 +5436,8 @@
         </p:blipFill>
         <p:spPr>
           <a:xfrm>
-            <a:off x="4206240" y="1690688"/>
-            <a:ext cx="10058400" cy="4992142"/>
+            <a:off x="0" y="1118195"/>
+            <a:ext cx="10058400" cy="5015957"/>
           </a:xfrm>
           <a:prstGeom prst="rect">
             <a:avLst/>
@@ -5464,7 +5447,7 @@
     </p:spTree>
     <p:extLst>
       <p:ext uri="{BB962C8B-B14F-4D97-AF65-F5344CB8AC3E}">
-        <p14:creationId xmlns:p14="http://schemas.microsoft.com/office/powerpoint/2010/main" val="4033178646"/>
+        <p14:creationId xmlns:p14="http://schemas.microsoft.com/office/powerpoint/2010/main" val="2206812976"/>
       </p:ext>
     </p:extLst>
   </p:cSld>
@@ -5508,7 +5491,12 @@
             <p:ph type="title"/>
           </p:nvPr>
         </p:nvSpPr>
-        <p:spPr/>
+        <p:spPr>
+          <a:xfrm>
+            <a:off x="838199" y="365125"/>
+            <a:ext cx="10921779" cy="1325563"/>
+          </a:xfrm>
+        </p:spPr>
         <p:txBody>
           <a:bodyPr/>
           <a:lstStyle/>
@@ -5516,7 +5504,15 @@
             <a:pPr algn="ctr"/>
             <a:r>
               <a:rPr lang="zh-TW" altLang="en-US" dirty="0" smtClean="0"/>
-              <a:t>賣家登出</a:t>
+              <a:t>賣家登入</a:t>
+            </a:r>
+            <a:r>
+              <a:rPr lang="en-US" altLang="zh-TW" dirty="0" smtClean="0"/>
+              <a:t>/</a:t>
+            </a:r>
+            <a:r>
+              <a:rPr lang="zh-TW" altLang="en-US" dirty="0" smtClean="0"/>
+              <a:t>賣家見到自己接到一筆訂單</a:t>
             </a:r>
             <a:endParaRPr lang="zh-TW" altLang="en-US" dirty="0"/>
           </a:p>
@@ -5544,6 +5540,127 @@
         </p:blipFill>
         <p:spPr>
           <a:xfrm>
+            <a:off x="-644055" y="1364881"/>
+            <a:ext cx="10058400" cy="4573445"/>
+          </a:xfrm>
+          <a:prstGeom prst="rect">
+            <a:avLst/>
+          </a:prstGeom>
+        </p:spPr>
+      </p:pic>
+      <p:pic>
+        <p:nvPicPr>
+          <p:cNvPr id="6" name="圖片 5"/>
+          <p:cNvPicPr>
+            <a:picLocks noChangeAspect="1"/>
+          </p:cNvPicPr>
+          <p:nvPr/>
+        </p:nvPicPr>
+        <p:blipFill>
+          <a:blip r:embed="rId3">
+            <a:extLst>
+              <a:ext uri="{28A0092B-C50C-407E-A947-70E740481C1C}">
+                <a14:useLocalDpi xmlns:a14="http://schemas.microsoft.com/office/drawing/2010/main" val="0"/>
+              </a:ext>
+            </a:extLst>
+          </a:blip>
+          <a:stretch>
+            <a:fillRect/>
+          </a:stretch>
+        </p:blipFill>
+        <p:spPr>
+          <a:xfrm>
+            <a:off x="4206240" y="1690688"/>
+            <a:ext cx="10058400" cy="4992142"/>
+          </a:xfrm>
+          <a:prstGeom prst="rect">
+            <a:avLst/>
+          </a:prstGeom>
+        </p:spPr>
+      </p:pic>
+    </p:spTree>
+    <p:extLst>
+      <p:ext uri="{BB962C8B-B14F-4D97-AF65-F5344CB8AC3E}">
+        <p14:creationId xmlns:p14="http://schemas.microsoft.com/office/powerpoint/2010/main" val="4033178646"/>
+      </p:ext>
+    </p:extLst>
+  </p:cSld>
+  <p:clrMapOvr>
+    <a:masterClrMapping/>
+  </p:clrMapOvr>
+  <p:timing>
+    <p:tnLst>
+      <p:par>
+        <p:cTn id="1" dur="indefinite" restart="never" nodeType="tmRoot"/>
+      </p:par>
+    </p:tnLst>
+  </p:timing>
+</p:sld>
+</file>
+
+<file path=ppt/slides/slide23.xml><?xml version="1.0" encoding="utf-8"?>
+<p:sld xmlns:a="http://schemas.openxmlformats.org/drawingml/2006/main" xmlns:r="http://schemas.openxmlformats.org/officeDocument/2006/relationships" xmlns:p="http://schemas.openxmlformats.org/presentationml/2006/main">
+  <p:cSld>
+    <p:spTree>
+      <p:nvGrpSpPr>
+        <p:cNvPr id="1" name=""/>
+        <p:cNvGrpSpPr/>
+        <p:nvPr/>
+      </p:nvGrpSpPr>
+      <p:grpSpPr>
+        <a:xfrm>
+          <a:off x="0" y="0"/>
+          <a:ext cx="0" cy="0"/>
+          <a:chOff x="0" y="0"/>
+          <a:chExt cx="0" cy="0"/>
+        </a:xfrm>
+      </p:grpSpPr>
+      <p:sp>
+        <p:nvSpPr>
+          <p:cNvPr id="2" name="標題 1"/>
+          <p:cNvSpPr>
+            <a:spLocks noGrp="1"/>
+          </p:cNvSpPr>
+          <p:nvPr>
+            <p:ph type="title"/>
+          </p:nvPr>
+        </p:nvSpPr>
+        <p:spPr/>
+        <p:txBody>
+          <a:bodyPr/>
+          <a:lstStyle/>
+          <a:p>
+            <a:pPr algn="ctr"/>
+            <a:r>
+              <a:rPr lang="zh-TW" altLang="en-US" dirty="0" smtClean="0"/>
+              <a:t>賣家登出</a:t>
+            </a:r>
+            <a:endParaRPr lang="zh-TW" altLang="en-US" dirty="0"/>
+          </a:p>
+        </p:txBody>
+      </p:sp>
+      <p:pic>
+        <p:nvPicPr>
+          <p:cNvPr id="4" name="圖片 3"/>
+          <p:cNvPicPr>
+            <a:picLocks noChangeAspect="1"/>
+          </p:cNvPicPr>
+          <p:nvPr/>
+        </p:nvPicPr>
+        <p:blipFill>
+          <a:blip r:embed="rId2">
+            <a:extLst>
+              <a:ext uri="{28A0092B-C50C-407E-A947-70E740481C1C}">
+                <a14:useLocalDpi xmlns:a14="http://schemas.microsoft.com/office/drawing/2010/main" val="0"/>
+              </a:ext>
+            </a:extLst>
+          </a:blip>
+          <a:stretch>
+            <a:fillRect/>
+          </a:stretch>
+        </p:blipFill>
+        <p:spPr>
+          <a:xfrm>
             <a:off x="1066800" y="1578475"/>
             <a:ext cx="10058400" cy="4772040"/>
           </a:xfrm>
@@ -5565,7 +5682,7 @@
 </p:sld>
 </file>
 
-<file path=ppt/slides/slide23.xml><?xml version="1.0" encoding="utf-8"?>
+<file path=ppt/slides/slide24.xml><?xml version="1.0" encoding="utf-8"?>
 <p:sld xmlns:a="http://schemas.openxmlformats.org/drawingml/2006/main" xmlns:r="http://schemas.openxmlformats.org/officeDocument/2006/relationships" xmlns:p="http://schemas.openxmlformats.org/presentationml/2006/main">
   <p:cSld>
     <p:spTree>
@@ -5693,151 +5810,6 @@
     <p:extLst>
       <p:ext uri="{BB962C8B-B14F-4D97-AF65-F5344CB8AC3E}">
         <p14:creationId xmlns:p14="http://schemas.microsoft.com/office/powerpoint/2010/main" val="3384940024"/>
-      </p:ext>
-    </p:extLst>
-  </p:cSld>
-  <p:clrMapOvr>
-    <a:masterClrMapping/>
-  </p:clrMapOvr>
-  <p:timing>
-    <p:tnLst>
-      <p:par>
-        <p:cTn id="1" dur="indefinite" restart="never" nodeType="tmRoot"/>
-      </p:par>
-    </p:tnLst>
-  </p:timing>
-</p:sld>
-</file>
-
-<file path=ppt/slides/slide24.xml><?xml version="1.0" encoding="utf-8"?>
-<p:sld xmlns:a="http://schemas.openxmlformats.org/drawingml/2006/main" xmlns:r="http://schemas.openxmlformats.org/officeDocument/2006/relationships" xmlns:p="http://schemas.openxmlformats.org/presentationml/2006/main">
-  <p:cSld>
-    <p:spTree>
-      <p:nvGrpSpPr>
-        <p:cNvPr id="1" name=""/>
-        <p:cNvGrpSpPr/>
-        <p:nvPr/>
-      </p:nvGrpSpPr>
-      <p:grpSpPr>
-        <a:xfrm>
-          <a:off x="0" y="0"/>
-          <a:ext cx="0" cy="0"/>
-          <a:chOff x="0" y="0"/>
-          <a:chExt cx="0" cy="0"/>
-        </a:xfrm>
-      </p:grpSpPr>
-      <p:sp>
-        <p:nvSpPr>
-          <p:cNvPr id="2" name="標題 1"/>
-          <p:cNvSpPr>
-            <a:spLocks noGrp="1"/>
-          </p:cNvSpPr>
-          <p:nvPr>
-            <p:ph type="title"/>
-          </p:nvPr>
-        </p:nvSpPr>
-        <p:spPr>
-          <a:xfrm>
-            <a:off x="806395" y="0"/>
-            <a:ext cx="10515600" cy="1325563"/>
-          </a:xfrm>
-        </p:spPr>
-        <p:txBody>
-          <a:bodyPr/>
-          <a:lstStyle/>
-          <a:p>
-            <a:pPr algn="ctr"/>
-            <a:r>
-              <a:rPr lang="zh-TW" altLang="en-US" dirty="0" smtClean="0"/>
-              <a:t>點擊</a:t>
-            </a:r>
-            <a:r>
-              <a:rPr lang="en-US" altLang="zh-TW" dirty="0" smtClean="0"/>
-              <a:t>Mailman</a:t>
-            </a:r>
-            <a:r>
-              <a:rPr lang="zh-TW" altLang="en-US" dirty="0" smtClean="0"/>
-              <a:t>進入頁面</a:t>
-            </a:r>
-            <a:r>
-              <a:rPr lang="en-US" altLang="zh-TW" dirty="0" smtClean="0"/>
-              <a:t>/</a:t>
-            </a:r>
-            <a:br>
-              <a:rPr lang="en-US" altLang="zh-TW" dirty="0" smtClean="0"/>
-            </a:br>
-            <a:r>
-              <a:rPr lang="zh-TW" altLang="en-US" dirty="0" smtClean="0"/>
-              <a:t>選取欲放入商品的置物櫃</a:t>
-            </a:r>
-            <a:endParaRPr lang="zh-TW" altLang="en-US" dirty="0"/>
-          </a:p>
-        </p:txBody>
-      </p:sp>
-      <p:pic>
-        <p:nvPicPr>
-          <p:cNvPr id="7" name="圖片 6"/>
-          <p:cNvPicPr>
-            <a:picLocks noChangeAspect="1"/>
-          </p:cNvPicPr>
-          <p:nvPr/>
-        </p:nvPicPr>
-        <p:blipFill>
-          <a:blip r:embed="rId2">
-            <a:extLst>
-              <a:ext uri="{28A0092B-C50C-407E-A947-70E740481C1C}">
-                <a14:useLocalDpi xmlns:a14="http://schemas.microsoft.com/office/drawing/2010/main" val="0"/>
-              </a:ext>
-            </a:extLst>
-          </a:blip>
-          <a:stretch>
-            <a:fillRect/>
-          </a:stretch>
-        </p:blipFill>
-        <p:spPr>
-          <a:xfrm>
-            <a:off x="-127221" y="1266962"/>
-            <a:ext cx="10058400" cy="4997403"/>
-          </a:xfrm>
-          <a:prstGeom prst="rect">
-            <a:avLst/>
-          </a:prstGeom>
-        </p:spPr>
-      </p:pic>
-      <p:pic>
-        <p:nvPicPr>
-          <p:cNvPr id="8" name="圖片 7"/>
-          <p:cNvPicPr>
-            <a:picLocks noChangeAspect="1"/>
-          </p:cNvPicPr>
-          <p:nvPr/>
-        </p:nvPicPr>
-        <p:blipFill>
-          <a:blip r:embed="rId3">
-            <a:extLst>
-              <a:ext uri="{28A0092B-C50C-407E-A947-70E740481C1C}">
-                <a14:useLocalDpi xmlns:a14="http://schemas.microsoft.com/office/drawing/2010/main" val="0"/>
-              </a:ext>
-            </a:extLst>
-          </a:blip>
-          <a:stretch>
-            <a:fillRect/>
-          </a:stretch>
-        </p:blipFill>
-        <p:spPr>
-          <a:xfrm>
-            <a:off x="3411109" y="1857902"/>
-            <a:ext cx="10058400" cy="5000098"/>
-          </a:xfrm>
-          <a:prstGeom prst="rect">
-            <a:avLst/>
-          </a:prstGeom>
-        </p:spPr>
-      </p:pic>
-    </p:spTree>
-    <p:extLst>
-      <p:ext uri="{BB962C8B-B14F-4D97-AF65-F5344CB8AC3E}">
-        <p14:creationId xmlns:p14="http://schemas.microsoft.com/office/powerpoint/2010/main" val="2051098822"/>
       </p:ext>
     </p:extLst>
   </p:cSld>
@@ -5883,34 +5855,39 @@
         </p:nvSpPr>
         <p:spPr>
           <a:xfrm>
-            <a:off x="742785" y="141997"/>
-            <a:ext cx="10515600" cy="519701"/>
-          </a:xfrm>
-        </p:spPr>
-        <p:txBody>
-          <a:bodyPr>
-            <a:normAutofit fontScale="90000"/>
-          </a:bodyPr>
+            <a:off x="806395" y="0"/>
+            <a:ext cx="10515600" cy="1325563"/>
+          </a:xfrm>
+        </p:spPr>
+        <p:txBody>
+          <a:bodyPr/>
           <a:lstStyle/>
           <a:p>
             <a:pPr algn="ctr"/>
             <a:r>
-              <a:rPr lang="en-US" altLang="zh-TW" sz="4000" dirty="0" err="1" smtClean="0"/>
-              <a:t>db</a:t>
-            </a:r>
-            <a:r>
-              <a:rPr lang="zh-TW" altLang="en-US" sz="4000" dirty="0" smtClean="0"/>
-              <a:t>更新商品抵達</a:t>
-            </a:r>
-            <a:r>
-              <a:rPr lang="en-US" altLang="zh-TW" sz="4000" dirty="0" smtClean="0"/>
-              <a:t>/mailer</a:t>
-            </a:r>
-            <a:r>
-              <a:rPr lang="zh-TW" altLang="en-US" sz="4000" dirty="0" smtClean="0"/>
-              <a:t>登出</a:t>
-            </a:r>
-            <a:endParaRPr lang="zh-TW" altLang="en-US" sz="4000" dirty="0"/>
+              <a:rPr lang="zh-TW" altLang="en-US" dirty="0" smtClean="0"/>
+              <a:t>點擊</a:t>
+            </a:r>
+            <a:r>
+              <a:rPr lang="en-US" altLang="zh-TW" dirty="0" smtClean="0"/>
+              <a:t>Mailman</a:t>
+            </a:r>
+            <a:r>
+              <a:rPr lang="zh-TW" altLang="en-US" dirty="0" smtClean="0"/>
+              <a:t>進入頁面</a:t>
+            </a:r>
+            <a:r>
+              <a:rPr lang="en-US" altLang="zh-TW" dirty="0" smtClean="0"/>
+              <a:t>/</a:t>
+            </a:r>
+            <a:br>
+              <a:rPr lang="en-US" altLang="zh-TW" dirty="0" smtClean="0"/>
+            </a:br>
+            <a:r>
+              <a:rPr lang="zh-TW" altLang="en-US" dirty="0" smtClean="0"/>
+              <a:t>選取欲放入商品的置物櫃</a:t>
+            </a:r>
+            <a:endParaRPr lang="zh-TW" altLang="en-US" dirty="0"/>
           </a:p>
         </p:txBody>
       </p:sp>
@@ -5936,8 +5913,8 @@
         </p:blipFill>
         <p:spPr>
           <a:xfrm>
-            <a:off x="2234317" y="2085960"/>
-            <a:ext cx="10058400" cy="4772040"/>
+            <a:off x="-127221" y="1266962"/>
+            <a:ext cx="10058400" cy="4997403"/>
           </a:xfrm>
           <a:prstGeom prst="rect">
             <a:avLst/>
@@ -5946,7 +5923,7 @@
       </p:pic>
       <p:pic>
         <p:nvPicPr>
-          <p:cNvPr id="3" name="圖片 2"/>
+          <p:cNvPr id="8" name="圖片 7"/>
           <p:cNvPicPr>
             <a:picLocks noChangeAspect="1"/>
           </p:cNvPicPr>
@@ -5966,8 +5943,8 @@
         </p:blipFill>
         <p:spPr>
           <a:xfrm>
-            <a:off x="0" y="661698"/>
-            <a:ext cx="10058400" cy="5071192"/>
+            <a:off x="3411109" y="1857902"/>
+            <a:ext cx="10058400" cy="5000098"/>
           </a:xfrm>
           <a:prstGeom prst="rect">
             <a:avLst/>
@@ -5977,7 +5954,7 @@
     </p:spTree>
     <p:extLst>
       <p:ext uri="{BB962C8B-B14F-4D97-AF65-F5344CB8AC3E}">
-        <p14:creationId xmlns:p14="http://schemas.microsoft.com/office/powerpoint/2010/main" val="3455872810"/>
+        <p14:creationId xmlns:p14="http://schemas.microsoft.com/office/powerpoint/2010/main" val="2051098822"/>
       </p:ext>
     </p:extLst>
   </p:cSld>
@@ -6021,6 +5998,146 @@
             <p:ph type="title"/>
           </p:nvPr>
         </p:nvSpPr>
+        <p:spPr>
+          <a:xfrm>
+            <a:off x="742785" y="141997"/>
+            <a:ext cx="10515600" cy="519701"/>
+          </a:xfrm>
+        </p:spPr>
+        <p:txBody>
+          <a:bodyPr>
+            <a:normAutofit fontScale="90000"/>
+          </a:bodyPr>
+          <a:lstStyle/>
+          <a:p>
+            <a:pPr algn="ctr"/>
+            <a:r>
+              <a:rPr lang="en-US" altLang="zh-TW" sz="4000" dirty="0" err="1" smtClean="0"/>
+              <a:t>db</a:t>
+            </a:r>
+            <a:r>
+              <a:rPr lang="zh-TW" altLang="en-US" sz="4000" dirty="0" smtClean="0"/>
+              <a:t>更新商品抵達</a:t>
+            </a:r>
+            <a:r>
+              <a:rPr lang="en-US" altLang="zh-TW" sz="4000" dirty="0" smtClean="0"/>
+              <a:t>/mailer</a:t>
+            </a:r>
+            <a:r>
+              <a:rPr lang="zh-TW" altLang="en-US" sz="4000" dirty="0" smtClean="0"/>
+              <a:t>登出</a:t>
+            </a:r>
+            <a:endParaRPr lang="zh-TW" altLang="en-US" sz="4000" dirty="0"/>
+          </a:p>
+        </p:txBody>
+      </p:sp>
+      <p:pic>
+        <p:nvPicPr>
+          <p:cNvPr id="7" name="圖片 6"/>
+          <p:cNvPicPr>
+            <a:picLocks noChangeAspect="1"/>
+          </p:cNvPicPr>
+          <p:nvPr/>
+        </p:nvPicPr>
+        <p:blipFill>
+          <a:blip r:embed="rId2">
+            <a:extLst>
+              <a:ext uri="{28A0092B-C50C-407E-A947-70E740481C1C}">
+                <a14:useLocalDpi xmlns:a14="http://schemas.microsoft.com/office/drawing/2010/main" val="0"/>
+              </a:ext>
+            </a:extLst>
+          </a:blip>
+          <a:stretch>
+            <a:fillRect/>
+          </a:stretch>
+        </p:blipFill>
+        <p:spPr>
+          <a:xfrm>
+            <a:off x="2234317" y="2085960"/>
+            <a:ext cx="10058400" cy="4772040"/>
+          </a:xfrm>
+          <a:prstGeom prst="rect">
+            <a:avLst/>
+          </a:prstGeom>
+        </p:spPr>
+      </p:pic>
+      <p:pic>
+        <p:nvPicPr>
+          <p:cNvPr id="3" name="圖片 2"/>
+          <p:cNvPicPr>
+            <a:picLocks noChangeAspect="1"/>
+          </p:cNvPicPr>
+          <p:nvPr/>
+        </p:nvPicPr>
+        <p:blipFill>
+          <a:blip r:embed="rId3">
+            <a:extLst>
+              <a:ext uri="{28A0092B-C50C-407E-A947-70E740481C1C}">
+                <a14:useLocalDpi xmlns:a14="http://schemas.microsoft.com/office/drawing/2010/main" val="0"/>
+              </a:ext>
+            </a:extLst>
+          </a:blip>
+          <a:stretch>
+            <a:fillRect/>
+          </a:stretch>
+        </p:blipFill>
+        <p:spPr>
+          <a:xfrm>
+            <a:off x="0" y="661698"/>
+            <a:ext cx="10058400" cy="5071192"/>
+          </a:xfrm>
+          <a:prstGeom prst="rect">
+            <a:avLst/>
+          </a:prstGeom>
+        </p:spPr>
+      </p:pic>
+    </p:spTree>
+    <p:extLst>
+      <p:ext uri="{BB962C8B-B14F-4D97-AF65-F5344CB8AC3E}">
+        <p14:creationId xmlns:p14="http://schemas.microsoft.com/office/powerpoint/2010/main" val="3455872810"/>
+      </p:ext>
+    </p:extLst>
+  </p:cSld>
+  <p:clrMapOvr>
+    <a:masterClrMapping/>
+  </p:clrMapOvr>
+  <p:timing>
+    <p:tnLst>
+      <p:par>
+        <p:cTn id="1" dur="indefinite" restart="never" nodeType="tmRoot"/>
+      </p:par>
+    </p:tnLst>
+  </p:timing>
+</p:sld>
+</file>
+
+<file path=ppt/slides/slide27.xml><?xml version="1.0" encoding="utf-8"?>
+<p:sld xmlns:a="http://schemas.openxmlformats.org/drawingml/2006/main" xmlns:r="http://schemas.openxmlformats.org/officeDocument/2006/relationships" xmlns:p="http://schemas.openxmlformats.org/presentationml/2006/main">
+  <p:cSld>
+    <p:spTree>
+      <p:nvGrpSpPr>
+        <p:cNvPr id="1" name=""/>
+        <p:cNvGrpSpPr/>
+        <p:nvPr/>
+      </p:nvGrpSpPr>
+      <p:grpSpPr>
+        <a:xfrm>
+          <a:off x="0" y="0"/>
+          <a:ext cx="0" cy="0"/>
+          <a:chOff x="0" y="0"/>
+          <a:chExt cx="0" cy="0"/>
+        </a:xfrm>
+      </p:grpSpPr>
+      <p:sp>
+        <p:nvSpPr>
+          <p:cNvPr id="2" name="標題 1"/>
+          <p:cNvSpPr>
+            <a:spLocks noGrp="1"/>
+          </p:cNvSpPr>
+          <p:nvPr>
+            <p:ph type="title"/>
+          </p:nvPr>
+        </p:nvSpPr>
         <p:spPr/>
         <p:txBody>
           <a:bodyPr/>
@@ -6123,7 +6240,7 @@
 </p:sld>
 </file>
 
-<file path=ppt/slides/slide27.xml><?xml version="1.0" encoding="utf-8"?>
+<file path=ppt/slides/slide28.xml><?xml version="1.0" encoding="utf-8"?>
 <p:sld xmlns:a="http://schemas.openxmlformats.org/drawingml/2006/main" xmlns:r="http://schemas.openxmlformats.org/officeDocument/2006/relationships" xmlns:p="http://schemas.openxmlformats.org/presentationml/2006/main">
   <p:cSld>
     <p:spTree>
@@ -6264,133 +6381,6 @@
     <p:extLst>
       <p:ext uri="{BB962C8B-B14F-4D97-AF65-F5344CB8AC3E}">
         <p14:creationId xmlns:p14="http://schemas.microsoft.com/office/powerpoint/2010/main" val="761964569"/>
-      </p:ext>
-    </p:extLst>
-  </p:cSld>
-  <p:clrMapOvr>
-    <a:masterClrMapping/>
-  </p:clrMapOvr>
-  <p:timing>
-    <p:tnLst>
-      <p:par>
-        <p:cTn id="1" dur="indefinite" restart="never" nodeType="tmRoot"/>
-      </p:par>
-    </p:tnLst>
-  </p:timing>
-</p:sld>
-</file>
-
-<file path=ppt/slides/slide28.xml><?xml version="1.0" encoding="utf-8"?>
-<p:sld xmlns:a="http://schemas.openxmlformats.org/drawingml/2006/main" xmlns:r="http://schemas.openxmlformats.org/officeDocument/2006/relationships" xmlns:p="http://schemas.openxmlformats.org/presentationml/2006/main">
-  <p:cSld>
-    <p:spTree>
-      <p:nvGrpSpPr>
-        <p:cNvPr id="1" name=""/>
-        <p:cNvGrpSpPr/>
-        <p:nvPr/>
-      </p:nvGrpSpPr>
-      <p:grpSpPr>
-        <a:xfrm>
-          <a:off x="0" y="0"/>
-          <a:ext cx="0" cy="0"/>
-          <a:chOff x="0" y="0"/>
-          <a:chExt cx="0" cy="0"/>
-        </a:xfrm>
-      </p:grpSpPr>
-      <p:sp>
-        <p:nvSpPr>
-          <p:cNvPr id="6" name="文字方塊 5"/>
-          <p:cNvSpPr txBox="1"/>
-          <p:nvPr/>
-        </p:nvSpPr>
-        <p:spPr>
-          <a:xfrm>
-            <a:off x="4158762" y="143123"/>
-            <a:ext cx="2236510" cy="707886"/>
-          </a:xfrm>
-          <a:prstGeom prst="rect">
-            <a:avLst/>
-          </a:prstGeom>
-          <a:noFill/>
-        </p:spPr>
-        <p:txBody>
-          <a:bodyPr wrap="none" rtlCol="0">
-            <a:spAutoFit/>
-          </a:bodyPr>
-          <a:lstStyle/>
-          <a:p>
-            <a:r>
-              <a:rPr lang="zh-TW" altLang="en-US" sz="4000" dirty="0" smtClean="0"/>
-              <a:t>尚未付款</a:t>
-            </a:r>
-            <a:endParaRPr lang="zh-TW" altLang="en-US" sz="4000" dirty="0"/>
-          </a:p>
-        </p:txBody>
-      </p:sp>
-      <p:pic>
-        <p:nvPicPr>
-          <p:cNvPr id="5" name="圖片 4"/>
-          <p:cNvPicPr>
-            <a:picLocks noChangeAspect="1"/>
-          </p:cNvPicPr>
-          <p:nvPr/>
-        </p:nvPicPr>
-        <p:blipFill>
-          <a:blip r:embed="rId2">
-            <a:extLst>
-              <a:ext uri="{28A0092B-C50C-407E-A947-70E740481C1C}">
-                <a14:useLocalDpi xmlns:a14="http://schemas.microsoft.com/office/drawing/2010/main" val="0"/>
-              </a:ext>
-            </a:extLst>
-          </a:blip>
-          <a:stretch>
-            <a:fillRect/>
-          </a:stretch>
-        </p:blipFill>
-        <p:spPr>
-          <a:xfrm>
-            <a:off x="-1351722" y="1196271"/>
-            <a:ext cx="10058400" cy="4918282"/>
-          </a:xfrm>
-          <a:prstGeom prst="rect">
-            <a:avLst/>
-          </a:prstGeom>
-        </p:spPr>
-      </p:pic>
-      <p:pic>
-        <p:nvPicPr>
-          <p:cNvPr id="4" name="圖片 3"/>
-          <p:cNvPicPr>
-            <a:picLocks noChangeAspect="1"/>
-          </p:cNvPicPr>
-          <p:nvPr/>
-        </p:nvPicPr>
-        <p:blipFill>
-          <a:blip r:embed="rId3" cstate="print">
-            <a:extLst>
-              <a:ext uri="{28A0092B-C50C-407E-A947-70E740481C1C}">
-                <a14:useLocalDpi xmlns:a14="http://schemas.microsoft.com/office/drawing/2010/main" val="0"/>
-              </a:ext>
-            </a:extLst>
-          </a:blip>
-          <a:stretch>
-            <a:fillRect/>
-          </a:stretch>
-        </p:blipFill>
-        <p:spPr>
-          <a:xfrm>
-            <a:off x="6478390" y="497066"/>
-            <a:ext cx="5872636" cy="6124602"/>
-          </a:xfrm>
-          <a:prstGeom prst="rect">
-            <a:avLst/>
-          </a:prstGeom>
-        </p:spPr>
-      </p:pic>
-    </p:spTree>
-    <p:extLst>
-      <p:ext uri="{BB962C8B-B14F-4D97-AF65-F5344CB8AC3E}">
-        <p14:creationId xmlns:p14="http://schemas.microsoft.com/office/powerpoint/2010/main" val="274921796"/>
       </p:ext>
     </p:extLst>
   </p:cSld>
@@ -6426,30 +6416,31 @@
       </p:grpSpPr>
       <p:sp>
         <p:nvSpPr>
-          <p:cNvPr id="2" name="標題 1"/>
-          <p:cNvSpPr>
-            <a:spLocks noGrp="1"/>
-          </p:cNvSpPr>
-          <p:nvPr>
-            <p:ph type="title"/>
-          </p:nvPr>
-        </p:nvSpPr>
-        <p:spPr>
-          <a:xfrm>
-            <a:off x="687125" y="102732"/>
-            <a:ext cx="10515600" cy="1325563"/>
-          </a:xfrm>
-        </p:spPr>
-        <p:txBody>
-          <a:bodyPr/>
-          <a:lstStyle/>
-          <a:p>
-            <a:pPr algn="ctr"/>
-            <a:r>
-              <a:rPr lang="zh-TW" altLang="en-US" dirty="0" smtClean="0"/>
-              <a:t>確實是未付款</a:t>
-            </a:r>
-            <a:endParaRPr lang="zh-TW" altLang="en-US" dirty="0"/>
+          <p:cNvPr id="6" name="文字方塊 5"/>
+          <p:cNvSpPr txBox="1"/>
+          <p:nvPr/>
+        </p:nvSpPr>
+        <p:spPr>
+          <a:xfrm>
+            <a:off x="4158762" y="143123"/>
+            <a:ext cx="2236510" cy="707886"/>
+          </a:xfrm>
+          <a:prstGeom prst="rect">
+            <a:avLst/>
+          </a:prstGeom>
+          <a:noFill/>
+        </p:spPr>
+        <p:txBody>
+          <a:bodyPr wrap="none" rtlCol="0">
+            <a:spAutoFit/>
+          </a:bodyPr>
+          <a:lstStyle/>
+          <a:p>
+            <a:r>
+              <a:rPr lang="zh-TW" altLang="en-US" sz="4000" dirty="0" smtClean="0"/>
+              <a:t>尚未付款</a:t>
+            </a:r>
+            <a:endParaRPr lang="zh-TW" altLang="en-US" sz="4000" dirty="0"/>
           </a:p>
         </p:txBody>
       </p:sp>
@@ -6475,8 +6466,38 @@
         </p:blipFill>
         <p:spPr>
           <a:xfrm>
-            <a:off x="1359673" y="1287530"/>
-            <a:ext cx="10058400" cy="5015944"/>
+            <a:off x="-1351722" y="1196271"/>
+            <a:ext cx="10058400" cy="4918282"/>
+          </a:xfrm>
+          <a:prstGeom prst="rect">
+            <a:avLst/>
+          </a:prstGeom>
+        </p:spPr>
+      </p:pic>
+      <p:pic>
+        <p:nvPicPr>
+          <p:cNvPr id="4" name="圖片 3"/>
+          <p:cNvPicPr>
+            <a:picLocks noChangeAspect="1"/>
+          </p:cNvPicPr>
+          <p:nvPr/>
+        </p:nvPicPr>
+        <p:blipFill>
+          <a:blip r:embed="rId3" cstate="print">
+            <a:extLst>
+              <a:ext uri="{28A0092B-C50C-407E-A947-70E740481C1C}">
+                <a14:useLocalDpi xmlns:a14="http://schemas.microsoft.com/office/drawing/2010/main" val="0"/>
+              </a:ext>
+            </a:extLst>
+          </a:blip>
+          <a:stretch>
+            <a:fillRect/>
+          </a:stretch>
+        </p:blipFill>
+        <p:spPr>
+          <a:xfrm>
+            <a:off x="6478390" y="497066"/>
+            <a:ext cx="5872636" cy="6124602"/>
           </a:xfrm>
           <a:prstGeom prst="rect">
             <a:avLst/>
@@ -6486,7 +6507,7 @@
     </p:spTree>
     <p:extLst>
       <p:ext uri="{BB962C8B-B14F-4D97-AF65-F5344CB8AC3E}">
-        <p14:creationId xmlns:p14="http://schemas.microsoft.com/office/powerpoint/2010/main" val="2114422350"/>
+        <p14:creationId xmlns:p14="http://schemas.microsoft.com/office/powerpoint/2010/main" val="274921796"/>
       </p:ext>
     </p:extLst>
   </p:cSld>
@@ -6646,59 +6667,18 @@
         </p:nvSpPr>
         <p:spPr>
           <a:xfrm>
-            <a:off x="687124" y="78697"/>
-            <a:ext cx="10508312" cy="1273260"/>
-          </a:xfrm>
-        </p:spPr>
-        <p:txBody>
-          <a:bodyPr>
-            <a:normAutofit fontScale="90000"/>
-          </a:bodyPr>
+            <a:off x="687125" y="102732"/>
+            <a:ext cx="10515600" cy="1325563"/>
+          </a:xfrm>
+        </p:spPr>
+        <p:txBody>
+          <a:bodyPr/>
           <a:lstStyle/>
           <a:p>
             <a:pPr algn="ctr"/>
             <a:r>
-              <a:rPr lang="en-US" altLang="zh-TW" dirty="0" smtClean="0"/>
-              <a:t>Buy Record</a:t>
-            </a:r>
-            <a:r>
               <a:rPr lang="zh-TW" altLang="en-US" dirty="0" smtClean="0"/>
-              <a:t>中找到該訂單合約地址</a:t>
-            </a:r>
-            <a:r>
-              <a:rPr lang="en-US" altLang="zh-TW" dirty="0" smtClean="0"/>
-              <a:t>/</a:t>
-            </a:r>
-            <a:br>
-              <a:rPr lang="en-US" altLang="zh-TW" dirty="0" smtClean="0"/>
-            </a:br>
-            <a:r>
-              <a:rPr lang="zh-TW" altLang="en-US" dirty="0" smtClean="0"/>
-              <a:t>貼到</a:t>
-            </a:r>
-            <a:r>
-              <a:rPr lang="en-US" altLang="zh-TW" dirty="0" smtClean="0"/>
-              <a:t>wallet</a:t>
-            </a:r>
-            <a:r>
-              <a:rPr lang="zh-TW" altLang="en-US" dirty="0" smtClean="0"/>
-              <a:t> </a:t>
-            </a:r>
-            <a:r>
-              <a:rPr lang="en-US" altLang="zh-TW" dirty="0" smtClean="0"/>
-              <a:t>for</a:t>
-            </a:r>
-            <a:r>
-              <a:rPr lang="zh-TW" altLang="en-US" dirty="0" smtClean="0"/>
-              <a:t> </a:t>
-            </a:r>
-            <a:r>
-              <a:rPr lang="en-US" altLang="zh-TW" dirty="0" err="1" smtClean="0"/>
-              <a:t>catchbo</a:t>
-            </a:r>
-            <a:r>
-              <a:rPr lang="zh-TW" altLang="en-US" dirty="0" smtClean="0"/>
-              <a:t>即可付款</a:t>
+              <a:t>確實是未付款</a:t>
             </a:r>
             <a:endParaRPr lang="zh-TW" altLang="en-US" dirty="0"/>
           </a:p>
@@ -6706,7 +6686,7 @@
       </p:sp>
       <p:pic>
         <p:nvPicPr>
-          <p:cNvPr id="13" name="圖片 12"/>
+          <p:cNvPr id="5" name="圖片 4"/>
           <p:cNvPicPr>
             <a:picLocks noChangeAspect="1"/>
           </p:cNvPicPr>
@@ -6726,38 +6706,8 @@
         </p:blipFill>
         <p:spPr>
           <a:xfrm>
-            <a:off x="0" y="1247774"/>
+            <a:off x="1359673" y="1287530"/>
             <a:ext cx="10058400" cy="5015944"/>
-          </a:xfrm>
-          <a:prstGeom prst="rect">
-            <a:avLst/>
-          </a:prstGeom>
-        </p:spPr>
-      </p:pic>
-      <p:pic>
-        <p:nvPicPr>
-          <p:cNvPr id="11" name="圖片 10"/>
-          <p:cNvPicPr>
-            <a:picLocks noChangeAspect="1"/>
-          </p:cNvPicPr>
-          <p:nvPr/>
-        </p:nvPicPr>
-        <p:blipFill>
-          <a:blip r:embed="rId3">
-            <a:extLst>
-              <a:ext uri="{28A0092B-C50C-407E-A947-70E740481C1C}">
-                <a14:useLocalDpi xmlns:a14="http://schemas.microsoft.com/office/drawing/2010/main" val="0"/>
-              </a:ext>
-            </a:extLst>
-          </a:blip>
-          <a:stretch>
-            <a:fillRect/>
-          </a:stretch>
-        </p:blipFill>
-        <p:spPr>
-          <a:xfrm>
-            <a:off x="7036904" y="1844749"/>
-            <a:ext cx="10058400" cy="5013251"/>
           </a:xfrm>
           <a:prstGeom prst="rect">
             <a:avLst/>
@@ -6767,7 +6717,7 @@
     </p:spTree>
     <p:extLst>
       <p:ext uri="{BB962C8B-B14F-4D97-AF65-F5344CB8AC3E}">
-        <p14:creationId xmlns:p14="http://schemas.microsoft.com/office/powerpoint/2010/main" val="3523007913"/>
+        <p14:creationId xmlns:p14="http://schemas.microsoft.com/office/powerpoint/2010/main" val="2114422350"/>
       </p:ext>
     </p:extLst>
   </p:cSld>
@@ -6813,18 +6763,59 @@
         </p:nvSpPr>
         <p:spPr>
           <a:xfrm>
-            <a:off x="814346" y="0"/>
-            <a:ext cx="10515600" cy="839898"/>
-          </a:xfrm>
-        </p:spPr>
-        <p:txBody>
-          <a:bodyPr/>
+            <a:off x="687124" y="78697"/>
+            <a:ext cx="10508312" cy="1273260"/>
+          </a:xfrm>
+        </p:spPr>
+        <p:txBody>
+          <a:bodyPr>
+            <a:normAutofit fontScale="90000"/>
+          </a:bodyPr>
           <a:lstStyle/>
           <a:p>
             <a:pPr algn="ctr"/>
             <a:r>
+              <a:rPr lang="en-US" altLang="zh-TW" dirty="0" smtClean="0"/>
+              <a:t>Buy Record</a:t>
+            </a:r>
+            <a:r>
               <a:rPr lang="zh-TW" altLang="en-US" dirty="0" smtClean="0"/>
-              <a:t>成功付款頁面</a:t>
+              <a:t>中找到該訂單合約地址</a:t>
+            </a:r>
+            <a:r>
+              <a:rPr lang="en-US" altLang="zh-TW" dirty="0" smtClean="0"/>
+              <a:t>/</a:t>
+            </a:r>
+            <a:br>
+              <a:rPr lang="en-US" altLang="zh-TW" dirty="0" smtClean="0"/>
+            </a:br>
+            <a:r>
+              <a:rPr lang="zh-TW" altLang="en-US" dirty="0" smtClean="0"/>
+              <a:t>貼到</a:t>
+            </a:r>
+            <a:r>
+              <a:rPr lang="en-US" altLang="zh-TW" dirty="0" smtClean="0"/>
+              <a:t>wallet</a:t>
+            </a:r>
+            <a:r>
+              <a:rPr lang="zh-TW" altLang="en-US" dirty="0" smtClean="0"/>
+              <a:t> </a:t>
+            </a:r>
+            <a:r>
+              <a:rPr lang="en-US" altLang="zh-TW" dirty="0" smtClean="0"/>
+              <a:t>for</a:t>
+            </a:r>
+            <a:r>
+              <a:rPr lang="zh-TW" altLang="en-US" dirty="0" smtClean="0"/>
+              <a:t> </a:t>
+            </a:r>
+            <a:r>
+              <a:rPr lang="en-US" altLang="zh-TW" dirty="0" err="1" smtClean="0"/>
+              <a:t>catchbo</a:t>
+            </a:r>
+            <a:r>
+              <a:rPr lang="zh-TW" altLang="en-US" dirty="0" smtClean="0"/>
+              <a:t>即可付款</a:t>
             </a:r>
             <a:endParaRPr lang="zh-TW" altLang="en-US" dirty="0"/>
           </a:p>
@@ -6832,7 +6823,7 @@
       </p:sp>
       <p:pic>
         <p:nvPicPr>
-          <p:cNvPr id="5" name="圖片 4"/>
+          <p:cNvPr id="13" name="圖片 12"/>
           <p:cNvPicPr>
             <a:picLocks noChangeAspect="1"/>
           </p:cNvPicPr>
@@ -6852,8 +6843,8 @@
         </p:blipFill>
         <p:spPr>
           <a:xfrm>
-            <a:off x="0" y="839898"/>
-            <a:ext cx="10058400" cy="4841168"/>
+            <a:off x="0" y="1247774"/>
+            <a:ext cx="10058400" cy="5015944"/>
           </a:xfrm>
           <a:prstGeom prst="rect">
             <a:avLst/>
@@ -6862,7 +6853,7 @@
       </p:pic>
       <p:pic>
         <p:nvPicPr>
-          <p:cNvPr id="6" name="圖片 5"/>
+          <p:cNvPr id="11" name="圖片 10"/>
           <p:cNvPicPr>
             <a:picLocks noChangeAspect="1"/>
           </p:cNvPicPr>
@@ -6882,8 +6873,8 @@
         </p:blipFill>
         <p:spPr>
           <a:xfrm>
-            <a:off x="4446147" y="3148717"/>
-            <a:ext cx="7745854" cy="3709283"/>
+            <a:off x="7036904" y="1844749"/>
+            <a:ext cx="10058400" cy="5013251"/>
           </a:xfrm>
           <a:prstGeom prst="rect">
             <a:avLst/>
@@ -6893,7 +6884,7 @@
     </p:spTree>
     <p:extLst>
       <p:ext uri="{BB962C8B-B14F-4D97-AF65-F5344CB8AC3E}">
-        <p14:creationId xmlns:p14="http://schemas.microsoft.com/office/powerpoint/2010/main" val="2664806659"/>
+        <p14:creationId xmlns:p14="http://schemas.microsoft.com/office/powerpoint/2010/main" val="3523007913"/>
       </p:ext>
     </p:extLst>
   </p:cSld>
@@ -6939,63 +6930,18 @@
         </p:nvSpPr>
         <p:spPr>
           <a:xfrm>
-            <a:off x="846151" y="0"/>
-            <a:ext cx="10515600" cy="1325563"/>
-          </a:xfrm>
-        </p:spPr>
-        <p:txBody>
-          <a:bodyPr>
-            <a:normAutofit/>
-          </a:bodyPr>
+            <a:off x="814346" y="0"/>
+            <a:ext cx="10515600" cy="839898"/>
+          </a:xfrm>
+        </p:spPr>
+        <p:txBody>
+          <a:bodyPr/>
           <a:lstStyle/>
           <a:p>
             <a:pPr algn="ctr"/>
             <a:r>
-              <a:rPr lang="en-US" altLang="zh-TW" dirty="0" err="1" smtClean="0"/>
-              <a:t>moneyPaid</a:t>
-            </a:r>
-            <a:r>
               <a:rPr lang="zh-TW" altLang="en-US" dirty="0" smtClean="0"/>
-              <a:t>變為</a:t>
-            </a:r>
-            <a:r>
-              <a:rPr lang="en-US" altLang="zh-TW" dirty="0" smtClean="0"/>
-              <a:t>true/</a:t>
-            </a:r>
-            <a:r>
-              <a:rPr lang="en-US" altLang="zh-TW" dirty="0"/>
-              <a:t/>
-            </a:r>
-            <a:br>
-              <a:rPr lang="en-US" altLang="zh-TW" dirty="0"/>
-            </a:br>
-            <a:r>
-              <a:rPr lang="zh-TW" altLang="en-US" dirty="0" smtClean="0"/>
-              <a:t>將已</a:t>
-            </a:r>
-            <a:r>
-              <a:rPr lang="zh-TW" altLang="en-US" dirty="0"/>
-              <a:t>付款</a:t>
-            </a:r>
-            <a:r>
-              <a:rPr lang="zh-TW" altLang="en-US" dirty="0" smtClean="0"/>
-              <a:t>訂單</a:t>
-            </a:r>
-            <a:r>
-              <a:rPr lang="zh-TW" altLang="en-US" dirty="0"/>
-              <a:t>的</a:t>
-            </a:r>
-            <a:r>
-              <a:rPr lang="en-US" altLang="zh-TW" dirty="0"/>
-              <a:t>_id</a:t>
-            </a:r>
-            <a:r>
-              <a:rPr lang="zh-TW" altLang="en-US" dirty="0"/>
-              <a:t>貼到輸入框並</a:t>
-            </a:r>
-            <a:r>
-              <a:rPr lang="en-US" altLang="zh-TW" dirty="0"/>
-              <a:t>submit</a:t>
+              <a:t>成功付款頁面</a:t>
             </a:r>
             <a:endParaRPr lang="zh-TW" altLang="en-US" dirty="0"/>
           </a:p>
@@ -7003,7 +6949,7 @@
       </p:sp>
       <p:pic>
         <p:nvPicPr>
-          <p:cNvPr id="14" name="圖片 13"/>
+          <p:cNvPr id="5" name="圖片 4"/>
           <p:cNvPicPr>
             <a:picLocks noChangeAspect="1"/>
           </p:cNvPicPr>
@@ -7023,8 +6969,8 @@
         </p:blipFill>
         <p:spPr>
           <a:xfrm>
-            <a:off x="0" y="1325563"/>
-            <a:ext cx="10058400" cy="5005390"/>
+            <a:off x="0" y="839898"/>
+            <a:ext cx="10058400" cy="4841168"/>
           </a:xfrm>
           <a:prstGeom prst="rect">
             <a:avLst/>
@@ -7033,7 +6979,7 @@
       </p:pic>
       <p:pic>
         <p:nvPicPr>
-          <p:cNvPr id="15" name="圖片 14"/>
+          <p:cNvPr id="6" name="圖片 5"/>
           <p:cNvPicPr>
             <a:picLocks noChangeAspect="1"/>
           </p:cNvPicPr>
@@ -7053,8 +6999,8 @@
         </p:blipFill>
         <p:spPr>
           <a:xfrm>
-            <a:off x="6332551" y="1622190"/>
-            <a:ext cx="10058400" cy="4412136"/>
+            <a:off x="4446147" y="3148717"/>
+            <a:ext cx="7745854" cy="3709283"/>
           </a:xfrm>
           <a:prstGeom prst="rect">
             <a:avLst/>
@@ -7064,7 +7010,7 @@
     </p:spTree>
     <p:extLst>
       <p:ext uri="{BB962C8B-B14F-4D97-AF65-F5344CB8AC3E}">
-        <p14:creationId xmlns:p14="http://schemas.microsoft.com/office/powerpoint/2010/main" val="2398518547"/>
+        <p14:creationId xmlns:p14="http://schemas.microsoft.com/office/powerpoint/2010/main" val="2664806659"/>
       </p:ext>
     </p:extLst>
   </p:cSld>
@@ -7100,6 +7046,177 @@
       </p:grpSpPr>
       <p:sp>
         <p:nvSpPr>
+          <p:cNvPr id="2" name="標題 1"/>
+          <p:cNvSpPr>
+            <a:spLocks noGrp="1"/>
+          </p:cNvSpPr>
+          <p:nvPr>
+            <p:ph type="title"/>
+          </p:nvPr>
+        </p:nvSpPr>
+        <p:spPr>
+          <a:xfrm>
+            <a:off x="846151" y="0"/>
+            <a:ext cx="10515600" cy="1325563"/>
+          </a:xfrm>
+        </p:spPr>
+        <p:txBody>
+          <a:bodyPr>
+            <a:normAutofit/>
+          </a:bodyPr>
+          <a:lstStyle/>
+          <a:p>
+            <a:pPr algn="ctr"/>
+            <a:r>
+              <a:rPr lang="en-US" altLang="zh-TW" dirty="0" err="1" smtClean="0"/>
+              <a:t>moneyPaid</a:t>
+            </a:r>
+            <a:r>
+              <a:rPr lang="zh-TW" altLang="en-US" dirty="0" smtClean="0"/>
+              <a:t>變為</a:t>
+            </a:r>
+            <a:r>
+              <a:rPr lang="en-US" altLang="zh-TW" dirty="0" smtClean="0"/>
+              <a:t>true/</a:t>
+            </a:r>
+            <a:r>
+              <a:rPr lang="en-US" altLang="zh-TW" dirty="0"/>
+              <a:t/>
+            </a:r>
+            <a:br>
+              <a:rPr lang="en-US" altLang="zh-TW" dirty="0"/>
+            </a:br>
+            <a:r>
+              <a:rPr lang="zh-TW" altLang="en-US" dirty="0" smtClean="0"/>
+              <a:t>將已</a:t>
+            </a:r>
+            <a:r>
+              <a:rPr lang="zh-TW" altLang="en-US" dirty="0"/>
+              <a:t>付款</a:t>
+            </a:r>
+            <a:r>
+              <a:rPr lang="zh-TW" altLang="en-US" dirty="0" smtClean="0"/>
+              <a:t>訂單</a:t>
+            </a:r>
+            <a:r>
+              <a:rPr lang="zh-TW" altLang="en-US" dirty="0"/>
+              <a:t>的</a:t>
+            </a:r>
+            <a:r>
+              <a:rPr lang="en-US" altLang="zh-TW" dirty="0"/>
+              <a:t>_id</a:t>
+            </a:r>
+            <a:r>
+              <a:rPr lang="zh-TW" altLang="en-US" dirty="0"/>
+              <a:t>貼到輸入框並</a:t>
+            </a:r>
+            <a:r>
+              <a:rPr lang="en-US" altLang="zh-TW" dirty="0"/>
+              <a:t>submit</a:t>
+            </a:r>
+            <a:endParaRPr lang="zh-TW" altLang="en-US" dirty="0"/>
+          </a:p>
+        </p:txBody>
+      </p:sp>
+      <p:pic>
+        <p:nvPicPr>
+          <p:cNvPr id="14" name="圖片 13"/>
+          <p:cNvPicPr>
+            <a:picLocks noChangeAspect="1"/>
+          </p:cNvPicPr>
+          <p:nvPr/>
+        </p:nvPicPr>
+        <p:blipFill>
+          <a:blip r:embed="rId2">
+            <a:extLst>
+              <a:ext uri="{28A0092B-C50C-407E-A947-70E740481C1C}">
+                <a14:useLocalDpi xmlns:a14="http://schemas.microsoft.com/office/drawing/2010/main" val="0"/>
+              </a:ext>
+            </a:extLst>
+          </a:blip>
+          <a:stretch>
+            <a:fillRect/>
+          </a:stretch>
+        </p:blipFill>
+        <p:spPr>
+          <a:xfrm>
+            <a:off x="0" y="1325563"/>
+            <a:ext cx="10058400" cy="5005390"/>
+          </a:xfrm>
+          <a:prstGeom prst="rect">
+            <a:avLst/>
+          </a:prstGeom>
+        </p:spPr>
+      </p:pic>
+      <p:pic>
+        <p:nvPicPr>
+          <p:cNvPr id="15" name="圖片 14"/>
+          <p:cNvPicPr>
+            <a:picLocks noChangeAspect="1"/>
+          </p:cNvPicPr>
+          <p:nvPr/>
+        </p:nvPicPr>
+        <p:blipFill>
+          <a:blip r:embed="rId3">
+            <a:extLst>
+              <a:ext uri="{28A0092B-C50C-407E-A947-70E740481C1C}">
+                <a14:useLocalDpi xmlns:a14="http://schemas.microsoft.com/office/drawing/2010/main" val="0"/>
+              </a:ext>
+            </a:extLst>
+          </a:blip>
+          <a:stretch>
+            <a:fillRect/>
+          </a:stretch>
+        </p:blipFill>
+        <p:spPr>
+          <a:xfrm>
+            <a:off x="6332551" y="1622190"/>
+            <a:ext cx="10058400" cy="4412136"/>
+          </a:xfrm>
+          <a:prstGeom prst="rect">
+            <a:avLst/>
+          </a:prstGeom>
+        </p:spPr>
+      </p:pic>
+    </p:spTree>
+    <p:extLst>
+      <p:ext uri="{BB962C8B-B14F-4D97-AF65-F5344CB8AC3E}">
+        <p14:creationId xmlns:p14="http://schemas.microsoft.com/office/powerpoint/2010/main" val="2398518547"/>
+      </p:ext>
+    </p:extLst>
+  </p:cSld>
+  <p:clrMapOvr>
+    <a:masterClrMapping/>
+  </p:clrMapOvr>
+  <p:timing>
+    <p:tnLst>
+      <p:par>
+        <p:cTn id="1" dur="indefinite" restart="never" nodeType="tmRoot"/>
+      </p:par>
+    </p:tnLst>
+  </p:timing>
+</p:sld>
+</file>
+
+<file path=ppt/slides/slide34.xml><?xml version="1.0" encoding="utf-8"?>
+<p:sld xmlns:a="http://schemas.openxmlformats.org/drawingml/2006/main" xmlns:r="http://schemas.openxmlformats.org/officeDocument/2006/relationships" xmlns:p="http://schemas.openxmlformats.org/presentationml/2006/main">
+  <p:cSld>
+    <p:spTree>
+      <p:nvGrpSpPr>
+        <p:cNvPr id="1" name=""/>
+        <p:cNvGrpSpPr/>
+        <p:nvPr/>
+      </p:nvGrpSpPr>
+      <p:grpSpPr>
+        <a:xfrm>
+          <a:off x="0" y="0"/>
+          <a:ext cx="0" cy="0"/>
+          <a:chOff x="0" y="0"/>
+          <a:chExt cx="0" cy="0"/>
+        </a:xfrm>
+      </p:grpSpPr>
+      <p:sp>
+        <p:nvSpPr>
           <p:cNvPr id="6" name="文字方塊 5"/>
           <p:cNvSpPr txBox="1"/>
           <p:nvPr/>
@@ -7215,7 +7332,7 @@
 </p:sld>
 </file>
 
-<file path=ppt/slides/slide34.xml><?xml version="1.0" encoding="utf-8"?>
+<file path=ppt/slides/slide35.xml><?xml version="1.0" encoding="utf-8"?>
 <p:sld xmlns:a="http://schemas.openxmlformats.org/drawingml/2006/main" xmlns:r="http://schemas.openxmlformats.org/officeDocument/2006/relationships" xmlns:p="http://schemas.openxmlformats.org/presentationml/2006/main">
   <p:cSld>
     <p:spTree>
@@ -7576,18 +7693,32 @@
         </p:nvSpPr>
         <p:spPr>
           <a:xfrm>
-            <a:off x="4961613" y="0"/>
-            <a:ext cx="1971261" cy="816045"/>
-          </a:xfrm>
-        </p:spPr>
-        <p:txBody>
-          <a:bodyPr/>
+            <a:off x="1273534" y="-71561"/>
+            <a:ext cx="9644932" cy="816045"/>
+          </a:xfrm>
+        </p:spPr>
+        <p:txBody>
+          <a:bodyPr>
+            <a:normAutofit fontScale="90000"/>
+          </a:bodyPr>
           <a:lstStyle/>
           <a:p>
             <a:pPr algn="ctr"/>
             <a:r>
+              <a:rPr lang="en-US" altLang="zh-TW" dirty="0" err="1" smtClean="0"/>
+              <a:t>Mongodb</a:t>
+            </a:r>
+            <a:r>
+              <a:rPr lang="en-US" altLang="zh-TW" dirty="0" smtClean="0"/>
+              <a:t> collections_ smart contract</a:t>
+            </a:r>
+            <a:r>
               <a:rPr lang="zh-TW" altLang="en-US" dirty="0" smtClean="0"/>
-              <a:t>類別圖</a:t>
+              <a:t>類別</a:t>
+            </a:r>
+            <a:r>
+              <a:rPr lang="zh-TW" altLang="en-US" dirty="0" smtClean="0"/>
+              <a:t>圖</a:t>
             </a:r>
             <a:endParaRPr lang="zh-TW" altLang="en-US" dirty="0"/>
           </a:p>
@@ -7595,7 +7726,7 @@
       </p:sp>
       <p:pic>
         <p:nvPicPr>
-          <p:cNvPr id="5" name="圖片 4"/>
+          <p:cNvPr id="6" name="圖片 5"/>
           <p:cNvPicPr>
             <a:picLocks noChangeAspect="1"/>
           </p:cNvPicPr>
@@ -7615,8 +7746,8 @@
         </p:blipFill>
         <p:spPr>
           <a:xfrm>
-            <a:off x="0" y="628153"/>
-            <a:ext cx="12192000" cy="6229847"/>
+            <a:off x="0" y="572493"/>
+            <a:ext cx="12192000" cy="6460435"/>
           </a:xfrm>
           <a:prstGeom prst="rect">
             <a:avLst/>
@@ -7672,13 +7803,13 @@
         </p:nvSpPr>
         <p:spPr>
           <a:xfrm>
-            <a:off x="4133684" y="124687"/>
-            <a:ext cx="3924631" cy="748058"/>
+            <a:off x="-390609" y="898497"/>
+            <a:ext cx="4612751" cy="462252"/>
           </a:xfrm>
         </p:spPr>
         <p:txBody>
           <a:bodyPr>
-            <a:normAutofit/>
+            <a:normAutofit fontScale="90000"/>
           </a:bodyPr>
           <a:lstStyle/>
           <a:p>
@@ -7689,15 +7820,7 @@
             </a:r>
             <a:r>
               <a:rPr lang="en-US" altLang="zh-TW" dirty="0" smtClean="0"/>
-              <a:t>(</a:t>
-            </a:r>
-            <a:r>
-              <a:rPr lang="zh-TW" altLang="en-US" dirty="0" smtClean="0"/>
-              <a:t>細節</a:t>
-            </a:r>
-            <a:r>
-              <a:rPr lang="en-US" altLang="zh-TW" dirty="0" smtClean="0"/>
-              <a:t>)</a:t>
+              <a:t>(outline)</a:t>
             </a:r>
             <a:endParaRPr lang="zh-TW" altLang="en-US" dirty="0"/>
           </a:p>
@@ -7725,8 +7848,8 @@
         </p:blipFill>
         <p:spPr>
           <a:xfrm>
-            <a:off x="0" y="872745"/>
-            <a:ext cx="12192000" cy="5985255"/>
+            <a:off x="3935397" y="0"/>
+            <a:ext cx="3977816" cy="6858000"/>
           </a:xfrm>
           <a:prstGeom prst="rect">
             <a:avLst/>
@@ -7736,7 +7859,7 @@
     </p:spTree>
     <p:extLst>
       <p:ext uri="{BB962C8B-B14F-4D97-AF65-F5344CB8AC3E}">
-        <p14:creationId xmlns:p14="http://schemas.microsoft.com/office/powerpoint/2010/main" val="657441618"/>
+        <p14:creationId xmlns:p14="http://schemas.microsoft.com/office/powerpoint/2010/main" val="952929357"/>
       </p:ext>
     </p:extLst>
   </p:cSld>
@@ -7763,57 +7886,16 @@
           <a:chExt cx="0" cy="0"/>
         </a:xfrm>
       </p:grpSpPr>
-      <p:sp>
-        <p:nvSpPr>
-          <p:cNvPr id="2" name="標題 1"/>
-          <p:cNvSpPr>
-            <a:spLocks noGrp="1"/>
-          </p:cNvSpPr>
-          <p:nvPr>
-            <p:ph type="title"/>
-          </p:nvPr>
-        </p:nvSpPr>
-        <p:spPr>
-          <a:xfrm>
-            <a:off x="3827890" y="118636"/>
-            <a:ext cx="4027998" cy="740106"/>
-          </a:xfrm>
-        </p:spPr>
-        <p:txBody>
-          <a:bodyPr/>
-          <a:lstStyle/>
-          <a:p>
-            <a:pPr algn="ctr"/>
-            <a:r>
-              <a:rPr lang="zh-TW" altLang="en-US" dirty="0" smtClean="0"/>
-              <a:t>活動圖</a:t>
-            </a:r>
-            <a:r>
-              <a:rPr lang="en-US" altLang="zh-TW" dirty="0" smtClean="0"/>
-              <a:t>(</a:t>
-            </a:r>
-            <a:r>
-              <a:rPr lang="zh-TW" altLang="en-US" dirty="0" smtClean="0"/>
-              <a:t>細節</a:t>
-            </a:r>
-            <a:r>
-              <a:rPr lang="en-US" altLang="zh-TW" dirty="0" smtClean="0"/>
-              <a:t>)</a:t>
-            </a:r>
-            <a:endParaRPr lang="zh-TW" altLang="en-US" dirty="0"/>
-          </a:p>
-        </p:txBody>
-      </p:sp>
       <p:pic>
         <p:nvPicPr>
-          <p:cNvPr id="6" name="圖片 5"/>
+          <p:cNvPr id="4" name="圖片 3"/>
           <p:cNvPicPr>
             <a:picLocks noChangeAspect="1"/>
           </p:cNvPicPr>
           <p:nvPr/>
         </p:nvPicPr>
         <p:blipFill>
-          <a:blip r:embed="rId2">
+          <a:blip r:embed="rId3">
             <a:extLst>
               <a:ext uri="{28A0092B-C50C-407E-A947-70E740481C1C}">
                 <a14:useLocalDpi xmlns:a14="http://schemas.microsoft.com/office/drawing/2010/main" val="0"/>
@@ -7826,8 +7908,8 @@
         </p:blipFill>
         <p:spPr>
           <a:xfrm>
-            <a:off x="0" y="723568"/>
-            <a:ext cx="12192000" cy="6134431"/>
+            <a:off x="1375575" y="0"/>
+            <a:ext cx="9504459" cy="6858000"/>
           </a:xfrm>
           <a:prstGeom prst="rect">
             <a:avLst/>
@@ -7837,7 +7919,7 @@
     </p:spTree>
     <p:extLst>
       <p:ext uri="{BB962C8B-B14F-4D97-AF65-F5344CB8AC3E}">
-        <p14:creationId xmlns:p14="http://schemas.microsoft.com/office/powerpoint/2010/main" val="297335561"/>
+        <p14:creationId xmlns:p14="http://schemas.microsoft.com/office/powerpoint/2010/main" val="657441618"/>
       </p:ext>
     </p:extLst>
   </p:cSld>

</xml_diff>

<commit_message>
PPT and WORD done!
</commit_message>
<xml_diff>
--- a/CatchBo.pptx
+++ b/CatchBo.pptx
@@ -5,7 +5,7 @@
     <p:sldMasterId id="2147483648" r:id="rId1"/>
   </p:sldMasterIdLst>
   <p:notesMasterIdLst>
-    <p:notesMasterId r:id="rId37"/>
+    <p:notesMasterId r:id="rId34"/>
   </p:notesMasterIdLst>
   <p:sldIdLst>
     <p:sldId id="257" r:id="rId2"/>
@@ -23,26 +23,23 @@
     <p:sldId id="258" r:id="rId14"/>
     <p:sldId id="259" r:id="rId15"/>
     <p:sldId id="260" r:id="rId16"/>
-    <p:sldId id="261" r:id="rId17"/>
-    <p:sldId id="285" r:id="rId18"/>
+    <p:sldId id="285" r:id="rId17"/>
+    <p:sldId id="292" r:id="rId18"/>
     <p:sldId id="262" r:id="rId19"/>
     <p:sldId id="263" r:id="rId20"/>
-    <p:sldId id="264" r:id="rId21"/>
-    <p:sldId id="265" r:id="rId22"/>
-    <p:sldId id="282" r:id="rId23"/>
-    <p:sldId id="286" r:id="rId24"/>
-    <p:sldId id="268" r:id="rId25"/>
-    <p:sldId id="273" r:id="rId26"/>
-    <p:sldId id="270" r:id="rId27"/>
-    <p:sldId id="284" r:id="rId28"/>
-    <p:sldId id="266" r:id="rId29"/>
-    <p:sldId id="274" r:id="rId30"/>
-    <p:sldId id="267" r:id="rId31"/>
-    <p:sldId id="269" r:id="rId32"/>
-    <p:sldId id="271" r:id="rId33"/>
-    <p:sldId id="272" r:id="rId34"/>
-    <p:sldId id="275" r:id="rId35"/>
-    <p:sldId id="281" r:id="rId36"/>
+    <p:sldId id="293" r:id="rId21"/>
+    <p:sldId id="294" r:id="rId22"/>
+    <p:sldId id="295" r:id="rId23"/>
+    <p:sldId id="296" r:id="rId24"/>
+    <p:sldId id="297" r:id="rId25"/>
+    <p:sldId id="298" r:id="rId26"/>
+    <p:sldId id="299" r:id="rId27"/>
+    <p:sldId id="300" r:id="rId28"/>
+    <p:sldId id="302" r:id="rId29"/>
+    <p:sldId id="301" r:id="rId30"/>
+    <p:sldId id="303" r:id="rId31"/>
+    <p:sldId id="304" r:id="rId32"/>
+    <p:sldId id="281" r:id="rId33"/>
   </p:sldIdLst>
   <p:sldSz cx="12192000" cy="6858000"/>
   <p:notesSz cx="6858000" cy="9144000"/>
@@ -231,7 +228,7 @@
           <a:p>
             <a:fld id="{35DA5B65-FF5A-4949-8C78-8AC5C84B93F6}" type="datetimeFigureOut">
               <a:rPr lang="zh-TW" altLang="en-US" smtClean="0"/>
-              <a:t>2018/9/24</a:t>
+              <a:t>2018/12/24</a:t>
             </a:fld>
             <a:endParaRPr lang="zh-TW" altLang="en-US"/>
           </a:p>
@@ -897,7 +894,7 @@
           <a:p>
             <a:fld id="{B40DF12A-1B60-4DFD-9E28-CDD98DEE53C4}" type="datetimeFigureOut">
               <a:rPr lang="zh-TW" altLang="en-US" smtClean="0"/>
-              <a:t>2018/9/24</a:t>
+              <a:t>2018/12/24</a:t>
             </a:fld>
             <a:endParaRPr lang="zh-TW" altLang="en-US"/>
           </a:p>
@@ -1067,7 +1064,7 @@
           <a:p>
             <a:fld id="{B40DF12A-1B60-4DFD-9E28-CDD98DEE53C4}" type="datetimeFigureOut">
               <a:rPr lang="zh-TW" altLang="en-US" smtClean="0"/>
-              <a:t>2018/9/24</a:t>
+              <a:t>2018/12/24</a:t>
             </a:fld>
             <a:endParaRPr lang="zh-TW" altLang="en-US"/>
           </a:p>
@@ -1247,7 +1244,7 @@
           <a:p>
             <a:fld id="{B40DF12A-1B60-4DFD-9E28-CDD98DEE53C4}" type="datetimeFigureOut">
               <a:rPr lang="zh-TW" altLang="en-US" smtClean="0"/>
-              <a:t>2018/9/24</a:t>
+              <a:t>2018/12/24</a:t>
             </a:fld>
             <a:endParaRPr lang="zh-TW" altLang="en-US"/>
           </a:p>
@@ -1417,7 +1414,7 @@
           <a:p>
             <a:fld id="{B40DF12A-1B60-4DFD-9E28-CDD98DEE53C4}" type="datetimeFigureOut">
               <a:rPr lang="zh-TW" altLang="en-US" smtClean="0"/>
-              <a:t>2018/9/24</a:t>
+              <a:t>2018/12/24</a:t>
             </a:fld>
             <a:endParaRPr lang="zh-TW" altLang="en-US"/>
           </a:p>
@@ -1663,7 +1660,7 @@
           <a:p>
             <a:fld id="{B40DF12A-1B60-4DFD-9E28-CDD98DEE53C4}" type="datetimeFigureOut">
               <a:rPr lang="zh-TW" altLang="en-US" smtClean="0"/>
-              <a:t>2018/9/24</a:t>
+              <a:t>2018/12/24</a:t>
             </a:fld>
             <a:endParaRPr lang="zh-TW" altLang="en-US"/>
           </a:p>
@@ -1895,7 +1892,7 @@
           <a:p>
             <a:fld id="{B40DF12A-1B60-4DFD-9E28-CDD98DEE53C4}" type="datetimeFigureOut">
               <a:rPr lang="zh-TW" altLang="en-US" smtClean="0"/>
-              <a:t>2018/9/24</a:t>
+              <a:t>2018/12/24</a:t>
             </a:fld>
             <a:endParaRPr lang="zh-TW" altLang="en-US"/>
           </a:p>
@@ -2262,7 +2259,7 @@
           <a:p>
             <a:fld id="{B40DF12A-1B60-4DFD-9E28-CDD98DEE53C4}" type="datetimeFigureOut">
               <a:rPr lang="zh-TW" altLang="en-US" smtClean="0"/>
-              <a:t>2018/9/24</a:t>
+              <a:t>2018/12/24</a:t>
             </a:fld>
             <a:endParaRPr lang="zh-TW" altLang="en-US"/>
           </a:p>
@@ -2380,7 +2377,7 @@
           <a:p>
             <a:fld id="{B40DF12A-1B60-4DFD-9E28-CDD98DEE53C4}" type="datetimeFigureOut">
               <a:rPr lang="zh-TW" altLang="en-US" smtClean="0"/>
-              <a:t>2018/9/24</a:t>
+              <a:t>2018/12/24</a:t>
             </a:fld>
             <a:endParaRPr lang="zh-TW" altLang="en-US"/>
           </a:p>
@@ -2475,7 +2472,7 @@
           <a:p>
             <a:fld id="{B40DF12A-1B60-4DFD-9E28-CDD98DEE53C4}" type="datetimeFigureOut">
               <a:rPr lang="zh-TW" altLang="en-US" smtClean="0"/>
-              <a:t>2018/9/24</a:t>
+              <a:t>2018/12/24</a:t>
             </a:fld>
             <a:endParaRPr lang="zh-TW" altLang="en-US"/>
           </a:p>
@@ -2752,7 +2749,7 @@
           <a:p>
             <a:fld id="{B40DF12A-1B60-4DFD-9E28-CDD98DEE53C4}" type="datetimeFigureOut">
               <a:rPr lang="zh-TW" altLang="en-US" smtClean="0"/>
-              <a:t>2018/9/24</a:t>
+              <a:t>2018/12/24</a:t>
             </a:fld>
             <a:endParaRPr lang="zh-TW" altLang="en-US"/>
           </a:p>
@@ -3005,7 +3002,7 @@
           <a:p>
             <a:fld id="{B40DF12A-1B60-4DFD-9E28-CDD98DEE53C4}" type="datetimeFigureOut">
               <a:rPr lang="zh-TW" altLang="en-US" smtClean="0"/>
-              <a:t>2018/9/24</a:t>
+              <a:t>2018/12/24</a:t>
             </a:fld>
             <a:endParaRPr lang="zh-TW" altLang="en-US"/>
           </a:p>
@@ -3218,7 +3215,7 @@
           <a:p>
             <a:fld id="{B40DF12A-1B60-4DFD-9E28-CDD98DEE53C4}" type="datetimeFigureOut">
               <a:rPr lang="zh-TW" altLang="en-US" smtClean="0"/>
-              <a:t>2018/9/24</a:t>
+              <a:t>2018/12/24</a:t>
             </a:fld>
             <a:endParaRPr lang="zh-TW" altLang="en-US"/>
           </a:p>
@@ -3994,7 +3991,7 @@
       </p:sp>
       <p:pic>
         <p:nvPicPr>
-          <p:cNvPr id="4" name="圖片 3"/>
+          <p:cNvPr id="7" name="圖片 6"/>
           <p:cNvPicPr>
             <a:picLocks noChangeAspect="1"/>
           </p:cNvPicPr>
@@ -4014,8 +4011,8 @@
         </p:blipFill>
         <p:spPr>
           <a:xfrm>
-            <a:off x="0" y="1047105"/>
-            <a:ext cx="10058400" cy="4782903"/>
+            <a:off x="0" y="982230"/>
+            <a:ext cx="10058400" cy="4965269"/>
           </a:xfrm>
           <a:prstGeom prst="rect">
             <a:avLst/>
@@ -4024,7 +4021,7 @@
       </p:pic>
       <p:pic>
         <p:nvPicPr>
-          <p:cNvPr id="5" name="圖片 4"/>
+          <p:cNvPr id="6" name="圖片 5"/>
           <p:cNvPicPr>
             <a:picLocks noChangeAspect="1"/>
           </p:cNvPicPr>
@@ -4044,8 +4041,8 @@
         </p:blipFill>
         <p:spPr>
           <a:xfrm>
-            <a:off x="4031312" y="1943915"/>
-            <a:ext cx="10058400" cy="4580685"/>
+            <a:off x="4055167" y="1844520"/>
+            <a:ext cx="10058400" cy="4999789"/>
           </a:xfrm>
           <a:prstGeom prst="rect">
             <a:avLst/>
@@ -4245,8 +4242,16 @@
           <a:p>
             <a:pPr algn="ctr"/>
             <a:r>
+              <a:rPr lang="en-US" altLang="zh-TW" dirty="0" smtClean="0"/>
+              <a:t>(Sel</a:t>
+            </a:r>
+            <a:r>
+              <a:rPr lang="en-US" altLang="zh-TW" dirty="0" smtClean="0"/>
+              <a:t>l things)</a:t>
+            </a:r>
+            <a:r>
               <a:rPr lang="zh-TW" altLang="en-US" dirty="0" smtClean="0"/>
-              <a:t>販售商品頁面</a:t>
+              <a:t>填寫商品資訊</a:t>
             </a:r>
             <a:r>
               <a:rPr lang="en-US" altLang="zh-TW" dirty="0" smtClean="0"/>
@@ -4254,7 +4259,7 @@
             </a:r>
             <a:r>
               <a:rPr lang="zh-TW" altLang="en-US" dirty="0" smtClean="0"/>
-              <a:t>填寫商品資訊</a:t>
+              <a:t>刊登成功</a:t>
             </a:r>
             <a:endParaRPr lang="zh-TW" altLang="en-US" dirty="0"/>
           </a:p>
@@ -4262,7 +4267,7 @@
       </p:sp>
       <p:pic>
         <p:nvPicPr>
-          <p:cNvPr id="3" name="圖片 2"/>
+          <p:cNvPr id="4" name="圖片 3"/>
           <p:cNvPicPr>
             <a:picLocks noChangeAspect="1"/>
           </p:cNvPicPr>
@@ -4282,8 +4287,8 @@
         </p:blipFill>
         <p:spPr>
           <a:xfrm>
-            <a:off x="0" y="1049049"/>
-            <a:ext cx="10058400" cy="5002730"/>
+            <a:off x="0" y="1108262"/>
+            <a:ext cx="10058400" cy="4983747"/>
           </a:xfrm>
           <a:prstGeom prst="rect">
             <a:avLst/>
@@ -4292,7 +4297,7 @@
       </p:pic>
       <p:pic>
         <p:nvPicPr>
-          <p:cNvPr id="5" name="圖片 4"/>
+          <p:cNvPr id="6" name="圖片 5"/>
           <p:cNvPicPr>
             <a:picLocks noChangeAspect="1"/>
           </p:cNvPicPr>
@@ -4312,8 +4317,8 @@
         </p:blipFill>
         <p:spPr>
           <a:xfrm>
-            <a:off x="3029447" y="1689829"/>
-            <a:ext cx="10058400" cy="5021255"/>
+            <a:off x="3330522" y="1781817"/>
+            <a:ext cx="10058400" cy="4986260"/>
           </a:xfrm>
           <a:prstGeom prst="rect">
             <a:avLst/>
@@ -4367,12 +4372,7 @@
             <p:ph type="title"/>
           </p:nvPr>
         </p:nvSpPr>
-        <p:spPr>
-          <a:xfrm>
-            <a:off x="838200" y="245855"/>
-            <a:ext cx="10515600" cy="1325563"/>
-          </a:xfrm>
-        </p:spPr>
+        <p:spPr/>
         <p:txBody>
           <a:bodyPr/>
           <a:lstStyle/>
@@ -4380,7 +4380,7 @@
             <a:pPr algn="ctr"/>
             <a:r>
               <a:rPr lang="zh-TW" altLang="en-US" dirty="0" smtClean="0"/>
-              <a:t>刊登成功</a:t>
+              <a:t>買家註冊</a:t>
             </a:r>
             <a:r>
               <a:rPr lang="en-US" altLang="zh-TW" dirty="0" smtClean="0"/>
@@ -4388,7 +4388,7 @@
             </a:r>
             <a:r>
               <a:rPr lang="zh-TW" altLang="en-US" dirty="0" smtClean="0"/>
-              <a:t>賣家登出</a:t>
+              <a:t>註冊成功頁面</a:t>
             </a:r>
             <a:endParaRPr lang="zh-TW" altLang="en-US" dirty="0"/>
           </a:p>
@@ -4396,7 +4396,7 @@
       </p:sp>
       <p:pic>
         <p:nvPicPr>
-          <p:cNvPr id="7" name="圖片 6"/>
+          <p:cNvPr id="3" name="圖片 2"/>
           <p:cNvPicPr>
             <a:picLocks noChangeAspect="1"/>
           </p:cNvPicPr>
@@ -4416,8 +4416,8 @@
         </p:blipFill>
         <p:spPr>
           <a:xfrm>
-            <a:off x="2468881" y="2083175"/>
-            <a:ext cx="10058400" cy="4774825"/>
+            <a:off x="-71562" y="1340331"/>
+            <a:ext cx="10058400" cy="4981302"/>
           </a:xfrm>
           <a:prstGeom prst="rect">
             <a:avLst/>
@@ -4426,7 +4426,7 @@
       </p:pic>
       <p:pic>
         <p:nvPicPr>
-          <p:cNvPr id="3" name="圖片 2"/>
+          <p:cNvPr id="6" name="圖片 5"/>
           <p:cNvPicPr>
             <a:picLocks noChangeAspect="1"/>
           </p:cNvPicPr>
@@ -4446,8 +4446,8 @@
         </p:blipFill>
         <p:spPr>
           <a:xfrm>
-            <a:off x="-707665" y="1204880"/>
-            <a:ext cx="10058400" cy="5008002"/>
+            <a:off x="4229018" y="2007165"/>
+            <a:ext cx="10058400" cy="4981302"/>
           </a:xfrm>
           <a:prstGeom prst="rect">
             <a:avLst/>
@@ -4457,20 +4457,13 @@
     </p:spTree>
     <p:extLst>
       <p:ext uri="{BB962C8B-B14F-4D97-AF65-F5344CB8AC3E}">
-        <p14:creationId xmlns:p14="http://schemas.microsoft.com/office/powerpoint/2010/main" val="3545366652"/>
+        <p14:creationId xmlns:p14="http://schemas.microsoft.com/office/powerpoint/2010/main" val="1128303336"/>
       </p:ext>
     </p:extLst>
   </p:cSld>
   <p:clrMapOvr>
     <a:masterClrMapping/>
   </p:clrMapOvr>
-  <p:timing>
-    <p:tnLst>
-      <p:par>
-        <p:cTn id="1" dur="indefinite" restart="never" nodeType="tmRoot"/>
-      </p:par>
-    </p:tnLst>
-  </p:timing>
 </p:sld>
 </file>
 
@@ -4509,7 +4502,7 @@
             <a:pPr algn="ctr"/>
             <a:r>
               <a:rPr lang="zh-TW" altLang="en-US" dirty="0" smtClean="0"/>
-              <a:t>買家註冊</a:t>
+              <a:t>買家登入</a:t>
             </a:r>
             <a:r>
               <a:rPr lang="en-US" altLang="zh-TW" dirty="0" smtClean="0"/>
@@ -4517,7 +4510,7 @@
             </a:r>
             <a:r>
               <a:rPr lang="zh-TW" altLang="en-US" dirty="0" smtClean="0"/>
-              <a:t>註冊成功頁面</a:t>
+              <a:t>登入成功</a:t>
             </a:r>
             <a:endParaRPr lang="zh-TW" altLang="en-US" dirty="0"/>
           </a:p>
@@ -4525,7 +4518,7 @@
       </p:sp>
       <p:pic>
         <p:nvPicPr>
-          <p:cNvPr id="5" name="圖片 4"/>
+          <p:cNvPr id="4" name="圖片 3"/>
           <p:cNvPicPr>
             <a:picLocks noChangeAspect="1"/>
           </p:cNvPicPr>
@@ -4545,8 +4538,8 @@
         </p:blipFill>
         <p:spPr>
           <a:xfrm>
-            <a:off x="0" y="1357206"/>
-            <a:ext cx="10058400" cy="4782903"/>
+            <a:off x="0" y="1407447"/>
+            <a:ext cx="10058400" cy="4844322"/>
           </a:xfrm>
           <a:prstGeom prst="rect">
             <a:avLst/>
@@ -4555,7 +4548,7 @@
       </p:pic>
       <p:pic>
         <p:nvPicPr>
-          <p:cNvPr id="4" name="圖片 3"/>
+          <p:cNvPr id="5" name="圖片 4"/>
           <p:cNvPicPr>
             <a:picLocks noChangeAspect="1"/>
           </p:cNvPicPr>
@@ -4575,8 +4568,8 @@
         </p:blipFill>
         <p:spPr>
           <a:xfrm>
-            <a:off x="4182386" y="2152351"/>
-            <a:ext cx="10058400" cy="4572964"/>
+            <a:off x="2694418" y="1690688"/>
+            <a:ext cx="10058400" cy="4973171"/>
           </a:xfrm>
           <a:prstGeom prst="rect">
             <a:avLst/>
@@ -4586,7 +4579,7 @@
     </p:spTree>
     <p:extLst>
       <p:ext uri="{BB962C8B-B14F-4D97-AF65-F5344CB8AC3E}">
-        <p14:creationId xmlns:p14="http://schemas.microsoft.com/office/powerpoint/2010/main" val="1128303336"/>
+        <p14:creationId xmlns:p14="http://schemas.microsoft.com/office/powerpoint/2010/main" val="172491178"/>
       </p:ext>
     </p:extLst>
   </p:cSld>
@@ -4630,19 +4623,48 @@
           <a:p>
             <a:pPr algn="ctr"/>
             <a:r>
+              <a:rPr lang="en-US" altLang="zh-TW" dirty="0" smtClean="0"/>
+              <a:t>(</a:t>
+            </a:r>
+            <a:r>
+              <a:rPr lang="en-US" altLang="zh-TW" dirty="0" err="1" smtClean="0"/>
+              <a:t>Buythings</a:t>
+            </a:r>
+            <a:r>
+              <a:rPr lang="en-US" altLang="zh-TW" dirty="0" smtClean="0"/>
+              <a:t>)</a:t>
+            </a:r>
+            <a:r>
               <a:rPr lang="zh-TW" altLang="en-US" dirty="0" smtClean="0"/>
-              <a:t>瀏覽商品頁</a:t>
-            </a:r>
-            <a:r>
-              <a:rPr lang="zh-TW" altLang="en-US" dirty="0"/>
+              <a:t>瀏覽</a:t>
+            </a:r>
+            <a:r>
+              <a:rPr lang="zh-TW" altLang="en-US" dirty="0" smtClean="0"/>
+              <a:t>商品頁</a:t>
+            </a:r>
+            <a:r>
+              <a:rPr lang="zh-TW" altLang="en-US" dirty="0" smtClean="0"/>
               <a:t>面</a:t>
             </a:r>
+            <a:r>
+              <a:rPr lang="en-US" altLang="zh-TW" dirty="0" smtClean="0"/>
+              <a:t>/</a:t>
+            </a:r>
+            <a:r>
+              <a:rPr lang="en-US" altLang="zh-TW" dirty="0" err="1" smtClean="0"/>
+              <a:t>readmore</a:t>
+            </a:r>
+            <a:r>
+              <a:rPr lang="zh-TW" altLang="en-US" dirty="0" smtClean="0"/>
+              <a:t>單品</a:t>
+            </a:r>
+            <a:endParaRPr lang="zh-TW" altLang="en-US" dirty="0"/>
           </a:p>
         </p:txBody>
       </p:sp>
       <p:pic>
         <p:nvPicPr>
-          <p:cNvPr id="8" name="圖片 7"/>
+          <p:cNvPr id="3" name="圖片 2"/>
           <p:cNvPicPr>
             <a:picLocks noChangeAspect="1"/>
           </p:cNvPicPr>
@@ -4662,8 +4684,8 @@
         </p:blipFill>
         <p:spPr>
           <a:xfrm>
-            <a:off x="0" y="1375136"/>
-            <a:ext cx="10058400" cy="4989474"/>
+            <a:off x="90778" y="1412392"/>
+            <a:ext cx="8529519" cy="4233034"/>
           </a:xfrm>
           <a:prstGeom prst="rect">
             <a:avLst/>
@@ -4672,7 +4694,7 @@
       </p:pic>
       <p:pic>
         <p:nvPicPr>
-          <p:cNvPr id="7" name="圖片 6"/>
+          <p:cNvPr id="4" name="圖片 3"/>
           <p:cNvPicPr>
             <a:picLocks noChangeAspect="1"/>
           </p:cNvPicPr>
@@ -4692,8 +4714,8 @@
         </p:blipFill>
         <p:spPr>
           <a:xfrm>
-            <a:off x="3912041" y="1906122"/>
-            <a:ext cx="10058400" cy="5018601"/>
+            <a:off x="2947569" y="2173412"/>
+            <a:ext cx="9244431" cy="4519281"/>
           </a:xfrm>
           <a:prstGeom prst="rect">
             <a:avLst/>
@@ -4760,23 +4782,15 @@
             <a:pPr algn="ctr"/>
             <a:r>
               <a:rPr lang="zh-TW" altLang="en-US" dirty="0" smtClean="0"/>
-              <a:t>單品庫存查詢</a:t>
+              <a:t>點擊</a:t>
             </a:r>
             <a:r>
               <a:rPr lang="en-US" altLang="zh-TW" dirty="0" smtClean="0"/>
-              <a:t>/</a:t>
+              <a:t>buy/</a:t>
             </a:r>
             <a:r>
               <a:rPr lang="zh-TW" altLang="en-US" dirty="0" smtClean="0"/>
-              <a:t>點擊</a:t>
-            </a:r>
-            <a:r>
-              <a:rPr lang="en-US" altLang="zh-TW" dirty="0" smtClean="0"/>
-              <a:t>buy</a:t>
-            </a:r>
-            <a:r>
-              <a:rPr lang="zh-TW" altLang="en-US" dirty="0" smtClean="0"/>
-              <a:t>後下訂單頁面</a:t>
+              <a:t>輸入付款錢包地址</a:t>
             </a:r>
             <a:endParaRPr lang="zh-TW" altLang="en-US" dirty="0"/>
           </a:p>
@@ -4784,7 +4798,7 @@
       </p:sp>
       <p:pic>
         <p:nvPicPr>
-          <p:cNvPr id="3" name="圖片 2"/>
+          <p:cNvPr id="5" name="圖片 4"/>
           <p:cNvPicPr>
             <a:picLocks noChangeAspect="1"/>
           </p:cNvPicPr>
@@ -4804,8 +4818,8 @@
         </p:blipFill>
         <p:spPr>
           <a:xfrm>
-            <a:off x="0" y="1964151"/>
-            <a:ext cx="10058400" cy="4893849"/>
+            <a:off x="0" y="1084581"/>
+            <a:ext cx="10058400" cy="4340598"/>
           </a:xfrm>
           <a:prstGeom prst="rect">
             <a:avLst/>
@@ -4814,7 +4828,7 @@
       </p:pic>
       <p:pic>
         <p:nvPicPr>
-          <p:cNvPr id="4" name="圖片 3"/>
+          <p:cNvPr id="6" name="圖片 5"/>
           <p:cNvPicPr>
             <a:picLocks noChangeAspect="1"/>
           </p:cNvPicPr>
@@ -4834,8 +4848,8 @@
         </p:blipFill>
         <p:spPr>
           <a:xfrm>
-            <a:off x="5700755" y="1458433"/>
-            <a:ext cx="10058400" cy="4143570"/>
+            <a:off x="4141554" y="2211135"/>
+            <a:ext cx="10058400" cy="4329881"/>
           </a:xfrm>
           <a:prstGeom prst="rect">
             <a:avLst/>
@@ -5181,28 +5195,19 @@
             <p:ph type="title"/>
           </p:nvPr>
         </p:nvSpPr>
-        <p:spPr>
-          <a:xfrm>
-            <a:off x="838199" y="365125"/>
-            <a:ext cx="10786607" cy="1325563"/>
-          </a:xfrm>
-        </p:spPr>
+        <p:spPr/>
         <p:txBody>
           <a:bodyPr/>
           <a:lstStyle/>
           <a:p>
             <a:pPr algn="ctr"/>
             <a:r>
+              <a:rPr lang="en-US" altLang="zh-TW" dirty="0" err="1" smtClean="0"/>
+              <a:t>buyRecord</a:t>
+            </a:r>
+            <a:r>
               <a:rPr lang="zh-TW" altLang="en-US" dirty="0" smtClean="0"/>
-              <a:t>填寫表單資訊</a:t>
-            </a:r>
-            <a:r>
-              <a:rPr lang="en-US" altLang="zh-TW" dirty="0" smtClean="0"/>
-              <a:t>/submit</a:t>
-            </a:r>
-            <a:r>
-              <a:rPr lang="zh-TW" altLang="en-US" dirty="0" smtClean="0"/>
-              <a:t>後頁面</a:t>
+              <a:t>中查看已下訂單</a:t>
             </a:r>
             <a:endParaRPr lang="zh-TW" altLang="en-US" dirty="0"/>
           </a:p>
@@ -5210,7 +5215,7 @@
       </p:sp>
       <p:pic>
         <p:nvPicPr>
-          <p:cNvPr id="3" name="圖片 2"/>
+          <p:cNvPr id="4" name="圖片 3"/>
           <p:cNvPicPr>
             <a:picLocks noChangeAspect="1"/>
           </p:cNvPicPr>
@@ -5230,38 +5235,8 @@
         </p:blipFill>
         <p:spPr>
           <a:xfrm>
-            <a:off x="0" y="1429636"/>
-            <a:ext cx="10058400" cy="4164847"/>
-          </a:xfrm>
-          <a:prstGeom prst="rect">
-            <a:avLst/>
-          </a:prstGeom>
-        </p:spPr>
-      </p:pic>
-      <p:pic>
-        <p:nvPicPr>
-          <p:cNvPr id="4" name="圖片 3"/>
-          <p:cNvPicPr>
-            <a:picLocks noChangeAspect="1"/>
-          </p:cNvPicPr>
-          <p:nvPr/>
-        </p:nvPicPr>
-        <p:blipFill>
-          <a:blip r:embed="rId3">
-            <a:extLst>
-              <a:ext uri="{28A0092B-C50C-407E-A947-70E740481C1C}">
-                <a14:useLocalDpi xmlns:a14="http://schemas.microsoft.com/office/drawing/2010/main" val="0"/>
-              </a:ext>
-            </a:extLst>
-          </a:blip>
-          <a:stretch>
-            <a:fillRect/>
-          </a:stretch>
-        </p:blipFill>
-        <p:spPr>
-          <a:xfrm>
-            <a:off x="3339548" y="2247509"/>
-            <a:ext cx="10058400" cy="4411485"/>
+            <a:off x="1066800" y="1761974"/>
+            <a:ext cx="10058400" cy="4954693"/>
           </a:xfrm>
           <a:prstGeom prst="rect">
             <a:avLst/>
@@ -5271,20 +5246,13 @@
     </p:spTree>
     <p:extLst>
       <p:ext uri="{BB962C8B-B14F-4D97-AF65-F5344CB8AC3E}">
-        <p14:creationId xmlns:p14="http://schemas.microsoft.com/office/powerpoint/2010/main" val="442481425"/>
+        <p14:creationId xmlns:p14="http://schemas.microsoft.com/office/powerpoint/2010/main" val="3033737198"/>
       </p:ext>
     </p:extLst>
   </p:cSld>
   <p:clrMapOvr>
     <a:masterClrMapping/>
   </p:clrMapOvr>
-  <p:timing>
-    <p:tnLst>
-      <p:par>
-        <p:cTn id="1" dur="indefinite" restart="never" nodeType="tmRoot"/>
-      </p:par>
-    </p:tnLst>
-  </p:timing>
 </p:sld>
 </file>
 
@@ -5315,78 +5283,23 @@
             <p:ph type="title"/>
           </p:nvPr>
         </p:nvSpPr>
-        <p:spPr>
-          <a:xfrm>
-            <a:off x="567855" y="0"/>
-            <a:ext cx="11255734" cy="1325563"/>
-          </a:xfrm>
-        </p:spPr>
-        <p:txBody>
-          <a:bodyPr>
-            <a:normAutofit fontScale="90000"/>
-          </a:bodyPr>
+        <p:spPr/>
+        <p:txBody>
+          <a:bodyPr/>
           <a:lstStyle/>
           <a:p>
             <a:pPr algn="ctr"/>
             <a:r>
-              <a:rPr lang="zh-TW" altLang="en-US" sz="3600" dirty="0" smtClean="0"/>
-              <a:t>點擊</a:t>
-            </a:r>
-            <a:r>
-              <a:rPr lang="en-US" altLang="zh-TW" sz="3600" dirty="0" smtClean="0"/>
-              <a:t>BUY</a:t>
-            </a:r>
-            <a:r>
-              <a:rPr lang="zh-TW" altLang="en-US" sz="3600" dirty="0" smtClean="0"/>
-              <a:t> </a:t>
-            </a:r>
-            <a:r>
-              <a:rPr lang="en-US" altLang="zh-TW" sz="3600" dirty="0" smtClean="0"/>
-              <a:t>RECORD</a:t>
-            </a:r>
-            <a:r>
-              <a:rPr lang="zh-TW" altLang="en-US" sz="3600" dirty="0" smtClean="0"/>
-              <a:t>，剛下的訂單</a:t>
-            </a:r>
-            <a:r>
-              <a:rPr lang="en-US" altLang="zh-TW" sz="3600" dirty="0" smtClean="0"/>
-              <a:t>“</a:t>
-            </a:r>
-            <a:r>
-              <a:rPr lang="en-US" altLang="zh-TW" sz="3600" dirty="0" err="1" smtClean="0"/>
-              <a:t>merchandiseArriveLocker</a:t>
-            </a:r>
-            <a:r>
-              <a:rPr lang="en-US" altLang="zh-TW" sz="3600" dirty="0" smtClean="0"/>
-              <a:t>”: false</a:t>
-            </a:r>
-            <a:r>
-              <a:rPr lang="zh-TW" altLang="en-US" sz="3600" dirty="0" smtClean="0"/>
-              <a:t>且</a:t>
-            </a:r>
-            <a:r>
-              <a:rPr lang="en-US" altLang="zh-TW" sz="3600" dirty="0" smtClean="0"/>
-              <a:t>“</a:t>
-            </a:r>
-            <a:r>
-              <a:rPr lang="en-US" altLang="zh-TW" sz="3600" dirty="0" err="1" smtClean="0"/>
-              <a:t>moneyPaid</a:t>
-            </a:r>
-            <a:r>
-              <a:rPr lang="en-US" altLang="zh-TW" sz="3600" dirty="0" smtClean="0"/>
-              <a:t>”: false/</a:t>
-            </a:r>
-            <a:r>
-              <a:rPr lang="zh-TW" altLang="en-US" sz="3600" dirty="0" smtClean="0"/>
-              <a:t>買家登出</a:t>
-            </a:r>
-            <a:endParaRPr lang="zh-TW" altLang="en-US" sz="3600" dirty="0"/>
+              <a:rPr lang="zh-TW" altLang="en-US" dirty="0" smtClean="0"/>
+              <a:t>郵差登入</a:t>
+            </a:r>
+            <a:endParaRPr lang="zh-TW" altLang="en-US" dirty="0"/>
           </a:p>
         </p:txBody>
       </p:sp>
       <p:pic>
         <p:nvPicPr>
-          <p:cNvPr id="7" name="圖片 6"/>
+          <p:cNvPr id="4" name="圖片 3"/>
           <p:cNvPicPr>
             <a:picLocks noChangeAspect="1"/>
           </p:cNvPicPr>
@@ -5406,8 +5319,8 @@
         </p:blipFill>
         <p:spPr>
           <a:xfrm>
-            <a:off x="2362502" y="2194559"/>
-            <a:ext cx="9829498" cy="4663441"/>
+            <a:off x="0" y="1457466"/>
+            <a:ext cx="10058400" cy="4892986"/>
           </a:xfrm>
           <a:prstGeom prst="rect">
             <a:avLst/>
@@ -5416,7 +5329,7 @@
       </p:pic>
       <p:pic>
         <p:nvPicPr>
-          <p:cNvPr id="4" name="圖片 3"/>
+          <p:cNvPr id="5" name="圖片 4"/>
           <p:cNvPicPr>
             <a:picLocks noChangeAspect="1"/>
           </p:cNvPicPr>
@@ -5436,8 +5349,8 @@
         </p:blipFill>
         <p:spPr>
           <a:xfrm>
-            <a:off x="0" y="1118195"/>
-            <a:ext cx="10058400" cy="5015957"/>
+            <a:off x="3736039" y="1906420"/>
+            <a:ext cx="10058400" cy="4951580"/>
           </a:xfrm>
           <a:prstGeom prst="rect">
             <a:avLst/>
@@ -5447,20 +5360,13 @@
     </p:spTree>
     <p:extLst>
       <p:ext uri="{BB962C8B-B14F-4D97-AF65-F5344CB8AC3E}">
-        <p14:creationId xmlns:p14="http://schemas.microsoft.com/office/powerpoint/2010/main" val="2206812976"/>
+        <p14:creationId xmlns:p14="http://schemas.microsoft.com/office/powerpoint/2010/main" val="2378951758"/>
       </p:ext>
     </p:extLst>
   </p:cSld>
   <p:clrMapOvr>
     <a:masterClrMapping/>
   </p:clrMapOvr>
-  <p:timing>
-    <p:tnLst>
-      <p:par>
-        <p:cTn id="1" dur="indefinite" restart="never" nodeType="tmRoot"/>
-      </p:par>
-    </p:tnLst>
-  </p:timing>
 </p:sld>
 </file>
 
@@ -5491,12 +5397,7 @@
             <p:ph type="title"/>
           </p:nvPr>
         </p:nvSpPr>
-        <p:spPr>
-          <a:xfrm>
-            <a:off x="838199" y="365125"/>
-            <a:ext cx="10921779" cy="1325563"/>
-          </a:xfrm>
-        </p:spPr>
+        <p:spPr/>
         <p:txBody>
           <a:bodyPr/>
           <a:lstStyle/>
@@ -5504,15 +5405,7 @@
             <a:pPr algn="ctr"/>
             <a:r>
               <a:rPr lang="zh-TW" altLang="en-US" dirty="0" smtClean="0"/>
-              <a:t>賣家登入</a:t>
-            </a:r>
-            <a:r>
-              <a:rPr lang="en-US" altLang="zh-TW" dirty="0" smtClean="0"/>
-              <a:t>/</a:t>
-            </a:r>
-            <a:r>
-              <a:rPr lang="zh-TW" altLang="en-US" dirty="0" smtClean="0"/>
-              <a:t>賣家見到自己接到一筆訂單</a:t>
+              <a:t>郵差放商品入置物櫃</a:t>
             </a:r>
             <a:endParaRPr lang="zh-TW" altLang="en-US" dirty="0"/>
           </a:p>
@@ -5540,8 +5433,8 @@
         </p:blipFill>
         <p:spPr>
           <a:xfrm>
-            <a:off x="-644055" y="1364881"/>
-            <a:ext cx="10058400" cy="4573445"/>
+            <a:off x="0" y="1736454"/>
+            <a:ext cx="10058400" cy="4994552"/>
           </a:xfrm>
           <a:prstGeom prst="rect">
             <a:avLst/>
@@ -5550,7 +5443,7 @@
       </p:pic>
       <p:pic>
         <p:nvPicPr>
-          <p:cNvPr id="6" name="圖片 5"/>
+          <p:cNvPr id="5" name="圖片 4"/>
           <p:cNvPicPr>
             <a:picLocks noChangeAspect="1"/>
           </p:cNvPicPr>
@@ -5570,8 +5463,8 @@
         </p:blipFill>
         <p:spPr>
           <a:xfrm>
-            <a:off x="4206240" y="1690688"/>
-            <a:ext cx="10058400" cy="4992142"/>
+            <a:off x="3608818" y="2584918"/>
+            <a:ext cx="10058400" cy="4146088"/>
           </a:xfrm>
           <a:prstGeom prst="rect">
             <a:avLst/>
@@ -5581,20 +5474,13 @@
     </p:spTree>
     <p:extLst>
       <p:ext uri="{BB962C8B-B14F-4D97-AF65-F5344CB8AC3E}">
-        <p14:creationId xmlns:p14="http://schemas.microsoft.com/office/powerpoint/2010/main" val="4033178646"/>
+        <p14:creationId xmlns:p14="http://schemas.microsoft.com/office/powerpoint/2010/main" val="3352193743"/>
       </p:ext>
     </p:extLst>
   </p:cSld>
   <p:clrMapOvr>
     <a:masterClrMapping/>
   </p:clrMapOvr>
-  <p:timing>
-    <p:tnLst>
-      <p:par>
-        <p:cTn id="1" dur="indefinite" restart="never" nodeType="tmRoot"/>
-      </p:par>
-    </p:tnLst>
-  </p:timing>
 </p:sld>
 </file>
 
@@ -5625,7 +5511,12 @@
             <p:ph type="title"/>
           </p:nvPr>
         </p:nvSpPr>
-        <p:spPr/>
+        <p:spPr>
+          <a:xfrm>
+            <a:off x="830249" y="143991"/>
+            <a:ext cx="10515600" cy="1325563"/>
+          </a:xfrm>
+        </p:spPr>
         <p:txBody>
           <a:bodyPr/>
           <a:lstStyle/>
@@ -5633,7 +5524,7 @@
             <a:pPr algn="ctr"/>
             <a:r>
               <a:rPr lang="zh-TW" altLang="en-US" dirty="0" smtClean="0"/>
-              <a:t>賣家登出</a:t>
+              <a:t>買家登入</a:t>
             </a:r>
             <a:endParaRPr lang="zh-TW" altLang="en-US" dirty="0"/>
           </a:p>
@@ -5641,7 +5532,7 @@
       </p:sp>
       <p:pic>
         <p:nvPicPr>
-          <p:cNvPr id="4" name="圖片 3"/>
+          <p:cNvPr id="6" name="圖片 5"/>
           <p:cNvPicPr>
             <a:picLocks noChangeAspect="1"/>
           </p:cNvPicPr>
@@ -5661,8 +5552,38 @@
         </p:blipFill>
         <p:spPr>
           <a:xfrm>
-            <a:off x="1066800" y="1578475"/>
-            <a:ext cx="10058400" cy="4772040"/>
+            <a:off x="151075" y="1248421"/>
+            <a:ext cx="10058400" cy="4844322"/>
+          </a:xfrm>
+          <a:prstGeom prst="rect">
+            <a:avLst/>
+          </a:prstGeom>
+        </p:spPr>
+      </p:pic>
+      <p:pic>
+        <p:nvPicPr>
+          <p:cNvPr id="7" name="圖片 6"/>
+          <p:cNvPicPr>
+            <a:picLocks noChangeAspect="1"/>
+          </p:cNvPicPr>
+          <p:nvPr/>
+        </p:nvPicPr>
+        <p:blipFill>
+          <a:blip r:embed="rId3">
+            <a:extLst>
+              <a:ext uri="{28A0092B-C50C-407E-A947-70E740481C1C}">
+                <a14:useLocalDpi xmlns:a14="http://schemas.microsoft.com/office/drawing/2010/main" val="0"/>
+              </a:ext>
+            </a:extLst>
+          </a:blip>
+          <a:stretch>
+            <a:fillRect/>
+          </a:stretch>
+        </p:blipFill>
+        <p:spPr>
+          <a:xfrm>
+            <a:off x="3624720" y="1690688"/>
+            <a:ext cx="10058400" cy="4973171"/>
           </a:xfrm>
           <a:prstGeom prst="rect">
             <a:avLst/>
@@ -5672,7 +5593,7 @@
     </p:spTree>
     <p:extLst>
       <p:ext uri="{BB962C8B-B14F-4D97-AF65-F5344CB8AC3E}">
-        <p14:creationId xmlns:p14="http://schemas.microsoft.com/office/powerpoint/2010/main" val="1761955608"/>
+        <p14:creationId xmlns:p14="http://schemas.microsoft.com/office/powerpoint/2010/main" val="3490622445"/>
       </p:ext>
     </p:extLst>
   </p:cSld>
@@ -5711,44 +5632,42 @@
         </p:nvSpPr>
         <p:spPr>
           <a:xfrm>
-            <a:off x="901811" y="0"/>
-            <a:ext cx="10515600" cy="1325563"/>
-          </a:xfrm>
-        </p:spPr>
-        <p:txBody>
-          <a:bodyPr>
-            <a:normAutofit/>
-          </a:bodyPr>
+            <a:off x="838200" y="365125"/>
+            <a:ext cx="10866120" cy="1325563"/>
+          </a:xfrm>
+        </p:spPr>
+        <p:txBody>
+          <a:bodyPr/>
           <a:lstStyle/>
           <a:p>
             <a:pPr algn="ctr"/>
             <a:r>
-              <a:rPr lang="en-US" altLang="zh-TW" sz="4000" dirty="0" err="1"/>
-              <a:t>n</a:t>
-            </a:r>
-            <a:r>
-              <a:rPr lang="en-US" altLang="zh-TW" sz="4000" dirty="0" err="1" smtClean="0"/>
-              <a:t>ccu_delivery_company</a:t>
-            </a:r>
-            <a:r>
-              <a:rPr lang="zh-TW" altLang="en-US" sz="4000" dirty="0" smtClean="0"/>
-              <a:t>登入帳密</a:t>
-            </a:r>
-            <a:r>
-              <a:rPr lang="en-US" altLang="zh-TW" sz="4000" dirty="0" smtClean="0"/>
-              <a:t>/</a:t>
-            </a:r>
-            <a:r>
-              <a:rPr lang="zh-TW" altLang="en-US" sz="4000" dirty="0" smtClean="0"/>
-              <a:t>成功登入頁面</a:t>
-            </a:r>
-            <a:endParaRPr lang="zh-TW" altLang="en-US" sz="4000" dirty="0"/>
+              <a:rPr lang="en-US" altLang="zh-TW" dirty="0" err="1" smtClean="0"/>
+              <a:t>merchandiseArriveLocker</a:t>
+            </a:r>
+            <a:r>
+              <a:rPr lang="zh-TW" altLang="en-US" dirty="0" smtClean="0"/>
+              <a:t>已被</a:t>
+            </a:r>
+            <a:r>
+              <a:rPr lang="zh-TW" altLang="en-US" dirty="0"/>
+              <a:t>郵差</a:t>
+            </a:r>
+            <a:r>
+              <a:rPr lang="zh-TW" altLang="en-US" dirty="0" smtClean="0"/>
+              <a:t>更新為</a:t>
+            </a:r>
+            <a:r>
+              <a:rPr lang="en-US" altLang="zh-TW" dirty="0" smtClean="0"/>
+              <a:t>true</a:t>
+            </a:r>
+            <a:endParaRPr lang="zh-TW" altLang="en-US" dirty="0"/>
           </a:p>
         </p:txBody>
       </p:sp>
       <p:pic>
         <p:nvPicPr>
-          <p:cNvPr id="3" name="圖片 2"/>
+          <p:cNvPr id="5" name="圖片 4"/>
           <p:cNvPicPr>
             <a:picLocks noChangeAspect="1"/>
           </p:cNvPicPr>
@@ -5768,38 +5687,8 @@
         </p:blipFill>
         <p:spPr>
           <a:xfrm>
-            <a:off x="0" y="991446"/>
-            <a:ext cx="10058400" cy="4796023"/>
-          </a:xfrm>
-          <a:prstGeom prst="rect">
-            <a:avLst/>
-          </a:prstGeom>
-        </p:spPr>
-      </p:pic>
-      <p:pic>
-        <p:nvPicPr>
-          <p:cNvPr id="4" name="圖片 3"/>
-          <p:cNvPicPr>
-            <a:picLocks noChangeAspect="1"/>
-          </p:cNvPicPr>
-          <p:nvPr/>
-        </p:nvPicPr>
-        <p:blipFill>
-          <a:blip r:embed="rId3">
-            <a:extLst>
-              <a:ext uri="{28A0092B-C50C-407E-A947-70E740481C1C}">
-                <a14:useLocalDpi xmlns:a14="http://schemas.microsoft.com/office/drawing/2010/main" val="0"/>
-              </a:ext>
-            </a:extLst>
-          </a:blip>
-          <a:stretch>
-            <a:fillRect/>
-          </a:stretch>
-        </p:blipFill>
-        <p:spPr>
-          <a:xfrm>
-            <a:off x="3919993" y="1944957"/>
-            <a:ext cx="10058400" cy="4560936"/>
+            <a:off x="1073426" y="1556646"/>
+            <a:ext cx="10058400" cy="4978615"/>
           </a:xfrm>
           <a:prstGeom prst="rect">
             <a:avLst/>
@@ -5809,20 +5698,13 @@
     </p:spTree>
     <p:extLst>
       <p:ext uri="{BB962C8B-B14F-4D97-AF65-F5344CB8AC3E}">
-        <p14:creationId xmlns:p14="http://schemas.microsoft.com/office/powerpoint/2010/main" val="3384940024"/>
+        <p14:creationId xmlns:p14="http://schemas.microsoft.com/office/powerpoint/2010/main" val="2521850694"/>
       </p:ext>
     </p:extLst>
   </p:cSld>
   <p:clrMapOvr>
     <a:masterClrMapping/>
   </p:clrMapOvr>
-  <p:timing>
-    <p:tnLst>
-      <p:par>
-        <p:cTn id="1" dur="indefinite" restart="never" nodeType="tmRoot"/>
-      </p:par>
-    </p:tnLst>
-  </p:timing>
 </p:sld>
 </file>
 
@@ -5855,8 +5737,8 @@
         </p:nvSpPr>
         <p:spPr>
           <a:xfrm>
-            <a:off x="806395" y="0"/>
-            <a:ext cx="10515600" cy="1325563"/>
+            <a:off x="838199" y="365125"/>
+            <a:ext cx="10834315" cy="1325563"/>
           </a:xfrm>
         </p:spPr>
         <p:txBody>
@@ -5866,26 +5748,15 @@
             <a:pPr algn="ctr"/>
             <a:r>
               <a:rPr lang="zh-TW" altLang="en-US" dirty="0" smtClean="0"/>
-              <a:t>點擊</a:t>
+              <a:t>使用本平台自製錢包付錢，或其他方式亦可</a:t>
             </a:r>
             <a:r>
               <a:rPr lang="en-US" altLang="zh-TW" dirty="0" smtClean="0"/>
-              <a:t>Mailman</a:t>
-            </a:r>
-            <a:r>
-              <a:rPr lang="zh-TW" altLang="en-US" dirty="0" smtClean="0"/>
-              <a:t>進入頁面</a:t>
-            </a:r>
-            <a:r>
-              <a:rPr lang="en-US" altLang="zh-TW" dirty="0" smtClean="0"/>
-              <a:t>/</a:t>
-            </a:r>
-            <a:br>
-              <a:rPr lang="en-US" altLang="zh-TW" dirty="0" smtClean="0"/>
-            </a:br>
-            <a:r>
-              <a:rPr lang="zh-TW" altLang="en-US" dirty="0" smtClean="0"/>
-              <a:t>選取欲放入商品的置物櫃</a:t>
+              <a:t>ex. </a:t>
+            </a:r>
+            <a:r>
+              <a:rPr lang="en-US" altLang="zh-TW" dirty="0" err="1" smtClean="0"/>
+              <a:t>geth</a:t>
             </a:r>
             <a:endParaRPr lang="zh-TW" altLang="en-US" dirty="0"/>
           </a:p>
@@ -5893,7 +5764,7 @@
       </p:sp>
       <p:pic>
         <p:nvPicPr>
-          <p:cNvPr id="7" name="圖片 6"/>
+          <p:cNvPr id="4" name="圖片 3"/>
           <p:cNvPicPr>
             <a:picLocks noChangeAspect="1"/>
           </p:cNvPicPr>
@@ -5913,8 +5784,8 @@
         </p:blipFill>
         <p:spPr>
           <a:xfrm>
-            <a:off x="-127221" y="1266962"/>
-            <a:ext cx="10058400" cy="4997403"/>
+            <a:off x="0" y="1611175"/>
+            <a:ext cx="10058400" cy="4947101"/>
           </a:xfrm>
           <a:prstGeom prst="rect">
             <a:avLst/>
@@ -5923,7 +5794,7 @@
       </p:pic>
       <p:pic>
         <p:nvPicPr>
-          <p:cNvPr id="8" name="圖片 7"/>
+          <p:cNvPr id="5" name="圖片 4"/>
           <p:cNvPicPr>
             <a:picLocks noChangeAspect="1"/>
           </p:cNvPicPr>
@@ -5943,8 +5814,8 @@
         </p:blipFill>
         <p:spPr>
           <a:xfrm>
-            <a:off x="3411109" y="1857902"/>
-            <a:ext cx="10058400" cy="5000098"/>
+            <a:off x="2305878" y="1903465"/>
+            <a:ext cx="10058400" cy="4954535"/>
           </a:xfrm>
           <a:prstGeom prst="rect">
             <a:avLst/>
@@ -5954,20 +5825,13 @@
     </p:spTree>
     <p:extLst>
       <p:ext uri="{BB962C8B-B14F-4D97-AF65-F5344CB8AC3E}">
-        <p14:creationId xmlns:p14="http://schemas.microsoft.com/office/powerpoint/2010/main" val="2051098822"/>
+        <p14:creationId xmlns:p14="http://schemas.microsoft.com/office/powerpoint/2010/main" val="4248842437"/>
       </p:ext>
     </p:extLst>
   </p:cSld>
   <p:clrMapOvr>
     <a:masterClrMapping/>
   </p:clrMapOvr>
-  <p:timing>
-    <p:tnLst>
-      <p:par>
-        <p:cTn id="1" dur="indefinite" restart="never" nodeType="tmRoot"/>
-      </p:par>
-    </p:tnLst>
-  </p:timing>
 </p:sld>
 </file>
 
@@ -5998,42 +5862,31 @@
             <p:ph type="title"/>
           </p:nvPr>
         </p:nvSpPr>
-        <p:spPr>
-          <a:xfrm>
-            <a:off x="742785" y="141997"/>
-            <a:ext cx="10515600" cy="519701"/>
-          </a:xfrm>
-        </p:spPr>
-        <p:txBody>
-          <a:bodyPr>
-            <a:normAutofit fontScale="90000"/>
-          </a:bodyPr>
+        <p:spPr/>
+        <p:txBody>
+          <a:bodyPr/>
           <a:lstStyle/>
           <a:p>
             <a:pPr algn="ctr"/>
             <a:r>
-              <a:rPr lang="en-US" altLang="zh-TW" sz="4000" dirty="0" err="1" smtClean="0"/>
-              <a:t>db</a:t>
-            </a:r>
-            <a:r>
-              <a:rPr lang="zh-TW" altLang="en-US" sz="4000" dirty="0" smtClean="0"/>
-              <a:t>更新商品抵達</a:t>
-            </a:r>
-            <a:r>
-              <a:rPr lang="en-US" altLang="zh-TW" sz="4000" dirty="0" smtClean="0"/>
-              <a:t>/mailer</a:t>
-            </a:r>
-            <a:r>
-              <a:rPr lang="zh-TW" altLang="en-US" sz="4000" dirty="0" smtClean="0"/>
-              <a:t>登出</a:t>
-            </a:r>
-            <a:endParaRPr lang="zh-TW" altLang="en-US" sz="4000" dirty="0"/>
+              <a:rPr lang="en-US" altLang="zh-TW" dirty="0" err="1" smtClean="0"/>
+              <a:t>moneyPaid</a:t>
+            </a:r>
+            <a:r>
+              <a:rPr lang="zh-TW" altLang="en-US" dirty="0" smtClean="0"/>
+              <a:t>欄位更新為</a:t>
+            </a:r>
+            <a:r>
+              <a:rPr lang="en-US" altLang="zh-TW" dirty="0" smtClean="0"/>
+              <a:t>true</a:t>
+            </a:r>
+            <a:endParaRPr lang="zh-TW" altLang="en-US" dirty="0"/>
           </a:p>
         </p:txBody>
       </p:sp>
       <p:pic>
         <p:nvPicPr>
-          <p:cNvPr id="7" name="圖片 6"/>
+          <p:cNvPr id="4" name="圖片 3"/>
           <p:cNvPicPr>
             <a:picLocks noChangeAspect="1"/>
           </p:cNvPicPr>
@@ -6053,38 +5906,8 @@
         </p:blipFill>
         <p:spPr>
           <a:xfrm>
-            <a:off x="2234317" y="2085960"/>
-            <a:ext cx="10058400" cy="4772040"/>
-          </a:xfrm>
-          <a:prstGeom prst="rect">
-            <a:avLst/>
-          </a:prstGeom>
-        </p:spPr>
-      </p:pic>
-      <p:pic>
-        <p:nvPicPr>
-          <p:cNvPr id="3" name="圖片 2"/>
-          <p:cNvPicPr>
-            <a:picLocks noChangeAspect="1"/>
-          </p:cNvPicPr>
-          <p:nvPr/>
-        </p:nvPicPr>
-        <p:blipFill>
-          <a:blip r:embed="rId3">
-            <a:extLst>
-              <a:ext uri="{28A0092B-C50C-407E-A947-70E740481C1C}">
-                <a14:useLocalDpi xmlns:a14="http://schemas.microsoft.com/office/drawing/2010/main" val="0"/>
-              </a:ext>
-            </a:extLst>
-          </a:blip>
-          <a:stretch>
-            <a:fillRect/>
-          </a:stretch>
-        </p:blipFill>
-        <p:spPr>
-          <a:xfrm>
-            <a:off x="0" y="661698"/>
-            <a:ext cx="10058400" cy="5071192"/>
+            <a:off x="1295400" y="1858086"/>
+            <a:ext cx="10058400" cy="4999914"/>
           </a:xfrm>
           <a:prstGeom prst="rect">
             <a:avLst/>
@@ -6094,20 +5917,13 @@
     </p:spTree>
     <p:extLst>
       <p:ext uri="{BB962C8B-B14F-4D97-AF65-F5344CB8AC3E}">
-        <p14:creationId xmlns:p14="http://schemas.microsoft.com/office/powerpoint/2010/main" val="3455872810"/>
+        <p14:creationId xmlns:p14="http://schemas.microsoft.com/office/powerpoint/2010/main" val="2242248734"/>
       </p:ext>
     </p:extLst>
   </p:cSld>
   <p:clrMapOvr>
     <a:masterClrMapping/>
   </p:clrMapOvr>
-  <p:timing>
-    <p:tnLst>
-      <p:par>
-        <p:cTn id="1" dur="indefinite" restart="never" nodeType="tmRoot"/>
-      </p:par>
-    </p:tnLst>
-  </p:timing>
 </p:sld>
 </file>
 
@@ -6143,25 +5959,18 @@
           <a:bodyPr/>
           <a:lstStyle/>
           <a:p>
+            <a:pPr algn="ctr"/>
             <a:r>
               <a:rPr lang="zh-TW" altLang="en-US" dirty="0" smtClean="0"/>
-              <a:t>買家登入</a:t>
+              <a:t>解鎖頁面</a:t>
             </a:r>
             <a:r>
               <a:rPr lang="en-US" altLang="zh-TW" dirty="0" smtClean="0"/>
               <a:t>/</a:t>
             </a:r>
             <a:r>
-              <a:rPr lang="en-US" altLang="zh-TW" dirty="0" err="1" smtClean="0"/>
-              <a:t>merchandiseArriveLocker</a:t>
-            </a:r>
-            <a:r>
               <a:rPr lang="zh-TW" altLang="en-US" dirty="0" smtClean="0"/>
-              <a:t>變成</a:t>
-            </a:r>
-            <a:r>
-              <a:rPr lang="en-US" altLang="zh-TW" dirty="0" smtClean="0"/>
-              <a:t>true</a:t>
+              <a:t>選擇欲解鎖訂單商品</a:t>
             </a:r>
             <a:endParaRPr lang="zh-TW" altLang="en-US" dirty="0"/>
           </a:p>
@@ -6169,7 +5978,7 @@
       </p:sp>
       <p:pic>
         <p:nvPicPr>
-          <p:cNvPr id="3" name="圖片 2"/>
+          <p:cNvPr id="4" name="圖片 3"/>
           <p:cNvPicPr>
             <a:picLocks noChangeAspect="1"/>
           </p:cNvPicPr>
@@ -6189,8 +5998,8 @@
         </p:blipFill>
         <p:spPr>
           <a:xfrm>
-            <a:off x="0" y="1350349"/>
-            <a:ext cx="10058400" cy="4164474"/>
+            <a:off x="-111318" y="1690688"/>
+            <a:ext cx="10058400" cy="4548703"/>
           </a:xfrm>
           <a:prstGeom prst="rect">
             <a:avLst/>
@@ -6199,7 +6008,7 @@
       </p:pic>
       <p:pic>
         <p:nvPicPr>
-          <p:cNvPr id="7" name="圖片 6"/>
+          <p:cNvPr id="5" name="圖片 4"/>
           <p:cNvPicPr>
             <a:picLocks noChangeAspect="1"/>
           </p:cNvPicPr>
@@ -6219,8 +6028,8 @@
         </p:blipFill>
         <p:spPr>
           <a:xfrm>
-            <a:off x="4754880" y="1839399"/>
-            <a:ext cx="10058400" cy="5018601"/>
+            <a:off x="2272998" y="2362222"/>
+            <a:ext cx="10058400" cy="4605376"/>
           </a:xfrm>
           <a:prstGeom prst="rect">
             <a:avLst/>
@@ -6230,7 +6039,7 @@
     </p:spTree>
     <p:extLst>
       <p:ext uri="{BB962C8B-B14F-4D97-AF65-F5344CB8AC3E}">
-        <p14:creationId xmlns:p14="http://schemas.microsoft.com/office/powerpoint/2010/main" val="2179588301"/>
+        <p14:creationId xmlns:p14="http://schemas.microsoft.com/office/powerpoint/2010/main" val="4043140122"/>
       </p:ext>
     </p:extLst>
   </p:cSld>
@@ -6267,12 +6076,7 @@
             <p:ph type="title"/>
           </p:nvPr>
         </p:nvSpPr>
-        <p:spPr>
-          <a:xfrm>
-            <a:off x="965421" y="229953"/>
-            <a:ext cx="10515600" cy="1325563"/>
-          </a:xfrm>
-        </p:spPr>
+        <p:spPr/>
         <p:txBody>
           <a:bodyPr/>
           <a:lstStyle/>
@@ -6280,38 +6084,19 @@
             <a:pPr algn="ctr"/>
             <a:r>
               <a:rPr lang="zh-TW" altLang="en-US" dirty="0" smtClean="0"/>
-              <a:t>複製</a:t>
+              <a:t>置物櫃目前狀態</a:t>
             </a:r>
             <a:r>
               <a:rPr lang="en-US" altLang="zh-TW" dirty="0" smtClean="0"/>
-              <a:t>_id</a:t>
+              <a:t>(</a:t>
             </a:r>
             <a:r>
               <a:rPr lang="zh-TW" altLang="en-US" dirty="0" smtClean="0"/>
-              <a:t>並點擊</a:t>
+              <a:t>亮紅燈表鎖著</a:t>
             </a:r>
             <a:r>
               <a:rPr lang="en-US" altLang="zh-TW" dirty="0" smtClean="0"/>
-              <a:t>PAY THEN UNLOCK/</a:t>
-            </a:r>
-            <a:br>
-              <a:rPr lang="en-US" altLang="zh-TW" dirty="0" smtClean="0"/>
-            </a:br>
-            <a:r>
-              <a:rPr lang="zh-TW" altLang="en-US" dirty="0" smtClean="0"/>
-              <a:t>將訂單的</a:t>
-            </a:r>
-            <a:r>
-              <a:rPr lang="en-US" altLang="zh-TW" dirty="0" smtClean="0"/>
-              <a:t>_id</a:t>
-            </a:r>
-            <a:r>
-              <a:rPr lang="zh-TW" altLang="en-US" dirty="0" smtClean="0"/>
-              <a:t>貼到輸入框並</a:t>
-            </a:r>
-            <a:r>
-              <a:rPr lang="en-US" altLang="zh-TW" dirty="0" smtClean="0"/>
-              <a:t>submit</a:t>
+              <a:t>)</a:t>
             </a:r>
             <a:endParaRPr lang="zh-TW" altLang="en-US" dirty="0"/>
           </a:p>
@@ -6319,14 +6104,14 @@
       </p:sp>
       <p:pic>
         <p:nvPicPr>
-          <p:cNvPr id="5" name="圖片 4"/>
+          <p:cNvPr id="4" name="圖片 3"/>
           <p:cNvPicPr>
             <a:picLocks noChangeAspect="1"/>
           </p:cNvPicPr>
           <p:nvPr/>
         </p:nvPicPr>
         <p:blipFill>
-          <a:blip r:embed="rId2">
+          <a:blip r:embed="rId2" cstate="print">
             <a:extLst>
               <a:ext uri="{28A0092B-C50C-407E-A947-70E740481C1C}">
                 <a14:useLocalDpi xmlns:a14="http://schemas.microsoft.com/office/drawing/2010/main" val="0"/>
@@ -6339,38 +6124,8 @@
         </p:blipFill>
         <p:spPr>
           <a:xfrm>
-            <a:off x="0" y="1481628"/>
-            <a:ext cx="10058400" cy="4997435"/>
-          </a:xfrm>
-          <a:prstGeom prst="rect">
-            <a:avLst/>
-          </a:prstGeom>
-        </p:spPr>
-      </p:pic>
-      <p:pic>
-        <p:nvPicPr>
-          <p:cNvPr id="6" name="圖片 5"/>
-          <p:cNvPicPr>
-            <a:picLocks noChangeAspect="1"/>
-          </p:cNvPicPr>
-          <p:nvPr/>
-        </p:nvPicPr>
-        <p:blipFill>
-          <a:blip r:embed="rId3">
-            <a:extLst>
-              <a:ext uri="{28A0092B-C50C-407E-A947-70E740481C1C}">
-                <a14:useLocalDpi xmlns:a14="http://schemas.microsoft.com/office/drawing/2010/main" val="0"/>
-              </a:ext>
-            </a:extLst>
-          </a:blip>
-          <a:stretch>
-            <a:fillRect/>
-          </a:stretch>
-        </p:blipFill>
-        <p:spPr>
-          <a:xfrm>
-            <a:off x="4579951" y="2472748"/>
-            <a:ext cx="10058400" cy="4397896"/>
+            <a:off x="3824577" y="1441426"/>
+            <a:ext cx="4190337" cy="5416574"/>
           </a:xfrm>
           <a:prstGeom prst="rect">
             <a:avLst/>
@@ -6380,20 +6135,13 @@
     </p:spTree>
     <p:extLst>
       <p:ext uri="{BB962C8B-B14F-4D97-AF65-F5344CB8AC3E}">
-        <p14:creationId xmlns:p14="http://schemas.microsoft.com/office/powerpoint/2010/main" val="761964569"/>
+        <p14:creationId xmlns:p14="http://schemas.microsoft.com/office/powerpoint/2010/main" val="3589802492"/>
       </p:ext>
     </p:extLst>
   </p:cSld>
   <p:clrMapOvr>
     <a:masterClrMapping/>
   </p:clrMapOvr>
-  <p:timing>
-    <p:tnLst>
-      <p:par>
-        <p:cTn id="1" dur="indefinite" restart="never" nodeType="tmRoot"/>
-      </p:par>
-    </p:tnLst>
-  </p:timing>
 </p:sld>
 </file>
 
@@ -6416,37 +6164,44 @@
       </p:grpSpPr>
       <p:sp>
         <p:nvSpPr>
-          <p:cNvPr id="6" name="文字方塊 5"/>
-          <p:cNvSpPr txBox="1"/>
-          <p:nvPr/>
-        </p:nvSpPr>
-        <p:spPr>
-          <a:xfrm>
-            <a:off x="4158762" y="143123"/>
-            <a:ext cx="2236510" cy="707886"/>
-          </a:xfrm>
-          <a:prstGeom prst="rect">
-            <a:avLst/>
-          </a:prstGeom>
-          <a:noFill/>
-        </p:spPr>
-        <p:txBody>
-          <a:bodyPr wrap="none" rtlCol="0">
-            <a:spAutoFit/>
-          </a:bodyPr>
-          <a:lstStyle/>
-          <a:p>
-            <a:r>
-              <a:rPr lang="zh-TW" altLang="en-US" sz="4000" dirty="0" smtClean="0"/>
-              <a:t>尚未付款</a:t>
-            </a:r>
-            <a:endParaRPr lang="zh-TW" altLang="en-US" sz="4000" dirty="0"/>
+          <p:cNvPr id="2" name="標題 1"/>
+          <p:cNvSpPr>
+            <a:spLocks noGrp="1"/>
+          </p:cNvSpPr>
+          <p:nvPr>
+            <p:ph type="title"/>
+          </p:nvPr>
+        </p:nvSpPr>
+        <p:spPr>
+          <a:xfrm>
+            <a:off x="838200" y="333320"/>
+            <a:ext cx="10515600" cy="1325563"/>
+          </a:xfrm>
+        </p:spPr>
+        <p:txBody>
+          <a:bodyPr/>
+          <a:lstStyle/>
+          <a:p>
+            <a:pPr algn="ctr"/>
+            <a:r>
+              <a:rPr lang="zh-TW" altLang="en-US" dirty="0" smtClean="0"/>
+              <a:t>解鎖鈕出現</a:t>
+            </a:r>
+            <a:r>
+              <a:rPr lang="en-US" altLang="zh-TW" dirty="0" smtClean="0"/>
+              <a:t>/</a:t>
+            </a:r>
+            <a:r>
+              <a:rPr lang="zh-TW" altLang="en-US" dirty="0" smtClean="0"/>
+              <a:t>點擊後成功解鎖</a:t>
+            </a:r>
+            <a:endParaRPr lang="zh-TW" altLang="en-US" dirty="0"/>
           </a:p>
         </p:txBody>
       </p:sp>
       <p:pic>
         <p:nvPicPr>
-          <p:cNvPr id="5" name="圖片 4"/>
+          <p:cNvPr id="4" name="圖片 3"/>
           <p:cNvPicPr>
             <a:picLocks noChangeAspect="1"/>
           </p:cNvPicPr>
@@ -6466,8 +6221,8 @@
         </p:blipFill>
         <p:spPr>
           <a:xfrm>
-            <a:off x="-1351722" y="1196271"/>
-            <a:ext cx="10058400" cy="4918282"/>
+            <a:off x="127221" y="1903582"/>
+            <a:ext cx="10058400" cy="4327451"/>
           </a:xfrm>
           <a:prstGeom prst="rect">
             <a:avLst/>
@@ -6476,14 +6231,14 @@
       </p:pic>
       <p:pic>
         <p:nvPicPr>
-          <p:cNvPr id="4" name="圖片 3"/>
+          <p:cNvPr id="5" name="圖片 4"/>
           <p:cNvPicPr>
             <a:picLocks noChangeAspect="1"/>
           </p:cNvPicPr>
           <p:nvPr/>
         </p:nvPicPr>
         <p:blipFill>
-          <a:blip r:embed="rId3" cstate="print">
+          <a:blip r:embed="rId3">
             <a:extLst>
               <a:ext uri="{28A0092B-C50C-407E-A947-70E740481C1C}">
                 <a14:useLocalDpi xmlns:a14="http://schemas.microsoft.com/office/drawing/2010/main" val="0"/>
@@ -6496,8 +6251,8 @@
         </p:blipFill>
         <p:spPr>
           <a:xfrm>
-            <a:off x="6478390" y="497066"/>
-            <a:ext cx="5872636" cy="6124602"/>
+            <a:off x="4397071" y="2566625"/>
+            <a:ext cx="7720717" cy="4038120"/>
           </a:xfrm>
           <a:prstGeom prst="rect">
             <a:avLst/>
@@ -6507,20 +6262,13 @@
     </p:spTree>
     <p:extLst>
       <p:ext uri="{BB962C8B-B14F-4D97-AF65-F5344CB8AC3E}">
-        <p14:creationId xmlns:p14="http://schemas.microsoft.com/office/powerpoint/2010/main" val="274921796"/>
+        <p14:creationId xmlns:p14="http://schemas.microsoft.com/office/powerpoint/2010/main" val="3831750027"/>
       </p:ext>
     </p:extLst>
   </p:cSld>
   <p:clrMapOvr>
     <a:masterClrMapping/>
   </p:clrMapOvr>
-  <p:timing>
-    <p:tnLst>
-      <p:par>
-        <p:cTn id="1" dur="indefinite" restart="never" nodeType="tmRoot"/>
-      </p:par>
-    </p:tnLst>
-  </p:timing>
 </p:sld>
 </file>
 
@@ -6667,7 +6415,7 @@
         </p:nvSpPr>
         <p:spPr>
           <a:xfrm>
-            <a:off x="687125" y="102732"/>
+            <a:off x="838200" y="142488"/>
             <a:ext cx="10515600" cy="1325563"/>
           </a:xfrm>
         </p:spPr>
@@ -6678,7 +6426,19 @@
             <a:pPr algn="ctr"/>
             <a:r>
               <a:rPr lang="zh-TW" altLang="en-US" dirty="0" smtClean="0"/>
-              <a:t>確實是未付款</a:t>
+              <a:t>置物櫃解鎖後狀態</a:t>
+            </a:r>
+            <a:r>
+              <a:rPr lang="en-US" altLang="zh-TW" dirty="0" smtClean="0"/>
+              <a:t>(</a:t>
+            </a:r>
+            <a:r>
+              <a:rPr lang="zh-TW" altLang="en-US" dirty="0" smtClean="0"/>
+              <a:t>亮綠燈表解鎖</a:t>
+            </a:r>
+            <a:r>
+              <a:rPr lang="en-US" altLang="zh-TW" dirty="0" smtClean="0"/>
+              <a:t>)</a:t>
             </a:r>
             <a:endParaRPr lang="zh-TW" altLang="en-US" dirty="0"/>
           </a:p>
@@ -6686,14 +6446,14 @@
       </p:sp>
       <p:pic>
         <p:nvPicPr>
-          <p:cNvPr id="5" name="圖片 4"/>
+          <p:cNvPr id="4" name="圖片 3"/>
           <p:cNvPicPr>
             <a:picLocks noChangeAspect="1"/>
           </p:cNvPicPr>
           <p:nvPr/>
         </p:nvPicPr>
         <p:blipFill>
-          <a:blip r:embed="rId2">
+          <a:blip r:embed="rId2" cstate="print">
             <a:extLst>
               <a:ext uri="{28A0092B-C50C-407E-A947-70E740481C1C}">
                 <a14:useLocalDpi xmlns:a14="http://schemas.microsoft.com/office/drawing/2010/main" val="0"/>
@@ -6706,8 +6466,8 @@
         </p:blipFill>
         <p:spPr>
           <a:xfrm>
-            <a:off x="1359673" y="1287530"/>
-            <a:ext cx="10058400" cy="5015944"/>
+            <a:off x="4048540" y="1243611"/>
+            <a:ext cx="4094920" cy="5614389"/>
           </a:xfrm>
           <a:prstGeom prst="rect">
             <a:avLst/>
@@ -6717,20 +6477,13 @@
     </p:spTree>
     <p:extLst>
       <p:ext uri="{BB962C8B-B14F-4D97-AF65-F5344CB8AC3E}">
-        <p14:creationId xmlns:p14="http://schemas.microsoft.com/office/powerpoint/2010/main" val="2114422350"/>
+        <p14:creationId xmlns:p14="http://schemas.microsoft.com/office/powerpoint/2010/main" val="2328862406"/>
       </p:ext>
     </p:extLst>
   </p:cSld>
   <p:clrMapOvr>
     <a:masterClrMapping/>
   </p:clrMapOvr>
-  <p:timing>
-    <p:tnLst>
-      <p:par>
-        <p:cTn id="1" dur="indefinite" restart="never" nodeType="tmRoot"/>
-      </p:par>
-    </p:tnLst>
-  </p:timing>
 </p:sld>
 </file>
 
@@ -6763,492 +6516,44 @@
         </p:nvSpPr>
         <p:spPr>
           <a:xfrm>
-            <a:off x="687124" y="78697"/>
-            <a:ext cx="10508312" cy="1273260"/>
-          </a:xfrm>
-        </p:spPr>
-        <p:txBody>
-          <a:bodyPr>
-            <a:normAutofit fontScale="90000"/>
-          </a:bodyPr>
+            <a:off x="774588" y="35026"/>
+            <a:ext cx="10683241" cy="1325563"/>
+          </a:xfrm>
+        </p:spPr>
+        <p:txBody>
+          <a:bodyPr/>
           <a:lstStyle/>
           <a:p>
             <a:pPr algn="ctr"/>
             <a:r>
+              <a:rPr lang="zh-TW" altLang="en-US" dirty="0" smtClean="0"/>
+              <a:t>合約地址</a:t>
+            </a:r>
+            <a:r>
               <a:rPr lang="en-US" altLang="zh-TW" dirty="0" smtClean="0"/>
-              <a:t>Buy Record</a:t>
+              <a:t>-&gt;</a:t>
             </a:r>
             <a:r>
               <a:rPr lang="zh-TW" altLang="en-US" dirty="0" smtClean="0"/>
-              <a:t>中找到該訂單合約地址</a:t>
+              <a:t>訂單資訊</a:t>
             </a:r>
             <a:r>
               <a:rPr lang="en-US" altLang="zh-TW" dirty="0" smtClean="0"/>
-              <a:t>/</a:t>
-            </a:r>
-            <a:br>
+              <a:t>-&gt;</a:t>
+            </a:r>
+            <a:r>
+              <a:rPr lang="zh-TW" altLang="en-US" dirty="0" smtClean="0"/>
+              <a:t>買賣家錢包餘額變化</a:t>
+            </a:r>
+            <a:r>
               <a:rPr lang="en-US" altLang="zh-TW" dirty="0" smtClean="0"/>
-            </a:br>
+              <a:t>and</a:t>
+            </a:r>
             <a:r>
               <a:rPr lang="zh-TW" altLang="en-US" dirty="0" smtClean="0"/>
-              <a:t>貼到</a:t>
-            </a:r>
-            <a:r>
-              <a:rPr lang="en-US" altLang="zh-TW" dirty="0" smtClean="0"/>
-              <a:t>wallet</a:t>
-            </a:r>
-            <a:r>
-              <a:rPr lang="zh-TW" altLang="en-US" dirty="0" smtClean="0"/>
-              <a:t> </a:t>
-            </a:r>
-            <a:r>
-              <a:rPr lang="en-US" altLang="zh-TW" dirty="0" smtClean="0"/>
-              <a:t>for</a:t>
-            </a:r>
-            <a:r>
-              <a:rPr lang="zh-TW" altLang="en-US" dirty="0" smtClean="0"/>
-              <a:t> </a:t>
-            </a:r>
-            <a:r>
-              <a:rPr lang="en-US" altLang="zh-TW" dirty="0" err="1" smtClean="0"/>
-              <a:t>catchbo</a:t>
-            </a:r>
-            <a:r>
-              <a:rPr lang="zh-TW" altLang="en-US" dirty="0" smtClean="0"/>
-              <a:t>即可付款</a:t>
+              <a:t>合約餘額變化</a:t>
             </a:r>
             <a:endParaRPr lang="zh-TW" altLang="en-US" dirty="0"/>
-          </a:p>
-        </p:txBody>
-      </p:sp>
-      <p:pic>
-        <p:nvPicPr>
-          <p:cNvPr id="13" name="圖片 12"/>
-          <p:cNvPicPr>
-            <a:picLocks noChangeAspect="1"/>
-          </p:cNvPicPr>
-          <p:nvPr/>
-        </p:nvPicPr>
-        <p:blipFill>
-          <a:blip r:embed="rId2">
-            <a:extLst>
-              <a:ext uri="{28A0092B-C50C-407E-A947-70E740481C1C}">
-                <a14:useLocalDpi xmlns:a14="http://schemas.microsoft.com/office/drawing/2010/main" val="0"/>
-              </a:ext>
-            </a:extLst>
-          </a:blip>
-          <a:stretch>
-            <a:fillRect/>
-          </a:stretch>
-        </p:blipFill>
-        <p:spPr>
-          <a:xfrm>
-            <a:off x="0" y="1247774"/>
-            <a:ext cx="10058400" cy="5015944"/>
-          </a:xfrm>
-          <a:prstGeom prst="rect">
-            <a:avLst/>
-          </a:prstGeom>
-        </p:spPr>
-      </p:pic>
-      <p:pic>
-        <p:nvPicPr>
-          <p:cNvPr id="11" name="圖片 10"/>
-          <p:cNvPicPr>
-            <a:picLocks noChangeAspect="1"/>
-          </p:cNvPicPr>
-          <p:nvPr/>
-        </p:nvPicPr>
-        <p:blipFill>
-          <a:blip r:embed="rId3">
-            <a:extLst>
-              <a:ext uri="{28A0092B-C50C-407E-A947-70E740481C1C}">
-                <a14:useLocalDpi xmlns:a14="http://schemas.microsoft.com/office/drawing/2010/main" val="0"/>
-              </a:ext>
-            </a:extLst>
-          </a:blip>
-          <a:stretch>
-            <a:fillRect/>
-          </a:stretch>
-        </p:blipFill>
-        <p:spPr>
-          <a:xfrm>
-            <a:off x="7036904" y="1844749"/>
-            <a:ext cx="10058400" cy="5013251"/>
-          </a:xfrm>
-          <a:prstGeom prst="rect">
-            <a:avLst/>
-          </a:prstGeom>
-        </p:spPr>
-      </p:pic>
-    </p:spTree>
-    <p:extLst>
-      <p:ext uri="{BB962C8B-B14F-4D97-AF65-F5344CB8AC3E}">
-        <p14:creationId xmlns:p14="http://schemas.microsoft.com/office/powerpoint/2010/main" val="3523007913"/>
-      </p:ext>
-    </p:extLst>
-  </p:cSld>
-  <p:clrMapOvr>
-    <a:masterClrMapping/>
-  </p:clrMapOvr>
-  <p:timing>
-    <p:tnLst>
-      <p:par>
-        <p:cTn id="1" dur="indefinite" restart="never" nodeType="tmRoot"/>
-      </p:par>
-    </p:tnLst>
-  </p:timing>
-</p:sld>
-</file>
-
-<file path=ppt/slides/slide32.xml><?xml version="1.0" encoding="utf-8"?>
-<p:sld xmlns:a="http://schemas.openxmlformats.org/drawingml/2006/main" xmlns:r="http://schemas.openxmlformats.org/officeDocument/2006/relationships" xmlns:p="http://schemas.openxmlformats.org/presentationml/2006/main">
-  <p:cSld>
-    <p:spTree>
-      <p:nvGrpSpPr>
-        <p:cNvPr id="1" name=""/>
-        <p:cNvGrpSpPr/>
-        <p:nvPr/>
-      </p:nvGrpSpPr>
-      <p:grpSpPr>
-        <a:xfrm>
-          <a:off x="0" y="0"/>
-          <a:ext cx="0" cy="0"/>
-          <a:chOff x="0" y="0"/>
-          <a:chExt cx="0" cy="0"/>
-        </a:xfrm>
-      </p:grpSpPr>
-      <p:sp>
-        <p:nvSpPr>
-          <p:cNvPr id="2" name="標題 1"/>
-          <p:cNvSpPr>
-            <a:spLocks noGrp="1"/>
-          </p:cNvSpPr>
-          <p:nvPr>
-            <p:ph type="title"/>
-          </p:nvPr>
-        </p:nvSpPr>
-        <p:spPr>
-          <a:xfrm>
-            <a:off x="814346" y="0"/>
-            <a:ext cx="10515600" cy="839898"/>
-          </a:xfrm>
-        </p:spPr>
-        <p:txBody>
-          <a:bodyPr/>
-          <a:lstStyle/>
-          <a:p>
-            <a:pPr algn="ctr"/>
-            <a:r>
-              <a:rPr lang="zh-TW" altLang="en-US" dirty="0" smtClean="0"/>
-              <a:t>成功付款頁面</a:t>
-            </a:r>
-            <a:endParaRPr lang="zh-TW" altLang="en-US" dirty="0"/>
-          </a:p>
-        </p:txBody>
-      </p:sp>
-      <p:pic>
-        <p:nvPicPr>
-          <p:cNvPr id="5" name="圖片 4"/>
-          <p:cNvPicPr>
-            <a:picLocks noChangeAspect="1"/>
-          </p:cNvPicPr>
-          <p:nvPr/>
-        </p:nvPicPr>
-        <p:blipFill>
-          <a:blip r:embed="rId2">
-            <a:extLst>
-              <a:ext uri="{28A0092B-C50C-407E-A947-70E740481C1C}">
-                <a14:useLocalDpi xmlns:a14="http://schemas.microsoft.com/office/drawing/2010/main" val="0"/>
-              </a:ext>
-            </a:extLst>
-          </a:blip>
-          <a:stretch>
-            <a:fillRect/>
-          </a:stretch>
-        </p:blipFill>
-        <p:spPr>
-          <a:xfrm>
-            <a:off x="0" y="839898"/>
-            <a:ext cx="10058400" cy="4841168"/>
-          </a:xfrm>
-          <a:prstGeom prst="rect">
-            <a:avLst/>
-          </a:prstGeom>
-        </p:spPr>
-      </p:pic>
-      <p:pic>
-        <p:nvPicPr>
-          <p:cNvPr id="6" name="圖片 5"/>
-          <p:cNvPicPr>
-            <a:picLocks noChangeAspect="1"/>
-          </p:cNvPicPr>
-          <p:nvPr/>
-        </p:nvPicPr>
-        <p:blipFill>
-          <a:blip r:embed="rId3">
-            <a:extLst>
-              <a:ext uri="{28A0092B-C50C-407E-A947-70E740481C1C}">
-                <a14:useLocalDpi xmlns:a14="http://schemas.microsoft.com/office/drawing/2010/main" val="0"/>
-              </a:ext>
-            </a:extLst>
-          </a:blip>
-          <a:stretch>
-            <a:fillRect/>
-          </a:stretch>
-        </p:blipFill>
-        <p:spPr>
-          <a:xfrm>
-            <a:off x="4446147" y="3148717"/>
-            <a:ext cx="7745854" cy="3709283"/>
-          </a:xfrm>
-          <a:prstGeom prst="rect">
-            <a:avLst/>
-          </a:prstGeom>
-        </p:spPr>
-      </p:pic>
-    </p:spTree>
-    <p:extLst>
-      <p:ext uri="{BB962C8B-B14F-4D97-AF65-F5344CB8AC3E}">
-        <p14:creationId xmlns:p14="http://schemas.microsoft.com/office/powerpoint/2010/main" val="2664806659"/>
-      </p:ext>
-    </p:extLst>
-  </p:cSld>
-  <p:clrMapOvr>
-    <a:masterClrMapping/>
-  </p:clrMapOvr>
-  <p:timing>
-    <p:tnLst>
-      <p:par>
-        <p:cTn id="1" dur="indefinite" restart="never" nodeType="tmRoot"/>
-      </p:par>
-    </p:tnLst>
-  </p:timing>
-</p:sld>
-</file>
-
-<file path=ppt/slides/slide33.xml><?xml version="1.0" encoding="utf-8"?>
-<p:sld xmlns:a="http://schemas.openxmlformats.org/drawingml/2006/main" xmlns:r="http://schemas.openxmlformats.org/officeDocument/2006/relationships" xmlns:p="http://schemas.openxmlformats.org/presentationml/2006/main">
-  <p:cSld>
-    <p:spTree>
-      <p:nvGrpSpPr>
-        <p:cNvPr id="1" name=""/>
-        <p:cNvGrpSpPr/>
-        <p:nvPr/>
-      </p:nvGrpSpPr>
-      <p:grpSpPr>
-        <a:xfrm>
-          <a:off x="0" y="0"/>
-          <a:ext cx="0" cy="0"/>
-          <a:chOff x="0" y="0"/>
-          <a:chExt cx="0" cy="0"/>
-        </a:xfrm>
-      </p:grpSpPr>
-      <p:sp>
-        <p:nvSpPr>
-          <p:cNvPr id="2" name="標題 1"/>
-          <p:cNvSpPr>
-            <a:spLocks noGrp="1"/>
-          </p:cNvSpPr>
-          <p:nvPr>
-            <p:ph type="title"/>
-          </p:nvPr>
-        </p:nvSpPr>
-        <p:spPr>
-          <a:xfrm>
-            <a:off x="846151" y="0"/>
-            <a:ext cx="10515600" cy="1325563"/>
-          </a:xfrm>
-        </p:spPr>
-        <p:txBody>
-          <a:bodyPr>
-            <a:normAutofit/>
-          </a:bodyPr>
-          <a:lstStyle/>
-          <a:p>
-            <a:pPr algn="ctr"/>
-            <a:r>
-              <a:rPr lang="en-US" altLang="zh-TW" dirty="0" err="1" smtClean="0"/>
-              <a:t>moneyPaid</a:t>
-            </a:r>
-            <a:r>
-              <a:rPr lang="zh-TW" altLang="en-US" dirty="0" smtClean="0"/>
-              <a:t>變為</a:t>
-            </a:r>
-            <a:r>
-              <a:rPr lang="en-US" altLang="zh-TW" dirty="0" smtClean="0"/>
-              <a:t>true/</a:t>
-            </a:r>
-            <a:r>
-              <a:rPr lang="en-US" altLang="zh-TW" dirty="0"/>
-              <a:t/>
-            </a:r>
-            <a:br>
-              <a:rPr lang="en-US" altLang="zh-TW" dirty="0"/>
-            </a:br>
-            <a:r>
-              <a:rPr lang="zh-TW" altLang="en-US" dirty="0" smtClean="0"/>
-              <a:t>將已</a:t>
-            </a:r>
-            <a:r>
-              <a:rPr lang="zh-TW" altLang="en-US" dirty="0"/>
-              <a:t>付款</a:t>
-            </a:r>
-            <a:r>
-              <a:rPr lang="zh-TW" altLang="en-US" dirty="0" smtClean="0"/>
-              <a:t>訂單</a:t>
-            </a:r>
-            <a:r>
-              <a:rPr lang="zh-TW" altLang="en-US" dirty="0"/>
-              <a:t>的</a:t>
-            </a:r>
-            <a:r>
-              <a:rPr lang="en-US" altLang="zh-TW" dirty="0"/>
-              <a:t>_id</a:t>
-            </a:r>
-            <a:r>
-              <a:rPr lang="zh-TW" altLang="en-US" dirty="0"/>
-              <a:t>貼到輸入框並</a:t>
-            </a:r>
-            <a:r>
-              <a:rPr lang="en-US" altLang="zh-TW" dirty="0"/>
-              <a:t>submit</a:t>
-            </a:r>
-            <a:endParaRPr lang="zh-TW" altLang="en-US" dirty="0"/>
-          </a:p>
-        </p:txBody>
-      </p:sp>
-      <p:pic>
-        <p:nvPicPr>
-          <p:cNvPr id="14" name="圖片 13"/>
-          <p:cNvPicPr>
-            <a:picLocks noChangeAspect="1"/>
-          </p:cNvPicPr>
-          <p:nvPr/>
-        </p:nvPicPr>
-        <p:blipFill>
-          <a:blip r:embed="rId2">
-            <a:extLst>
-              <a:ext uri="{28A0092B-C50C-407E-A947-70E740481C1C}">
-                <a14:useLocalDpi xmlns:a14="http://schemas.microsoft.com/office/drawing/2010/main" val="0"/>
-              </a:ext>
-            </a:extLst>
-          </a:blip>
-          <a:stretch>
-            <a:fillRect/>
-          </a:stretch>
-        </p:blipFill>
-        <p:spPr>
-          <a:xfrm>
-            <a:off x="0" y="1325563"/>
-            <a:ext cx="10058400" cy="5005390"/>
-          </a:xfrm>
-          <a:prstGeom prst="rect">
-            <a:avLst/>
-          </a:prstGeom>
-        </p:spPr>
-      </p:pic>
-      <p:pic>
-        <p:nvPicPr>
-          <p:cNvPr id="15" name="圖片 14"/>
-          <p:cNvPicPr>
-            <a:picLocks noChangeAspect="1"/>
-          </p:cNvPicPr>
-          <p:nvPr/>
-        </p:nvPicPr>
-        <p:blipFill>
-          <a:blip r:embed="rId3">
-            <a:extLst>
-              <a:ext uri="{28A0092B-C50C-407E-A947-70E740481C1C}">
-                <a14:useLocalDpi xmlns:a14="http://schemas.microsoft.com/office/drawing/2010/main" val="0"/>
-              </a:ext>
-            </a:extLst>
-          </a:blip>
-          <a:stretch>
-            <a:fillRect/>
-          </a:stretch>
-        </p:blipFill>
-        <p:spPr>
-          <a:xfrm>
-            <a:off x="6332551" y="1622190"/>
-            <a:ext cx="10058400" cy="4412136"/>
-          </a:xfrm>
-          <a:prstGeom prst="rect">
-            <a:avLst/>
-          </a:prstGeom>
-        </p:spPr>
-      </p:pic>
-    </p:spTree>
-    <p:extLst>
-      <p:ext uri="{BB962C8B-B14F-4D97-AF65-F5344CB8AC3E}">
-        <p14:creationId xmlns:p14="http://schemas.microsoft.com/office/powerpoint/2010/main" val="2398518547"/>
-      </p:ext>
-    </p:extLst>
-  </p:cSld>
-  <p:clrMapOvr>
-    <a:masterClrMapping/>
-  </p:clrMapOvr>
-  <p:timing>
-    <p:tnLst>
-      <p:par>
-        <p:cTn id="1" dur="indefinite" restart="never" nodeType="tmRoot"/>
-      </p:par>
-    </p:tnLst>
-  </p:timing>
-</p:sld>
-</file>
-
-<file path=ppt/slides/slide34.xml><?xml version="1.0" encoding="utf-8"?>
-<p:sld xmlns:a="http://schemas.openxmlformats.org/drawingml/2006/main" xmlns:r="http://schemas.openxmlformats.org/officeDocument/2006/relationships" xmlns:p="http://schemas.openxmlformats.org/presentationml/2006/main">
-  <p:cSld>
-    <p:spTree>
-      <p:nvGrpSpPr>
-        <p:cNvPr id="1" name=""/>
-        <p:cNvGrpSpPr/>
-        <p:nvPr/>
-      </p:nvGrpSpPr>
-      <p:grpSpPr>
-        <a:xfrm>
-          <a:off x="0" y="0"/>
-          <a:ext cx="0" cy="0"/>
-          <a:chOff x="0" y="0"/>
-          <a:chExt cx="0" cy="0"/>
-        </a:xfrm>
-      </p:grpSpPr>
-      <p:sp>
-        <p:nvSpPr>
-          <p:cNvPr id="6" name="文字方塊 5"/>
-          <p:cNvSpPr txBox="1"/>
-          <p:nvPr/>
-        </p:nvSpPr>
-        <p:spPr>
-          <a:xfrm>
-            <a:off x="1823617" y="142904"/>
-            <a:ext cx="5213287" cy="707886"/>
-          </a:xfrm>
-          <a:prstGeom prst="rect">
-            <a:avLst/>
-          </a:prstGeom>
-          <a:noFill/>
-        </p:spPr>
-        <p:txBody>
-          <a:bodyPr wrap="none" rtlCol="0">
-            <a:spAutoFit/>
-          </a:bodyPr>
-          <a:lstStyle/>
-          <a:p>
-            <a:r>
-              <a:rPr lang="en-US" altLang="zh-TW" sz="4000" dirty="0" smtClean="0"/>
-              <a:t>submit</a:t>
-            </a:r>
-            <a:r>
-              <a:rPr lang="zh-TW" altLang="en-US" sz="4000" dirty="0" smtClean="0"/>
-              <a:t>後頁面點擊解</a:t>
-            </a:r>
-            <a:r>
-              <a:rPr lang="zh-TW" altLang="en-US" sz="4000" dirty="0"/>
-              <a:t>鎖</a:t>
-            </a:r>
           </a:p>
         </p:txBody>
       </p:sp>
@@ -7274,38 +6579,8 @@
         </p:blipFill>
         <p:spPr>
           <a:xfrm>
-            <a:off x="0" y="896766"/>
-            <a:ext cx="10058400" cy="5233690"/>
-          </a:xfrm>
-          <a:prstGeom prst="rect">
-            <a:avLst/>
-          </a:prstGeom>
-        </p:spPr>
-      </p:pic>
-      <p:pic>
-        <p:nvPicPr>
-          <p:cNvPr id="5" name="圖片 4"/>
-          <p:cNvPicPr>
-            <a:picLocks noChangeAspect="1"/>
-          </p:cNvPicPr>
-          <p:nvPr/>
-        </p:nvPicPr>
-        <p:blipFill>
-          <a:blip r:embed="rId3">
-            <a:extLst>
-              <a:ext uri="{28A0092B-C50C-407E-A947-70E740481C1C}">
-                <a14:useLocalDpi xmlns:a14="http://schemas.microsoft.com/office/drawing/2010/main" val="0"/>
-              </a:ext>
-            </a:extLst>
-          </a:blip>
-          <a:stretch>
-            <a:fillRect/>
-          </a:stretch>
-        </p:blipFill>
-        <p:spPr>
-          <a:xfrm>
-            <a:off x="7036904" y="496847"/>
-            <a:ext cx="4909548" cy="6128839"/>
+            <a:off x="2072449" y="1226332"/>
+            <a:ext cx="8237934" cy="5631668"/>
           </a:xfrm>
           <a:prstGeom prst="rect">
             <a:avLst/>
@@ -7315,24 +6590,17 @@
     </p:spTree>
     <p:extLst>
       <p:ext uri="{BB962C8B-B14F-4D97-AF65-F5344CB8AC3E}">
-        <p14:creationId xmlns:p14="http://schemas.microsoft.com/office/powerpoint/2010/main" val="1910811663"/>
+        <p14:creationId xmlns:p14="http://schemas.microsoft.com/office/powerpoint/2010/main" val="1428218204"/>
       </p:ext>
     </p:extLst>
   </p:cSld>
   <p:clrMapOvr>
     <a:masterClrMapping/>
   </p:clrMapOvr>
-  <p:timing>
-    <p:tnLst>
-      <p:par>
-        <p:cTn id="1" dur="indefinite" restart="never" nodeType="tmRoot"/>
-      </p:par>
-    </p:tnLst>
-  </p:timing>
 </p:sld>
 </file>
 
-<file path=ppt/slides/slide35.xml><?xml version="1.0" encoding="utf-8"?>
+<file path=ppt/slides/slide32.xml><?xml version="1.0" encoding="utf-8"?>
 <p:sld xmlns:a="http://schemas.openxmlformats.org/drawingml/2006/main" xmlns:r="http://schemas.openxmlformats.org/officeDocument/2006/relationships" xmlns:p="http://schemas.openxmlformats.org/presentationml/2006/main">
   <p:cSld>
     <p:spTree>
@@ -7714,11 +6982,7 @@
             </a:r>
             <a:r>
               <a:rPr lang="zh-TW" altLang="en-US" dirty="0" smtClean="0"/>
-              <a:t>類別</a:t>
-            </a:r>
-            <a:r>
-              <a:rPr lang="zh-TW" altLang="en-US" dirty="0" smtClean="0"/>
-              <a:t>圖</a:t>
+              <a:t>類別圖</a:t>
             </a:r>
             <a:endParaRPr lang="zh-TW" altLang="en-US" dirty="0"/>
           </a:p>
@@ -7726,7 +6990,7 @@
       </p:sp>
       <p:pic>
         <p:nvPicPr>
-          <p:cNvPr id="6" name="圖片 5"/>
+          <p:cNvPr id="5" name="圖片 4"/>
           <p:cNvPicPr>
             <a:picLocks noChangeAspect="1"/>
           </p:cNvPicPr>
@@ -7746,8 +7010,8 @@
         </p:blipFill>
         <p:spPr>
           <a:xfrm>
-            <a:off x="0" y="572493"/>
-            <a:ext cx="12192000" cy="6460435"/>
+            <a:off x="0" y="566794"/>
+            <a:ext cx="12192000" cy="6291206"/>
           </a:xfrm>
           <a:prstGeom prst="rect">
             <a:avLst/>

</xml_diff>